<commit_message>
Creación del proyecto base. Cambios menores en el análisis. Adaptación de los riesgos para incluirlos en el proyecto.
</commit_message>
<xml_diff>
--- a/Diseños/aquitectura.pptx
+++ b/Diseños/aquitectura.pptx
@@ -9,6 +9,7 @@
     <p:sldId id="259" r:id="rId3"/>
     <p:sldId id="257" r:id="rId4"/>
     <p:sldId id="258" r:id="rId5"/>
+    <p:sldId id="260" r:id="rId6"/>
   </p:sldIdLst>
   <p:sldSz cx="12192000" cy="6858000"/>
   <p:notesSz cx="6858000" cy="9144000"/>
@@ -262,7 +263,7 @@
           <a:p>
             <a:fld id="{3E1544B7-206C-4EA6-AC0C-B0859B395411}" type="datetimeFigureOut">
               <a:rPr lang="es-ES" smtClean="0"/>
-              <a:t>29/03/2022</a:t>
+              <a:t>08/04/2022</a:t>
             </a:fld>
             <a:endParaRPr lang="es-ES"/>
           </a:p>
@@ -460,7 +461,7 @@
           <a:p>
             <a:fld id="{3E1544B7-206C-4EA6-AC0C-B0859B395411}" type="datetimeFigureOut">
               <a:rPr lang="es-ES" smtClean="0"/>
-              <a:t>29/03/2022</a:t>
+              <a:t>08/04/2022</a:t>
             </a:fld>
             <a:endParaRPr lang="es-ES"/>
           </a:p>
@@ -668,7 +669,7 @@
           <a:p>
             <a:fld id="{3E1544B7-206C-4EA6-AC0C-B0859B395411}" type="datetimeFigureOut">
               <a:rPr lang="es-ES" smtClean="0"/>
-              <a:t>29/03/2022</a:t>
+              <a:t>08/04/2022</a:t>
             </a:fld>
             <a:endParaRPr lang="es-ES"/>
           </a:p>
@@ -866,7 +867,7 @@
           <a:p>
             <a:fld id="{3E1544B7-206C-4EA6-AC0C-B0859B395411}" type="datetimeFigureOut">
               <a:rPr lang="es-ES" smtClean="0"/>
-              <a:t>29/03/2022</a:t>
+              <a:t>08/04/2022</a:t>
             </a:fld>
             <a:endParaRPr lang="es-ES"/>
           </a:p>
@@ -1141,7 +1142,7 @@
           <a:p>
             <a:fld id="{3E1544B7-206C-4EA6-AC0C-B0859B395411}" type="datetimeFigureOut">
               <a:rPr lang="es-ES" smtClean="0"/>
-              <a:t>29/03/2022</a:t>
+              <a:t>08/04/2022</a:t>
             </a:fld>
             <a:endParaRPr lang="es-ES"/>
           </a:p>
@@ -1406,7 +1407,7 @@
           <a:p>
             <a:fld id="{3E1544B7-206C-4EA6-AC0C-B0859B395411}" type="datetimeFigureOut">
               <a:rPr lang="es-ES" smtClean="0"/>
-              <a:t>29/03/2022</a:t>
+              <a:t>08/04/2022</a:t>
             </a:fld>
             <a:endParaRPr lang="es-ES"/>
           </a:p>
@@ -1818,7 +1819,7 @@
           <a:p>
             <a:fld id="{3E1544B7-206C-4EA6-AC0C-B0859B395411}" type="datetimeFigureOut">
               <a:rPr lang="es-ES" smtClean="0"/>
-              <a:t>29/03/2022</a:t>
+              <a:t>08/04/2022</a:t>
             </a:fld>
             <a:endParaRPr lang="es-ES"/>
           </a:p>
@@ -1959,7 +1960,7 @@
           <a:p>
             <a:fld id="{3E1544B7-206C-4EA6-AC0C-B0859B395411}" type="datetimeFigureOut">
               <a:rPr lang="es-ES" smtClean="0"/>
-              <a:t>29/03/2022</a:t>
+              <a:t>08/04/2022</a:t>
             </a:fld>
             <a:endParaRPr lang="es-ES"/>
           </a:p>
@@ -2072,7 +2073,7 @@
           <a:p>
             <a:fld id="{3E1544B7-206C-4EA6-AC0C-B0859B395411}" type="datetimeFigureOut">
               <a:rPr lang="es-ES" smtClean="0"/>
-              <a:t>29/03/2022</a:t>
+              <a:t>08/04/2022</a:t>
             </a:fld>
             <a:endParaRPr lang="es-ES"/>
           </a:p>
@@ -2383,7 +2384,7 @@
           <a:p>
             <a:fld id="{3E1544B7-206C-4EA6-AC0C-B0859B395411}" type="datetimeFigureOut">
               <a:rPr lang="es-ES" smtClean="0"/>
-              <a:t>29/03/2022</a:t>
+              <a:t>08/04/2022</a:t>
             </a:fld>
             <a:endParaRPr lang="es-ES"/>
           </a:p>
@@ -2671,7 +2672,7 @@
           <a:p>
             <a:fld id="{3E1544B7-206C-4EA6-AC0C-B0859B395411}" type="datetimeFigureOut">
               <a:rPr lang="es-ES" smtClean="0"/>
-              <a:t>29/03/2022</a:t>
+              <a:t>08/04/2022</a:t>
             </a:fld>
             <a:endParaRPr lang="es-ES"/>
           </a:p>
@@ -2912,7 +2913,7 @@
           <a:p>
             <a:fld id="{3E1544B7-206C-4EA6-AC0C-B0859B395411}" type="datetimeFigureOut">
               <a:rPr lang="es-ES" smtClean="0"/>
-              <a:t>29/03/2022</a:t>
+              <a:t>08/04/2022</a:t>
             </a:fld>
             <a:endParaRPr lang="es-ES"/>
           </a:p>
@@ -8336,6 +8337,647 @@
 </p:sld>
 </file>
 
+<file path=ppt/slides/slide5.xml><?xml version="1.0" encoding="utf-8"?>
+<p:sld xmlns:a="http://schemas.openxmlformats.org/drawingml/2006/main" xmlns:r="http://schemas.openxmlformats.org/officeDocument/2006/relationships" xmlns:p="http://schemas.openxmlformats.org/presentationml/2006/main">
+  <p:cSld>
+    <p:spTree>
+      <p:nvGrpSpPr>
+        <p:cNvPr id="1" name=""/>
+        <p:cNvGrpSpPr/>
+        <p:nvPr/>
+      </p:nvGrpSpPr>
+      <p:grpSpPr>
+        <a:xfrm>
+          <a:off x="0" y="0"/>
+          <a:ext cx="0" cy="0"/>
+          <a:chOff x="0" y="0"/>
+          <a:chExt cx="0" cy="0"/>
+        </a:xfrm>
+      </p:grpSpPr>
+      <p:cxnSp>
+        <p:nvCxnSpPr>
+          <p:cNvPr id="7" name="Conector recto 6">
+            <a:extLst>
+              <a:ext uri="{FF2B5EF4-FFF2-40B4-BE49-F238E27FC236}">
+                <a16:creationId xmlns:a16="http://schemas.microsoft.com/office/drawing/2014/main" id="{5ACB792A-9F93-4898-BD8A-EFA3E1B365FE}"/>
+              </a:ext>
+            </a:extLst>
+          </p:cNvPr>
+          <p:cNvCxnSpPr/>
+          <p:nvPr/>
+        </p:nvCxnSpPr>
+        <p:spPr>
+          <a:xfrm flipV="1">
+            <a:off x="630316" y="3142695"/>
+            <a:ext cx="372862" cy="1953088"/>
+          </a:xfrm>
+          <a:prstGeom prst="line">
+            <a:avLst/>
+          </a:prstGeom>
+          <a:ln w="76200">
+            <a:solidFill>
+              <a:srgbClr val="00B050"/>
+            </a:solidFill>
+          </a:ln>
+        </p:spPr>
+        <p:style>
+          <a:lnRef idx="1">
+            <a:schemeClr val="accent1"/>
+          </a:lnRef>
+          <a:fillRef idx="0">
+            <a:schemeClr val="accent1"/>
+          </a:fillRef>
+          <a:effectRef idx="0">
+            <a:schemeClr val="accent1"/>
+          </a:effectRef>
+          <a:fontRef idx="minor">
+            <a:schemeClr val="tx1"/>
+          </a:fontRef>
+        </p:style>
+      </p:cxnSp>
+      <p:sp>
+        <p:nvSpPr>
+          <p:cNvPr id="8" name="Diagrama de flujo: terminador 7">
+            <a:extLst>
+              <a:ext uri="{FF2B5EF4-FFF2-40B4-BE49-F238E27FC236}">
+                <a16:creationId xmlns:a16="http://schemas.microsoft.com/office/drawing/2014/main" id="{B7319775-2292-4047-BAD4-17D53EE583EB}"/>
+              </a:ext>
+            </a:extLst>
+          </p:cNvPr>
+          <p:cNvSpPr/>
+          <p:nvPr/>
+        </p:nvSpPr>
+        <p:spPr>
+          <a:xfrm rot="17656331">
+            <a:off x="1872064" y="2640511"/>
+            <a:ext cx="3240000" cy="468000"/>
+          </a:xfrm>
+          <a:prstGeom prst="flowChartTerminator">
+            <a:avLst/>
+          </a:prstGeom>
+          <a:solidFill>
+            <a:srgbClr val="00B050"/>
+          </a:solidFill>
+          <a:ln>
+            <a:noFill/>
+          </a:ln>
+        </p:spPr>
+        <p:style>
+          <a:lnRef idx="2">
+            <a:schemeClr val="accent1">
+              <a:shade val="50000"/>
+            </a:schemeClr>
+          </a:lnRef>
+          <a:fillRef idx="1">
+            <a:schemeClr val="accent1"/>
+          </a:fillRef>
+          <a:effectRef idx="0">
+            <a:schemeClr val="accent1"/>
+          </a:effectRef>
+          <a:fontRef idx="minor">
+            <a:schemeClr val="lt1"/>
+          </a:fontRef>
+        </p:style>
+        <p:txBody>
+          <a:bodyPr rtlCol="0" anchor="ctr"/>
+          <a:lstStyle/>
+          <a:p>
+            <a:pPr algn="ctr"/>
+            <a:endParaRPr lang="es-ES"/>
+          </a:p>
+        </p:txBody>
+      </p:sp>
+      <p:sp>
+        <p:nvSpPr>
+          <p:cNvPr id="11" name="Diagrama de flujo: terminador 10">
+            <a:extLst>
+              <a:ext uri="{FF2B5EF4-FFF2-40B4-BE49-F238E27FC236}">
+                <a16:creationId xmlns:a16="http://schemas.microsoft.com/office/drawing/2014/main" id="{F6F8413A-04FE-4A77-B02F-E57A9103A404}"/>
+              </a:ext>
+            </a:extLst>
+          </p:cNvPr>
+          <p:cNvSpPr/>
+          <p:nvPr/>
+        </p:nvSpPr>
+        <p:spPr>
+          <a:xfrm rot="3943669" flipV="1">
+            <a:off x="4476000" y="2640510"/>
+            <a:ext cx="3240000" cy="468000"/>
+          </a:xfrm>
+          <a:prstGeom prst="flowChartTerminator">
+            <a:avLst/>
+          </a:prstGeom>
+          <a:solidFill>
+            <a:srgbClr val="00B050"/>
+          </a:solidFill>
+          <a:ln>
+            <a:noFill/>
+          </a:ln>
+        </p:spPr>
+        <p:style>
+          <a:lnRef idx="2">
+            <a:schemeClr val="accent1">
+              <a:shade val="50000"/>
+            </a:schemeClr>
+          </a:lnRef>
+          <a:fillRef idx="1">
+            <a:schemeClr val="accent1"/>
+          </a:fillRef>
+          <a:effectRef idx="0">
+            <a:schemeClr val="accent1"/>
+          </a:effectRef>
+          <a:fontRef idx="minor">
+            <a:schemeClr val="lt1"/>
+          </a:fontRef>
+        </p:style>
+        <p:txBody>
+          <a:bodyPr rtlCol="0" anchor="ctr"/>
+          <a:lstStyle/>
+          <a:p>
+            <a:pPr algn="ctr"/>
+            <a:endParaRPr lang="es-ES"/>
+          </a:p>
+        </p:txBody>
+      </p:sp>
+      <p:sp>
+        <p:nvSpPr>
+          <p:cNvPr id="12" name="Diagrama de flujo: terminador 11">
+            <a:extLst>
+              <a:ext uri="{FF2B5EF4-FFF2-40B4-BE49-F238E27FC236}">
+                <a16:creationId xmlns:a16="http://schemas.microsoft.com/office/drawing/2014/main" id="{40B20B8C-5A84-4EC2-A639-7E57C49238DE}"/>
+              </a:ext>
+            </a:extLst>
+          </p:cNvPr>
+          <p:cNvSpPr/>
+          <p:nvPr/>
+        </p:nvSpPr>
+        <p:spPr>
+          <a:xfrm rot="3307078" flipV="1">
+            <a:off x="3712435" y="1797311"/>
+            <a:ext cx="1571638" cy="468000"/>
+          </a:xfrm>
+          <a:prstGeom prst="flowChartTerminator">
+            <a:avLst/>
+          </a:prstGeom>
+          <a:solidFill>
+            <a:srgbClr val="00B050"/>
+          </a:solidFill>
+          <a:ln>
+            <a:noFill/>
+          </a:ln>
+        </p:spPr>
+        <p:style>
+          <a:lnRef idx="2">
+            <a:schemeClr val="accent1">
+              <a:shade val="50000"/>
+            </a:schemeClr>
+          </a:lnRef>
+          <a:fillRef idx="1">
+            <a:schemeClr val="accent1"/>
+          </a:fillRef>
+          <a:effectRef idx="0">
+            <a:schemeClr val="accent1"/>
+          </a:effectRef>
+          <a:fontRef idx="minor">
+            <a:schemeClr val="lt1"/>
+          </a:fontRef>
+        </p:style>
+        <p:txBody>
+          <a:bodyPr rtlCol="0" anchor="ctr"/>
+          <a:lstStyle/>
+          <a:p>
+            <a:pPr algn="ctr"/>
+            <a:endParaRPr lang="es-ES"/>
+          </a:p>
+        </p:txBody>
+      </p:sp>
+      <p:sp>
+        <p:nvSpPr>
+          <p:cNvPr id="13" name="Diagrama de flujo: terminador 12">
+            <a:extLst>
+              <a:ext uri="{FF2B5EF4-FFF2-40B4-BE49-F238E27FC236}">
+                <a16:creationId xmlns:a16="http://schemas.microsoft.com/office/drawing/2014/main" id="{B885B247-2387-4D89-ACB6-245038026DED}"/>
+              </a:ext>
+            </a:extLst>
+          </p:cNvPr>
+          <p:cNvSpPr/>
+          <p:nvPr/>
+        </p:nvSpPr>
+        <p:spPr>
+          <a:xfrm rot="18292922" flipH="1" flipV="1">
+            <a:off x="4353793" y="1797311"/>
+            <a:ext cx="1571638" cy="468000"/>
+          </a:xfrm>
+          <a:prstGeom prst="flowChartTerminator">
+            <a:avLst/>
+          </a:prstGeom>
+          <a:solidFill>
+            <a:srgbClr val="00B050"/>
+          </a:solidFill>
+          <a:ln>
+            <a:noFill/>
+          </a:ln>
+        </p:spPr>
+        <p:style>
+          <a:lnRef idx="2">
+            <a:schemeClr val="accent1">
+              <a:shade val="50000"/>
+            </a:schemeClr>
+          </a:lnRef>
+          <a:fillRef idx="1">
+            <a:schemeClr val="accent1"/>
+          </a:fillRef>
+          <a:effectRef idx="0">
+            <a:schemeClr val="accent1"/>
+          </a:effectRef>
+          <a:fontRef idx="minor">
+            <a:schemeClr val="lt1"/>
+          </a:fontRef>
+        </p:style>
+        <p:txBody>
+          <a:bodyPr rtlCol="0" anchor="ctr"/>
+          <a:lstStyle/>
+          <a:p>
+            <a:pPr algn="ctr"/>
+            <a:endParaRPr lang="es-ES"/>
+          </a:p>
+        </p:txBody>
+      </p:sp>
+      <p:sp>
+        <p:nvSpPr>
+          <p:cNvPr id="14" name="CuadroTexto 13">
+            <a:extLst>
+              <a:ext uri="{FF2B5EF4-FFF2-40B4-BE49-F238E27FC236}">
+                <a16:creationId xmlns:a16="http://schemas.microsoft.com/office/drawing/2014/main" id="{B61D92F8-6DB0-4584-AA67-CBC06F98844D}"/>
+              </a:ext>
+            </a:extLst>
+          </p:cNvPr>
+          <p:cNvSpPr txBox="1"/>
+          <p:nvPr/>
+        </p:nvSpPr>
+        <p:spPr>
+          <a:xfrm>
+            <a:off x="10048435" y="4248809"/>
+            <a:ext cx="1349406" cy="1569660"/>
+          </a:xfrm>
+          <a:prstGeom prst="rect">
+            <a:avLst/>
+          </a:prstGeom>
+          <a:noFill/>
+        </p:spPr>
+        <p:txBody>
+          <a:bodyPr wrap="square" rtlCol="0">
+            <a:spAutoFit/>
+          </a:bodyPr>
+          <a:lstStyle/>
+          <a:p>
+            <a:r>
+              <a:rPr lang="es-ES" sz="9600" dirty="0">
+                <a:latin typeface="MS Reference Sans Serif" panose="020B0604030504040204" pitchFamily="34" charset="0"/>
+                <a:ea typeface="Cambria Math" panose="02040503050406030204" pitchFamily="18" charset="0"/>
+                <a:cs typeface="Lao UI" panose="020B0604020202020204" pitchFamily="34" charset="0"/>
+              </a:rPr>
+              <a:t>M</a:t>
+            </a:r>
+          </a:p>
+        </p:txBody>
+      </p:sp>
+      <p:sp>
+        <p:nvSpPr>
+          <p:cNvPr id="15" name="CuadroTexto 14">
+            <a:extLst>
+              <a:ext uri="{FF2B5EF4-FFF2-40B4-BE49-F238E27FC236}">
+                <a16:creationId xmlns:a16="http://schemas.microsoft.com/office/drawing/2014/main" id="{BE095718-8487-43F8-8EFE-B587140ED356}"/>
+              </a:ext>
+            </a:extLst>
+          </p:cNvPr>
+          <p:cNvSpPr txBox="1"/>
+          <p:nvPr/>
+        </p:nvSpPr>
+        <p:spPr>
+          <a:xfrm>
+            <a:off x="10412419" y="3142695"/>
+            <a:ext cx="1349406" cy="769441"/>
+          </a:xfrm>
+          <a:prstGeom prst="rect">
+            <a:avLst/>
+          </a:prstGeom>
+          <a:noFill/>
+        </p:spPr>
+        <p:txBody>
+          <a:bodyPr wrap="square" rtlCol="0">
+            <a:spAutoFit/>
+          </a:bodyPr>
+          <a:lstStyle/>
+          <a:p>
+            <a:r>
+              <a:rPr lang="es-ES" sz="4400" dirty="0">
+                <a:latin typeface="MS Reference Sans Serif" panose="020B0604030504040204" pitchFamily="34" charset="0"/>
+                <a:ea typeface="Cambria Math" panose="02040503050406030204" pitchFamily="18" charset="0"/>
+                <a:cs typeface="Lao UI" panose="020B0604020202020204" pitchFamily="34" charset="0"/>
+              </a:rPr>
+              <a:t>M</a:t>
+            </a:r>
+          </a:p>
+        </p:txBody>
+      </p:sp>
+      <p:sp>
+        <p:nvSpPr>
+          <p:cNvPr id="16" name="CuadroTexto 15">
+            <a:extLst>
+              <a:ext uri="{FF2B5EF4-FFF2-40B4-BE49-F238E27FC236}">
+                <a16:creationId xmlns:a16="http://schemas.microsoft.com/office/drawing/2014/main" id="{8AEEF1A0-F27C-4D1C-8D82-8D435D0EA679}"/>
+              </a:ext>
+            </a:extLst>
+          </p:cNvPr>
+          <p:cNvSpPr txBox="1"/>
+          <p:nvPr/>
+        </p:nvSpPr>
+        <p:spPr>
+          <a:xfrm>
+            <a:off x="7504748" y="2089680"/>
+            <a:ext cx="1349406" cy="1569660"/>
+          </a:xfrm>
+          <a:prstGeom prst="rect">
+            <a:avLst/>
+          </a:prstGeom>
+          <a:solidFill>
+            <a:schemeClr val="bg1">
+              <a:lumMod val="95000"/>
+            </a:schemeClr>
+          </a:solidFill>
+          <a:ln>
+            <a:noFill/>
+          </a:ln>
+        </p:spPr>
+        <p:txBody>
+          <a:bodyPr wrap="square" rtlCol="0">
+            <a:spAutoFit/>
+          </a:bodyPr>
+          <a:lstStyle/>
+          <a:p>
+            <a:pPr algn="ctr"/>
+            <a:r>
+              <a:rPr lang="es-ES" sz="9600" dirty="0">
+                <a:ln>
+                  <a:solidFill>
+                    <a:schemeClr val="tx1">
+                      <a:lumMod val="65000"/>
+                      <a:lumOff val="35000"/>
+                    </a:schemeClr>
+                  </a:solidFill>
+                </a:ln>
+                <a:solidFill>
+                  <a:srgbClr val="0099FF"/>
+                </a:solidFill>
+                <a:effectLst>
+                  <a:innerShdw blurRad="63500" dist="50800" dir="2700000">
+                    <a:prstClr val="black">
+                      <a:alpha val="50000"/>
+                    </a:prstClr>
+                  </a:innerShdw>
+                </a:effectLst>
+                <a:latin typeface="Gill Sans MT" panose="020B0502020104020203" pitchFamily="34" charset="0"/>
+                <a:ea typeface="Cambria Math" panose="02040503050406030204" pitchFamily="18" charset="0"/>
+                <a:cs typeface="Lao UI" panose="020B0604020202020204" pitchFamily="34" charset="0"/>
+              </a:rPr>
+              <a:t>M</a:t>
+            </a:r>
+          </a:p>
+        </p:txBody>
+      </p:sp>
+      <p:sp>
+        <p:nvSpPr>
+          <p:cNvPr id="17" name="CuadroTexto 16">
+            <a:extLst>
+              <a:ext uri="{FF2B5EF4-FFF2-40B4-BE49-F238E27FC236}">
+                <a16:creationId xmlns:a16="http://schemas.microsoft.com/office/drawing/2014/main" id="{A1B28C98-A22A-4FA7-A54D-7B63621849F1}"/>
+              </a:ext>
+            </a:extLst>
+          </p:cNvPr>
+          <p:cNvSpPr txBox="1"/>
+          <p:nvPr/>
+        </p:nvSpPr>
+        <p:spPr>
+          <a:xfrm>
+            <a:off x="7504748" y="2775600"/>
+            <a:ext cx="1349405" cy="707886"/>
+          </a:xfrm>
+          <a:prstGeom prst="rect">
+            <a:avLst/>
+          </a:prstGeom>
+          <a:noFill/>
+        </p:spPr>
+        <p:txBody>
+          <a:bodyPr wrap="square" rtlCol="0">
+            <a:spAutoFit/>
+          </a:bodyPr>
+          <a:lstStyle/>
+          <a:p>
+            <a:pPr algn="ctr"/>
+            <a:r>
+              <a:rPr lang="es-ES" sz="4000" dirty="0">
+                <a:ln>
+                  <a:solidFill>
+                    <a:schemeClr val="tx1">
+                      <a:lumMod val="65000"/>
+                      <a:lumOff val="35000"/>
+                    </a:schemeClr>
+                  </a:solidFill>
+                </a:ln>
+                <a:solidFill>
+                  <a:srgbClr val="00B0F0"/>
+                </a:solidFill>
+                <a:effectLst>
+                  <a:innerShdw blurRad="63500" dist="50800" dir="18900000">
+                    <a:prstClr val="black">
+                      <a:alpha val="50000"/>
+                    </a:prstClr>
+                  </a:innerShdw>
+                </a:effectLst>
+                <a:latin typeface="Gill Sans MT" panose="020B0502020104020203" pitchFamily="34" charset="0"/>
+                <a:ea typeface="Cambria Math" panose="02040503050406030204" pitchFamily="18" charset="0"/>
+                <a:cs typeface="Lao UI" panose="020B0604020202020204" pitchFamily="34" charset="0"/>
+              </a:rPr>
+              <a:t>M</a:t>
+            </a:r>
+          </a:p>
+        </p:txBody>
+      </p:sp>
+      <p:sp>
+        <p:nvSpPr>
+          <p:cNvPr id="22" name="CuadroTexto 21">
+            <a:extLst>
+              <a:ext uri="{FF2B5EF4-FFF2-40B4-BE49-F238E27FC236}">
+                <a16:creationId xmlns:a16="http://schemas.microsoft.com/office/drawing/2014/main" id="{89CA6447-2D98-4196-A672-3F04AC85E69B}"/>
+              </a:ext>
+            </a:extLst>
+          </p:cNvPr>
+          <p:cNvSpPr txBox="1"/>
+          <p:nvPr/>
+        </p:nvSpPr>
+        <p:spPr>
+          <a:xfrm>
+            <a:off x="10144316" y="1059558"/>
+            <a:ext cx="1349406" cy="1569660"/>
+          </a:xfrm>
+          <a:prstGeom prst="rect">
+            <a:avLst/>
+          </a:prstGeom>
+          <a:noFill/>
+          <a:ln>
+            <a:solidFill>
+              <a:schemeClr val="tx1"/>
+            </a:solidFill>
+          </a:ln>
+        </p:spPr>
+        <p:txBody>
+          <a:bodyPr wrap="square" rtlCol="0">
+            <a:spAutoFit/>
+          </a:bodyPr>
+          <a:lstStyle/>
+          <a:p>
+            <a:pPr algn="ctr"/>
+            <a:r>
+              <a:rPr lang="es-ES" sz="9600" dirty="0">
+                <a:latin typeface="Gill Sans MT" panose="020B0502020104020203" pitchFamily="34" charset="0"/>
+                <a:ea typeface="Cambria Math" panose="02040503050406030204" pitchFamily="18" charset="0"/>
+                <a:cs typeface="Lao UI" panose="020B0604020202020204" pitchFamily="34" charset="0"/>
+              </a:rPr>
+              <a:t>M</a:t>
+            </a:r>
+          </a:p>
+        </p:txBody>
+      </p:sp>
+      <p:sp>
+        <p:nvSpPr>
+          <p:cNvPr id="23" name="CuadroTexto 22">
+            <a:extLst>
+              <a:ext uri="{FF2B5EF4-FFF2-40B4-BE49-F238E27FC236}">
+                <a16:creationId xmlns:a16="http://schemas.microsoft.com/office/drawing/2014/main" id="{040C1C51-AD37-4408-902E-027B525F3CFC}"/>
+              </a:ext>
+            </a:extLst>
+          </p:cNvPr>
+          <p:cNvSpPr txBox="1"/>
+          <p:nvPr/>
+        </p:nvSpPr>
+        <p:spPr>
+          <a:xfrm>
+            <a:off x="10144316" y="1745478"/>
+            <a:ext cx="1349405" cy="707886"/>
+          </a:xfrm>
+          <a:prstGeom prst="rect">
+            <a:avLst/>
+          </a:prstGeom>
+          <a:noFill/>
+        </p:spPr>
+        <p:txBody>
+          <a:bodyPr wrap="square" rtlCol="0">
+            <a:spAutoFit/>
+          </a:bodyPr>
+          <a:lstStyle/>
+          <a:p>
+            <a:pPr algn="ctr"/>
+            <a:r>
+              <a:rPr lang="es-ES" sz="4000" dirty="0">
+                <a:latin typeface="Gill Sans MT" panose="020B0502020104020203" pitchFamily="34" charset="0"/>
+                <a:ea typeface="Cambria Math" panose="02040503050406030204" pitchFamily="18" charset="0"/>
+                <a:cs typeface="Lao UI" panose="020B0604020202020204" pitchFamily="34" charset="0"/>
+              </a:rPr>
+              <a:t>M</a:t>
+            </a:r>
+          </a:p>
+        </p:txBody>
+      </p:sp>
+      <p:cxnSp>
+        <p:nvCxnSpPr>
+          <p:cNvPr id="24" name="Conector recto 23">
+            <a:extLst>
+              <a:ext uri="{FF2B5EF4-FFF2-40B4-BE49-F238E27FC236}">
+                <a16:creationId xmlns:a16="http://schemas.microsoft.com/office/drawing/2014/main" id="{14487049-4C66-4F4C-9981-AE6E573A9594}"/>
+              </a:ext>
+            </a:extLst>
+          </p:cNvPr>
+          <p:cNvCxnSpPr>
+            <a:cxnSpLocks/>
+          </p:cNvCxnSpPr>
+          <p:nvPr/>
+        </p:nvCxnSpPr>
+        <p:spPr>
+          <a:xfrm>
+            <a:off x="10144316" y="2276958"/>
+            <a:ext cx="1349405" cy="0"/>
+          </a:xfrm>
+          <a:prstGeom prst="line">
+            <a:avLst/>
+          </a:prstGeom>
+        </p:spPr>
+        <p:style>
+          <a:lnRef idx="1">
+            <a:schemeClr val="accent1"/>
+          </a:lnRef>
+          <a:fillRef idx="0">
+            <a:schemeClr val="accent1"/>
+          </a:fillRef>
+          <a:effectRef idx="0">
+            <a:schemeClr val="accent1"/>
+          </a:effectRef>
+          <a:fontRef idx="minor">
+            <a:schemeClr val="tx1"/>
+          </a:fontRef>
+        </p:style>
+      </p:cxnSp>
+      <p:cxnSp>
+        <p:nvCxnSpPr>
+          <p:cNvPr id="25" name="Conector recto 24">
+            <a:extLst>
+              <a:ext uri="{FF2B5EF4-FFF2-40B4-BE49-F238E27FC236}">
+                <a16:creationId xmlns:a16="http://schemas.microsoft.com/office/drawing/2014/main" id="{45284A8E-17CB-4630-BE29-2E0CC9AA4909}"/>
+              </a:ext>
+            </a:extLst>
+          </p:cNvPr>
+          <p:cNvCxnSpPr>
+            <a:cxnSpLocks/>
+          </p:cNvCxnSpPr>
+          <p:nvPr/>
+        </p:nvCxnSpPr>
+        <p:spPr>
+          <a:xfrm>
+            <a:off x="10144315" y="1442568"/>
+            <a:ext cx="1349405" cy="0"/>
+          </a:xfrm>
+          <a:prstGeom prst="line">
+            <a:avLst/>
+          </a:prstGeom>
+        </p:spPr>
+        <p:style>
+          <a:lnRef idx="1">
+            <a:schemeClr val="accent1"/>
+          </a:lnRef>
+          <a:fillRef idx="0">
+            <a:schemeClr val="accent1"/>
+          </a:fillRef>
+          <a:effectRef idx="0">
+            <a:schemeClr val="accent1"/>
+          </a:effectRef>
+          <a:fontRef idx="minor">
+            <a:schemeClr val="tx1"/>
+          </a:fontRef>
+        </p:style>
+      </p:cxnSp>
+    </p:spTree>
+    <p:extLst>
+      <p:ext uri="{BB962C8B-B14F-4D97-AF65-F5344CB8AC3E}">
+        <p14:creationId xmlns:p14="http://schemas.microsoft.com/office/powerpoint/2010/main" val="136269441"/>
+      </p:ext>
+    </p:extLst>
+  </p:cSld>
+  <p:clrMapOvr>
+    <a:masterClrMapping/>
+  </p:clrMapOvr>
+</p:sld>
+</file>
+
 <file path=ppt/theme/theme1.xml><?xml version="1.0" encoding="utf-8"?>
 <a:theme xmlns:a="http://schemas.openxmlformats.org/drawingml/2006/main" name="Tema de Office">
   <a:themeElements>

</xml_diff>

<commit_message>
Inserción de la funcionalidad de registro con validación por correo.
</commit_message>
<xml_diff>
--- a/Diseños/aquitectura.pptx
+++ b/Diseños/aquitectura.pptx
@@ -263,7 +263,7 @@
           <a:p>
             <a:fld id="{3E1544B7-206C-4EA6-AC0C-B0859B395411}" type="datetimeFigureOut">
               <a:rPr lang="es-ES" smtClean="0"/>
-              <a:t>08/04/2022</a:t>
+              <a:t>15/04/2022</a:t>
             </a:fld>
             <a:endParaRPr lang="es-ES"/>
           </a:p>
@@ -461,7 +461,7 @@
           <a:p>
             <a:fld id="{3E1544B7-206C-4EA6-AC0C-B0859B395411}" type="datetimeFigureOut">
               <a:rPr lang="es-ES" smtClean="0"/>
-              <a:t>08/04/2022</a:t>
+              <a:t>15/04/2022</a:t>
             </a:fld>
             <a:endParaRPr lang="es-ES"/>
           </a:p>
@@ -669,7 +669,7 @@
           <a:p>
             <a:fld id="{3E1544B7-206C-4EA6-AC0C-B0859B395411}" type="datetimeFigureOut">
               <a:rPr lang="es-ES" smtClean="0"/>
-              <a:t>08/04/2022</a:t>
+              <a:t>15/04/2022</a:t>
             </a:fld>
             <a:endParaRPr lang="es-ES"/>
           </a:p>
@@ -867,7 +867,7 @@
           <a:p>
             <a:fld id="{3E1544B7-206C-4EA6-AC0C-B0859B395411}" type="datetimeFigureOut">
               <a:rPr lang="es-ES" smtClean="0"/>
-              <a:t>08/04/2022</a:t>
+              <a:t>15/04/2022</a:t>
             </a:fld>
             <a:endParaRPr lang="es-ES"/>
           </a:p>
@@ -1142,7 +1142,7 @@
           <a:p>
             <a:fld id="{3E1544B7-206C-4EA6-AC0C-B0859B395411}" type="datetimeFigureOut">
               <a:rPr lang="es-ES" smtClean="0"/>
-              <a:t>08/04/2022</a:t>
+              <a:t>15/04/2022</a:t>
             </a:fld>
             <a:endParaRPr lang="es-ES"/>
           </a:p>
@@ -1407,7 +1407,7 @@
           <a:p>
             <a:fld id="{3E1544B7-206C-4EA6-AC0C-B0859B395411}" type="datetimeFigureOut">
               <a:rPr lang="es-ES" smtClean="0"/>
-              <a:t>08/04/2022</a:t>
+              <a:t>15/04/2022</a:t>
             </a:fld>
             <a:endParaRPr lang="es-ES"/>
           </a:p>
@@ -1819,7 +1819,7 @@
           <a:p>
             <a:fld id="{3E1544B7-206C-4EA6-AC0C-B0859B395411}" type="datetimeFigureOut">
               <a:rPr lang="es-ES" smtClean="0"/>
-              <a:t>08/04/2022</a:t>
+              <a:t>15/04/2022</a:t>
             </a:fld>
             <a:endParaRPr lang="es-ES"/>
           </a:p>
@@ -1960,7 +1960,7 @@
           <a:p>
             <a:fld id="{3E1544B7-206C-4EA6-AC0C-B0859B395411}" type="datetimeFigureOut">
               <a:rPr lang="es-ES" smtClean="0"/>
-              <a:t>08/04/2022</a:t>
+              <a:t>15/04/2022</a:t>
             </a:fld>
             <a:endParaRPr lang="es-ES"/>
           </a:p>
@@ -2073,7 +2073,7 @@
           <a:p>
             <a:fld id="{3E1544B7-206C-4EA6-AC0C-B0859B395411}" type="datetimeFigureOut">
               <a:rPr lang="es-ES" smtClean="0"/>
-              <a:t>08/04/2022</a:t>
+              <a:t>15/04/2022</a:t>
             </a:fld>
             <a:endParaRPr lang="es-ES"/>
           </a:p>
@@ -2384,7 +2384,7 @@
           <a:p>
             <a:fld id="{3E1544B7-206C-4EA6-AC0C-B0859B395411}" type="datetimeFigureOut">
               <a:rPr lang="es-ES" smtClean="0"/>
-              <a:t>08/04/2022</a:t>
+              <a:t>15/04/2022</a:t>
             </a:fld>
             <a:endParaRPr lang="es-ES"/>
           </a:p>
@@ -2672,7 +2672,7 @@
           <a:p>
             <a:fld id="{3E1544B7-206C-4EA6-AC0C-B0859B395411}" type="datetimeFigureOut">
               <a:rPr lang="es-ES" smtClean="0"/>
-              <a:t>08/04/2022</a:t>
+              <a:t>15/04/2022</a:t>
             </a:fld>
             <a:endParaRPr lang="es-ES"/>
           </a:p>
@@ -2913,7 +2913,7 @@
           <a:p>
             <a:fld id="{3E1544B7-206C-4EA6-AC0C-B0859B395411}" type="datetimeFigureOut">
               <a:rPr lang="es-ES" smtClean="0"/>
-              <a:t>08/04/2022</a:t>
+              <a:t>15/04/2022</a:t>
             </a:fld>
             <a:endParaRPr lang="es-ES"/>
           </a:p>
@@ -4634,41 +4634,6 @@
       </p:sp>
       <p:sp>
         <p:nvSpPr>
-          <p:cNvPr id="65" name="CuadroTexto 64">
-            <a:extLst>
-              <a:ext uri="{FF2B5EF4-FFF2-40B4-BE49-F238E27FC236}">
-                <a16:creationId xmlns:a16="http://schemas.microsoft.com/office/drawing/2014/main" id="{BAEB2906-3795-4495-9BDC-F18A7F71D4FD}"/>
-              </a:ext>
-            </a:extLst>
-          </p:cNvPr>
-          <p:cNvSpPr txBox="1"/>
-          <p:nvPr/>
-        </p:nvSpPr>
-        <p:spPr>
-          <a:xfrm>
-            <a:off x="10622597" y="569962"/>
-            <a:ext cx="1125706" cy="261610"/>
-          </a:xfrm>
-          <a:prstGeom prst="rect">
-            <a:avLst/>
-          </a:prstGeom>
-          <a:noFill/>
-        </p:spPr>
-        <p:txBody>
-          <a:bodyPr wrap="square" rtlCol="0">
-            <a:spAutoFit/>
-          </a:bodyPr>
-          <a:lstStyle/>
-          <a:p>
-            <a:r>
-              <a:rPr lang="es-ES" sz="1100" dirty="0"/>
-              <a:t>PostgreSQL</a:t>
-            </a:r>
-          </a:p>
-        </p:txBody>
-      </p:sp>
-      <p:sp>
-        <p:nvSpPr>
           <p:cNvPr id="66" name="CuadroTexto 65">
             <a:extLst>
               <a:ext uri="{FF2B5EF4-FFF2-40B4-BE49-F238E27FC236}">
@@ -4949,8 +4914,8 @@
         </p:blipFill>
         <p:spPr>
           <a:xfrm>
-            <a:off x="2428088" y="1898103"/>
-            <a:ext cx="889248" cy="889248"/>
+            <a:off x="2244336" y="1837233"/>
+            <a:ext cx="764777" cy="764777"/>
           </a:xfrm>
           <a:prstGeom prst="rect">
             <a:avLst/>
@@ -4985,7 +4950,7 @@
         </p:blipFill>
         <p:spPr>
           <a:xfrm>
-            <a:off x="5241850" y="5301094"/>
+            <a:off x="5362247" y="5185353"/>
             <a:ext cx="938764" cy="938764"/>
           </a:xfrm>
           <a:prstGeom prst="rect">
@@ -5165,8 +5130,8 @@
         </p:blipFill>
         <p:spPr>
           <a:xfrm>
-            <a:off x="5202549" y="2070731"/>
-            <a:ext cx="770880" cy="772422"/>
+            <a:off x="5629215" y="1962588"/>
+            <a:ext cx="539558" cy="540637"/>
           </a:xfrm>
           <a:prstGeom prst="rect">
             <a:avLst/>
@@ -5237,8 +5202,539 @@
         </p:blipFill>
         <p:spPr>
           <a:xfrm>
-            <a:off x="8309124" y="3618342"/>
+            <a:off x="6707930" y="3645076"/>
             <a:ext cx="686783" cy="686783"/>
+          </a:xfrm>
+          <a:prstGeom prst="rect">
+            <a:avLst/>
+          </a:prstGeom>
+        </p:spPr>
+      </p:pic>
+      <p:sp>
+        <p:nvSpPr>
+          <p:cNvPr id="50" name="Rectángulo 49">
+            <a:extLst>
+              <a:ext uri="{FF2B5EF4-FFF2-40B4-BE49-F238E27FC236}">
+                <a16:creationId xmlns:a16="http://schemas.microsoft.com/office/drawing/2014/main" id="{9C6F46A1-3D04-4DDB-8BF5-DA90AE38DA42}"/>
+              </a:ext>
+            </a:extLst>
+          </p:cNvPr>
+          <p:cNvSpPr/>
+          <p:nvPr/>
+        </p:nvSpPr>
+        <p:spPr>
+          <a:xfrm>
+            <a:off x="10168078" y="3118938"/>
+            <a:ext cx="1439121" cy="1212921"/>
+          </a:xfrm>
+          <a:prstGeom prst="rect">
+            <a:avLst/>
+          </a:prstGeom>
+          <a:noFill/>
+          <a:ln w="28575">
+            <a:solidFill>
+              <a:schemeClr val="tx1"/>
+            </a:solidFill>
+          </a:ln>
+        </p:spPr>
+        <p:style>
+          <a:lnRef idx="2">
+            <a:schemeClr val="accent1">
+              <a:shade val="50000"/>
+            </a:schemeClr>
+          </a:lnRef>
+          <a:fillRef idx="1">
+            <a:schemeClr val="accent1"/>
+          </a:fillRef>
+          <a:effectRef idx="0">
+            <a:schemeClr val="accent1"/>
+          </a:effectRef>
+          <a:fontRef idx="minor">
+            <a:schemeClr val="lt1"/>
+          </a:fontRef>
+        </p:style>
+        <p:txBody>
+          <a:bodyPr rtlCol="0" anchor="ctr"/>
+          <a:lstStyle/>
+          <a:p>
+            <a:pPr algn="ctr"/>
+            <a:endParaRPr lang="es-ES" dirty="0"/>
+          </a:p>
+        </p:txBody>
+      </p:sp>
+      <p:sp>
+        <p:nvSpPr>
+          <p:cNvPr id="51" name="CuadroTexto 50">
+            <a:extLst>
+              <a:ext uri="{FF2B5EF4-FFF2-40B4-BE49-F238E27FC236}">
+                <a16:creationId xmlns:a16="http://schemas.microsoft.com/office/drawing/2014/main" id="{31665F2D-4AEE-4403-8601-637282CE6866}"/>
+              </a:ext>
+            </a:extLst>
+          </p:cNvPr>
+          <p:cNvSpPr txBox="1"/>
+          <p:nvPr/>
+        </p:nvSpPr>
+        <p:spPr>
+          <a:xfrm>
+            <a:off x="10145576" y="3092730"/>
+            <a:ext cx="1580225" cy="369332"/>
+          </a:xfrm>
+          <a:prstGeom prst="rect">
+            <a:avLst/>
+          </a:prstGeom>
+          <a:noFill/>
+        </p:spPr>
+        <p:txBody>
+          <a:bodyPr wrap="square" rtlCol="0">
+            <a:spAutoFit/>
+          </a:bodyPr>
+          <a:lstStyle/>
+          <a:p>
+            <a:r>
+              <a:rPr lang="es-ES" dirty="0"/>
+              <a:t>Servidor email</a:t>
+            </a:r>
+          </a:p>
+        </p:txBody>
+      </p:sp>
+      <p:pic>
+        <p:nvPicPr>
+          <p:cNvPr id="16" name="Imagen 15" descr="Logotipo&#10;&#10;Descripción generada automáticamente">
+            <a:extLst>
+              <a:ext uri="{FF2B5EF4-FFF2-40B4-BE49-F238E27FC236}">
+                <a16:creationId xmlns:a16="http://schemas.microsoft.com/office/drawing/2014/main" id="{08F3CDB9-A39B-42AA-A08C-B8074EE967C9}"/>
+              </a:ext>
+            </a:extLst>
+          </p:cNvPr>
+          <p:cNvPicPr>
+            <a:picLocks noChangeAspect="1"/>
+          </p:cNvPicPr>
+          <p:nvPr/>
+        </p:nvPicPr>
+        <p:blipFill>
+          <a:blip r:embed="rId16">
+            <a:extLst>
+              <a:ext uri="{28A0092B-C50C-407E-A947-70E740481C1C}">
+                <a14:useLocalDpi xmlns:a14="http://schemas.microsoft.com/office/drawing/2010/main" val="0"/>
+              </a:ext>
+            </a:extLst>
+          </a:blip>
+          <a:stretch>
+            <a:fillRect/>
+          </a:stretch>
+        </p:blipFill>
+        <p:spPr>
+          <a:xfrm>
+            <a:off x="8375840" y="3740502"/>
+            <a:ext cx="600548" cy="609556"/>
+          </a:xfrm>
+          <a:prstGeom prst="rect">
+            <a:avLst/>
+          </a:prstGeom>
+        </p:spPr>
+      </p:pic>
+      <p:sp>
+        <p:nvSpPr>
+          <p:cNvPr id="57" name="Rectángulo 56">
+            <a:extLst>
+              <a:ext uri="{FF2B5EF4-FFF2-40B4-BE49-F238E27FC236}">
+                <a16:creationId xmlns:a16="http://schemas.microsoft.com/office/drawing/2014/main" id="{50889BA1-7107-43AC-8ED1-0168DEC32A82}"/>
+              </a:ext>
+            </a:extLst>
+          </p:cNvPr>
+          <p:cNvSpPr/>
+          <p:nvPr/>
+        </p:nvSpPr>
+        <p:spPr>
+          <a:xfrm>
+            <a:off x="8262542" y="3694278"/>
+            <a:ext cx="783804" cy="655780"/>
+          </a:xfrm>
+          <a:prstGeom prst="rect">
+            <a:avLst/>
+          </a:prstGeom>
+          <a:noFill/>
+          <a:ln w="28575">
+            <a:solidFill>
+              <a:schemeClr val="tx1"/>
+            </a:solidFill>
+          </a:ln>
+        </p:spPr>
+        <p:style>
+          <a:lnRef idx="2">
+            <a:schemeClr val="accent1">
+              <a:shade val="50000"/>
+            </a:schemeClr>
+          </a:lnRef>
+          <a:fillRef idx="1">
+            <a:schemeClr val="accent1"/>
+          </a:fillRef>
+          <a:effectRef idx="0">
+            <a:schemeClr val="accent1"/>
+          </a:effectRef>
+          <a:fontRef idx="minor">
+            <a:schemeClr val="lt1"/>
+          </a:fontRef>
+        </p:style>
+        <p:txBody>
+          <a:bodyPr rtlCol="0" anchor="ctr"/>
+          <a:lstStyle/>
+          <a:p>
+            <a:pPr algn="ctr"/>
+            <a:endParaRPr lang="es-ES" dirty="0"/>
+          </a:p>
+        </p:txBody>
+      </p:sp>
+      <p:cxnSp>
+        <p:nvCxnSpPr>
+          <p:cNvPr id="59" name="Conector recto de flecha 58">
+            <a:extLst>
+              <a:ext uri="{FF2B5EF4-FFF2-40B4-BE49-F238E27FC236}">
+                <a16:creationId xmlns:a16="http://schemas.microsoft.com/office/drawing/2014/main" id="{ED390E8C-83D3-411A-B97E-2D11BE1771E5}"/>
+              </a:ext>
+            </a:extLst>
+          </p:cNvPr>
+          <p:cNvCxnSpPr>
+            <a:cxnSpLocks/>
+            <a:stCxn id="57" idx="3"/>
+            <a:endCxn id="50" idx="1"/>
+          </p:cNvCxnSpPr>
+          <p:nvPr/>
+        </p:nvCxnSpPr>
+        <p:spPr>
+          <a:xfrm flipV="1">
+            <a:off x="9046346" y="3725399"/>
+            <a:ext cx="1121732" cy="296769"/>
+          </a:xfrm>
+          <a:prstGeom prst="straightConnector1">
+            <a:avLst/>
+          </a:prstGeom>
+          <a:ln>
+            <a:headEnd type="none" w="med" len="med"/>
+            <a:tailEnd type="triangle" w="med" len="med"/>
+          </a:ln>
+        </p:spPr>
+        <p:style>
+          <a:lnRef idx="1">
+            <a:schemeClr val="dk1"/>
+          </a:lnRef>
+          <a:fillRef idx="0">
+            <a:schemeClr val="dk1"/>
+          </a:fillRef>
+          <a:effectRef idx="0">
+            <a:schemeClr val="dk1"/>
+          </a:effectRef>
+          <a:fontRef idx="minor">
+            <a:schemeClr val="tx1"/>
+          </a:fontRef>
+        </p:style>
+      </p:cxnSp>
+      <p:pic>
+        <p:nvPicPr>
+          <p:cNvPr id="30" name="Imagen 29" descr="Icono&#10;&#10;Descripción generada automáticamente">
+            <a:extLst>
+              <a:ext uri="{FF2B5EF4-FFF2-40B4-BE49-F238E27FC236}">
+                <a16:creationId xmlns:a16="http://schemas.microsoft.com/office/drawing/2014/main" id="{D7133743-1C46-4337-919F-CBB88A4A6459}"/>
+              </a:ext>
+            </a:extLst>
+          </p:cNvPr>
+          <p:cNvPicPr>
+            <a:picLocks noChangeAspect="1"/>
+          </p:cNvPicPr>
+          <p:nvPr/>
+        </p:nvPicPr>
+        <p:blipFill>
+          <a:blip r:embed="rId17">
+            <a:extLst>
+              <a:ext uri="{28A0092B-C50C-407E-A947-70E740481C1C}">
+                <a14:useLocalDpi xmlns:a14="http://schemas.microsoft.com/office/drawing/2010/main" val="0"/>
+              </a:ext>
+            </a:extLst>
+          </a:blip>
+          <a:stretch>
+            <a:fillRect/>
+          </a:stretch>
+        </p:blipFill>
+        <p:spPr>
+          <a:xfrm>
+            <a:off x="10427393" y="3260282"/>
+            <a:ext cx="920489" cy="920489"/>
+          </a:xfrm>
+          <a:prstGeom prst="rect">
+            <a:avLst/>
+          </a:prstGeom>
+        </p:spPr>
+      </p:pic>
+      <p:sp>
+        <p:nvSpPr>
+          <p:cNvPr id="60" name="CuadroTexto 59">
+            <a:extLst>
+              <a:ext uri="{FF2B5EF4-FFF2-40B4-BE49-F238E27FC236}">
+                <a16:creationId xmlns:a16="http://schemas.microsoft.com/office/drawing/2014/main" id="{71BBD71F-BDDD-42A9-A397-F7B857AF37A1}"/>
+              </a:ext>
+            </a:extLst>
+          </p:cNvPr>
+          <p:cNvSpPr txBox="1"/>
+          <p:nvPr/>
+        </p:nvSpPr>
+        <p:spPr>
+          <a:xfrm>
+            <a:off x="10395337" y="4024082"/>
+            <a:ext cx="1580225" cy="307777"/>
+          </a:xfrm>
+          <a:prstGeom prst="rect">
+            <a:avLst/>
+          </a:prstGeom>
+          <a:noFill/>
+        </p:spPr>
+        <p:txBody>
+          <a:bodyPr wrap="square" rtlCol="0">
+            <a:spAutoFit/>
+          </a:bodyPr>
+          <a:lstStyle/>
+          <a:p>
+            <a:r>
+              <a:rPr lang="es-ES" sz="1400" dirty="0">
+                <a:solidFill>
+                  <a:srgbClr val="0070C0"/>
+                </a:solidFill>
+              </a:rPr>
+              <a:t>Gmail SMTP</a:t>
+            </a:r>
+          </a:p>
+        </p:txBody>
+      </p:sp>
+      <p:sp>
+        <p:nvSpPr>
+          <p:cNvPr id="61" name="CuadroTexto 60">
+            <a:extLst>
+              <a:ext uri="{FF2B5EF4-FFF2-40B4-BE49-F238E27FC236}">
+                <a16:creationId xmlns:a16="http://schemas.microsoft.com/office/drawing/2014/main" id="{E576F930-A713-4F1D-BB3B-009FB281A4A8}"/>
+              </a:ext>
+            </a:extLst>
+          </p:cNvPr>
+          <p:cNvSpPr txBox="1"/>
+          <p:nvPr/>
+        </p:nvSpPr>
+        <p:spPr>
+          <a:xfrm>
+            <a:off x="5436722" y="6119145"/>
+            <a:ext cx="1580225" cy="307777"/>
+          </a:xfrm>
+          <a:prstGeom prst="rect">
+            <a:avLst/>
+          </a:prstGeom>
+          <a:noFill/>
+        </p:spPr>
+        <p:txBody>
+          <a:bodyPr wrap="square" rtlCol="0">
+            <a:spAutoFit/>
+          </a:bodyPr>
+          <a:lstStyle/>
+          <a:p>
+            <a:r>
+              <a:rPr lang="es-ES" sz="1400" dirty="0" err="1">
+                <a:solidFill>
+                  <a:srgbClr val="0070C0"/>
+                </a:solidFill>
+              </a:rPr>
+              <a:t>Ejabberd</a:t>
+            </a:r>
+            <a:endParaRPr lang="es-ES" sz="1400" dirty="0">
+              <a:solidFill>
+                <a:srgbClr val="0070C0"/>
+              </a:solidFill>
+            </a:endParaRPr>
+          </a:p>
+        </p:txBody>
+      </p:sp>
+      <p:sp>
+        <p:nvSpPr>
+          <p:cNvPr id="68" name="CuadroTexto 67">
+            <a:extLst>
+              <a:ext uri="{FF2B5EF4-FFF2-40B4-BE49-F238E27FC236}">
+                <a16:creationId xmlns:a16="http://schemas.microsoft.com/office/drawing/2014/main" id="{403BC9A9-41BB-4242-8F26-1E83B2BBC132}"/>
+              </a:ext>
+            </a:extLst>
+          </p:cNvPr>
+          <p:cNvSpPr txBox="1"/>
+          <p:nvPr/>
+        </p:nvSpPr>
+        <p:spPr>
+          <a:xfrm>
+            <a:off x="2107290" y="2542557"/>
+            <a:ext cx="1580225" cy="307777"/>
+          </a:xfrm>
+          <a:prstGeom prst="rect">
+            <a:avLst/>
+          </a:prstGeom>
+          <a:noFill/>
+        </p:spPr>
+        <p:txBody>
+          <a:bodyPr wrap="square" rtlCol="0">
+            <a:spAutoFit/>
+          </a:bodyPr>
+          <a:lstStyle/>
+          <a:p>
+            <a:r>
+              <a:rPr lang="es-ES" sz="1400" dirty="0">
+                <a:solidFill>
+                  <a:srgbClr val="0070C0"/>
+                </a:solidFill>
+              </a:rPr>
+              <a:t>Converse.js</a:t>
+            </a:r>
+          </a:p>
+        </p:txBody>
+      </p:sp>
+      <p:sp>
+        <p:nvSpPr>
+          <p:cNvPr id="69" name="CuadroTexto 68">
+            <a:extLst>
+              <a:ext uri="{FF2B5EF4-FFF2-40B4-BE49-F238E27FC236}">
+                <a16:creationId xmlns:a16="http://schemas.microsoft.com/office/drawing/2014/main" id="{82B34917-E804-4679-870F-B2C8240D070E}"/>
+              </a:ext>
+            </a:extLst>
+          </p:cNvPr>
+          <p:cNvSpPr txBox="1"/>
+          <p:nvPr/>
+        </p:nvSpPr>
+        <p:spPr>
+          <a:xfrm>
+            <a:off x="9144483" y="3449654"/>
+            <a:ext cx="1125706" cy="261610"/>
+          </a:xfrm>
+          <a:prstGeom prst="rect">
+            <a:avLst/>
+          </a:prstGeom>
+          <a:noFill/>
+        </p:spPr>
+        <p:txBody>
+          <a:bodyPr wrap="square" rtlCol="0">
+            <a:spAutoFit/>
+          </a:bodyPr>
+          <a:lstStyle/>
+          <a:p>
+            <a:r>
+              <a:rPr lang="es-ES" sz="1100" dirty="0"/>
+              <a:t>Correos a enviar</a:t>
+            </a:r>
+          </a:p>
+        </p:txBody>
+      </p:sp>
+      <p:sp>
+        <p:nvSpPr>
+          <p:cNvPr id="70" name="CuadroTexto 69">
+            <a:extLst>
+              <a:ext uri="{FF2B5EF4-FFF2-40B4-BE49-F238E27FC236}">
+                <a16:creationId xmlns:a16="http://schemas.microsoft.com/office/drawing/2014/main" id="{36DE5A64-AF0A-4D29-8AB5-FB4C584F4D17}"/>
+              </a:ext>
+            </a:extLst>
+          </p:cNvPr>
+          <p:cNvSpPr txBox="1"/>
+          <p:nvPr/>
+        </p:nvSpPr>
+        <p:spPr>
+          <a:xfrm>
+            <a:off x="1656525" y="1264802"/>
+            <a:ext cx="940003" cy="307777"/>
+          </a:xfrm>
+          <a:prstGeom prst="rect">
+            <a:avLst/>
+          </a:prstGeom>
+          <a:noFill/>
+        </p:spPr>
+        <p:txBody>
+          <a:bodyPr wrap="square" rtlCol="0">
+            <a:spAutoFit/>
+          </a:bodyPr>
+          <a:lstStyle/>
+          <a:p>
+            <a:r>
+              <a:rPr lang="es-ES" sz="1400" dirty="0">
+                <a:solidFill>
+                  <a:srgbClr val="0070C0"/>
+                </a:solidFill>
+              </a:rPr>
+              <a:t>Bootstrap</a:t>
+            </a:r>
+          </a:p>
+        </p:txBody>
+      </p:sp>
+      <p:sp>
+        <p:nvSpPr>
+          <p:cNvPr id="72" name="CuadroTexto 71">
+            <a:extLst>
+              <a:ext uri="{FF2B5EF4-FFF2-40B4-BE49-F238E27FC236}">
+                <a16:creationId xmlns:a16="http://schemas.microsoft.com/office/drawing/2014/main" id="{A8A44532-9555-4C74-A477-9A06589523EB}"/>
+              </a:ext>
+            </a:extLst>
+          </p:cNvPr>
+          <p:cNvSpPr txBox="1"/>
+          <p:nvPr/>
+        </p:nvSpPr>
+        <p:spPr>
+          <a:xfrm>
+            <a:off x="5410861" y="2480176"/>
+            <a:ext cx="974515" cy="307777"/>
+          </a:xfrm>
+          <a:prstGeom prst="rect">
+            <a:avLst/>
+          </a:prstGeom>
+          <a:noFill/>
+        </p:spPr>
+        <p:txBody>
+          <a:bodyPr wrap="square" rtlCol="0">
+            <a:spAutoFit/>
+          </a:bodyPr>
+          <a:lstStyle/>
+          <a:p>
+            <a:r>
+              <a:rPr lang="es-ES" sz="1400" dirty="0" err="1">
+                <a:solidFill>
+                  <a:srgbClr val="0070C0"/>
+                </a:solidFill>
+              </a:rPr>
+              <a:t>Thymeleaf</a:t>
+            </a:r>
+            <a:endParaRPr lang="es-ES" sz="1400" dirty="0">
+              <a:solidFill>
+                <a:srgbClr val="0070C0"/>
+              </a:solidFill>
+            </a:endParaRPr>
+          </a:p>
+        </p:txBody>
+      </p:sp>
+      <p:pic>
+        <p:nvPicPr>
+          <p:cNvPr id="38" name="Imagen 37" descr="Logotipo&#10;&#10;Descripción generada automáticamente">
+            <a:extLst>
+              <a:ext uri="{FF2B5EF4-FFF2-40B4-BE49-F238E27FC236}">
+                <a16:creationId xmlns:a16="http://schemas.microsoft.com/office/drawing/2014/main" id="{E6B331E9-BCCE-4389-A922-BB4A19FC2DB2}"/>
+              </a:ext>
+            </a:extLst>
+          </p:cNvPr>
+          <p:cNvPicPr>
+            <a:picLocks noChangeAspect="1"/>
+          </p:cNvPicPr>
+          <p:nvPr/>
+        </p:nvPicPr>
+        <p:blipFill>
+          <a:blip r:embed="rId18">
+            <a:extLst>
+              <a:ext uri="{28A0092B-C50C-407E-A947-70E740481C1C}">
+                <a14:useLocalDpi xmlns:a14="http://schemas.microsoft.com/office/drawing/2010/main" val="0"/>
+              </a:ext>
+            </a:extLst>
+          </a:blip>
+          <a:stretch>
+            <a:fillRect/>
+          </a:stretch>
+        </p:blipFill>
+        <p:spPr>
+          <a:xfrm>
+            <a:off x="7516809" y="3706182"/>
+            <a:ext cx="593101" cy="593101"/>
           </a:xfrm>
           <a:prstGeom prst="rect">
             <a:avLst/>
@@ -5319,10 +5815,15 @@
             <p:ph idx="1"/>
           </p:nvPr>
         </p:nvSpPr>
-        <p:spPr/>
+        <p:spPr>
+          <a:xfrm>
+            <a:off x="838200" y="1825625"/>
+            <a:ext cx="10515600" cy="4667250"/>
+          </a:xfrm>
+        </p:spPr>
         <p:txBody>
           <a:bodyPr>
-            <a:normAutofit/>
+            <a:normAutofit fontScale="92500" lnSpcReduction="10000"/>
           </a:bodyPr>
           <a:lstStyle/>
           <a:p>
@@ -5541,6 +6042,42 @@
               <a:t>https://icon-icons.com/es/icono/postgresql-llano-la-marca-logotipo/146390</a:t>
             </a:r>
             <a:endParaRPr lang="es-ES" sz="1100" dirty="0"/>
+          </a:p>
+          <a:p>
+            <a:r>
+              <a:rPr lang="es-ES" sz="1100" dirty="0" err="1"/>
+              <a:t>JavaMail</a:t>
+            </a:r>
+            <a:r>
+              <a:rPr lang="es-ES" sz="1100" dirty="0"/>
+              <a:t>: </a:t>
+            </a:r>
+            <a:r>
+              <a:rPr lang="es-ES" sz="1100" dirty="0">
+                <a:hlinkClick r:id="rId16"/>
+              </a:rPr>
+              <a:t>http://coderzen.blogspot.com/2015/01/javamail-wont-work-authenticationfailed.html</a:t>
+            </a:r>
+            <a:endParaRPr lang="es-ES" sz="1100" dirty="0"/>
+          </a:p>
+          <a:p>
+            <a:r>
+              <a:rPr lang="es-ES" sz="1100" dirty="0"/>
+              <a:t>Gmail: </a:t>
+            </a:r>
+            <a:r>
+              <a:rPr lang="es-ES" sz="1100" dirty="0">
+                <a:hlinkClick r:id="rId17"/>
+              </a:rPr>
+              <a:t>https://www.flaticon.es/icono-gratis/gmail_732200?term=gmail&amp;page=1&amp;position=1&amp;page=1&amp;position=1&amp;related_id=732200&amp;origin=search</a:t>
+            </a:r>
+            <a:endParaRPr lang="es-ES" sz="1100" dirty="0"/>
+          </a:p>
+          <a:p>
+            <a:r>
+              <a:rPr lang="es-ES" sz="1100" dirty="0"/>
+              <a:t>Java: https://www.flaticon.es/icono-gratis/java_226777?term=java&amp;page=1&amp;position=1&amp;page=1&amp;position=1&amp;related_id=226777&amp;origin=search</a:t>
+            </a:r>
           </a:p>
           <a:p>
             <a:endParaRPr lang="es-ES" sz="1100" dirty="0"/>
@@ -6207,6 +6744,146 @@
           </a:p>
         </p:txBody>
       </p:sp>
+      <p:sp>
+        <p:nvSpPr>
+          <p:cNvPr id="16" name="Rectángulo 15">
+            <a:extLst>
+              <a:ext uri="{FF2B5EF4-FFF2-40B4-BE49-F238E27FC236}">
+                <a16:creationId xmlns:a16="http://schemas.microsoft.com/office/drawing/2014/main" id="{B3EDCE97-D81F-4DEC-B83F-6D8BF59960A0}"/>
+              </a:ext>
+            </a:extLst>
+          </p:cNvPr>
+          <p:cNvSpPr/>
+          <p:nvPr/>
+        </p:nvSpPr>
+        <p:spPr>
+          <a:xfrm>
+            <a:off x="8979313" y="2796465"/>
+            <a:ext cx="994299" cy="843379"/>
+          </a:xfrm>
+          <a:prstGeom prst="rect">
+            <a:avLst/>
+          </a:prstGeom>
+          <a:solidFill>
+            <a:schemeClr val="bg1"/>
+          </a:solidFill>
+          <a:ln w="12700">
+            <a:solidFill>
+              <a:schemeClr val="tx1"/>
+            </a:solidFill>
+          </a:ln>
+        </p:spPr>
+        <p:style>
+          <a:lnRef idx="2">
+            <a:schemeClr val="accent1">
+              <a:shade val="50000"/>
+            </a:schemeClr>
+          </a:lnRef>
+          <a:fillRef idx="1">
+            <a:schemeClr val="accent1"/>
+          </a:fillRef>
+          <a:effectRef idx="0">
+            <a:schemeClr val="accent1"/>
+          </a:effectRef>
+          <a:fontRef idx="minor">
+            <a:schemeClr val="lt1"/>
+          </a:fontRef>
+        </p:style>
+        <p:txBody>
+          <a:bodyPr rtlCol="0" anchor="ctr"/>
+          <a:lstStyle/>
+          <a:p>
+            <a:pPr algn="ctr"/>
+            <a:r>
+              <a:rPr lang="es-ES" sz="1100" dirty="0">
+                <a:solidFill>
+                  <a:schemeClr val="tx1"/>
+                </a:solidFill>
+              </a:rPr>
+              <a:t>Gmail SMTP</a:t>
+            </a:r>
+          </a:p>
+        </p:txBody>
+      </p:sp>
+      <p:cxnSp>
+        <p:nvCxnSpPr>
+          <p:cNvPr id="17" name="Conector recto de flecha 16">
+            <a:extLst>
+              <a:ext uri="{FF2B5EF4-FFF2-40B4-BE49-F238E27FC236}">
+                <a16:creationId xmlns:a16="http://schemas.microsoft.com/office/drawing/2014/main" id="{8AB342A0-C2BC-4142-A799-4A993B6ED382}"/>
+              </a:ext>
+            </a:extLst>
+          </p:cNvPr>
+          <p:cNvCxnSpPr>
+            <a:cxnSpLocks/>
+            <a:stCxn id="7" idx="6"/>
+            <a:endCxn id="16" idx="1"/>
+          </p:cNvCxnSpPr>
+          <p:nvPr/>
+        </p:nvCxnSpPr>
+        <p:spPr>
+          <a:xfrm>
+            <a:off x="6933460" y="3218155"/>
+            <a:ext cx="2045853" cy="0"/>
+          </a:xfrm>
+          <a:prstGeom prst="straightConnector1">
+            <a:avLst/>
+          </a:prstGeom>
+          <a:ln>
+            <a:headEnd type="none" w="med" len="med"/>
+            <a:tailEnd type="triangle" w="med" len="med"/>
+          </a:ln>
+        </p:spPr>
+        <p:style>
+          <a:lnRef idx="1">
+            <a:schemeClr val="dk1"/>
+          </a:lnRef>
+          <a:fillRef idx="0">
+            <a:schemeClr val="dk1"/>
+          </a:fillRef>
+          <a:effectRef idx="0">
+            <a:schemeClr val="dk1"/>
+          </a:effectRef>
+          <a:fontRef idx="minor">
+            <a:schemeClr val="tx1"/>
+          </a:fontRef>
+        </p:style>
+      </p:cxnSp>
+      <p:sp>
+        <p:nvSpPr>
+          <p:cNvPr id="19" name="CuadroTexto 18">
+            <a:extLst>
+              <a:ext uri="{FF2B5EF4-FFF2-40B4-BE49-F238E27FC236}">
+                <a16:creationId xmlns:a16="http://schemas.microsoft.com/office/drawing/2014/main" id="{84B4DE42-78B8-4189-8DAB-BA9C889B4D50}"/>
+              </a:ext>
+            </a:extLst>
+          </p:cNvPr>
+          <p:cNvSpPr txBox="1"/>
+          <p:nvPr/>
+        </p:nvSpPr>
+        <p:spPr>
+          <a:xfrm>
+            <a:off x="7379812" y="2897792"/>
+            <a:ext cx="1599501" cy="253916"/>
+          </a:xfrm>
+          <a:prstGeom prst="rect">
+            <a:avLst/>
+          </a:prstGeom>
+          <a:noFill/>
+        </p:spPr>
+        <p:txBody>
+          <a:bodyPr wrap="square" rtlCol="0">
+            <a:spAutoFit/>
+          </a:bodyPr>
+          <a:lstStyle/>
+          <a:p>
+            <a:r>
+              <a:rPr lang="es-ES" sz="1050" dirty="0"/>
+              <a:t>Mensajes</a:t>
+            </a:r>
+          </a:p>
+        </p:txBody>
+      </p:sp>
     </p:spTree>
     <p:extLst>
       <p:ext uri="{BB962C8B-B14F-4D97-AF65-F5344CB8AC3E}">
@@ -6312,7 +6989,7 @@
         </p:nvSpPr>
         <p:spPr>
           <a:xfrm>
-            <a:off x="787815" y="5327317"/>
+            <a:off x="555044" y="4926536"/>
             <a:ext cx="994299" cy="843379"/>
           </a:xfrm>
           <a:prstGeom prst="rect">
@@ -6433,7 +7110,7 @@
         </p:nvSpPr>
         <p:spPr>
           <a:xfrm>
-            <a:off x="10109045" y="4608368"/>
+            <a:off x="10183370" y="3018894"/>
             <a:ext cx="1819276" cy="967387"/>
           </a:xfrm>
           <a:prstGeom prst="mathEqual">
@@ -6496,9 +7173,9 @@
           <p:nvPr/>
         </p:nvCxnSpPr>
         <p:spPr>
-          <a:xfrm>
-            <a:off x="7208796" y="3889765"/>
-            <a:ext cx="3809887" cy="946132"/>
+          <a:xfrm flipV="1">
+            <a:off x="7208796" y="3246423"/>
+            <a:ext cx="3884212" cy="643342"/>
           </a:xfrm>
           <a:prstGeom prst="straightConnector1">
             <a:avLst/>
@@ -6629,8 +7306,8 @@
         </p:nvCxnSpPr>
         <p:spPr>
           <a:xfrm flipV="1">
-            <a:off x="1284965" y="4304126"/>
-            <a:ext cx="1158947" cy="1023191"/>
+            <a:off x="1052194" y="4304126"/>
+            <a:ext cx="1391718" cy="622410"/>
           </a:xfrm>
           <a:prstGeom prst="straightConnector1">
             <a:avLst/>
@@ -6866,7 +7543,7 @@
                   <a:schemeClr val="tx1"/>
                 </a:solidFill>
               </a:rPr>
-              <a:t>3.Gestión de los chats</a:t>
+              <a:t>4.Gestión de los chats</a:t>
             </a:r>
           </a:p>
         </p:txBody>
@@ -7271,7 +7948,7 @@
                   <a:schemeClr val="tx1"/>
                 </a:solidFill>
               </a:rPr>
-              <a:t>4.Gestión de ficheros</a:t>
+              <a:t>5.Gestión de ficheros</a:t>
             </a:r>
           </a:p>
         </p:txBody>
@@ -7343,7 +8020,7 @@
                   <a:schemeClr val="tx1"/>
                 </a:solidFill>
               </a:rPr>
-              <a:t>5.Gestión de informes</a:t>
+              <a:t>6.Gestión de informes</a:t>
             </a:r>
           </a:p>
         </p:txBody>
@@ -7447,15 +8124,15 @@
           </p:cNvPr>
           <p:cNvCxnSpPr>
             <a:cxnSpLocks/>
-            <a:stCxn id="6" idx="3"/>
+            <a:stCxn id="41" idx="3"/>
             <a:endCxn id="56" idx="1"/>
           </p:cNvCxnSpPr>
           <p:nvPr/>
         </p:nvCxnSpPr>
         <p:spPr>
-          <a:xfrm flipV="1">
-            <a:off x="1782114" y="5413241"/>
-            <a:ext cx="3855057" cy="335766"/>
+          <a:xfrm>
+            <a:off x="4015537" y="4304126"/>
+            <a:ext cx="1621634" cy="1109115"/>
           </a:xfrm>
           <a:prstGeom prst="straightConnector1">
             <a:avLst/>
@@ -7524,50 +8201,6 @@
           </a:fontRef>
         </p:style>
       </p:cxnSp>
-      <p:cxnSp>
-        <p:nvCxnSpPr>
-          <p:cNvPr id="84" name="Conector recto de flecha 83">
-            <a:extLst>
-              <a:ext uri="{FF2B5EF4-FFF2-40B4-BE49-F238E27FC236}">
-                <a16:creationId xmlns:a16="http://schemas.microsoft.com/office/drawing/2014/main" id="{CB37B497-9F51-42D5-B688-E994794C1958}"/>
-              </a:ext>
-            </a:extLst>
-          </p:cNvPr>
-          <p:cNvCxnSpPr>
-            <a:cxnSpLocks/>
-            <a:stCxn id="18" idx="0"/>
-            <a:endCxn id="48" idx="3"/>
-          </p:cNvCxnSpPr>
-          <p:nvPr/>
-        </p:nvCxnSpPr>
-        <p:spPr>
-          <a:xfrm flipH="1" flipV="1">
-            <a:off x="7208795" y="784576"/>
-            <a:ext cx="2004594" cy="665464"/>
-          </a:xfrm>
-          <a:prstGeom prst="straightConnector1">
-            <a:avLst/>
-          </a:prstGeom>
-          <a:ln>
-            <a:headEnd type="triangle"/>
-            <a:tailEnd type="triangle"/>
-          </a:ln>
-        </p:spPr>
-        <p:style>
-          <a:lnRef idx="1">
-            <a:schemeClr val="dk1"/>
-          </a:lnRef>
-          <a:fillRef idx="0">
-            <a:schemeClr val="dk1"/>
-          </a:fillRef>
-          <a:effectRef idx="0">
-            <a:schemeClr val="dk1"/>
-          </a:effectRef>
-          <a:fontRef idx="minor">
-            <a:schemeClr val="tx1"/>
-          </a:fontRef>
-        </p:style>
-      </p:cxnSp>
       <p:sp>
         <p:nvSpPr>
           <p:cNvPr id="87" name="Rectángulo: esquina doblada 86">
@@ -7733,10 +8366,10 @@
       </p:sp>
       <p:sp>
         <p:nvSpPr>
-          <p:cNvPr id="93" name="CuadroTexto 92">
-            <a:extLst>
-              <a:ext uri="{FF2B5EF4-FFF2-40B4-BE49-F238E27FC236}">
-                <a16:creationId xmlns:a16="http://schemas.microsoft.com/office/drawing/2014/main" id="{601248E2-AD21-42C7-BB72-905481C05A1D}"/>
+          <p:cNvPr id="94" name="CuadroTexto 93">
+            <a:extLst>
+              <a:ext uri="{FF2B5EF4-FFF2-40B4-BE49-F238E27FC236}">
+                <a16:creationId xmlns:a16="http://schemas.microsoft.com/office/drawing/2014/main" id="{3920C25D-70C2-4579-AE72-9C8548AA62CE}"/>
               </a:ext>
             </a:extLst>
           </p:cNvPr>
@@ -7744,8 +8377,8 @@
           <p:nvPr/>
         </p:nvSpPr>
         <p:spPr>
-          <a:xfrm rot="1035249">
-            <a:off x="7796419" y="944437"/>
+          <a:xfrm rot="21330761">
+            <a:off x="7217640" y="2102732"/>
             <a:ext cx="1298424" cy="276999"/>
           </a:xfrm>
           <a:prstGeom prst="rect">
@@ -7761,17 +8394,17 @@
           <a:p>
             <a:r>
               <a:rPr lang="es-ES" sz="1200" dirty="0"/>
-              <a:t>Enlace a ficheros</a:t>
-            </a:r>
-          </a:p>
-        </p:txBody>
-      </p:sp>
-      <p:sp>
-        <p:nvSpPr>
-          <p:cNvPr id="94" name="CuadroTexto 93">
-            <a:extLst>
-              <a:ext uri="{FF2B5EF4-FFF2-40B4-BE49-F238E27FC236}">
-                <a16:creationId xmlns:a16="http://schemas.microsoft.com/office/drawing/2014/main" id="{3920C25D-70C2-4579-AE72-9C8548AA62CE}"/>
+              <a:t>Datos de usuarios</a:t>
+            </a:r>
+          </a:p>
+        </p:txBody>
+      </p:sp>
+      <p:sp>
+        <p:nvSpPr>
+          <p:cNvPr id="99" name="CuadroTexto 98">
+            <a:extLst>
+              <a:ext uri="{FF2B5EF4-FFF2-40B4-BE49-F238E27FC236}">
+                <a16:creationId xmlns:a16="http://schemas.microsoft.com/office/drawing/2014/main" id="{67B62028-F736-4EBD-8BBB-7FBDAFABEB8A}"/>
               </a:ext>
             </a:extLst>
           </p:cNvPr>
@@ -7779,8 +8412,8 @@
           <p:nvPr/>
         </p:nvSpPr>
         <p:spPr>
-          <a:xfrm rot="21330761">
-            <a:off x="7217640" y="2102732"/>
+          <a:xfrm rot="1509951">
+            <a:off x="10046235" y="1931361"/>
             <a:ext cx="1298424" cy="276999"/>
           </a:xfrm>
           <a:prstGeom prst="rect">
@@ -7803,10 +8436,10 @@
       </p:sp>
       <p:sp>
         <p:nvSpPr>
-          <p:cNvPr id="99" name="CuadroTexto 98">
-            <a:extLst>
-              <a:ext uri="{FF2B5EF4-FFF2-40B4-BE49-F238E27FC236}">
-                <a16:creationId xmlns:a16="http://schemas.microsoft.com/office/drawing/2014/main" id="{67B62028-F736-4EBD-8BBB-7FBDAFABEB8A}"/>
+          <p:cNvPr id="100" name="CuadroTexto 99">
+            <a:extLst>
+              <a:ext uri="{FF2B5EF4-FFF2-40B4-BE49-F238E27FC236}">
+                <a16:creationId xmlns:a16="http://schemas.microsoft.com/office/drawing/2014/main" id="{BCE856EE-AE28-40D1-9B1C-3108DA0EE308}"/>
               </a:ext>
             </a:extLst>
           </p:cNvPr>
@@ -7814,43 +8447,8 @@
           <p:nvPr/>
         </p:nvSpPr>
         <p:spPr>
-          <a:xfrm rot="1509951">
-            <a:off x="10046235" y="1931361"/>
-            <a:ext cx="1298424" cy="276999"/>
-          </a:xfrm>
-          <a:prstGeom prst="rect">
-            <a:avLst/>
-          </a:prstGeom>
-          <a:noFill/>
-        </p:spPr>
-        <p:txBody>
-          <a:bodyPr wrap="square" rtlCol="0">
-            <a:spAutoFit/>
-          </a:bodyPr>
-          <a:lstStyle/>
-          <a:p>
-            <a:r>
-              <a:rPr lang="es-ES" sz="1200" dirty="0"/>
-              <a:t>Datos de usuarios</a:t>
-            </a:r>
-          </a:p>
-        </p:txBody>
-      </p:sp>
-      <p:sp>
-        <p:nvSpPr>
-          <p:cNvPr id="100" name="CuadroTexto 99">
-            <a:extLst>
-              <a:ext uri="{FF2B5EF4-FFF2-40B4-BE49-F238E27FC236}">
-                <a16:creationId xmlns:a16="http://schemas.microsoft.com/office/drawing/2014/main" id="{BCE856EE-AE28-40D1-9B1C-3108DA0EE308}"/>
-              </a:ext>
-            </a:extLst>
-          </p:cNvPr>
-          <p:cNvSpPr txBox="1"/>
-          <p:nvPr/>
-        </p:nvSpPr>
-        <p:spPr>
           <a:xfrm rot="18419315">
-            <a:off x="8185743" y="3349839"/>
+            <a:off x="8008112" y="2953858"/>
             <a:ext cx="1298424" cy="276999"/>
           </a:xfrm>
           <a:prstGeom prst="rect">
@@ -7889,8 +8487,8 @@
         </p:nvCxnSpPr>
         <p:spPr>
           <a:xfrm flipV="1">
-            <a:off x="7208796" y="5348226"/>
-            <a:ext cx="3141394" cy="65015"/>
+            <a:off x="7208796" y="3758752"/>
+            <a:ext cx="3215719" cy="1654489"/>
           </a:xfrm>
           <a:prstGeom prst="straightConnector1">
             <a:avLst/>
@@ -7928,43 +8526,8 @@
           <p:nvPr/>
         </p:nvSpPr>
         <p:spPr>
-          <a:xfrm rot="837094">
-            <a:off x="8763745" y="4120581"/>
-            <a:ext cx="1298424" cy="276999"/>
-          </a:xfrm>
-          <a:prstGeom prst="rect">
-            <a:avLst/>
-          </a:prstGeom>
-          <a:noFill/>
-        </p:spPr>
-        <p:txBody>
-          <a:bodyPr wrap="square" rtlCol="0">
-            <a:spAutoFit/>
-          </a:bodyPr>
-          <a:lstStyle/>
-          <a:p>
-            <a:r>
-              <a:rPr lang="es-ES" sz="1200" dirty="0"/>
-              <a:t>Mensajes</a:t>
-            </a:r>
-          </a:p>
-        </p:txBody>
-      </p:sp>
-      <p:sp>
-        <p:nvSpPr>
-          <p:cNvPr id="105" name="CuadroTexto 104">
-            <a:extLst>
-              <a:ext uri="{FF2B5EF4-FFF2-40B4-BE49-F238E27FC236}">
-                <a16:creationId xmlns:a16="http://schemas.microsoft.com/office/drawing/2014/main" id="{D3CE2C1B-8C6B-45AA-A2B7-03A8EEB5A484}"/>
-              </a:ext>
-            </a:extLst>
-          </p:cNvPr>
-          <p:cNvSpPr txBox="1"/>
-          <p:nvPr/>
-        </p:nvSpPr>
-        <p:spPr>
-          <a:xfrm>
-            <a:off x="8486339" y="5085327"/>
+          <a:xfrm>
+            <a:off x="9757437" y="3437102"/>
             <a:ext cx="1298424" cy="276999"/>
           </a:xfrm>
           <a:prstGeom prst="rect">
@@ -8077,8 +8640,8 @@
           <p:nvPr/>
         </p:nvSpPr>
         <p:spPr>
-          <a:xfrm rot="21205340">
-            <a:off x="3637778" y="5544178"/>
+          <a:xfrm rot="2114478">
+            <a:off x="4202146" y="4869542"/>
             <a:ext cx="1298424" cy="276999"/>
           </a:xfrm>
           <a:prstGeom prst="rect">
@@ -8320,6 +8883,419 @@
             <a:r>
               <a:rPr lang="es-ES" sz="1200" dirty="0"/>
               <a:t>(instituciones)</a:t>
+            </a:r>
+          </a:p>
+        </p:txBody>
+      </p:sp>
+      <p:sp>
+        <p:nvSpPr>
+          <p:cNvPr id="46" name="Rectángulo 45">
+            <a:extLst>
+              <a:ext uri="{FF2B5EF4-FFF2-40B4-BE49-F238E27FC236}">
+                <a16:creationId xmlns:a16="http://schemas.microsoft.com/office/drawing/2014/main" id="{37BBCEFB-0BAF-4703-8C16-20547820C7C9}"/>
+              </a:ext>
+            </a:extLst>
+          </p:cNvPr>
+          <p:cNvSpPr/>
+          <p:nvPr/>
+        </p:nvSpPr>
+        <p:spPr>
+          <a:xfrm>
+            <a:off x="11102797" y="5348225"/>
+            <a:ext cx="994299" cy="843379"/>
+          </a:xfrm>
+          <a:prstGeom prst="rect">
+            <a:avLst/>
+          </a:prstGeom>
+          <a:solidFill>
+            <a:schemeClr val="bg1"/>
+          </a:solidFill>
+          <a:ln w="12700">
+            <a:solidFill>
+              <a:schemeClr val="tx1"/>
+            </a:solidFill>
+          </a:ln>
+        </p:spPr>
+        <p:style>
+          <a:lnRef idx="2">
+            <a:schemeClr val="accent1">
+              <a:shade val="50000"/>
+            </a:schemeClr>
+          </a:lnRef>
+          <a:fillRef idx="1">
+            <a:schemeClr val="accent1"/>
+          </a:fillRef>
+          <a:effectRef idx="0">
+            <a:schemeClr val="accent1"/>
+          </a:effectRef>
+          <a:fontRef idx="minor">
+            <a:schemeClr val="lt1"/>
+          </a:fontRef>
+        </p:style>
+        <p:txBody>
+          <a:bodyPr rtlCol="0" anchor="ctr"/>
+          <a:lstStyle/>
+          <a:p>
+            <a:pPr algn="ctr"/>
+            <a:r>
+              <a:rPr lang="es-ES" sz="1100" dirty="0">
+                <a:solidFill>
+                  <a:schemeClr val="tx1"/>
+                </a:solidFill>
+              </a:rPr>
+              <a:t>Correo Gmail de la aplicación</a:t>
+            </a:r>
+          </a:p>
+        </p:txBody>
+      </p:sp>
+      <p:sp>
+        <p:nvSpPr>
+          <p:cNvPr id="51" name="Diagrama de flujo: almacenamiento interno 50">
+            <a:extLst>
+              <a:ext uri="{FF2B5EF4-FFF2-40B4-BE49-F238E27FC236}">
+                <a16:creationId xmlns:a16="http://schemas.microsoft.com/office/drawing/2014/main" id="{2E51D576-9686-459E-BB91-A09E883C3807}"/>
+              </a:ext>
+            </a:extLst>
+          </p:cNvPr>
+          <p:cNvSpPr/>
+          <p:nvPr/>
+        </p:nvSpPr>
+        <p:spPr>
+          <a:xfrm>
+            <a:off x="8355737" y="5181120"/>
+            <a:ext cx="1571625" cy="1177589"/>
+          </a:xfrm>
+          <a:prstGeom prst="flowChartInternalStorage">
+            <a:avLst/>
+          </a:prstGeom>
+          <a:solidFill>
+            <a:schemeClr val="bg1"/>
+          </a:solidFill>
+          <a:ln>
+            <a:solidFill>
+              <a:schemeClr val="tx1"/>
+            </a:solidFill>
+          </a:ln>
+        </p:spPr>
+        <p:style>
+          <a:lnRef idx="2">
+            <a:schemeClr val="accent1">
+              <a:shade val="50000"/>
+            </a:schemeClr>
+          </a:lnRef>
+          <a:fillRef idx="1">
+            <a:schemeClr val="accent1"/>
+          </a:fillRef>
+          <a:effectRef idx="0">
+            <a:schemeClr val="accent1"/>
+          </a:effectRef>
+          <a:fontRef idx="minor">
+            <a:schemeClr val="lt1"/>
+          </a:fontRef>
+        </p:style>
+        <p:txBody>
+          <a:bodyPr rtlCol="0" anchor="t"/>
+          <a:lstStyle/>
+          <a:p>
+            <a:pPr algn="ctr"/>
+            <a:r>
+              <a:rPr lang="es-ES" sz="1200" dirty="0">
+                <a:solidFill>
+                  <a:schemeClr val="tx1"/>
+                </a:solidFill>
+              </a:rPr>
+              <a:t>&lt;&lt; Subsistema &gt;&gt;</a:t>
+            </a:r>
+          </a:p>
+          <a:p>
+            <a:pPr algn="ctr"/>
+            <a:r>
+              <a:rPr lang="es-ES" sz="1200" dirty="0">
+                <a:solidFill>
+                  <a:schemeClr val="tx1"/>
+                </a:solidFill>
+              </a:rPr>
+              <a:t>3.Gestión de la mensajería</a:t>
+            </a:r>
+          </a:p>
+        </p:txBody>
+      </p:sp>
+      <p:cxnSp>
+        <p:nvCxnSpPr>
+          <p:cNvPr id="52" name="Conector recto de flecha 51">
+            <a:extLst>
+              <a:ext uri="{FF2B5EF4-FFF2-40B4-BE49-F238E27FC236}">
+                <a16:creationId xmlns:a16="http://schemas.microsoft.com/office/drawing/2014/main" id="{269BE920-5B4D-40DF-A8C1-CF74579BCD2F}"/>
+              </a:ext>
+            </a:extLst>
+          </p:cNvPr>
+          <p:cNvCxnSpPr>
+            <a:cxnSpLocks/>
+            <a:stCxn id="51" idx="0"/>
+            <a:endCxn id="20" idx="3"/>
+          </p:cNvCxnSpPr>
+          <p:nvPr/>
+        </p:nvCxnSpPr>
+        <p:spPr>
+          <a:xfrm flipH="1" flipV="1">
+            <a:off x="7208796" y="3889765"/>
+            <a:ext cx="1932754" cy="1291355"/>
+          </a:xfrm>
+          <a:prstGeom prst="straightConnector1">
+            <a:avLst/>
+          </a:prstGeom>
+          <a:ln>
+            <a:headEnd type="triangle"/>
+            <a:tailEnd type="none"/>
+          </a:ln>
+        </p:spPr>
+        <p:style>
+          <a:lnRef idx="1">
+            <a:schemeClr val="dk1"/>
+          </a:lnRef>
+          <a:fillRef idx="0">
+            <a:schemeClr val="dk1"/>
+          </a:fillRef>
+          <a:effectRef idx="0">
+            <a:schemeClr val="dk1"/>
+          </a:effectRef>
+          <a:fontRef idx="minor">
+            <a:schemeClr val="tx1"/>
+          </a:fontRef>
+        </p:style>
+      </p:cxnSp>
+      <p:cxnSp>
+        <p:nvCxnSpPr>
+          <p:cNvPr id="55" name="Conector recto de flecha 54">
+            <a:extLst>
+              <a:ext uri="{FF2B5EF4-FFF2-40B4-BE49-F238E27FC236}">
+                <a16:creationId xmlns:a16="http://schemas.microsoft.com/office/drawing/2014/main" id="{0E9CF3C1-A811-4CE6-AEA1-BAC6CF3C7E3D}"/>
+              </a:ext>
+            </a:extLst>
+          </p:cNvPr>
+          <p:cNvCxnSpPr>
+            <a:cxnSpLocks/>
+            <a:stCxn id="51" idx="1"/>
+          </p:cNvCxnSpPr>
+          <p:nvPr/>
+        </p:nvCxnSpPr>
+        <p:spPr>
+          <a:xfrm flipH="1">
+            <a:off x="7203608" y="5769915"/>
+            <a:ext cx="1152129" cy="0"/>
+          </a:xfrm>
+          <a:prstGeom prst="straightConnector1">
+            <a:avLst/>
+          </a:prstGeom>
+          <a:ln>
+            <a:headEnd type="triangle"/>
+            <a:tailEnd type="none"/>
+          </a:ln>
+        </p:spPr>
+        <p:style>
+          <a:lnRef idx="1">
+            <a:schemeClr val="dk1"/>
+          </a:lnRef>
+          <a:fillRef idx="0">
+            <a:schemeClr val="dk1"/>
+          </a:fillRef>
+          <a:effectRef idx="0">
+            <a:schemeClr val="dk1"/>
+          </a:effectRef>
+          <a:fontRef idx="minor">
+            <a:schemeClr val="tx1"/>
+          </a:fontRef>
+        </p:style>
+      </p:cxnSp>
+      <p:cxnSp>
+        <p:nvCxnSpPr>
+          <p:cNvPr id="64" name="Conector recto de flecha 63">
+            <a:extLst>
+              <a:ext uri="{FF2B5EF4-FFF2-40B4-BE49-F238E27FC236}">
+                <a16:creationId xmlns:a16="http://schemas.microsoft.com/office/drawing/2014/main" id="{7B98CBB9-0DF5-49C7-B2E0-E294F0344585}"/>
+              </a:ext>
+            </a:extLst>
+          </p:cNvPr>
+          <p:cNvCxnSpPr>
+            <a:cxnSpLocks/>
+            <a:stCxn id="51" idx="0"/>
+            <a:endCxn id="11" idx="3"/>
+          </p:cNvCxnSpPr>
+          <p:nvPr/>
+        </p:nvCxnSpPr>
+        <p:spPr>
+          <a:xfrm flipH="1" flipV="1">
+            <a:off x="7208795" y="2148025"/>
+            <a:ext cx="1932755" cy="3033095"/>
+          </a:xfrm>
+          <a:prstGeom prst="straightConnector1">
+            <a:avLst/>
+          </a:prstGeom>
+          <a:ln>
+            <a:headEnd type="triangle"/>
+            <a:tailEnd type="none"/>
+          </a:ln>
+        </p:spPr>
+        <p:style>
+          <a:lnRef idx="1">
+            <a:schemeClr val="dk1"/>
+          </a:lnRef>
+          <a:fillRef idx="0">
+            <a:schemeClr val="dk1"/>
+          </a:fillRef>
+          <a:effectRef idx="0">
+            <a:schemeClr val="dk1"/>
+          </a:effectRef>
+          <a:fontRef idx="minor">
+            <a:schemeClr val="tx1"/>
+          </a:fontRef>
+        </p:style>
+      </p:cxnSp>
+      <p:sp>
+        <p:nvSpPr>
+          <p:cNvPr id="70" name="CuadroTexto 69">
+            <a:extLst>
+              <a:ext uri="{FF2B5EF4-FFF2-40B4-BE49-F238E27FC236}">
+                <a16:creationId xmlns:a16="http://schemas.microsoft.com/office/drawing/2014/main" id="{49AC8758-01DD-4520-BCBE-0EF37F451B8D}"/>
+              </a:ext>
+            </a:extLst>
+          </p:cNvPr>
+          <p:cNvSpPr txBox="1"/>
+          <p:nvPr/>
+        </p:nvSpPr>
+        <p:spPr>
+          <a:xfrm>
+            <a:off x="8849325" y="4555128"/>
+            <a:ext cx="1298424" cy="276999"/>
+          </a:xfrm>
+          <a:prstGeom prst="rect">
+            <a:avLst/>
+          </a:prstGeom>
+          <a:noFill/>
+        </p:spPr>
+        <p:txBody>
+          <a:bodyPr wrap="square" rtlCol="0">
+            <a:spAutoFit/>
+          </a:bodyPr>
+          <a:lstStyle/>
+          <a:p>
+            <a:r>
+              <a:rPr lang="es-ES" sz="1200" dirty="0"/>
+              <a:t>Correo a enviar</a:t>
+            </a:r>
+          </a:p>
+        </p:txBody>
+      </p:sp>
+      <p:sp>
+        <p:nvSpPr>
+          <p:cNvPr id="71" name="CuadroTexto 70">
+            <a:extLst>
+              <a:ext uri="{FF2B5EF4-FFF2-40B4-BE49-F238E27FC236}">
+                <a16:creationId xmlns:a16="http://schemas.microsoft.com/office/drawing/2014/main" id="{28DADB5E-5513-4D39-BB35-8E8E2B44A87A}"/>
+              </a:ext>
+            </a:extLst>
+          </p:cNvPr>
+          <p:cNvSpPr txBox="1"/>
+          <p:nvPr/>
+        </p:nvSpPr>
+        <p:spPr>
+          <a:xfrm>
+            <a:off x="7274879" y="5425110"/>
+            <a:ext cx="1298424" cy="276999"/>
+          </a:xfrm>
+          <a:prstGeom prst="rect">
+            <a:avLst/>
+          </a:prstGeom>
+          <a:noFill/>
+        </p:spPr>
+        <p:txBody>
+          <a:bodyPr wrap="square" rtlCol="0">
+            <a:spAutoFit/>
+          </a:bodyPr>
+          <a:lstStyle/>
+          <a:p>
+            <a:r>
+              <a:rPr lang="es-ES" sz="1200" dirty="0"/>
+              <a:t>Correo a enviar</a:t>
+            </a:r>
+          </a:p>
+        </p:txBody>
+      </p:sp>
+      <p:cxnSp>
+        <p:nvCxnSpPr>
+          <p:cNvPr id="72" name="Conector recto de flecha 71">
+            <a:extLst>
+              <a:ext uri="{FF2B5EF4-FFF2-40B4-BE49-F238E27FC236}">
+                <a16:creationId xmlns:a16="http://schemas.microsoft.com/office/drawing/2014/main" id="{EA210FD6-16FC-490B-9809-54EFCDCD6658}"/>
+              </a:ext>
+            </a:extLst>
+          </p:cNvPr>
+          <p:cNvCxnSpPr>
+            <a:cxnSpLocks/>
+            <a:stCxn id="46" idx="1"/>
+            <a:endCxn id="51" idx="3"/>
+          </p:cNvCxnSpPr>
+          <p:nvPr/>
+        </p:nvCxnSpPr>
+        <p:spPr>
+          <a:xfrm flipH="1">
+            <a:off x="9927362" y="5769915"/>
+            <a:ext cx="1175435" cy="0"/>
+          </a:xfrm>
+          <a:prstGeom prst="straightConnector1">
+            <a:avLst/>
+          </a:prstGeom>
+          <a:ln>
+            <a:headEnd type="triangle"/>
+            <a:tailEnd type="none"/>
+          </a:ln>
+        </p:spPr>
+        <p:style>
+          <a:lnRef idx="1">
+            <a:schemeClr val="dk1"/>
+          </a:lnRef>
+          <a:fillRef idx="0">
+            <a:schemeClr val="dk1"/>
+          </a:fillRef>
+          <a:effectRef idx="0">
+            <a:schemeClr val="dk1"/>
+          </a:effectRef>
+          <a:fontRef idx="minor">
+            <a:schemeClr val="tx1"/>
+          </a:fontRef>
+        </p:style>
+      </p:cxnSp>
+      <p:sp>
+        <p:nvSpPr>
+          <p:cNvPr id="77" name="CuadroTexto 76">
+            <a:extLst>
+              <a:ext uri="{FF2B5EF4-FFF2-40B4-BE49-F238E27FC236}">
+                <a16:creationId xmlns:a16="http://schemas.microsoft.com/office/drawing/2014/main" id="{9B8C6A60-E16B-41FC-9553-6BC417491EAB}"/>
+              </a:ext>
+            </a:extLst>
+          </p:cNvPr>
+          <p:cNvSpPr txBox="1"/>
+          <p:nvPr/>
+        </p:nvSpPr>
+        <p:spPr>
+          <a:xfrm>
+            <a:off x="9957794" y="5480389"/>
+            <a:ext cx="1298424" cy="276999"/>
+          </a:xfrm>
+          <a:prstGeom prst="rect">
+            <a:avLst/>
+          </a:prstGeom>
+          <a:noFill/>
+        </p:spPr>
+        <p:txBody>
+          <a:bodyPr wrap="square" rtlCol="0">
+            <a:spAutoFit/>
+          </a:bodyPr>
+          <a:lstStyle/>
+          <a:p>
+            <a:r>
+              <a:rPr lang="es-ES" sz="1200" dirty="0"/>
+              <a:t>Correo a enviar</a:t>
             </a:r>
           </a:p>
         </p:txBody>

</xml_diff>

<commit_message>
Añadidas las funcionalidades de editar el perfil, añadir o eliminar areas de conocimiento, buscar mentores y acceder a su perfil.
</commit_message>
<xml_diff>
--- a/Diseños/aquitectura.pptx
+++ b/Diseños/aquitectura.pptx
@@ -10,6 +10,7 @@
     <p:sldId id="257" r:id="rId4"/>
     <p:sldId id="258" r:id="rId5"/>
     <p:sldId id="260" r:id="rId6"/>
+    <p:sldId id="261" r:id="rId7"/>
   </p:sldIdLst>
   <p:sldSz cx="12192000" cy="6858000"/>
   <p:notesSz cx="6858000" cy="9144000"/>
@@ -263,7 +264,7 @@
           <a:p>
             <a:fld id="{3E1544B7-206C-4EA6-AC0C-B0859B395411}" type="datetimeFigureOut">
               <a:rPr lang="es-ES" smtClean="0"/>
-              <a:t>15/04/2022</a:t>
+              <a:t>20/04/2022</a:t>
             </a:fld>
             <a:endParaRPr lang="es-ES"/>
           </a:p>
@@ -461,7 +462,7 @@
           <a:p>
             <a:fld id="{3E1544B7-206C-4EA6-AC0C-B0859B395411}" type="datetimeFigureOut">
               <a:rPr lang="es-ES" smtClean="0"/>
-              <a:t>15/04/2022</a:t>
+              <a:t>20/04/2022</a:t>
             </a:fld>
             <a:endParaRPr lang="es-ES"/>
           </a:p>
@@ -669,7 +670,7 @@
           <a:p>
             <a:fld id="{3E1544B7-206C-4EA6-AC0C-B0859B395411}" type="datetimeFigureOut">
               <a:rPr lang="es-ES" smtClean="0"/>
-              <a:t>15/04/2022</a:t>
+              <a:t>20/04/2022</a:t>
             </a:fld>
             <a:endParaRPr lang="es-ES"/>
           </a:p>
@@ -867,7 +868,7 @@
           <a:p>
             <a:fld id="{3E1544B7-206C-4EA6-AC0C-B0859B395411}" type="datetimeFigureOut">
               <a:rPr lang="es-ES" smtClean="0"/>
-              <a:t>15/04/2022</a:t>
+              <a:t>20/04/2022</a:t>
             </a:fld>
             <a:endParaRPr lang="es-ES"/>
           </a:p>
@@ -1142,7 +1143,7 @@
           <a:p>
             <a:fld id="{3E1544B7-206C-4EA6-AC0C-B0859B395411}" type="datetimeFigureOut">
               <a:rPr lang="es-ES" smtClean="0"/>
-              <a:t>15/04/2022</a:t>
+              <a:t>20/04/2022</a:t>
             </a:fld>
             <a:endParaRPr lang="es-ES"/>
           </a:p>
@@ -1407,7 +1408,7 @@
           <a:p>
             <a:fld id="{3E1544B7-206C-4EA6-AC0C-B0859B395411}" type="datetimeFigureOut">
               <a:rPr lang="es-ES" smtClean="0"/>
-              <a:t>15/04/2022</a:t>
+              <a:t>20/04/2022</a:t>
             </a:fld>
             <a:endParaRPr lang="es-ES"/>
           </a:p>
@@ -1819,7 +1820,7 @@
           <a:p>
             <a:fld id="{3E1544B7-206C-4EA6-AC0C-B0859B395411}" type="datetimeFigureOut">
               <a:rPr lang="es-ES" smtClean="0"/>
-              <a:t>15/04/2022</a:t>
+              <a:t>20/04/2022</a:t>
             </a:fld>
             <a:endParaRPr lang="es-ES"/>
           </a:p>
@@ -1960,7 +1961,7 @@
           <a:p>
             <a:fld id="{3E1544B7-206C-4EA6-AC0C-B0859B395411}" type="datetimeFigureOut">
               <a:rPr lang="es-ES" smtClean="0"/>
-              <a:t>15/04/2022</a:t>
+              <a:t>20/04/2022</a:t>
             </a:fld>
             <a:endParaRPr lang="es-ES"/>
           </a:p>
@@ -2073,7 +2074,7 @@
           <a:p>
             <a:fld id="{3E1544B7-206C-4EA6-AC0C-B0859B395411}" type="datetimeFigureOut">
               <a:rPr lang="es-ES" smtClean="0"/>
-              <a:t>15/04/2022</a:t>
+              <a:t>20/04/2022</a:t>
             </a:fld>
             <a:endParaRPr lang="es-ES"/>
           </a:p>
@@ -2384,7 +2385,7 @@
           <a:p>
             <a:fld id="{3E1544B7-206C-4EA6-AC0C-B0859B395411}" type="datetimeFigureOut">
               <a:rPr lang="es-ES" smtClean="0"/>
-              <a:t>15/04/2022</a:t>
+              <a:t>20/04/2022</a:t>
             </a:fld>
             <a:endParaRPr lang="es-ES"/>
           </a:p>
@@ -2672,7 +2673,7 @@
           <a:p>
             <a:fld id="{3E1544B7-206C-4EA6-AC0C-B0859B395411}" type="datetimeFigureOut">
               <a:rPr lang="es-ES" smtClean="0"/>
-              <a:t>15/04/2022</a:t>
+              <a:t>20/04/2022</a:t>
             </a:fld>
             <a:endParaRPr lang="es-ES"/>
           </a:p>
@@ -2913,7 +2914,7 @@
           <a:p>
             <a:fld id="{3E1544B7-206C-4EA6-AC0C-B0859B395411}" type="datetimeFigureOut">
               <a:rPr lang="es-ES" smtClean="0"/>
-              <a:t>15/04/2022</a:t>
+              <a:t>20/04/2022</a:t>
             </a:fld>
             <a:endParaRPr lang="es-ES"/>
           </a:p>
@@ -9954,6 +9955,116 @@
 </p:sld>
 </file>
 
+<file path=ppt/slides/slide6.xml><?xml version="1.0" encoding="utf-8"?>
+<p:sld xmlns:a="http://schemas.openxmlformats.org/drawingml/2006/main" xmlns:r="http://schemas.openxmlformats.org/officeDocument/2006/relationships" xmlns:p="http://schemas.openxmlformats.org/presentationml/2006/main">
+  <p:cSld>
+    <p:bg>
+      <p:bgPr>
+        <a:solidFill>
+          <a:schemeClr val="bg1"/>
+        </a:solidFill>
+        <a:effectLst/>
+      </p:bgPr>
+    </p:bg>
+    <p:spTree>
+      <p:nvGrpSpPr>
+        <p:cNvPr id="1" name=""/>
+        <p:cNvGrpSpPr/>
+        <p:nvPr/>
+      </p:nvGrpSpPr>
+      <p:grpSpPr>
+        <a:xfrm>
+          <a:off x="0" y="0"/>
+          <a:ext cx="0" cy="0"/>
+          <a:chOff x="0" y="0"/>
+          <a:chExt cx="0" cy="0"/>
+        </a:xfrm>
+      </p:grpSpPr>
+      <p:pic>
+        <p:nvPicPr>
+          <p:cNvPr id="7" name="Imagen 6" descr="Gráfico&#10;&#10;Descripción generada automáticamente">
+            <a:extLst>
+              <a:ext uri="{FF2B5EF4-FFF2-40B4-BE49-F238E27FC236}">
+                <a16:creationId xmlns:a16="http://schemas.microsoft.com/office/drawing/2014/main" id="{37606EC5-347B-4BBD-8C24-F9458BDC7E83}"/>
+              </a:ext>
+            </a:extLst>
+          </p:cNvPr>
+          <p:cNvPicPr>
+            <a:picLocks noChangeAspect="1"/>
+          </p:cNvPicPr>
+          <p:nvPr/>
+        </p:nvPicPr>
+        <p:blipFill>
+          <a:blip r:embed="rId2">
+            <a:extLst>
+              <a:ext uri="{28A0092B-C50C-407E-A947-70E740481C1C}">
+                <a14:useLocalDpi xmlns:a14="http://schemas.microsoft.com/office/drawing/2010/main" val="0"/>
+              </a:ext>
+            </a:extLst>
+          </a:blip>
+          <a:stretch>
+            <a:fillRect/>
+          </a:stretch>
+        </p:blipFill>
+        <p:spPr>
+          <a:xfrm>
+            <a:off x="643467" y="1431396"/>
+            <a:ext cx="5291666" cy="3995207"/>
+          </a:xfrm>
+          <a:prstGeom prst="rect">
+            <a:avLst/>
+          </a:prstGeom>
+        </p:spPr>
+      </p:pic>
+      <p:pic>
+        <p:nvPicPr>
+          <p:cNvPr id="5" name="Imagen 4" descr="Interfaz de usuario gráfica&#10;&#10;Descripción generada automáticamente">
+            <a:extLst>
+              <a:ext uri="{FF2B5EF4-FFF2-40B4-BE49-F238E27FC236}">
+                <a16:creationId xmlns:a16="http://schemas.microsoft.com/office/drawing/2014/main" id="{7316FCD4-DCD3-4CFE-A612-C47C9CA099B9}"/>
+              </a:ext>
+            </a:extLst>
+          </p:cNvPr>
+          <p:cNvPicPr>
+            <a:picLocks noChangeAspect="1"/>
+          </p:cNvPicPr>
+          <p:nvPr/>
+        </p:nvPicPr>
+        <p:blipFill>
+          <a:blip r:embed="rId3">
+            <a:extLst>
+              <a:ext uri="{28A0092B-C50C-407E-A947-70E740481C1C}">
+                <a14:useLocalDpi xmlns:a14="http://schemas.microsoft.com/office/drawing/2010/main" val="0"/>
+              </a:ext>
+            </a:extLst>
+          </a:blip>
+          <a:stretch>
+            <a:fillRect/>
+          </a:stretch>
+        </p:blipFill>
+        <p:spPr>
+          <a:xfrm>
+            <a:off x="6256865" y="2066396"/>
+            <a:ext cx="5291667" cy="2725208"/>
+          </a:xfrm>
+          <a:prstGeom prst="rect">
+            <a:avLst/>
+          </a:prstGeom>
+        </p:spPr>
+      </p:pic>
+    </p:spTree>
+    <p:extLst>
+      <p:ext uri="{BB962C8B-B14F-4D97-AF65-F5344CB8AC3E}">
+        <p14:creationId xmlns:p14="http://schemas.microsoft.com/office/powerpoint/2010/main" val="1582732238"/>
+      </p:ext>
+    </p:extLst>
+  </p:cSld>
+  <p:clrMapOvr>
+    <a:masterClrMapping/>
+  </p:clrMapOvr>
+</p:sld>
+</file>
+
 <file path=ppt/theme/theme1.xml><?xml version="1.0" encoding="utf-8"?>
 <a:theme xmlns:a="http://schemas.openxmlformats.org/drawingml/2006/main" name="Tema de Office">
   <a:themeElements>

</xml_diff>

<commit_message>
Añadida la interfaz grafica de principal mentor y añadido el control de las excepciones en sus metodos
</commit_message>
<xml_diff>
--- a/Diseños/aquitectura.pptx
+++ b/Diseños/aquitectura.pptx
@@ -264,7 +264,7 @@
           <a:p>
             <a:fld id="{3E1544B7-206C-4EA6-AC0C-B0859B395411}" type="datetimeFigureOut">
               <a:rPr lang="es-ES" smtClean="0"/>
-              <a:t>20/04/2022</a:t>
+              <a:t>30/04/2022</a:t>
             </a:fld>
             <a:endParaRPr lang="es-ES"/>
           </a:p>
@@ -462,7 +462,7 @@
           <a:p>
             <a:fld id="{3E1544B7-206C-4EA6-AC0C-B0859B395411}" type="datetimeFigureOut">
               <a:rPr lang="es-ES" smtClean="0"/>
-              <a:t>20/04/2022</a:t>
+              <a:t>30/04/2022</a:t>
             </a:fld>
             <a:endParaRPr lang="es-ES"/>
           </a:p>
@@ -670,7 +670,7 @@
           <a:p>
             <a:fld id="{3E1544B7-206C-4EA6-AC0C-B0859B395411}" type="datetimeFigureOut">
               <a:rPr lang="es-ES" smtClean="0"/>
-              <a:t>20/04/2022</a:t>
+              <a:t>30/04/2022</a:t>
             </a:fld>
             <a:endParaRPr lang="es-ES"/>
           </a:p>
@@ -868,7 +868,7 @@
           <a:p>
             <a:fld id="{3E1544B7-206C-4EA6-AC0C-B0859B395411}" type="datetimeFigureOut">
               <a:rPr lang="es-ES" smtClean="0"/>
-              <a:t>20/04/2022</a:t>
+              <a:t>30/04/2022</a:t>
             </a:fld>
             <a:endParaRPr lang="es-ES"/>
           </a:p>
@@ -1143,7 +1143,7 @@
           <a:p>
             <a:fld id="{3E1544B7-206C-4EA6-AC0C-B0859B395411}" type="datetimeFigureOut">
               <a:rPr lang="es-ES" smtClean="0"/>
-              <a:t>20/04/2022</a:t>
+              <a:t>30/04/2022</a:t>
             </a:fld>
             <a:endParaRPr lang="es-ES"/>
           </a:p>
@@ -1408,7 +1408,7 @@
           <a:p>
             <a:fld id="{3E1544B7-206C-4EA6-AC0C-B0859B395411}" type="datetimeFigureOut">
               <a:rPr lang="es-ES" smtClean="0"/>
-              <a:t>20/04/2022</a:t>
+              <a:t>30/04/2022</a:t>
             </a:fld>
             <a:endParaRPr lang="es-ES"/>
           </a:p>
@@ -1820,7 +1820,7 @@
           <a:p>
             <a:fld id="{3E1544B7-206C-4EA6-AC0C-B0859B395411}" type="datetimeFigureOut">
               <a:rPr lang="es-ES" smtClean="0"/>
-              <a:t>20/04/2022</a:t>
+              <a:t>30/04/2022</a:t>
             </a:fld>
             <a:endParaRPr lang="es-ES"/>
           </a:p>
@@ -1961,7 +1961,7 @@
           <a:p>
             <a:fld id="{3E1544B7-206C-4EA6-AC0C-B0859B395411}" type="datetimeFigureOut">
               <a:rPr lang="es-ES" smtClean="0"/>
-              <a:t>20/04/2022</a:t>
+              <a:t>30/04/2022</a:t>
             </a:fld>
             <a:endParaRPr lang="es-ES"/>
           </a:p>
@@ -2074,7 +2074,7 @@
           <a:p>
             <a:fld id="{3E1544B7-206C-4EA6-AC0C-B0859B395411}" type="datetimeFigureOut">
               <a:rPr lang="es-ES" smtClean="0"/>
-              <a:t>20/04/2022</a:t>
+              <a:t>30/04/2022</a:t>
             </a:fld>
             <a:endParaRPr lang="es-ES"/>
           </a:p>
@@ -2385,7 +2385,7 @@
           <a:p>
             <a:fld id="{3E1544B7-206C-4EA6-AC0C-B0859B395411}" type="datetimeFigureOut">
               <a:rPr lang="es-ES" smtClean="0"/>
-              <a:t>20/04/2022</a:t>
+              <a:t>30/04/2022</a:t>
             </a:fld>
             <a:endParaRPr lang="es-ES"/>
           </a:p>
@@ -2673,7 +2673,7 @@
           <a:p>
             <a:fld id="{3E1544B7-206C-4EA6-AC0C-B0859B395411}" type="datetimeFigureOut">
               <a:rPr lang="es-ES" smtClean="0"/>
-              <a:t>20/04/2022</a:t>
+              <a:t>30/04/2022</a:t>
             </a:fld>
             <a:endParaRPr lang="es-ES"/>
           </a:p>
@@ -2914,7 +2914,7 @@
           <a:p>
             <a:fld id="{3E1544B7-206C-4EA6-AC0C-B0859B395411}" type="datetimeFigureOut">
               <a:rPr lang="es-ES" smtClean="0"/>
-              <a:t>20/04/2022</a:t>
+              <a:t>30/04/2022</a:t>
             </a:fld>
             <a:endParaRPr lang="es-ES"/>
           </a:p>
@@ -9658,129 +9658,150 @@
           </a:p>
         </p:txBody>
       </p:sp>
-      <p:sp>
-        <p:nvSpPr>
-          <p:cNvPr id="16" name="CuadroTexto 15">
-            <a:extLst>
-              <a:ext uri="{FF2B5EF4-FFF2-40B4-BE49-F238E27FC236}">
-                <a16:creationId xmlns:a16="http://schemas.microsoft.com/office/drawing/2014/main" id="{8AEEF1A0-F27C-4D1C-8D82-8D435D0EA679}"/>
-              </a:ext>
-            </a:extLst>
-          </p:cNvPr>
-          <p:cNvSpPr txBox="1"/>
-          <p:nvPr/>
-        </p:nvSpPr>
-        <p:spPr>
+      <p:grpSp>
+        <p:nvGrpSpPr>
+          <p:cNvPr id="2" name="Grupo 1">
+            <a:extLst>
+              <a:ext uri="{FF2B5EF4-FFF2-40B4-BE49-F238E27FC236}">
+                <a16:creationId xmlns:a16="http://schemas.microsoft.com/office/drawing/2014/main" id="{70D8B590-4376-496D-B93D-EF0C1BD9AD0F}"/>
+              </a:ext>
+            </a:extLst>
+          </p:cNvPr>
+          <p:cNvGrpSpPr/>
+          <p:nvPr/>
+        </p:nvGrpSpPr>
+        <p:grpSpPr>
           <a:xfrm>
             <a:off x="7504748" y="2089680"/>
             <a:ext cx="1349406" cy="1569660"/>
-          </a:xfrm>
-          <a:prstGeom prst="rect">
-            <a:avLst/>
-          </a:prstGeom>
-          <a:solidFill>
-            <a:schemeClr val="bg1">
-              <a:lumMod val="95000"/>
-            </a:schemeClr>
-          </a:solidFill>
-          <a:ln>
+            <a:chOff x="7504748" y="2089680"/>
+            <a:chExt cx="1349406" cy="1569660"/>
+          </a:xfrm>
+        </p:grpSpPr>
+        <p:sp>
+          <p:nvSpPr>
+            <p:cNvPr id="16" name="CuadroTexto 15">
+              <a:extLst>
+                <a:ext uri="{FF2B5EF4-FFF2-40B4-BE49-F238E27FC236}">
+                  <a16:creationId xmlns:a16="http://schemas.microsoft.com/office/drawing/2014/main" id="{8AEEF1A0-F27C-4D1C-8D82-8D435D0EA679}"/>
+                </a:ext>
+              </a:extLst>
+            </p:cNvPr>
+            <p:cNvSpPr txBox="1"/>
+            <p:nvPr/>
+          </p:nvSpPr>
+          <p:spPr>
+            <a:xfrm>
+              <a:off x="7504748" y="2089680"/>
+              <a:ext cx="1349406" cy="1569660"/>
+            </a:xfrm>
+            <a:prstGeom prst="rect">
+              <a:avLst/>
+            </a:prstGeom>
+            <a:solidFill>
+              <a:schemeClr val="bg1">
+                <a:lumMod val="95000"/>
+              </a:schemeClr>
+            </a:solidFill>
+            <a:ln>
+              <a:noFill/>
+            </a:ln>
+          </p:spPr>
+          <p:txBody>
+            <a:bodyPr wrap="square" rtlCol="0">
+              <a:spAutoFit/>
+            </a:bodyPr>
+            <a:lstStyle/>
+            <a:p>
+              <a:pPr algn="ctr"/>
+              <a:r>
+                <a:rPr lang="es-ES" sz="9600" dirty="0">
+                  <a:ln>
+                    <a:solidFill>
+                      <a:schemeClr val="tx1">
+                        <a:lumMod val="65000"/>
+                        <a:lumOff val="35000"/>
+                      </a:schemeClr>
+                    </a:solidFill>
+                  </a:ln>
+                  <a:solidFill>
+                    <a:srgbClr val="0099FF"/>
+                  </a:solidFill>
+                  <a:effectLst>
+                    <a:innerShdw blurRad="63500" dist="50800" dir="2700000">
+                      <a:prstClr val="black">
+                        <a:alpha val="50000"/>
+                      </a:prstClr>
+                    </a:innerShdw>
+                  </a:effectLst>
+                  <a:latin typeface="Gill Sans MT" panose="020B0502020104020203" pitchFamily="34" charset="0"/>
+                  <a:ea typeface="Cambria Math" panose="02040503050406030204" pitchFamily="18" charset="0"/>
+                  <a:cs typeface="Lao UI" panose="020B0604020202020204" pitchFamily="34" charset="0"/>
+                </a:rPr>
+                <a:t>M</a:t>
+              </a:r>
+            </a:p>
+          </p:txBody>
+        </p:sp>
+        <p:sp>
+          <p:nvSpPr>
+            <p:cNvPr id="17" name="CuadroTexto 16">
+              <a:extLst>
+                <a:ext uri="{FF2B5EF4-FFF2-40B4-BE49-F238E27FC236}">
+                  <a16:creationId xmlns:a16="http://schemas.microsoft.com/office/drawing/2014/main" id="{A1B28C98-A22A-4FA7-A54D-7B63621849F1}"/>
+                </a:ext>
+              </a:extLst>
+            </p:cNvPr>
+            <p:cNvSpPr txBox="1"/>
+            <p:nvPr/>
+          </p:nvSpPr>
+          <p:spPr>
+            <a:xfrm>
+              <a:off x="7504748" y="2775600"/>
+              <a:ext cx="1349405" cy="707886"/>
+            </a:xfrm>
+            <a:prstGeom prst="rect">
+              <a:avLst/>
+            </a:prstGeom>
             <a:noFill/>
-          </a:ln>
-        </p:spPr>
-        <p:txBody>
-          <a:bodyPr wrap="square" rtlCol="0">
-            <a:spAutoFit/>
-          </a:bodyPr>
-          <a:lstStyle/>
-          <a:p>
-            <a:pPr algn="ctr"/>
-            <a:r>
-              <a:rPr lang="es-ES" sz="9600" dirty="0">
-                <a:ln>
+          </p:spPr>
+          <p:txBody>
+            <a:bodyPr wrap="square" rtlCol="0">
+              <a:spAutoFit/>
+            </a:bodyPr>
+            <a:lstStyle/>
+            <a:p>
+              <a:pPr algn="ctr"/>
+              <a:r>
+                <a:rPr lang="es-ES" sz="4000" dirty="0">
+                  <a:ln>
+                    <a:solidFill>
+                      <a:schemeClr val="tx1">
+                        <a:lumMod val="65000"/>
+                        <a:lumOff val="35000"/>
+                      </a:schemeClr>
+                    </a:solidFill>
+                  </a:ln>
                   <a:solidFill>
-                    <a:schemeClr val="tx1">
-                      <a:lumMod val="65000"/>
-                      <a:lumOff val="35000"/>
-                    </a:schemeClr>
+                    <a:srgbClr val="00B0F0"/>
                   </a:solidFill>
-                </a:ln>
-                <a:solidFill>
-                  <a:srgbClr val="0099FF"/>
-                </a:solidFill>
-                <a:effectLst>
-                  <a:innerShdw blurRad="63500" dist="50800" dir="2700000">
-                    <a:prstClr val="black">
-                      <a:alpha val="50000"/>
-                    </a:prstClr>
-                  </a:innerShdw>
-                </a:effectLst>
-                <a:latin typeface="Gill Sans MT" panose="020B0502020104020203" pitchFamily="34" charset="0"/>
-                <a:ea typeface="Cambria Math" panose="02040503050406030204" pitchFamily="18" charset="0"/>
-                <a:cs typeface="Lao UI" panose="020B0604020202020204" pitchFamily="34" charset="0"/>
-              </a:rPr>
-              <a:t>M</a:t>
-            </a:r>
-          </a:p>
-        </p:txBody>
-      </p:sp>
-      <p:sp>
-        <p:nvSpPr>
-          <p:cNvPr id="17" name="CuadroTexto 16">
-            <a:extLst>
-              <a:ext uri="{FF2B5EF4-FFF2-40B4-BE49-F238E27FC236}">
-                <a16:creationId xmlns:a16="http://schemas.microsoft.com/office/drawing/2014/main" id="{A1B28C98-A22A-4FA7-A54D-7B63621849F1}"/>
-              </a:ext>
-            </a:extLst>
-          </p:cNvPr>
-          <p:cNvSpPr txBox="1"/>
-          <p:nvPr/>
-        </p:nvSpPr>
-        <p:spPr>
-          <a:xfrm>
-            <a:off x="7504748" y="2775600"/>
-            <a:ext cx="1349405" cy="707886"/>
-          </a:xfrm>
-          <a:prstGeom prst="rect">
-            <a:avLst/>
-          </a:prstGeom>
-          <a:noFill/>
-        </p:spPr>
-        <p:txBody>
-          <a:bodyPr wrap="square" rtlCol="0">
-            <a:spAutoFit/>
-          </a:bodyPr>
-          <a:lstStyle/>
-          <a:p>
-            <a:pPr algn="ctr"/>
-            <a:r>
-              <a:rPr lang="es-ES" sz="4000" dirty="0">
-                <a:ln>
-                  <a:solidFill>
-                    <a:schemeClr val="tx1">
-                      <a:lumMod val="65000"/>
-                      <a:lumOff val="35000"/>
-                    </a:schemeClr>
-                  </a:solidFill>
-                </a:ln>
-                <a:solidFill>
-                  <a:srgbClr val="00B0F0"/>
-                </a:solidFill>
-                <a:effectLst>
-                  <a:innerShdw blurRad="63500" dist="50800" dir="18900000">
-                    <a:prstClr val="black">
-                      <a:alpha val="50000"/>
-                    </a:prstClr>
-                  </a:innerShdw>
-                </a:effectLst>
-                <a:latin typeface="Gill Sans MT" panose="020B0502020104020203" pitchFamily="34" charset="0"/>
-                <a:ea typeface="Cambria Math" panose="02040503050406030204" pitchFamily="18" charset="0"/>
-                <a:cs typeface="Lao UI" panose="020B0604020202020204" pitchFamily="34" charset="0"/>
-              </a:rPr>
-              <a:t>M</a:t>
-            </a:r>
-          </a:p>
-        </p:txBody>
-      </p:sp>
+                  <a:effectLst>
+                    <a:innerShdw blurRad="63500" dist="50800" dir="18900000">
+                      <a:prstClr val="black">
+                        <a:alpha val="50000"/>
+                      </a:prstClr>
+                    </a:innerShdw>
+                  </a:effectLst>
+                  <a:latin typeface="Gill Sans MT" panose="020B0502020104020203" pitchFamily="34" charset="0"/>
+                  <a:ea typeface="Cambria Math" panose="02040503050406030204" pitchFamily="18" charset="0"/>
+                  <a:cs typeface="Lao UI" panose="020B0604020202020204" pitchFamily="34" charset="0"/>
+                </a:rPr>
+                <a:t>M</a:t>
+              </a:r>
+            </a:p>
+          </p:txBody>
+        </p:sp>
+      </p:grpSp>
       <p:sp>
         <p:nvSpPr>
           <p:cNvPr id="22" name="CuadroTexto 21">
@@ -9942,6 +9963,42 @@
           </a:fontRef>
         </p:style>
       </p:cxnSp>
+      <p:pic>
+        <p:nvPicPr>
+          <p:cNvPr id="4" name="Imagen 3" descr="Forma&#10;&#10;Descripción generada automáticamente con confianza baja">
+            <a:extLst>
+              <a:ext uri="{FF2B5EF4-FFF2-40B4-BE49-F238E27FC236}">
+                <a16:creationId xmlns:a16="http://schemas.microsoft.com/office/drawing/2014/main" id="{499C93E6-07F2-890B-80E7-E607C9168248}"/>
+              </a:ext>
+            </a:extLst>
+          </p:cNvPr>
+          <p:cNvPicPr>
+            <a:picLocks noChangeAspect="1"/>
+          </p:cNvPicPr>
+          <p:nvPr/>
+        </p:nvPicPr>
+        <p:blipFill>
+          <a:blip r:embed="rId2">
+            <a:extLst>
+              <a:ext uri="{28A0092B-C50C-407E-A947-70E740481C1C}">
+                <a14:useLocalDpi xmlns:a14="http://schemas.microsoft.com/office/drawing/2010/main" val="0"/>
+              </a:ext>
+            </a:extLst>
+          </a:blip>
+          <a:stretch>
+            <a:fillRect/>
+          </a:stretch>
+        </p:blipFill>
+        <p:spPr>
+          <a:xfrm>
+            <a:off x="4900437" y="5365968"/>
+            <a:ext cx="478349" cy="478349"/>
+          </a:xfrm>
+          <a:prstGeom prst="rect">
+            <a:avLst/>
+          </a:prstGeom>
+        </p:spPr>
+      </p:pic>
     </p:spTree>
     <p:extLst>
       <p:ext uri="{BB962C8B-B14F-4D97-AF65-F5344CB8AC3E}">

</xml_diff>

<commit_message>
Implementada la interfaz de los mentorizados
</commit_message>
<xml_diff>
--- a/Diseños/aquitectura.pptx
+++ b/Diseños/aquitectura.pptx
@@ -264,7 +264,7 @@
           <a:p>
             <a:fld id="{3E1544B7-206C-4EA6-AC0C-B0859B395411}" type="datetimeFigureOut">
               <a:rPr lang="es-ES" smtClean="0"/>
-              <a:t>30/04/2022</a:t>
+              <a:t>01/05/2022</a:t>
             </a:fld>
             <a:endParaRPr lang="es-ES"/>
           </a:p>
@@ -462,7 +462,7 @@
           <a:p>
             <a:fld id="{3E1544B7-206C-4EA6-AC0C-B0859B395411}" type="datetimeFigureOut">
               <a:rPr lang="es-ES" smtClean="0"/>
-              <a:t>30/04/2022</a:t>
+              <a:t>01/05/2022</a:t>
             </a:fld>
             <a:endParaRPr lang="es-ES"/>
           </a:p>
@@ -670,7 +670,7 @@
           <a:p>
             <a:fld id="{3E1544B7-206C-4EA6-AC0C-B0859B395411}" type="datetimeFigureOut">
               <a:rPr lang="es-ES" smtClean="0"/>
-              <a:t>30/04/2022</a:t>
+              <a:t>01/05/2022</a:t>
             </a:fld>
             <a:endParaRPr lang="es-ES"/>
           </a:p>
@@ -868,7 +868,7 @@
           <a:p>
             <a:fld id="{3E1544B7-206C-4EA6-AC0C-B0859B395411}" type="datetimeFigureOut">
               <a:rPr lang="es-ES" smtClean="0"/>
-              <a:t>30/04/2022</a:t>
+              <a:t>01/05/2022</a:t>
             </a:fld>
             <a:endParaRPr lang="es-ES"/>
           </a:p>
@@ -1143,7 +1143,7 @@
           <a:p>
             <a:fld id="{3E1544B7-206C-4EA6-AC0C-B0859B395411}" type="datetimeFigureOut">
               <a:rPr lang="es-ES" smtClean="0"/>
-              <a:t>30/04/2022</a:t>
+              <a:t>01/05/2022</a:t>
             </a:fld>
             <a:endParaRPr lang="es-ES"/>
           </a:p>
@@ -1408,7 +1408,7 @@
           <a:p>
             <a:fld id="{3E1544B7-206C-4EA6-AC0C-B0859B395411}" type="datetimeFigureOut">
               <a:rPr lang="es-ES" smtClean="0"/>
-              <a:t>30/04/2022</a:t>
+              <a:t>01/05/2022</a:t>
             </a:fld>
             <a:endParaRPr lang="es-ES"/>
           </a:p>
@@ -1820,7 +1820,7 @@
           <a:p>
             <a:fld id="{3E1544B7-206C-4EA6-AC0C-B0859B395411}" type="datetimeFigureOut">
               <a:rPr lang="es-ES" smtClean="0"/>
-              <a:t>30/04/2022</a:t>
+              <a:t>01/05/2022</a:t>
             </a:fld>
             <a:endParaRPr lang="es-ES"/>
           </a:p>
@@ -1961,7 +1961,7 @@
           <a:p>
             <a:fld id="{3E1544B7-206C-4EA6-AC0C-B0859B395411}" type="datetimeFigureOut">
               <a:rPr lang="es-ES" smtClean="0"/>
-              <a:t>30/04/2022</a:t>
+              <a:t>01/05/2022</a:t>
             </a:fld>
             <a:endParaRPr lang="es-ES"/>
           </a:p>
@@ -2074,7 +2074,7 @@
           <a:p>
             <a:fld id="{3E1544B7-206C-4EA6-AC0C-B0859B395411}" type="datetimeFigureOut">
               <a:rPr lang="es-ES" smtClean="0"/>
-              <a:t>30/04/2022</a:t>
+              <a:t>01/05/2022</a:t>
             </a:fld>
             <a:endParaRPr lang="es-ES"/>
           </a:p>
@@ -2385,7 +2385,7 @@
           <a:p>
             <a:fld id="{3E1544B7-206C-4EA6-AC0C-B0859B395411}" type="datetimeFigureOut">
               <a:rPr lang="es-ES" smtClean="0"/>
-              <a:t>30/04/2022</a:t>
+              <a:t>01/05/2022</a:t>
             </a:fld>
             <a:endParaRPr lang="es-ES"/>
           </a:p>
@@ -2673,7 +2673,7 @@
           <a:p>
             <a:fld id="{3E1544B7-206C-4EA6-AC0C-B0859B395411}" type="datetimeFigureOut">
               <a:rPr lang="es-ES" smtClean="0"/>
-              <a:t>30/04/2022</a:t>
+              <a:t>01/05/2022</a:t>
             </a:fld>
             <a:endParaRPr lang="es-ES"/>
           </a:p>
@@ -2914,7 +2914,7 @@
           <a:p>
             <a:fld id="{3E1544B7-206C-4EA6-AC0C-B0859B395411}" type="datetimeFigureOut">
               <a:rPr lang="es-ES" smtClean="0"/>
-              <a:t>30/04/2022</a:t>
+              <a:t>01/05/2022</a:t>
             </a:fld>
             <a:endParaRPr lang="es-ES"/>
           </a:p>
@@ -9999,6 +9999,673 @@
           </a:prstGeom>
         </p:spPr>
       </p:pic>
+      <p:sp>
+        <p:nvSpPr>
+          <p:cNvPr id="3" name="Estrella: 5 puntas 2">
+            <a:extLst>
+              <a:ext uri="{FF2B5EF4-FFF2-40B4-BE49-F238E27FC236}">
+                <a16:creationId xmlns:a16="http://schemas.microsoft.com/office/drawing/2014/main" id="{BA0787DC-56F7-E1B3-60EA-DABF9368DF69}"/>
+              </a:ext>
+            </a:extLst>
+          </p:cNvPr>
+          <p:cNvSpPr/>
+          <p:nvPr/>
+        </p:nvSpPr>
+        <p:spPr>
+          <a:xfrm>
+            <a:off x="1765300" y="4987508"/>
+            <a:ext cx="478349" cy="478349"/>
+          </a:xfrm>
+          <a:prstGeom prst="star5">
+            <a:avLst/>
+          </a:prstGeom>
+          <a:solidFill>
+            <a:schemeClr val="accent4">
+              <a:lumMod val="60000"/>
+              <a:lumOff val="40000"/>
+            </a:schemeClr>
+          </a:solidFill>
+          <a:ln>
+            <a:solidFill>
+              <a:schemeClr val="tx1"/>
+            </a:solidFill>
+          </a:ln>
+          <a:effectLst/>
+        </p:spPr>
+        <p:style>
+          <a:lnRef idx="2">
+            <a:schemeClr val="accent1">
+              <a:shade val="50000"/>
+            </a:schemeClr>
+          </a:lnRef>
+          <a:fillRef idx="1">
+            <a:schemeClr val="accent1"/>
+          </a:fillRef>
+          <a:effectRef idx="0">
+            <a:schemeClr val="accent1"/>
+          </a:effectRef>
+          <a:fontRef idx="minor">
+            <a:schemeClr val="lt1"/>
+          </a:fontRef>
+        </p:style>
+        <p:txBody>
+          <a:bodyPr rtlCol="0" anchor="ctr"/>
+          <a:lstStyle/>
+          <a:p>
+            <a:pPr algn="ctr"/>
+            <a:r>
+              <a:rPr lang="es-ES" sz="1400" dirty="0"/>
+              <a:t>1</a:t>
+            </a:r>
+          </a:p>
+        </p:txBody>
+      </p:sp>
+      <p:sp>
+        <p:nvSpPr>
+          <p:cNvPr id="18" name="Estrella: 5 puntas 17">
+            <a:extLst>
+              <a:ext uri="{FF2B5EF4-FFF2-40B4-BE49-F238E27FC236}">
+                <a16:creationId xmlns:a16="http://schemas.microsoft.com/office/drawing/2014/main" id="{C4971CD6-BB5B-556E-1551-EC08363F2E05}"/>
+              </a:ext>
+            </a:extLst>
+          </p:cNvPr>
+          <p:cNvSpPr/>
+          <p:nvPr/>
+        </p:nvSpPr>
+        <p:spPr>
+          <a:xfrm>
+            <a:off x="2326438" y="4987508"/>
+            <a:ext cx="478349" cy="478349"/>
+          </a:xfrm>
+          <a:prstGeom prst="star5">
+            <a:avLst/>
+          </a:prstGeom>
+          <a:solidFill>
+            <a:schemeClr val="accent4">
+              <a:lumMod val="60000"/>
+              <a:lumOff val="40000"/>
+            </a:schemeClr>
+          </a:solidFill>
+          <a:ln>
+            <a:solidFill>
+              <a:schemeClr val="tx1"/>
+            </a:solidFill>
+          </a:ln>
+          <a:effectLst/>
+        </p:spPr>
+        <p:style>
+          <a:lnRef idx="2">
+            <a:schemeClr val="accent1">
+              <a:shade val="50000"/>
+            </a:schemeClr>
+          </a:lnRef>
+          <a:fillRef idx="1">
+            <a:schemeClr val="accent1"/>
+          </a:fillRef>
+          <a:effectRef idx="0">
+            <a:schemeClr val="accent1"/>
+          </a:effectRef>
+          <a:fontRef idx="minor">
+            <a:schemeClr val="lt1"/>
+          </a:fontRef>
+        </p:style>
+        <p:txBody>
+          <a:bodyPr rtlCol="0" anchor="ctr"/>
+          <a:lstStyle/>
+          <a:p>
+            <a:pPr algn="ctr"/>
+            <a:r>
+              <a:rPr lang="es-ES" sz="1400" dirty="0"/>
+              <a:t>2</a:t>
+            </a:r>
+          </a:p>
+        </p:txBody>
+      </p:sp>
+      <p:sp>
+        <p:nvSpPr>
+          <p:cNvPr id="19" name="Estrella: 5 puntas 18">
+            <a:extLst>
+              <a:ext uri="{FF2B5EF4-FFF2-40B4-BE49-F238E27FC236}">
+                <a16:creationId xmlns:a16="http://schemas.microsoft.com/office/drawing/2014/main" id="{75780B8A-547C-C9A3-8B74-0B8E2F9A8859}"/>
+              </a:ext>
+            </a:extLst>
+          </p:cNvPr>
+          <p:cNvSpPr/>
+          <p:nvPr/>
+        </p:nvSpPr>
+        <p:spPr>
+          <a:xfrm>
+            <a:off x="2908098" y="4987508"/>
+            <a:ext cx="478349" cy="478349"/>
+          </a:xfrm>
+          <a:prstGeom prst="star5">
+            <a:avLst/>
+          </a:prstGeom>
+          <a:solidFill>
+            <a:schemeClr val="accent4">
+              <a:lumMod val="60000"/>
+              <a:lumOff val="40000"/>
+            </a:schemeClr>
+          </a:solidFill>
+          <a:ln>
+            <a:solidFill>
+              <a:schemeClr val="tx1"/>
+            </a:solidFill>
+          </a:ln>
+          <a:effectLst/>
+        </p:spPr>
+        <p:style>
+          <a:lnRef idx="2">
+            <a:schemeClr val="accent1">
+              <a:shade val="50000"/>
+            </a:schemeClr>
+          </a:lnRef>
+          <a:fillRef idx="1">
+            <a:schemeClr val="accent1"/>
+          </a:fillRef>
+          <a:effectRef idx="0">
+            <a:schemeClr val="accent1"/>
+          </a:effectRef>
+          <a:fontRef idx="minor">
+            <a:schemeClr val="lt1"/>
+          </a:fontRef>
+        </p:style>
+        <p:txBody>
+          <a:bodyPr rtlCol="0" anchor="ctr"/>
+          <a:lstStyle/>
+          <a:p>
+            <a:pPr algn="ctr"/>
+            <a:r>
+              <a:rPr lang="es-ES" sz="1400" dirty="0"/>
+              <a:t>3</a:t>
+            </a:r>
+          </a:p>
+        </p:txBody>
+      </p:sp>
+      <p:sp>
+        <p:nvSpPr>
+          <p:cNvPr id="20" name="Estrella: 5 puntas 19">
+            <a:extLst>
+              <a:ext uri="{FF2B5EF4-FFF2-40B4-BE49-F238E27FC236}">
+                <a16:creationId xmlns:a16="http://schemas.microsoft.com/office/drawing/2014/main" id="{3DCB8D53-8834-326E-01DC-2871EB360A90}"/>
+              </a:ext>
+            </a:extLst>
+          </p:cNvPr>
+          <p:cNvSpPr/>
+          <p:nvPr/>
+        </p:nvSpPr>
+        <p:spPr>
+          <a:xfrm>
+            <a:off x="3474730" y="4987508"/>
+            <a:ext cx="478349" cy="478349"/>
+          </a:xfrm>
+          <a:prstGeom prst="star5">
+            <a:avLst/>
+          </a:prstGeom>
+          <a:solidFill>
+            <a:schemeClr val="accent4">
+              <a:lumMod val="60000"/>
+              <a:lumOff val="40000"/>
+            </a:schemeClr>
+          </a:solidFill>
+          <a:ln>
+            <a:solidFill>
+              <a:schemeClr val="tx1"/>
+            </a:solidFill>
+          </a:ln>
+          <a:effectLst/>
+        </p:spPr>
+        <p:style>
+          <a:lnRef idx="2">
+            <a:schemeClr val="accent1">
+              <a:shade val="50000"/>
+            </a:schemeClr>
+          </a:lnRef>
+          <a:fillRef idx="1">
+            <a:schemeClr val="accent1"/>
+          </a:fillRef>
+          <a:effectRef idx="0">
+            <a:schemeClr val="accent1"/>
+          </a:effectRef>
+          <a:fontRef idx="minor">
+            <a:schemeClr val="lt1"/>
+          </a:fontRef>
+        </p:style>
+        <p:txBody>
+          <a:bodyPr rtlCol="0" anchor="ctr"/>
+          <a:lstStyle/>
+          <a:p>
+            <a:pPr algn="ctr"/>
+            <a:r>
+              <a:rPr lang="es-ES" sz="1400" dirty="0"/>
+              <a:t>4</a:t>
+            </a:r>
+          </a:p>
+        </p:txBody>
+      </p:sp>
+      <p:sp>
+        <p:nvSpPr>
+          <p:cNvPr id="21" name="Estrella: 5 puntas 20">
+            <a:extLst>
+              <a:ext uri="{FF2B5EF4-FFF2-40B4-BE49-F238E27FC236}">
+                <a16:creationId xmlns:a16="http://schemas.microsoft.com/office/drawing/2014/main" id="{4FAE4C04-0151-BB28-702C-E1C8ECF96613}"/>
+              </a:ext>
+            </a:extLst>
+          </p:cNvPr>
+          <p:cNvSpPr/>
+          <p:nvPr/>
+        </p:nvSpPr>
+        <p:spPr>
+          <a:xfrm>
+            <a:off x="1765300" y="5579294"/>
+            <a:ext cx="478349" cy="478349"/>
+          </a:xfrm>
+          <a:prstGeom prst="star5">
+            <a:avLst/>
+          </a:prstGeom>
+          <a:solidFill>
+            <a:schemeClr val="accent4">
+              <a:lumMod val="60000"/>
+              <a:lumOff val="40000"/>
+            </a:schemeClr>
+          </a:solidFill>
+          <a:ln>
+            <a:solidFill>
+              <a:schemeClr val="tx1"/>
+            </a:solidFill>
+          </a:ln>
+          <a:effectLst/>
+        </p:spPr>
+        <p:style>
+          <a:lnRef idx="2">
+            <a:schemeClr val="accent1">
+              <a:shade val="50000"/>
+            </a:schemeClr>
+          </a:lnRef>
+          <a:fillRef idx="1">
+            <a:schemeClr val="accent1"/>
+          </a:fillRef>
+          <a:effectRef idx="0">
+            <a:schemeClr val="accent1"/>
+          </a:effectRef>
+          <a:fontRef idx="minor">
+            <a:schemeClr val="lt1"/>
+          </a:fontRef>
+        </p:style>
+        <p:txBody>
+          <a:bodyPr rtlCol="0" anchor="ctr"/>
+          <a:lstStyle/>
+          <a:p>
+            <a:pPr algn="ctr"/>
+            <a:r>
+              <a:rPr lang="es-ES" sz="1400" dirty="0"/>
+              <a:t>6</a:t>
+            </a:r>
+          </a:p>
+        </p:txBody>
+      </p:sp>
+      <p:sp>
+        <p:nvSpPr>
+          <p:cNvPr id="26" name="Estrella: 5 puntas 25">
+            <a:extLst>
+              <a:ext uri="{FF2B5EF4-FFF2-40B4-BE49-F238E27FC236}">
+                <a16:creationId xmlns:a16="http://schemas.microsoft.com/office/drawing/2014/main" id="{D1DF2B77-C5DE-3ED1-28CD-EB155A414103}"/>
+              </a:ext>
+            </a:extLst>
+          </p:cNvPr>
+          <p:cNvSpPr/>
+          <p:nvPr/>
+        </p:nvSpPr>
+        <p:spPr>
+          <a:xfrm>
+            <a:off x="2326438" y="5579293"/>
+            <a:ext cx="478349" cy="478349"/>
+          </a:xfrm>
+          <a:prstGeom prst="star5">
+            <a:avLst/>
+          </a:prstGeom>
+          <a:solidFill>
+            <a:schemeClr val="accent4">
+              <a:lumMod val="60000"/>
+              <a:lumOff val="40000"/>
+            </a:schemeClr>
+          </a:solidFill>
+          <a:ln>
+            <a:solidFill>
+              <a:schemeClr val="tx1"/>
+            </a:solidFill>
+          </a:ln>
+          <a:effectLst/>
+        </p:spPr>
+        <p:style>
+          <a:lnRef idx="2">
+            <a:schemeClr val="accent1">
+              <a:shade val="50000"/>
+            </a:schemeClr>
+          </a:lnRef>
+          <a:fillRef idx="1">
+            <a:schemeClr val="accent1"/>
+          </a:fillRef>
+          <a:effectRef idx="0">
+            <a:schemeClr val="accent1"/>
+          </a:effectRef>
+          <a:fontRef idx="minor">
+            <a:schemeClr val="lt1"/>
+          </a:fontRef>
+        </p:style>
+        <p:txBody>
+          <a:bodyPr rtlCol="0" anchor="ctr"/>
+          <a:lstStyle/>
+          <a:p>
+            <a:pPr algn="ctr"/>
+            <a:r>
+              <a:rPr lang="es-ES" sz="1400" dirty="0"/>
+              <a:t>7</a:t>
+            </a:r>
+          </a:p>
+        </p:txBody>
+      </p:sp>
+      <p:sp>
+        <p:nvSpPr>
+          <p:cNvPr id="27" name="Estrella: 5 puntas 26">
+            <a:extLst>
+              <a:ext uri="{FF2B5EF4-FFF2-40B4-BE49-F238E27FC236}">
+                <a16:creationId xmlns:a16="http://schemas.microsoft.com/office/drawing/2014/main" id="{E8518ADC-F8EB-C33F-14EB-0F5D35E0B051}"/>
+              </a:ext>
+            </a:extLst>
+          </p:cNvPr>
+          <p:cNvSpPr/>
+          <p:nvPr/>
+        </p:nvSpPr>
+        <p:spPr>
+          <a:xfrm>
+            <a:off x="2908098" y="5579292"/>
+            <a:ext cx="478349" cy="478349"/>
+          </a:xfrm>
+          <a:prstGeom prst="star5">
+            <a:avLst/>
+          </a:prstGeom>
+          <a:solidFill>
+            <a:schemeClr val="accent4">
+              <a:lumMod val="60000"/>
+              <a:lumOff val="40000"/>
+            </a:schemeClr>
+          </a:solidFill>
+          <a:ln>
+            <a:solidFill>
+              <a:schemeClr val="tx1"/>
+            </a:solidFill>
+          </a:ln>
+          <a:effectLst/>
+        </p:spPr>
+        <p:style>
+          <a:lnRef idx="2">
+            <a:schemeClr val="accent1">
+              <a:shade val="50000"/>
+            </a:schemeClr>
+          </a:lnRef>
+          <a:fillRef idx="1">
+            <a:schemeClr val="accent1"/>
+          </a:fillRef>
+          <a:effectRef idx="0">
+            <a:schemeClr val="accent1"/>
+          </a:effectRef>
+          <a:fontRef idx="minor">
+            <a:schemeClr val="lt1"/>
+          </a:fontRef>
+        </p:style>
+        <p:txBody>
+          <a:bodyPr rtlCol="0" anchor="ctr"/>
+          <a:lstStyle/>
+          <a:p>
+            <a:pPr algn="ctr"/>
+            <a:r>
+              <a:rPr lang="es-ES" sz="1400" dirty="0"/>
+              <a:t>8</a:t>
+            </a:r>
+          </a:p>
+        </p:txBody>
+      </p:sp>
+      <p:sp>
+        <p:nvSpPr>
+          <p:cNvPr id="28" name="Estrella: 5 puntas 27">
+            <a:extLst>
+              <a:ext uri="{FF2B5EF4-FFF2-40B4-BE49-F238E27FC236}">
+                <a16:creationId xmlns:a16="http://schemas.microsoft.com/office/drawing/2014/main" id="{0907E525-70A2-FACF-C313-8B70DD841370}"/>
+              </a:ext>
+            </a:extLst>
+          </p:cNvPr>
+          <p:cNvSpPr/>
+          <p:nvPr/>
+        </p:nvSpPr>
+        <p:spPr>
+          <a:xfrm>
+            <a:off x="3469236" y="5579289"/>
+            <a:ext cx="478349" cy="478349"/>
+          </a:xfrm>
+          <a:prstGeom prst="star5">
+            <a:avLst/>
+          </a:prstGeom>
+          <a:solidFill>
+            <a:schemeClr val="accent4">
+              <a:lumMod val="60000"/>
+              <a:lumOff val="40000"/>
+            </a:schemeClr>
+          </a:solidFill>
+          <a:ln>
+            <a:solidFill>
+              <a:schemeClr val="tx1"/>
+            </a:solidFill>
+          </a:ln>
+          <a:effectLst/>
+        </p:spPr>
+        <p:style>
+          <a:lnRef idx="2">
+            <a:schemeClr val="accent1">
+              <a:shade val="50000"/>
+            </a:schemeClr>
+          </a:lnRef>
+          <a:fillRef idx="1">
+            <a:schemeClr val="accent1"/>
+          </a:fillRef>
+          <a:effectRef idx="0">
+            <a:schemeClr val="accent1"/>
+          </a:effectRef>
+          <a:fontRef idx="minor">
+            <a:schemeClr val="lt1"/>
+          </a:fontRef>
+        </p:style>
+        <p:txBody>
+          <a:bodyPr rtlCol="0" anchor="ctr"/>
+          <a:lstStyle/>
+          <a:p>
+            <a:pPr algn="ctr"/>
+            <a:r>
+              <a:rPr lang="es-ES" sz="1400" dirty="0"/>
+              <a:t>9</a:t>
+            </a:r>
+          </a:p>
+        </p:txBody>
+      </p:sp>
+      <p:sp>
+        <p:nvSpPr>
+          <p:cNvPr id="29" name="Estrella: 5 puntas 28">
+            <a:extLst>
+              <a:ext uri="{FF2B5EF4-FFF2-40B4-BE49-F238E27FC236}">
+                <a16:creationId xmlns:a16="http://schemas.microsoft.com/office/drawing/2014/main" id="{1F0515AA-F954-9F99-1DA4-F47C670CF520}"/>
+              </a:ext>
+            </a:extLst>
+          </p:cNvPr>
+          <p:cNvSpPr/>
+          <p:nvPr/>
+        </p:nvSpPr>
+        <p:spPr>
+          <a:xfrm>
+            <a:off x="4019904" y="4987507"/>
+            <a:ext cx="478349" cy="478349"/>
+          </a:xfrm>
+          <a:prstGeom prst="star5">
+            <a:avLst/>
+          </a:prstGeom>
+          <a:solidFill>
+            <a:schemeClr val="accent4">
+              <a:lumMod val="60000"/>
+              <a:lumOff val="40000"/>
+            </a:schemeClr>
+          </a:solidFill>
+          <a:ln>
+            <a:solidFill>
+              <a:schemeClr val="tx1"/>
+            </a:solidFill>
+          </a:ln>
+          <a:effectLst/>
+        </p:spPr>
+        <p:style>
+          <a:lnRef idx="2">
+            <a:schemeClr val="accent1">
+              <a:shade val="50000"/>
+            </a:schemeClr>
+          </a:lnRef>
+          <a:fillRef idx="1">
+            <a:schemeClr val="accent1"/>
+          </a:fillRef>
+          <a:effectRef idx="0">
+            <a:schemeClr val="accent1"/>
+          </a:effectRef>
+          <a:fontRef idx="minor">
+            <a:schemeClr val="lt1"/>
+          </a:fontRef>
+        </p:style>
+        <p:txBody>
+          <a:bodyPr rtlCol="0" anchor="ctr"/>
+          <a:lstStyle/>
+          <a:p>
+            <a:pPr algn="ctr"/>
+            <a:r>
+              <a:rPr lang="es-ES" sz="1400" dirty="0"/>
+              <a:t>5</a:t>
+            </a:r>
+          </a:p>
+        </p:txBody>
+      </p:sp>
+      <p:grpSp>
+        <p:nvGrpSpPr>
+          <p:cNvPr id="6" name="Grupo 5">
+            <a:extLst>
+              <a:ext uri="{FF2B5EF4-FFF2-40B4-BE49-F238E27FC236}">
+                <a16:creationId xmlns:a16="http://schemas.microsoft.com/office/drawing/2014/main" id="{3476729C-E28F-63A5-5670-9F663549B125}"/>
+              </a:ext>
+            </a:extLst>
+          </p:cNvPr>
+          <p:cNvGrpSpPr/>
+          <p:nvPr/>
+        </p:nvGrpSpPr>
+        <p:grpSpPr>
+          <a:xfrm>
+            <a:off x="4019903" y="5579290"/>
+            <a:ext cx="478349" cy="478349"/>
+            <a:chOff x="4019903" y="5579290"/>
+            <a:chExt cx="478349" cy="478349"/>
+          </a:xfrm>
+        </p:grpSpPr>
+        <p:sp>
+          <p:nvSpPr>
+            <p:cNvPr id="30" name="Estrella: 5 puntas 29">
+              <a:extLst>
+                <a:ext uri="{FF2B5EF4-FFF2-40B4-BE49-F238E27FC236}">
+                  <a16:creationId xmlns:a16="http://schemas.microsoft.com/office/drawing/2014/main" id="{6A640D2D-70F9-C373-4C60-B848DDC49F8F}"/>
+                </a:ext>
+              </a:extLst>
+            </p:cNvPr>
+            <p:cNvSpPr/>
+            <p:nvPr/>
+          </p:nvSpPr>
+          <p:spPr>
+            <a:xfrm>
+              <a:off x="4019903" y="5579290"/>
+              <a:ext cx="478349" cy="478349"/>
+            </a:xfrm>
+            <a:prstGeom prst="star5">
+              <a:avLst/>
+            </a:prstGeom>
+            <a:solidFill>
+              <a:schemeClr val="accent4">
+                <a:lumMod val="60000"/>
+                <a:lumOff val="40000"/>
+              </a:schemeClr>
+            </a:solidFill>
+            <a:ln>
+              <a:solidFill>
+                <a:schemeClr val="tx1"/>
+              </a:solidFill>
+            </a:ln>
+            <a:effectLst/>
+          </p:spPr>
+          <p:style>
+            <a:lnRef idx="2">
+              <a:schemeClr val="accent1">
+                <a:shade val="50000"/>
+              </a:schemeClr>
+            </a:lnRef>
+            <a:fillRef idx="1">
+              <a:schemeClr val="accent1"/>
+            </a:fillRef>
+            <a:effectRef idx="0">
+              <a:schemeClr val="accent1"/>
+            </a:effectRef>
+            <a:fontRef idx="minor">
+              <a:schemeClr val="lt1"/>
+            </a:fontRef>
+          </p:style>
+          <p:txBody>
+            <a:bodyPr rtlCol="0" anchor="ctr"/>
+            <a:lstStyle/>
+            <a:p>
+              <a:pPr algn="ctr"/>
+              <a:endParaRPr lang="es-ES" sz="1050" dirty="0"/>
+            </a:p>
+          </p:txBody>
+        </p:sp>
+        <p:sp>
+          <p:nvSpPr>
+            <p:cNvPr id="5" name="CuadroTexto 4">
+              <a:extLst>
+                <a:ext uri="{FF2B5EF4-FFF2-40B4-BE49-F238E27FC236}">
+                  <a16:creationId xmlns:a16="http://schemas.microsoft.com/office/drawing/2014/main" id="{44668861-5B29-1F83-D407-A240877ACC63}"/>
+                </a:ext>
+              </a:extLst>
+            </p:cNvPr>
+            <p:cNvSpPr txBox="1"/>
+            <p:nvPr/>
+          </p:nvSpPr>
+          <p:spPr>
+            <a:xfrm>
+              <a:off x="4072387" y="5713288"/>
+              <a:ext cx="403860" cy="307777"/>
+            </a:xfrm>
+            <a:prstGeom prst="rect">
+              <a:avLst/>
+            </a:prstGeom>
+            <a:noFill/>
+          </p:spPr>
+          <p:txBody>
+            <a:bodyPr wrap="square" rtlCol="0">
+              <a:spAutoFit/>
+            </a:bodyPr>
+            <a:lstStyle/>
+            <a:p>
+              <a:r>
+                <a:rPr lang="es-ES" sz="1400" dirty="0">
+                  <a:solidFill>
+                    <a:schemeClr val="bg1"/>
+                  </a:solidFill>
+                </a:rPr>
+                <a:t>10</a:t>
+              </a:r>
+            </a:p>
+          </p:txBody>
+        </p:sp>
+      </p:grpSp>
     </p:spTree>
     <p:extLst>
       <p:ext uri="{BB962C8B-B14F-4D97-AF65-F5344CB8AC3E}">

</xml_diff>

<commit_message>
Reordenación de la estructura del proyecto, de las clases auxiliares. Agregada la herramienta de chat.
</commit_message>
<xml_diff>
--- a/Diseños/aquitectura.pptx
+++ b/Diseños/aquitectura.pptx
@@ -11,6 +11,7 @@
     <p:sldId id="258" r:id="rId5"/>
     <p:sldId id="260" r:id="rId6"/>
     <p:sldId id="261" r:id="rId7"/>
+    <p:sldId id="262" r:id="rId8"/>
   </p:sldIdLst>
   <p:sldSz cx="12192000" cy="6858000"/>
   <p:notesSz cx="6858000" cy="9144000"/>
@@ -264,7 +265,7 @@
           <a:p>
             <a:fld id="{3E1544B7-206C-4EA6-AC0C-B0859B395411}" type="datetimeFigureOut">
               <a:rPr lang="es-ES" smtClean="0"/>
-              <a:t>01/05/2022</a:t>
+              <a:t>17/05/2022</a:t>
             </a:fld>
             <a:endParaRPr lang="es-ES"/>
           </a:p>
@@ -462,7 +463,7 @@
           <a:p>
             <a:fld id="{3E1544B7-206C-4EA6-AC0C-B0859B395411}" type="datetimeFigureOut">
               <a:rPr lang="es-ES" smtClean="0"/>
-              <a:t>01/05/2022</a:t>
+              <a:t>17/05/2022</a:t>
             </a:fld>
             <a:endParaRPr lang="es-ES"/>
           </a:p>
@@ -670,7 +671,7 @@
           <a:p>
             <a:fld id="{3E1544B7-206C-4EA6-AC0C-B0859B395411}" type="datetimeFigureOut">
               <a:rPr lang="es-ES" smtClean="0"/>
-              <a:t>01/05/2022</a:t>
+              <a:t>17/05/2022</a:t>
             </a:fld>
             <a:endParaRPr lang="es-ES"/>
           </a:p>
@@ -868,7 +869,7 @@
           <a:p>
             <a:fld id="{3E1544B7-206C-4EA6-AC0C-B0859B395411}" type="datetimeFigureOut">
               <a:rPr lang="es-ES" smtClean="0"/>
-              <a:t>01/05/2022</a:t>
+              <a:t>17/05/2022</a:t>
             </a:fld>
             <a:endParaRPr lang="es-ES"/>
           </a:p>
@@ -1143,7 +1144,7 @@
           <a:p>
             <a:fld id="{3E1544B7-206C-4EA6-AC0C-B0859B395411}" type="datetimeFigureOut">
               <a:rPr lang="es-ES" smtClean="0"/>
-              <a:t>01/05/2022</a:t>
+              <a:t>17/05/2022</a:t>
             </a:fld>
             <a:endParaRPr lang="es-ES"/>
           </a:p>
@@ -1408,7 +1409,7 @@
           <a:p>
             <a:fld id="{3E1544B7-206C-4EA6-AC0C-B0859B395411}" type="datetimeFigureOut">
               <a:rPr lang="es-ES" smtClean="0"/>
-              <a:t>01/05/2022</a:t>
+              <a:t>17/05/2022</a:t>
             </a:fld>
             <a:endParaRPr lang="es-ES"/>
           </a:p>
@@ -1820,7 +1821,7 @@
           <a:p>
             <a:fld id="{3E1544B7-206C-4EA6-AC0C-B0859B395411}" type="datetimeFigureOut">
               <a:rPr lang="es-ES" smtClean="0"/>
-              <a:t>01/05/2022</a:t>
+              <a:t>17/05/2022</a:t>
             </a:fld>
             <a:endParaRPr lang="es-ES"/>
           </a:p>
@@ -1961,7 +1962,7 @@
           <a:p>
             <a:fld id="{3E1544B7-206C-4EA6-AC0C-B0859B395411}" type="datetimeFigureOut">
               <a:rPr lang="es-ES" smtClean="0"/>
-              <a:t>01/05/2022</a:t>
+              <a:t>17/05/2022</a:t>
             </a:fld>
             <a:endParaRPr lang="es-ES"/>
           </a:p>
@@ -2074,7 +2075,7 @@
           <a:p>
             <a:fld id="{3E1544B7-206C-4EA6-AC0C-B0859B395411}" type="datetimeFigureOut">
               <a:rPr lang="es-ES" smtClean="0"/>
-              <a:t>01/05/2022</a:t>
+              <a:t>17/05/2022</a:t>
             </a:fld>
             <a:endParaRPr lang="es-ES"/>
           </a:p>
@@ -2385,7 +2386,7 @@
           <a:p>
             <a:fld id="{3E1544B7-206C-4EA6-AC0C-B0859B395411}" type="datetimeFigureOut">
               <a:rPr lang="es-ES" smtClean="0"/>
-              <a:t>01/05/2022</a:t>
+              <a:t>17/05/2022</a:t>
             </a:fld>
             <a:endParaRPr lang="es-ES"/>
           </a:p>
@@ -2673,7 +2674,7 @@
           <a:p>
             <a:fld id="{3E1544B7-206C-4EA6-AC0C-B0859B395411}" type="datetimeFigureOut">
               <a:rPr lang="es-ES" smtClean="0"/>
-              <a:t>01/05/2022</a:t>
+              <a:t>17/05/2022</a:t>
             </a:fld>
             <a:endParaRPr lang="es-ES"/>
           </a:p>
@@ -2914,7 +2915,7 @@
           <a:p>
             <a:fld id="{3E1544B7-206C-4EA6-AC0C-B0859B395411}" type="datetimeFigureOut">
               <a:rPr lang="es-ES" smtClean="0"/>
-              <a:t>01/05/2022</a:t>
+              <a:t>17/05/2022</a:t>
             </a:fld>
             <a:endParaRPr lang="es-ES"/>
           </a:p>
@@ -10789,6 +10790,2920 @@
 </p:sld>
 </file>
 
+<file path=ppt/slides/slide7.xml><?xml version="1.0" encoding="utf-8"?>
+<p:sld xmlns:a="http://schemas.openxmlformats.org/drawingml/2006/main" xmlns:r="http://schemas.openxmlformats.org/officeDocument/2006/relationships" xmlns:p="http://schemas.openxmlformats.org/presentationml/2006/main">
+  <p:cSld>
+    <p:spTree>
+      <p:nvGrpSpPr>
+        <p:cNvPr id="1" name=""/>
+        <p:cNvGrpSpPr/>
+        <p:nvPr/>
+      </p:nvGrpSpPr>
+      <p:grpSpPr>
+        <a:xfrm>
+          <a:off x="0" y="0"/>
+          <a:ext cx="0" cy="0"/>
+          <a:chOff x="0" y="0"/>
+          <a:chExt cx="0" cy="0"/>
+        </a:xfrm>
+      </p:grpSpPr>
+      <p:pic>
+        <p:nvPicPr>
+          <p:cNvPr id="1026" name="Picture 2" descr="Map of Kalimdor - World of Warcraft">
+            <a:extLst>
+              <a:ext uri="{FF2B5EF4-FFF2-40B4-BE49-F238E27FC236}">
+                <a16:creationId xmlns:a16="http://schemas.microsoft.com/office/drawing/2014/main" id="{0537BFED-6160-C4EF-C48F-7EB4EF2F22B3}"/>
+              </a:ext>
+            </a:extLst>
+          </p:cNvPr>
+          <p:cNvPicPr>
+            <a:picLocks noChangeAspect="1" noChangeArrowheads="1"/>
+          </p:cNvPicPr>
+          <p:nvPr/>
+        </p:nvPicPr>
+        <p:blipFill>
+          <a:blip r:embed="rId2">
+            <a:extLst>
+              <a:ext uri="{28A0092B-C50C-407E-A947-70E740481C1C}">
+                <a14:useLocalDpi xmlns:a14="http://schemas.microsoft.com/office/drawing/2010/main" val="0"/>
+              </a:ext>
+            </a:extLst>
+          </a:blip>
+          <a:srcRect/>
+          <a:stretch>
+            <a:fillRect/>
+          </a:stretch>
+        </p:blipFill>
+        <p:spPr bwMode="auto">
+          <a:xfrm>
+            <a:off x="0" y="0"/>
+            <a:ext cx="4643437" cy="6858000"/>
+          </a:xfrm>
+          <a:prstGeom prst="rect">
+            <a:avLst/>
+          </a:prstGeom>
+          <a:noFill/>
+          <a:extLst>
+            <a:ext uri="{909E8E84-426E-40DD-AFC4-6F175D3DCCD1}">
+              <a14:hiddenFill xmlns:a14="http://schemas.microsoft.com/office/drawing/2010/main">
+                <a:solidFill>
+                  <a:srgbClr val="FFFFFF"/>
+                </a:solidFill>
+              </a14:hiddenFill>
+            </a:ext>
+          </a:extLst>
+        </p:spPr>
+      </p:pic>
+      <p:pic>
+        <p:nvPicPr>
+          <p:cNvPr id="1028" name="Picture 4" descr="Reinos del Este - Wowpedia">
+            <a:extLst>
+              <a:ext uri="{FF2B5EF4-FFF2-40B4-BE49-F238E27FC236}">
+                <a16:creationId xmlns:a16="http://schemas.microsoft.com/office/drawing/2014/main" id="{E81B8D07-C089-34D8-F5A9-5545F3F0D30C}"/>
+              </a:ext>
+            </a:extLst>
+          </p:cNvPr>
+          <p:cNvPicPr>
+            <a:picLocks noChangeAspect="1" noChangeArrowheads="1"/>
+          </p:cNvPicPr>
+          <p:nvPr/>
+        </p:nvPicPr>
+        <p:blipFill rotWithShape="1">
+          <a:blip r:embed="rId3">
+            <a:extLst>
+              <a:ext uri="{28A0092B-C50C-407E-A947-70E740481C1C}">
+                <a14:useLocalDpi xmlns:a14="http://schemas.microsoft.com/office/drawing/2010/main" val="0"/>
+              </a:ext>
+            </a:extLst>
+          </a:blip>
+          <a:srcRect l="30937" r="34687"/>
+          <a:stretch/>
+        </p:blipFill>
+        <p:spPr bwMode="auto">
+          <a:xfrm>
+            <a:off x="4643437" y="0"/>
+            <a:ext cx="3538538" cy="6858327"/>
+          </a:xfrm>
+          <a:prstGeom prst="rect">
+            <a:avLst/>
+          </a:prstGeom>
+          <a:noFill/>
+          <a:extLst>
+            <a:ext uri="{909E8E84-426E-40DD-AFC4-6F175D3DCCD1}">
+              <a14:hiddenFill xmlns:a14="http://schemas.microsoft.com/office/drawing/2010/main">
+                <a:solidFill>
+                  <a:srgbClr val="FFFFFF"/>
+                </a:solidFill>
+              </a14:hiddenFill>
+            </a:ext>
+          </a:extLst>
+        </p:spPr>
+      </p:pic>
+      <p:sp>
+        <p:nvSpPr>
+          <p:cNvPr id="4" name="CuadroTexto 3">
+            <a:extLst>
+              <a:ext uri="{FF2B5EF4-FFF2-40B4-BE49-F238E27FC236}">
+                <a16:creationId xmlns:a16="http://schemas.microsoft.com/office/drawing/2014/main" id="{FEE35DBE-4B24-806D-264B-6BC92BFD9BD9}"/>
+              </a:ext>
+            </a:extLst>
+          </p:cNvPr>
+          <p:cNvSpPr txBox="1"/>
+          <p:nvPr/>
+        </p:nvSpPr>
+        <p:spPr>
+          <a:xfrm>
+            <a:off x="8439150" y="409575"/>
+            <a:ext cx="2638425" cy="646331"/>
+          </a:xfrm>
+          <a:prstGeom prst="rect">
+            <a:avLst/>
+          </a:prstGeom>
+          <a:noFill/>
+        </p:spPr>
+        <p:txBody>
+          <a:bodyPr wrap="square" rtlCol="0">
+            <a:spAutoFit/>
+          </a:bodyPr>
+          <a:lstStyle/>
+          <a:p>
+            <a:r>
+              <a:rPr lang="es-ES" dirty="0">
+                <a:solidFill>
+                  <a:srgbClr val="FF0000"/>
+                </a:solidFill>
+              </a:rPr>
+              <a:t>-</a:t>
+            </a:r>
+            <a:r>
+              <a:rPr lang="es-ES" dirty="0" err="1">
+                <a:solidFill>
+                  <a:srgbClr val="FF0000"/>
+                </a:solidFill>
+              </a:rPr>
+              <a:t>Wain</a:t>
+            </a:r>
+            <a:endParaRPr lang="es-ES" dirty="0">
+              <a:solidFill>
+                <a:srgbClr val="FF0000"/>
+              </a:solidFill>
+            </a:endParaRPr>
+          </a:p>
+          <a:p>
+            <a:endParaRPr lang="es-ES" dirty="0">
+              <a:solidFill>
+                <a:srgbClr val="00B050"/>
+              </a:solidFill>
+            </a:endParaRPr>
+          </a:p>
+        </p:txBody>
+      </p:sp>
+      <p:sp>
+        <p:nvSpPr>
+          <p:cNvPr id="7" name="CuadroTexto 6">
+            <a:extLst>
+              <a:ext uri="{FF2B5EF4-FFF2-40B4-BE49-F238E27FC236}">
+                <a16:creationId xmlns:a16="http://schemas.microsoft.com/office/drawing/2014/main" id="{990CDA3D-7F9F-735A-D031-596774ECFD71}"/>
+              </a:ext>
+            </a:extLst>
+          </p:cNvPr>
+          <p:cNvSpPr txBox="1"/>
+          <p:nvPr/>
+        </p:nvSpPr>
+        <p:spPr>
+          <a:xfrm>
+            <a:off x="8439149" y="769194"/>
+            <a:ext cx="2638425" cy="646331"/>
+          </a:xfrm>
+          <a:prstGeom prst="rect">
+            <a:avLst/>
+          </a:prstGeom>
+          <a:noFill/>
+        </p:spPr>
+        <p:txBody>
+          <a:bodyPr wrap="square" rtlCol="0">
+            <a:spAutoFit/>
+          </a:bodyPr>
+          <a:lstStyle/>
+          <a:p>
+            <a:r>
+              <a:rPr lang="es-ES" dirty="0">
+                <a:solidFill>
+                  <a:srgbClr val="00B050"/>
+                </a:solidFill>
+              </a:rPr>
+              <a:t>-</a:t>
+            </a:r>
+            <a:r>
+              <a:rPr lang="es-ES" dirty="0" err="1">
+                <a:solidFill>
+                  <a:srgbClr val="00B050"/>
+                </a:solidFill>
+              </a:rPr>
+              <a:t>Joanmar</a:t>
+            </a:r>
+            <a:endParaRPr lang="es-ES" dirty="0">
+              <a:solidFill>
+                <a:srgbClr val="00B050"/>
+              </a:solidFill>
+            </a:endParaRPr>
+          </a:p>
+          <a:p>
+            <a:endParaRPr lang="es-ES" dirty="0">
+              <a:solidFill>
+                <a:srgbClr val="00B050"/>
+              </a:solidFill>
+            </a:endParaRPr>
+          </a:p>
+        </p:txBody>
+      </p:sp>
+      <p:sp>
+        <p:nvSpPr>
+          <p:cNvPr id="8" name="CuadroTexto 7">
+            <a:extLst>
+              <a:ext uri="{FF2B5EF4-FFF2-40B4-BE49-F238E27FC236}">
+                <a16:creationId xmlns:a16="http://schemas.microsoft.com/office/drawing/2014/main" id="{A6DAD067-BF93-5329-CB98-126D1B0CF849}"/>
+              </a:ext>
+            </a:extLst>
+          </p:cNvPr>
+          <p:cNvSpPr txBox="1"/>
+          <p:nvPr/>
+        </p:nvSpPr>
+        <p:spPr>
+          <a:xfrm>
+            <a:off x="8439149" y="1128813"/>
+            <a:ext cx="2638425" cy="646331"/>
+          </a:xfrm>
+          <a:prstGeom prst="rect">
+            <a:avLst/>
+          </a:prstGeom>
+          <a:noFill/>
+        </p:spPr>
+        <p:txBody>
+          <a:bodyPr wrap="square" rtlCol="0">
+            <a:spAutoFit/>
+          </a:bodyPr>
+          <a:lstStyle/>
+          <a:p>
+            <a:r>
+              <a:rPr lang="es-ES" dirty="0">
+                <a:solidFill>
+                  <a:srgbClr val="00B0F0"/>
+                </a:solidFill>
+              </a:rPr>
+              <a:t>-</a:t>
+            </a:r>
+            <a:r>
+              <a:rPr lang="es-ES" dirty="0" err="1">
+                <a:solidFill>
+                  <a:srgbClr val="00B0F0"/>
+                </a:solidFill>
+              </a:rPr>
+              <a:t>Varrya</a:t>
+            </a:r>
+            <a:endParaRPr lang="es-ES" dirty="0">
+              <a:solidFill>
+                <a:srgbClr val="00B0F0"/>
+              </a:solidFill>
+            </a:endParaRPr>
+          </a:p>
+          <a:p>
+            <a:endParaRPr lang="es-ES" dirty="0">
+              <a:solidFill>
+                <a:srgbClr val="00B050"/>
+              </a:solidFill>
+            </a:endParaRPr>
+          </a:p>
+        </p:txBody>
+      </p:sp>
+      <p:sp>
+        <p:nvSpPr>
+          <p:cNvPr id="9" name="CuadroTexto 8">
+            <a:extLst>
+              <a:ext uri="{FF2B5EF4-FFF2-40B4-BE49-F238E27FC236}">
+                <a16:creationId xmlns:a16="http://schemas.microsoft.com/office/drawing/2014/main" id="{16F8B990-92E4-C40A-2233-96CC3F8652AA}"/>
+              </a:ext>
+            </a:extLst>
+          </p:cNvPr>
+          <p:cNvSpPr txBox="1"/>
+          <p:nvPr/>
+        </p:nvSpPr>
+        <p:spPr>
+          <a:xfrm>
+            <a:off x="8439149" y="1488432"/>
+            <a:ext cx="2638425" cy="369332"/>
+          </a:xfrm>
+          <a:prstGeom prst="rect">
+            <a:avLst/>
+          </a:prstGeom>
+          <a:noFill/>
+        </p:spPr>
+        <p:txBody>
+          <a:bodyPr wrap="square" rtlCol="0">
+            <a:spAutoFit/>
+          </a:bodyPr>
+          <a:lstStyle/>
+          <a:p>
+            <a:r>
+              <a:rPr lang="es-ES" dirty="0">
+                <a:solidFill>
+                  <a:srgbClr val="002060"/>
+                </a:solidFill>
+              </a:rPr>
+              <a:t>-</a:t>
+            </a:r>
+            <a:r>
+              <a:rPr lang="es-ES" dirty="0" err="1">
+                <a:solidFill>
+                  <a:srgbClr val="002060"/>
+                </a:solidFill>
+              </a:rPr>
+              <a:t>Minaerva</a:t>
+            </a:r>
+            <a:endParaRPr lang="es-ES" dirty="0">
+              <a:solidFill>
+                <a:srgbClr val="002060"/>
+              </a:solidFill>
+            </a:endParaRPr>
+          </a:p>
+        </p:txBody>
+      </p:sp>
+      <p:sp>
+        <p:nvSpPr>
+          <p:cNvPr id="5" name="Signo de multiplicación 4">
+            <a:extLst>
+              <a:ext uri="{FF2B5EF4-FFF2-40B4-BE49-F238E27FC236}">
+                <a16:creationId xmlns:a16="http://schemas.microsoft.com/office/drawing/2014/main" id="{5393499A-4738-96FD-3DB6-DDAE9547315A}"/>
+              </a:ext>
+            </a:extLst>
+          </p:cNvPr>
+          <p:cNvSpPr/>
+          <p:nvPr/>
+        </p:nvSpPr>
+        <p:spPr>
+          <a:xfrm>
+            <a:off x="6001305" y="5051394"/>
+            <a:ext cx="275208" cy="204187"/>
+          </a:xfrm>
+          <a:prstGeom prst="mathMultiply">
+            <a:avLst/>
+          </a:prstGeom>
+          <a:solidFill>
+            <a:srgbClr val="FF0000"/>
+          </a:solidFill>
+        </p:spPr>
+        <p:style>
+          <a:lnRef idx="2">
+            <a:schemeClr val="accent1">
+              <a:shade val="50000"/>
+            </a:schemeClr>
+          </a:lnRef>
+          <a:fillRef idx="1">
+            <a:schemeClr val="accent1"/>
+          </a:fillRef>
+          <a:effectRef idx="0">
+            <a:schemeClr val="accent1"/>
+          </a:effectRef>
+          <a:fontRef idx="minor">
+            <a:schemeClr val="lt1"/>
+          </a:fontRef>
+        </p:style>
+        <p:txBody>
+          <a:bodyPr rtlCol="0" anchor="ctr"/>
+          <a:lstStyle/>
+          <a:p>
+            <a:pPr algn="ctr"/>
+            <a:endParaRPr lang="es-ES"/>
+          </a:p>
+        </p:txBody>
+      </p:sp>
+      <p:sp>
+        <p:nvSpPr>
+          <p:cNvPr id="11" name="Signo de multiplicación 10">
+            <a:extLst>
+              <a:ext uri="{FF2B5EF4-FFF2-40B4-BE49-F238E27FC236}">
+                <a16:creationId xmlns:a16="http://schemas.microsoft.com/office/drawing/2014/main" id="{3720BE16-668B-5B48-8781-323D65C1328A}"/>
+              </a:ext>
+            </a:extLst>
+          </p:cNvPr>
+          <p:cNvSpPr/>
+          <p:nvPr/>
+        </p:nvSpPr>
+        <p:spPr>
+          <a:xfrm>
+            <a:off x="6042734" y="5453849"/>
+            <a:ext cx="275208" cy="204187"/>
+          </a:xfrm>
+          <a:prstGeom prst="mathMultiply">
+            <a:avLst/>
+          </a:prstGeom>
+          <a:solidFill>
+            <a:srgbClr val="FF0000"/>
+          </a:solidFill>
+        </p:spPr>
+        <p:style>
+          <a:lnRef idx="2">
+            <a:schemeClr val="accent1">
+              <a:shade val="50000"/>
+            </a:schemeClr>
+          </a:lnRef>
+          <a:fillRef idx="1">
+            <a:schemeClr val="accent1"/>
+          </a:fillRef>
+          <a:effectRef idx="0">
+            <a:schemeClr val="accent1"/>
+          </a:effectRef>
+          <a:fontRef idx="minor">
+            <a:schemeClr val="lt1"/>
+          </a:fontRef>
+        </p:style>
+        <p:txBody>
+          <a:bodyPr rtlCol="0" anchor="ctr"/>
+          <a:lstStyle/>
+          <a:p>
+            <a:pPr algn="ctr"/>
+            <a:endParaRPr lang="es-ES"/>
+          </a:p>
+        </p:txBody>
+      </p:sp>
+      <p:sp>
+        <p:nvSpPr>
+          <p:cNvPr id="12" name="Signo de multiplicación 11">
+            <a:extLst>
+              <a:ext uri="{FF2B5EF4-FFF2-40B4-BE49-F238E27FC236}">
+                <a16:creationId xmlns:a16="http://schemas.microsoft.com/office/drawing/2014/main" id="{03F6AD23-42B0-3CC7-1C05-49E50AD2C443}"/>
+              </a:ext>
+            </a:extLst>
+          </p:cNvPr>
+          <p:cNvSpPr/>
+          <p:nvPr/>
+        </p:nvSpPr>
+        <p:spPr>
+          <a:xfrm>
+            <a:off x="6612385" y="5118879"/>
+            <a:ext cx="275208" cy="204187"/>
+          </a:xfrm>
+          <a:prstGeom prst="mathMultiply">
+            <a:avLst/>
+          </a:prstGeom>
+          <a:solidFill>
+            <a:srgbClr val="FF0000"/>
+          </a:solidFill>
+        </p:spPr>
+        <p:style>
+          <a:lnRef idx="2">
+            <a:schemeClr val="accent1">
+              <a:shade val="50000"/>
+            </a:schemeClr>
+          </a:lnRef>
+          <a:fillRef idx="1">
+            <a:schemeClr val="accent1"/>
+          </a:fillRef>
+          <a:effectRef idx="0">
+            <a:schemeClr val="accent1"/>
+          </a:effectRef>
+          <a:fontRef idx="minor">
+            <a:schemeClr val="lt1"/>
+          </a:fontRef>
+        </p:style>
+        <p:txBody>
+          <a:bodyPr rtlCol="0" anchor="ctr"/>
+          <a:lstStyle/>
+          <a:p>
+            <a:pPr algn="ctr"/>
+            <a:endParaRPr lang="es-ES"/>
+          </a:p>
+        </p:txBody>
+      </p:sp>
+      <p:sp>
+        <p:nvSpPr>
+          <p:cNvPr id="13" name="Signo de multiplicación 12">
+            <a:extLst>
+              <a:ext uri="{FF2B5EF4-FFF2-40B4-BE49-F238E27FC236}">
+                <a16:creationId xmlns:a16="http://schemas.microsoft.com/office/drawing/2014/main" id="{3BB5321D-B19A-1798-08D4-C1B9E4BC7B6C}"/>
+              </a:ext>
+            </a:extLst>
+          </p:cNvPr>
+          <p:cNvSpPr/>
+          <p:nvPr/>
+        </p:nvSpPr>
+        <p:spPr>
+          <a:xfrm>
+            <a:off x="5510351" y="5453849"/>
+            <a:ext cx="275208" cy="204187"/>
+          </a:xfrm>
+          <a:prstGeom prst="mathMultiply">
+            <a:avLst/>
+          </a:prstGeom>
+          <a:solidFill>
+            <a:srgbClr val="FF0000"/>
+          </a:solidFill>
+        </p:spPr>
+        <p:style>
+          <a:lnRef idx="2">
+            <a:schemeClr val="accent1">
+              <a:shade val="50000"/>
+            </a:schemeClr>
+          </a:lnRef>
+          <a:fillRef idx="1">
+            <a:schemeClr val="accent1"/>
+          </a:fillRef>
+          <a:effectRef idx="0">
+            <a:schemeClr val="accent1"/>
+          </a:effectRef>
+          <a:fontRef idx="minor">
+            <a:schemeClr val="lt1"/>
+          </a:fontRef>
+        </p:style>
+        <p:txBody>
+          <a:bodyPr rtlCol="0" anchor="ctr"/>
+          <a:lstStyle/>
+          <a:p>
+            <a:pPr algn="ctr"/>
+            <a:endParaRPr lang="es-ES"/>
+          </a:p>
+        </p:txBody>
+      </p:sp>
+      <p:sp>
+        <p:nvSpPr>
+          <p:cNvPr id="6" name="Círculo: vacío 5">
+            <a:extLst>
+              <a:ext uri="{FF2B5EF4-FFF2-40B4-BE49-F238E27FC236}">
+                <a16:creationId xmlns:a16="http://schemas.microsoft.com/office/drawing/2014/main" id="{0DE1D92C-E5FC-6274-14CF-123CFEED794D}"/>
+              </a:ext>
+            </a:extLst>
+          </p:cNvPr>
+          <p:cNvSpPr/>
+          <p:nvPr/>
+        </p:nvSpPr>
+        <p:spPr>
+          <a:xfrm>
+            <a:off x="6138909" y="5885895"/>
+            <a:ext cx="275208" cy="301841"/>
+          </a:xfrm>
+          <a:prstGeom prst="donut">
+            <a:avLst/>
+          </a:prstGeom>
+          <a:solidFill>
+            <a:srgbClr val="FF0000"/>
+          </a:solidFill>
+        </p:spPr>
+        <p:style>
+          <a:lnRef idx="2">
+            <a:schemeClr val="accent1">
+              <a:shade val="50000"/>
+            </a:schemeClr>
+          </a:lnRef>
+          <a:fillRef idx="1">
+            <a:schemeClr val="accent1"/>
+          </a:fillRef>
+          <a:effectRef idx="0">
+            <a:schemeClr val="accent1"/>
+          </a:effectRef>
+          <a:fontRef idx="minor">
+            <a:schemeClr val="lt1"/>
+          </a:fontRef>
+        </p:style>
+        <p:txBody>
+          <a:bodyPr rtlCol="0" anchor="ctr"/>
+          <a:lstStyle/>
+          <a:p>
+            <a:pPr algn="ctr"/>
+            <a:endParaRPr lang="es-ES">
+              <a:solidFill>
+                <a:schemeClr val="tx1"/>
+              </a:solidFill>
+            </a:endParaRPr>
+          </a:p>
+        </p:txBody>
+      </p:sp>
+      <p:sp>
+        <p:nvSpPr>
+          <p:cNvPr id="15" name="Signo de multiplicación 14">
+            <a:extLst>
+              <a:ext uri="{FF2B5EF4-FFF2-40B4-BE49-F238E27FC236}">
+                <a16:creationId xmlns:a16="http://schemas.microsoft.com/office/drawing/2014/main" id="{3CA82D03-CA61-6F7D-3F31-8031DC102DC1}"/>
+              </a:ext>
+            </a:extLst>
+          </p:cNvPr>
+          <p:cNvSpPr/>
+          <p:nvPr/>
+        </p:nvSpPr>
+        <p:spPr>
+          <a:xfrm>
+            <a:off x="5958396" y="4151464"/>
+            <a:ext cx="275208" cy="204187"/>
+          </a:xfrm>
+          <a:prstGeom prst="mathMultiply">
+            <a:avLst/>
+          </a:prstGeom>
+          <a:solidFill>
+            <a:srgbClr val="00B050"/>
+          </a:solidFill>
+        </p:spPr>
+        <p:style>
+          <a:lnRef idx="2">
+            <a:schemeClr val="accent1">
+              <a:shade val="50000"/>
+            </a:schemeClr>
+          </a:lnRef>
+          <a:fillRef idx="1">
+            <a:schemeClr val="accent1"/>
+          </a:fillRef>
+          <a:effectRef idx="0">
+            <a:schemeClr val="accent1"/>
+          </a:effectRef>
+          <a:fontRef idx="minor">
+            <a:schemeClr val="lt1"/>
+          </a:fontRef>
+        </p:style>
+        <p:txBody>
+          <a:bodyPr rtlCol="0" anchor="ctr"/>
+          <a:lstStyle/>
+          <a:p>
+            <a:pPr algn="ctr"/>
+            <a:endParaRPr lang="es-ES"/>
+          </a:p>
+        </p:txBody>
+      </p:sp>
+      <p:sp>
+        <p:nvSpPr>
+          <p:cNvPr id="16" name="Signo de multiplicación 15">
+            <a:extLst>
+              <a:ext uri="{FF2B5EF4-FFF2-40B4-BE49-F238E27FC236}">
+                <a16:creationId xmlns:a16="http://schemas.microsoft.com/office/drawing/2014/main" id="{7F5C22DE-63B6-6C07-DDB4-0FEE87CA6CAA}"/>
+              </a:ext>
+            </a:extLst>
+          </p:cNvPr>
+          <p:cNvSpPr/>
+          <p:nvPr/>
+        </p:nvSpPr>
+        <p:spPr>
+          <a:xfrm>
+            <a:off x="6764785" y="4075677"/>
+            <a:ext cx="275208" cy="204187"/>
+          </a:xfrm>
+          <a:prstGeom prst="mathMultiply">
+            <a:avLst/>
+          </a:prstGeom>
+          <a:solidFill>
+            <a:srgbClr val="00B050"/>
+          </a:solidFill>
+        </p:spPr>
+        <p:style>
+          <a:lnRef idx="2">
+            <a:schemeClr val="accent1">
+              <a:shade val="50000"/>
+            </a:schemeClr>
+          </a:lnRef>
+          <a:fillRef idx="1">
+            <a:schemeClr val="accent1"/>
+          </a:fillRef>
+          <a:effectRef idx="0">
+            <a:schemeClr val="accent1"/>
+          </a:effectRef>
+          <a:fontRef idx="minor">
+            <a:schemeClr val="lt1"/>
+          </a:fontRef>
+        </p:style>
+        <p:txBody>
+          <a:bodyPr rtlCol="0" anchor="ctr"/>
+          <a:lstStyle/>
+          <a:p>
+            <a:pPr algn="ctr"/>
+            <a:endParaRPr lang="es-ES"/>
+          </a:p>
+        </p:txBody>
+      </p:sp>
+      <p:sp>
+        <p:nvSpPr>
+          <p:cNvPr id="17" name="Círculo: vacío 16">
+            <a:extLst>
+              <a:ext uri="{FF2B5EF4-FFF2-40B4-BE49-F238E27FC236}">
+                <a16:creationId xmlns:a16="http://schemas.microsoft.com/office/drawing/2014/main" id="{C8D32F90-43C5-1A4B-066D-698AB3802E97}"/>
+              </a:ext>
+            </a:extLst>
+          </p:cNvPr>
+          <p:cNvSpPr/>
+          <p:nvPr/>
+        </p:nvSpPr>
+        <p:spPr>
+          <a:xfrm>
+            <a:off x="6597658" y="3583618"/>
+            <a:ext cx="275208" cy="301841"/>
+          </a:xfrm>
+          <a:prstGeom prst="donut">
+            <a:avLst/>
+          </a:prstGeom>
+          <a:solidFill>
+            <a:srgbClr val="00B050"/>
+          </a:solidFill>
+        </p:spPr>
+        <p:style>
+          <a:lnRef idx="2">
+            <a:schemeClr val="accent1">
+              <a:shade val="50000"/>
+            </a:schemeClr>
+          </a:lnRef>
+          <a:fillRef idx="1">
+            <a:schemeClr val="accent1"/>
+          </a:fillRef>
+          <a:effectRef idx="0">
+            <a:schemeClr val="accent1"/>
+          </a:effectRef>
+          <a:fontRef idx="minor">
+            <a:schemeClr val="lt1"/>
+          </a:fontRef>
+        </p:style>
+        <p:txBody>
+          <a:bodyPr rtlCol="0" anchor="ctr"/>
+          <a:lstStyle/>
+          <a:p>
+            <a:pPr algn="ctr"/>
+            <a:endParaRPr lang="es-ES">
+              <a:solidFill>
+                <a:schemeClr val="tx1"/>
+              </a:solidFill>
+            </a:endParaRPr>
+          </a:p>
+        </p:txBody>
+      </p:sp>
+      <p:sp>
+        <p:nvSpPr>
+          <p:cNvPr id="19" name="Círculo: vacío 18">
+            <a:extLst>
+              <a:ext uri="{FF2B5EF4-FFF2-40B4-BE49-F238E27FC236}">
+                <a16:creationId xmlns:a16="http://schemas.microsoft.com/office/drawing/2014/main" id="{789FB6FE-938D-CB6E-4170-37047114C9CC}"/>
+              </a:ext>
+            </a:extLst>
+          </p:cNvPr>
+          <p:cNvSpPr/>
+          <p:nvPr/>
+        </p:nvSpPr>
+        <p:spPr>
+          <a:xfrm>
+            <a:off x="263512" y="941438"/>
+            <a:ext cx="275208" cy="301841"/>
+          </a:xfrm>
+          <a:prstGeom prst="donut">
+            <a:avLst/>
+          </a:prstGeom>
+          <a:solidFill>
+            <a:srgbClr val="00B0F0"/>
+          </a:solidFill>
+        </p:spPr>
+        <p:style>
+          <a:lnRef idx="2">
+            <a:schemeClr val="accent1">
+              <a:shade val="50000"/>
+            </a:schemeClr>
+          </a:lnRef>
+          <a:fillRef idx="1">
+            <a:schemeClr val="accent1"/>
+          </a:fillRef>
+          <a:effectRef idx="0">
+            <a:schemeClr val="accent1"/>
+          </a:effectRef>
+          <a:fontRef idx="minor">
+            <a:schemeClr val="lt1"/>
+          </a:fontRef>
+        </p:style>
+        <p:txBody>
+          <a:bodyPr rtlCol="0" anchor="ctr"/>
+          <a:lstStyle/>
+          <a:p>
+            <a:pPr algn="ctr"/>
+            <a:endParaRPr lang="es-ES" dirty="0">
+              <a:solidFill>
+                <a:schemeClr val="tx1"/>
+              </a:solidFill>
+            </a:endParaRPr>
+          </a:p>
+        </p:txBody>
+      </p:sp>
+      <p:sp>
+        <p:nvSpPr>
+          <p:cNvPr id="20" name="Círculo: vacío 19">
+            <a:extLst>
+              <a:ext uri="{FF2B5EF4-FFF2-40B4-BE49-F238E27FC236}">
+                <a16:creationId xmlns:a16="http://schemas.microsoft.com/office/drawing/2014/main" id="{77FDC465-8AFF-EB84-6803-987842C6D4C6}"/>
+              </a:ext>
+            </a:extLst>
+          </p:cNvPr>
+          <p:cNvSpPr/>
+          <p:nvPr/>
+        </p:nvSpPr>
+        <p:spPr>
+          <a:xfrm>
+            <a:off x="6505483" y="3035748"/>
+            <a:ext cx="275208" cy="301841"/>
+          </a:xfrm>
+          <a:prstGeom prst="donut">
+            <a:avLst/>
+          </a:prstGeom>
+          <a:solidFill>
+            <a:srgbClr val="00B050"/>
+          </a:solidFill>
+        </p:spPr>
+        <p:style>
+          <a:lnRef idx="2">
+            <a:schemeClr val="accent1">
+              <a:shade val="50000"/>
+            </a:schemeClr>
+          </a:lnRef>
+          <a:fillRef idx="1">
+            <a:schemeClr val="accent1"/>
+          </a:fillRef>
+          <a:effectRef idx="0">
+            <a:schemeClr val="accent1"/>
+          </a:effectRef>
+          <a:fontRef idx="minor">
+            <a:schemeClr val="lt1"/>
+          </a:fontRef>
+        </p:style>
+        <p:txBody>
+          <a:bodyPr rtlCol="0" anchor="ctr"/>
+          <a:lstStyle/>
+          <a:p>
+            <a:pPr algn="ctr"/>
+            <a:endParaRPr lang="es-ES">
+              <a:solidFill>
+                <a:schemeClr val="tx1"/>
+              </a:solidFill>
+            </a:endParaRPr>
+          </a:p>
+        </p:txBody>
+      </p:sp>
+      <p:sp>
+        <p:nvSpPr>
+          <p:cNvPr id="23" name="Círculo: vacío 22">
+            <a:extLst>
+              <a:ext uri="{FF2B5EF4-FFF2-40B4-BE49-F238E27FC236}">
+                <a16:creationId xmlns:a16="http://schemas.microsoft.com/office/drawing/2014/main" id="{9CD43163-7570-97D8-7C63-EFE925A7826C}"/>
+              </a:ext>
+            </a:extLst>
+          </p:cNvPr>
+          <p:cNvSpPr/>
+          <p:nvPr/>
+        </p:nvSpPr>
+        <p:spPr>
+          <a:xfrm>
+            <a:off x="6735262" y="2610892"/>
+            <a:ext cx="275208" cy="301841"/>
+          </a:xfrm>
+          <a:prstGeom prst="donut">
+            <a:avLst/>
+          </a:prstGeom>
+          <a:solidFill>
+            <a:srgbClr val="00B050"/>
+          </a:solidFill>
+        </p:spPr>
+        <p:style>
+          <a:lnRef idx="2">
+            <a:schemeClr val="accent1">
+              <a:shade val="50000"/>
+            </a:schemeClr>
+          </a:lnRef>
+          <a:fillRef idx="1">
+            <a:schemeClr val="accent1"/>
+          </a:fillRef>
+          <a:effectRef idx="0">
+            <a:schemeClr val="accent1"/>
+          </a:effectRef>
+          <a:fontRef idx="minor">
+            <a:schemeClr val="lt1"/>
+          </a:fontRef>
+        </p:style>
+        <p:txBody>
+          <a:bodyPr rtlCol="0" anchor="ctr"/>
+          <a:lstStyle/>
+          <a:p>
+            <a:pPr algn="ctr"/>
+            <a:endParaRPr lang="es-ES">
+              <a:solidFill>
+                <a:schemeClr val="tx1"/>
+              </a:solidFill>
+            </a:endParaRPr>
+          </a:p>
+        </p:txBody>
+      </p:sp>
+      <p:sp>
+        <p:nvSpPr>
+          <p:cNvPr id="24" name="Círculo: vacío 23">
+            <a:extLst>
+              <a:ext uri="{FF2B5EF4-FFF2-40B4-BE49-F238E27FC236}">
+                <a16:creationId xmlns:a16="http://schemas.microsoft.com/office/drawing/2014/main" id="{03EF9540-8859-2C3B-2F14-FFB5198A6AC9}"/>
+              </a:ext>
+            </a:extLst>
+          </p:cNvPr>
+          <p:cNvSpPr/>
+          <p:nvPr/>
+        </p:nvSpPr>
+        <p:spPr>
+          <a:xfrm>
+            <a:off x="6390513" y="2096771"/>
+            <a:ext cx="275208" cy="301841"/>
+          </a:xfrm>
+          <a:prstGeom prst="donut">
+            <a:avLst/>
+          </a:prstGeom>
+          <a:solidFill>
+            <a:srgbClr val="FF0000"/>
+          </a:solidFill>
+        </p:spPr>
+        <p:style>
+          <a:lnRef idx="2">
+            <a:schemeClr val="accent1">
+              <a:shade val="50000"/>
+            </a:schemeClr>
+          </a:lnRef>
+          <a:fillRef idx="1">
+            <a:schemeClr val="accent1"/>
+          </a:fillRef>
+          <a:effectRef idx="0">
+            <a:schemeClr val="accent1"/>
+          </a:effectRef>
+          <a:fontRef idx="minor">
+            <a:schemeClr val="lt1"/>
+          </a:fontRef>
+        </p:style>
+        <p:txBody>
+          <a:bodyPr rtlCol="0" anchor="ctr"/>
+          <a:lstStyle/>
+          <a:p>
+            <a:pPr algn="ctr"/>
+            <a:endParaRPr lang="es-ES">
+              <a:solidFill>
+                <a:schemeClr val="tx1"/>
+              </a:solidFill>
+            </a:endParaRPr>
+          </a:p>
+        </p:txBody>
+      </p:sp>
+      <p:sp>
+        <p:nvSpPr>
+          <p:cNvPr id="25" name="Círculo: vacío 24">
+            <a:extLst>
+              <a:ext uri="{FF2B5EF4-FFF2-40B4-BE49-F238E27FC236}">
+                <a16:creationId xmlns:a16="http://schemas.microsoft.com/office/drawing/2014/main" id="{179C4CA8-8442-0C7C-FB2B-D043316B65A8}"/>
+              </a:ext>
+            </a:extLst>
+          </p:cNvPr>
+          <p:cNvSpPr/>
+          <p:nvPr/>
+        </p:nvSpPr>
+        <p:spPr>
+          <a:xfrm>
+            <a:off x="6887593" y="2117197"/>
+            <a:ext cx="275208" cy="301841"/>
+          </a:xfrm>
+          <a:prstGeom prst="donut">
+            <a:avLst/>
+          </a:prstGeom>
+          <a:solidFill>
+            <a:srgbClr val="FF0000"/>
+          </a:solidFill>
+        </p:spPr>
+        <p:style>
+          <a:lnRef idx="2">
+            <a:schemeClr val="accent1">
+              <a:shade val="50000"/>
+            </a:schemeClr>
+          </a:lnRef>
+          <a:fillRef idx="1">
+            <a:schemeClr val="accent1"/>
+          </a:fillRef>
+          <a:effectRef idx="0">
+            <a:schemeClr val="accent1"/>
+          </a:effectRef>
+          <a:fontRef idx="minor">
+            <a:schemeClr val="lt1"/>
+          </a:fontRef>
+        </p:style>
+        <p:txBody>
+          <a:bodyPr rtlCol="0" anchor="ctr"/>
+          <a:lstStyle/>
+          <a:p>
+            <a:pPr algn="ctr"/>
+            <a:endParaRPr lang="es-ES">
+              <a:solidFill>
+                <a:schemeClr val="tx1"/>
+              </a:solidFill>
+            </a:endParaRPr>
+          </a:p>
+        </p:txBody>
+      </p:sp>
+      <p:sp>
+        <p:nvSpPr>
+          <p:cNvPr id="26" name="Círculo: vacío 25">
+            <a:extLst>
+              <a:ext uri="{FF2B5EF4-FFF2-40B4-BE49-F238E27FC236}">
+                <a16:creationId xmlns:a16="http://schemas.microsoft.com/office/drawing/2014/main" id="{295FBAFE-E185-481B-F499-0CE71B83832D}"/>
+              </a:ext>
+            </a:extLst>
+          </p:cNvPr>
+          <p:cNvSpPr/>
+          <p:nvPr/>
+        </p:nvSpPr>
+        <p:spPr>
+          <a:xfrm>
+            <a:off x="1673512" y="409575"/>
+            <a:ext cx="275208" cy="301841"/>
+          </a:xfrm>
+          <a:prstGeom prst="donut">
+            <a:avLst/>
+          </a:prstGeom>
+          <a:solidFill>
+            <a:srgbClr val="002060"/>
+          </a:solidFill>
+        </p:spPr>
+        <p:style>
+          <a:lnRef idx="2">
+            <a:schemeClr val="accent1">
+              <a:shade val="50000"/>
+            </a:schemeClr>
+          </a:lnRef>
+          <a:fillRef idx="1">
+            <a:schemeClr val="accent1"/>
+          </a:fillRef>
+          <a:effectRef idx="0">
+            <a:schemeClr val="accent1"/>
+          </a:effectRef>
+          <a:fontRef idx="minor">
+            <a:schemeClr val="lt1"/>
+          </a:fontRef>
+        </p:style>
+        <p:txBody>
+          <a:bodyPr rtlCol="0" anchor="ctr"/>
+          <a:lstStyle/>
+          <a:p>
+            <a:pPr algn="ctr"/>
+            <a:endParaRPr lang="es-ES" dirty="0">
+              <a:solidFill>
+                <a:schemeClr val="tx1"/>
+              </a:solidFill>
+            </a:endParaRPr>
+          </a:p>
+        </p:txBody>
+      </p:sp>
+      <p:sp>
+        <p:nvSpPr>
+          <p:cNvPr id="27" name="Círculo: vacío 26">
+            <a:extLst>
+              <a:ext uri="{FF2B5EF4-FFF2-40B4-BE49-F238E27FC236}">
+                <a16:creationId xmlns:a16="http://schemas.microsoft.com/office/drawing/2014/main" id="{5DD98A11-7342-C432-A7F5-462234B22F93}"/>
+              </a:ext>
+            </a:extLst>
+          </p:cNvPr>
+          <p:cNvSpPr/>
+          <p:nvPr/>
+        </p:nvSpPr>
+        <p:spPr>
+          <a:xfrm>
+            <a:off x="2046510" y="1337511"/>
+            <a:ext cx="275208" cy="301841"/>
+          </a:xfrm>
+          <a:prstGeom prst="donut">
+            <a:avLst/>
+          </a:prstGeom>
+          <a:solidFill>
+            <a:srgbClr val="002060"/>
+          </a:solidFill>
+        </p:spPr>
+        <p:style>
+          <a:lnRef idx="2">
+            <a:schemeClr val="accent1">
+              <a:shade val="50000"/>
+            </a:schemeClr>
+          </a:lnRef>
+          <a:fillRef idx="1">
+            <a:schemeClr val="accent1"/>
+          </a:fillRef>
+          <a:effectRef idx="0">
+            <a:schemeClr val="accent1"/>
+          </a:effectRef>
+          <a:fontRef idx="minor">
+            <a:schemeClr val="lt1"/>
+          </a:fontRef>
+        </p:style>
+        <p:txBody>
+          <a:bodyPr rtlCol="0" anchor="ctr"/>
+          <a:lstStyle/>
+          <a:p>
+            <a:pPr algn="ctr"/>
+            <a:endParaRPr lang="es-ES" dirty="0">
+              <a:solidFill>
+                <a:schemeClr val="tx1"/>
+              </a:solidFill>
+            </a:endParaRPr>
+          </a:p>
+        </p:txBody>
+      </p:sp>
+      <p:sp>
+        <p:nvSpPr>
+          <p:cNvPr id="28" name="Círculo: vacío 27">
+            <a:extLst>
+              <a:ext uri="{FF2B5EF4-FFF2-40B4-BE49-F238E27FC236}">
+                <a16:creationId xmlns:a16="http://schemas.microsoft.com/office/drawing/2014/main" id="{991805F0-C61F-A597-6CBF-39D9B81B3895}"/>
+              </a:ext>
+            </a:extLst>
+          </p:cNvPr>
+          <p:cNvSpPr/>
+          <p:nvPr/>
+        </p:nvSpPr>
+        <p:spPr>
+          <a:xfrm>
+            <a:off x="2046510" y="2518443"/>
+            <a:ext cx="275208" cy="301841"/>
+          </a:xfrm>
+          <a:prstGeom prst="donut">
+            <a:avLst/>
+          </a:prstGeom>
+          <a:solidFill>
+            <a:srgbClr val="002060"/>
+          </a:solidFill>
+        </p:spPr>
+        <p:style>
+          <a:lnRef idx="2">
+            <a:schemeClr val="accent1">
+              <a:shade val="50000"/>
+            </a:schemeClr>
+          </a:lnRef>
+          <a:fillRef idx="1">
+            <a:schemeClr val="accent1"/>
+          </a:fillRef>
+          <a:effectRef idx="0">
+            <a:schemeClr val="accent1"/>
+          </a:effectRef>
+          <a:fontRef idx="minor">
+            <a:schemeClr val="lt1"/>
+          </a:fontRef>
+        </p:style>
+        <p:txBody>
+          <a:bodyPr rtlCol="0" anchor="ctr"/>
+          <a:lstStyle/>
+          <a:p>
+            <a:pPr algn="ctr"/>
+            <a:endParaRPr lang="es-ES" dirty="0">
+              <a:solidFill>
+                <a:schemeClr val="tx1"/>
+              </a:solidFill>
+            </a:endParaRPr>
+          </a:p>
+        </p:txBody>
+      </p:sp>
+      <p:sp>
+        <p:nvSpPr>
+          <p:cNvPr id="29" name="Círculo: vacío 28">
+            <a:extLst>
+              <a:ext uri="{FF2B5EF4-FFF2-40B4-BE49-F238E27FC236}">
+                <a16:creationId xmlns:a16="http://schemas.microsoft.com/office/drawing/2014/main" id="{03620EA9-8E0B-6896-AEDF-A9B74F8BFF50}"/>
+              </a:ext>
+            </a:extLst>
+          </p:cNvPr>
+          <p:cNvSpPr/>
+          <p:nvPr/>
+        </p:nvSpPr>
+        <p:spPr>
+          <a:xfrm>
+            <a:off x="1815021" y="2979707"/>
+            <a:ext cx="275208" cy="301841"/>
+          </a:xfrm>
+          <a:prstGeom prst="donut">
+            <a:avLst/>
+          </a:prstGeom>
+          <a:solidFill>
+            <a:srgbClr val="002060"/>
+          </a:solidFill>
+        </p:spPr>
+        <p:style>
+          <a:lnRef idx="2">
+            <a:schemeClr val="accent1">
+              <a:shade val="50000"/>
+            </a:schemeClr>
+          </a:lnRef>
+          <a:fillRef idx="1">
+            <a:schemeClr val="accent1"/>
+          </a:fillRef>
+          <a:effectRef idx="0">
+            <a:schemeClr val="accent1"/>
+          </a:effectRef>
+          <a:fontRef idx="minor">
+            <a:schemeClr val="lt1"/>
+          </a:fontRef>
+        </p:style>
+        <p:txBody>
+          <a:bodyPr rtlCol="0" anchor="ctr"/>
+          <a:lstStyle/>
+          <a:p>
+            <a:pPr algn="ctr"/>
+            <a:endParaRPr lang="es-ES" dirty="0">
+              <a:solidFill>
+                <a:schemeClr val="tx1"/>
+              </a:solidFill>
+            </a:endParaRPr>
+          </a:p>
+        </p:txBody>
+      </p:sp>
+      <p:sp>
+        <p:nvSpPr>
+          <p:cNvPr id="30" name="Círculo: vacío 29">
+            <a:extLst>
+              <a:ext uri="{FF2B5EF4-FFF2-40B4-BE49-F238E27FC236}">
+                <a16:creationId xmlns:a16="http://schemas.microsoft.com/office/drawing/2014/main" id="{7FCAB538-25F9-FFC2-4A7C-BF3D078906EB}"/>
+              </a:ext>
+            </a:extLst>
+          </p:cNvPr>
+          <p:cNvSpPr/>
+          <p:nvPr/>
+        </p:nvSpPr>
+        <p:spPr>
+          <a:xfrm>
+            <a:off x="1668611" y="3702220"/>
+            <a:ext cx="275208" cy="301841"/>
+          </a:xfrm>
+          <a:prstGeom prst="donut">
+            <a:avLst/>
+          </a:prstGeom>
+          <a:solidFill>
+            <a:srgbClr val="002060"/>
+          </a:solidFill>
+        </p:spPr>
+        <p:style>
+          <a:lnRef idx="2">
+            <a:schemeClr val="accent1">
+              <a:shade val="50000"/>
+            </a:schemeClr>
+          </a:lnRef>
+          <a:fillRef idx="1">
+            <a:schemeClr val="accent1"/>
+          </a:fillRef>
+          <a:effectRef idx="0">
+            <a:schemeClr val="accent1"/>
+          </a:effectRef>
+          <a:fontRef idx="minor">
+            <a:schemeClr val="lt1"/>
+          </a:fontRef>
+        </p:style>
+        <p:txBody>
+          <a:bodyPr rtlCol="0" anchor="ctr"/>
+          <a:lstStyle/>
+          <a:p>
+            <a:pPr algn="ctr"/>
+            <a:endParaRPr lang="es-ES" dirty="0">
+              <a:solidFill>
+                <a:schemeClr val="tx1"/>
+              </a:solidFill>
+            </a:endParaRPr>
+          </a:p>
+        </p:txBody>
+      </p:sp>
+      <p:sp>
+        <p:nvSpPr>
+          <p:cNvPr id="31" name="Círculo: vacío 30">
+            <a:extLst>
+              <a:ext uri="{FF2B5EF4-FFF2-40B4-BE49-F238E27FC236}">
+                <a16:creationId xmlns:a16="http://schemas.microsoft.com/office/drawing/2014/main" id="{5E0238D1-3758-2051-4DF8-82AB466D8763}"/>
+              </a:ext>
+            </a:extLst>
+          </p:cNvPr>
+          <p:cNvSpPr/>
+          <p:nvPr/>
+        </p:nvSpPr>
+        <p:spPr>
+          <a:xfrm>
+            <a:off x="1694642" y="4749553"/>
+            <a:ext cx="275208" cy="301841"/>
+          </a:xfrm>
+          <a:prstGeom prst="donut">
+            <a:avLst/>
+          </a:prstGeom>
+          <a:solidFill>
+            <a:srgbClr val="002060"/>
+          </a:solidFill>
+        </p:spPr>
+        <p:style>
+          <a:lnRef idx="2">
+            <a:schemeClr val="accent1">
+              <a:shade val="50000"/>
+            </a:schemeClr>
+          </a:lnRef>
+          <a:fillRef idx="1">
+            <a:schemeClr val="accent1"/>
+          </a:fillRef>
+          <a:effectRef idx="0">
+            <a:schemeClr val="accent1"/>
+          </a:effectRef>
+          <a:fontRef idx="minor">
+            <a:schemeClr val="lt1"/>
+          </a:fontRef>
+        </p:style>
+        <p:txBody>
+          <a:bodyPr rtlCol="0" anchor="ctr"/>
+          <a:lstStyle/>
+          <a:p>
+            <a:pPr algn="ctr"/>
+            <a:endParaRPr lang="es-ES" dirty="0">
+              <a:solidFill>
+                <a:schemeClr val="tx1"/>
+              </a:solidFill>
+            </a:endParaRPr>
+          </a:p>
+        </p:txBody>
+      </p:sp>
+      <p:sp>
+        <p:nvSpPr>
+          <p:cNvPr id="32" name="Círculo: vacío 31">
+            <a:extLst>
+              <a:ext uri="{FF2B5EF4-FFF2-40B4-BE49-F238E27FC236}">
+                <a16:creationId xmlns:a16="http://schemas.microsoft.com/office/drawing/2014/main" id="{DD5DEB2F-3FA4-887F-F3C9-6F26B371DA4F}"/>
+              </a:ext>
+            </a:extLst>
+          </p:cNvPr>
+          <p:cNvSpPr/>
+          <p:nvPr/>
+        </p:nvSpPr>
+        <p:spPr>
+          <a:xfrm>
+            <a:off x="2478593" y="2610892"/>
+            <a:ext cx="275208" cy="301841"/>
+          </a:xfrm>
+          <a:prstGeom prst="donut">
+            <a:avLst/>
+          </a:prstGeom>
+          <a:solidFill>
+            <a:srgbClr val="00B0F0"/>
+          </a:solidFill>
+        </p:spPr>
+        <p:style>
+          <a:lnRef idx="2">
+            <a:schemeClr val="accent1">
+              <a:shade val="50000"/>
+            </a:schemeClr>
+          </a:lnRef>
+          <a:fillRef idx="1">
+            <a:schemeClr val="accent1"/>
+          </a:fillRef>
+          <a:effectRef idx="0">
+            <a:schemeClr val="accent1"/>
+          </a:effectRef>
+          <a:fontRef idx="minor">
+            <a:schemeClr val="lt1"/>
+          </a:fontRef>
+        </p:style>
+        <p:txBody>
+          <a:bodyPr rtlCol="0" anchor="ctr"/>
+          <a:lstStyle/>
+          <a:p>
+            <a:pPr algn="ctr"/>
+            <a:endParaRPr lang="es-ES" dirty="0">
+              <a:solidFill>
+                <a:schemeClr val="tx1"/>
+              </a:solidFill>
+            </a:endParaRPr>
+          </a:p>
+        </p:txBody>
+      </p:sp>
+      <p:sp>
+        <p:nvSpPr>
+          <p:cNvPr id="33" name="Círculo: vacío 32">
+            <a:extLst>
+              <a:ext uri="{FF2B5EF4-FFF2-40B4-BE49-F238E27FC236}">
+                <a16:creationId xmlns:a16="http://schemas.microsoft.com/office/drawing/2014/main" id="{B26844D8-8B0D-2F2D-4652-08BA80F76731}"/>
+              </a:ext>
+            </a:extLst>
+          </p:cNvPr>
+          <p:cNvSpPr/>
+          <p:nvPr/>
+        </p:nvSpPr>
+        <p:spPr>
+          <a:xfrm>
+            <a:off x="2764367" y="3583617"/>
+            <a:ext cx="275208" cy="301841"/>
+          </a:xfrm>
+          <a:prstGeom prst="donut">
+            <a:avLst/>
+          </a:prstGeom>
+          <a:solidFill>
+            <a:srgbClr val="00B0F0"/>
+          </a:solidFill>
+        </p:spPr>
+        <p:style>
+          <a:lnRef idx="2">
+            <a:schemeClr val="accent1">
+              <a:shade val="50000"/>
+            </a:schemeClr>
+          </a:lnRef>
+          <a:fillRef idx="1">
+            <a:schemeClr val="accent1"/>
+          </a:fillRef>
+          <a:effectRef idx="0">
+            <a:schemeClr val="accent1"/>
+          </a:effectRef>
+          <a:fontRef idx="minor">
+            <a:schemeClr val="lt1"/>
+          </a:fontRef>
+        </p:style>
+        <p:txBody>
+          <a:bodyPr rtlCol="0" anchor="ctr"/>
+          <a:lstStyle/>
+          <a:p>
+            <a:pPr algn="ctr"/>
+            <a:endParaRPr lang="es-ES" dirty="0">
+              <a:solidFill>
+                <a:schemeClr val="tx1"/>
+              </a:solidFill>
+            </a:endParaRPr>
+          </a:p>
+        </p:txBody>
+      </p:sp>
+      <p:sp>
+        <p:nvSpPr>
+          <p:cNvPr id="34" name="Círculo: vacío 33">
+            <a:extLst>
+              <a:ext uri="{FF2B5EF4-FFF2-40B4-BE49-F238E27FC236}">
+                <a16:creationId xmlns:a16="http://schemas.microsoft.com/office/drawing/2014/main" id="{D9D64F15-D1D0-F56F-D918-54DE4B8735FA}"/>
+              </a:ext>
+            </a:extLst>
+          </p:cNvPr>
+          <p:cNvSpPr/>
+          <p:nvPr/>
+        </p:nvSpPr>
+        <p:spPr>
+          <a:xfrm>
+            <a:off x="3156024" y="4581109"/>
+            <a:ext cx="275208" cy="301841"/>
+          </a:xfrm>
+          <a:prstGeom prst="donut">
+            <a:avLst/>
+          </a:prstGeom>
+          <a:solidFill>
+            <a:srgbClr val="00B0F0"/>
+          </a:solidFill>
+        </p:spPr>
+        <p:style>
+          <a:lnRef idx="2">
+            <a:schemeClr val="accent1">
+              <a:shade val="50000"/>
+            </a:schemeClr>
+          </a:lnRef>
+          <a:fillRef idx="1">
+            <a:schemeClr val="accent1"/>
+          </a:fillRef>
+          <a:effectRef idx="0">
+            <a:schemeClr val="accent1"/>
+          </a:effectRef>
+          <a:fontRef idx="minor">
+            <a:schemeClr val="lt1"/>
+          </a:fontRef>
+        </p:style>
+        <p:txBody>
+          <a:bodyPr rtlCol="0" anchor="ctr"/>
+          <a:lstStyle/>
+          <a:p>
+            <a:pPr algn="ctr"/>
+            <a:endParaRPr lang="es-ES" dirty="0">
+              <a:solidFill>
+                <a:schemeClr val="tx1"/>
+              </a:solidFill>
+            </a:endParaRPr>
+          </a:p>
+        </p:txBody>
+      </p:sp>
+      <p:sp>
+        <p:nvSpPr>
+          <p:cNvPr id="35" name="Círculo: vacío 34">
+            <a:extLst>
+              <a:ext uri="{FF2B5EF4-FFF2-40B4-BE49-F238E27FC236}">
+                <a16:creationId xmlns:a16="http://schemas.microsoft.com/office/drawing/2014/main" id="{1DD610F1-22D5-F79C-66F8-98B58B01C001}"/>
+              </a:ext>
+            </a:extLst>
+          </p:cNvPr>
+          <p:cNvSpPr/>
+          <p:nvPr/>
+        </p:nvSpPr>
+        <p:spPr>
+          <a:xfrm>
+            <a:off x="2705784" y="4998128"/>
+            <a:ext cx="275208" cy="301841"/>
+          </a:xfrm>
+          <a:prstGeom prst="donut">
+            <a:avLst/>
+          </a:prstGeom>
+          <a:solidFill>
+            <a:srgbClr val="00B0F0"/>
+          </a:solidFill>
+        </p:spPr>
+        <p:style>
+          <a:lnRef idx="2">
+            <a:schemeClr val="accent1">
+              <a:shade val="50000"/>
+            </a:schemeClr>
+          </a:lnRef>
+          <a:fillRef idx="1">
+            <a:schemeClr val="accent1"/>
+          </a:fillRef>
+          <a:effectRef idx="0">
+            <a:schemeClr val="accent1"/>
+          </a:effectRef>
+          <a:fontRef idx="minor">
+            <a:schemeClr val="lt1"/>
+          </a:fontRef>
+        </p:style>
+        <p:txBody>
+          <a:bodyPr rtlCol="0" anchor="ctr"/>
+          <a:lstStyle/>
+          <a:p>
+            <a:pPr algn="ctr"/>
+            <a:endParaRPr lang="es-ES" dirty="0">
+              <a:solidFill>
+                <a:schemeClr val="tx1"/>
+              </a:solidFill>
+            </a:endParaRPr>
+          </a:p>
+        </p:txBody>
+      </p:sp>
+      <p:sp>
+        <p:nvSpPr>
+          <p:cNvPr id="36" name="Círculo: vacío 35">
+            <a:extLst>
+              <a:ext uri="{FF2B5EF4-FFF2-40B4-BE49-F238E27FC236}">
+                <a16:creationId xmlns:a16="http://schemas.microsoft.com/office/drawing/2014/main" id="{BF59BFA2-D732-85C3-CD76-96463ECC5EB3}"/>
+              </a:ext>
+            </a:extLst>
+          </p:cNvPr>
+          <p:cNvSpPr/>
+          <p:nvPr/>
+        </p:nvSpPr>
+        <p:spPr>
+          <a:xfrm>
+            <a:off x="3169040" y="5924365"/>
+            <a:ext cx="275208" cy="301841"/>
+          </a:xfrm>
+          <a:prstGeom prst="donut">
+            <a:avLst/>
+          </a:prstGeom>
+          <a:solidFill>
+            <a:srgbClr val="00B0F0"/>
+          </a:solidFill>
+        </p:spPr>
+        <p:style>
+          <a:lnRef idx="2">
+            <a:schemeClr val="accent1">
+              <a:shade val="50000"/>
+            </a:schemeClr>
+          </a:lnRef>
+          <a:fillRef idx="1">
+            <a:schemeClr val="accent1"/>
+          </a:fillRef>
+          <a:effectRef idx="0">
+            <a:schemeClr val="accent1"/>
+          </a:effectRef>
+          <a:fontRef idx="minor">
+            <a:schemeClr val="lt1"/>
+          </a:fontRef>
+        </p:style>
+        <p:txBody>
+          <a:bodyPr rtlCol="0" anchor="ctr"/>
+          <a:lstStyle/>
+          <a:p>
+            <a:pPr algn="ctr"/>
+            <a:endParaRPr lang="es-ES" dirty="0">
+              <a:solidFill>
+                <a:schemeClr val="tx1"/>
+              </a:solidFill>
+            </a:endParaRPr>
+          </a:p>
+        </p:txBody>
+      </p:sp>
+      <p:sp>
+        <p:nvSpPr>
+          <p:cNvPr id="37" name="Círculo: vacío 36">
+            <a:extLst>
+              <a:ext uri="{FF2B5EF4-FFF2-40B4-BE49-F238E27FC236}">
+                <a16:creationId xmlns:a16="http://schemas.microsoft.com/office/drawing/2014/main" id="{460E5001-7238-9014-3AC5-9331B3010E6A}"/>
+              </a:ext>
+            </a:extLst>
+          </p:cNvPr>
+          <p:cNvSpPr/>
+          <p:nvPr/>
+        </p:nvSpPr>
+        <p:spPr>
+          <a:xfrm>
+            <a:off x="2380951" y="5609207"/>
+            <a:ext cx="275208" cy="301841"/>
+          </a:xfrm>
+          <a:prstGeom prst="donut">
+            <a:avLst/>
+          </a:prstGeom>
+          <a:solidFill>
+            <a:srgbClr val="00B0F0"/>
+          </a:solidFill>
+        </p:spPr>
+        <p:style>
+          <a:lnRef idx="2">
+            <a:schemeClr val="accent1">
+              <a:shade val="50000"/>
+            </a:schemeClr>
+          </a:lnRef>
+          <a:fillRef idx="1">
+            <a:schemeClr val="accent1"/>
+          </a:fillRef>
+          <a:effectRef idx="0">
+            <a:schemeClr val="accent1"/>
+          </a:effectRef>
+          <a:fontRef idx="minor">
+            <a:schemeClr val="lt1"/>
+          </a:fontRef>
+        </p:style>
+        <p:txBody>
+          <a:bodyPr rtlCol="0" anchor="ctr"/>
+          <a:lstStyle/>
+          <a:p>
+            <a:pPr algn="ctr"/>
+            <a:endParaRPr lang="es-ES" dirty="0">
+              <a:solidFill>
+                <a:schemeClr val="tx1"/>
+              </a:solidFill>
+            </a:endParaRPr>
+          </a:p>
+        </p:txBody>
+      </p:sp>
+      <p:sp>
+        <p:nvSpPr>
+          <p:cNvPr id="38" name="Círculo: vacío 37">
+            <a:extLst>
+              <a:ext uri="{FF2B5EF4-FFF2-40B4-BE49-F238E27FC236}">
+                <a16:creationId xmlns:a16="http://schemas.microsoft.com/office/drawing/2014/main" id="{2D3BEF8B-5523-D784-4523-EE8192A6726B}"/>
+              </a:ext>
+            </a:extLst>
+          </p:cNvPr>
+          <p:cNvSpPr/>
+          <p:nvPr/>
+        </p:nvSpPr>
+        <p:spPr>
+          <a:xfrm>
+            <a:off x="1778439" y="5796886"/>
+            <a:ext cx="275208" cy="301841"/>
+          </a:xfrm>
+          <a:prstGeom prst="donut">
+            <a:avLst/>
+          </a:prstGeom>
+          <a:solidFill>
+            <a:srgbClr val="00B0F0"/>
+          </a:solidFill>
+        </p:spPr>
+        <p:style>
+          <a:lnRef idx="2">
+            <a:schemeClr val="accent1">
+              <a:shade val="50000"/>
+            </a:schemeClr>
+          </a:lnRef>
+          <a:fillRef idx="1">
+            <a:schemeClr val="accent1"/>
+          </a:fillRef>
+          <a:effectRef idx="0">
+            <a:schemeClr val="accent1"/>
+          </a:effectRef>
+          <a:fontRef idx="minor">
+            <a:schemeClr val="lt1"/>
+          </a:fontRef>
+        </p:style>
+        <p:txBody>
+          <a:bodyPr rtlCol="0" anchor="ctr"/>
+          <a:lstStyle/>
+          <a:p>
+            <a:pPr algn="ctr"/>
+            <a:endParaRPr lang="es-ES" dirty="0">
+              <a:solidFill>
+                <a:schemeClr val="tx1"/>
+              </a:solidFill>
+            </a:endParaRPr>
+          </a:p>
+        </p:txBody>
+      </p:sp>
+      <p:sp>
+        <p:nvSpPr>
+          <p:cNvPr id="39" name="Círculo: vacío 38">
+            <a:extLst>
+              <a:ext uri="{FF2B5EF4-FFF2-40B4-BE49-F238E27FC236}">
+                <a16:creationId xmlns:a16="http://schemas.microsoft.com/office/drawing/2014/main" id="{0E0E2E9C-BECB-BD13-6905-36248D7FA28B}"/>
+              </a:ext>
+            </a:extLst>
+          </p:cNvPr>
+          <p:cNvSpPr/>
+          <p:nvPr/>
+        </p:nvSpPr>
+        <p:spPr>
+          <a:xfrm>
+            <a:off x="2329062" y="1624223"/>
+            <a:ext cx="275208" cy="301841"/>
+          </a:xfrm>
+          <a:prstGeom prst="donut">
+            <a:avLst/>
+          </a:prstGeom>
+          <a:solidFill>
+            <a:srgbClr val="002060"/>
+          </a:solidFill>
+        </p:spPr>
+        <p:style>
+          <a:lnRef idx="2">
+            <a:schemeClr val="accent1">
+              <a:shade val="50000"/>
+            </a:schemeClr>
+          </a:lnRef>
+          <a:fillRef idx="1">
+            <a:schemeClr val="accent1"/>
+          </a:fillRef>
+          <a:effectRef idx="0">
+            <a:schemeClr val="accent1"/>
+          </a:effectRef>
+          <a:fontRef idx="minor">
+            <a:schemeClr val="lt1"/>
+          </a:fontRef>
+        </p:style>
+        <p:txBody>
+          <a:bodyPr rtlCol="0" anchor="ctr"/>
+          <a:lstStyle/>
+          <a:p>
+            <a:pPr algn="ctr"/>
+            <a:endParaRPr lang="es-ES" dirty="0">
+              <a:solidFill>
+                <a:schemeClr val="tx1"/>
+              </a:solidFill>
+            </a:endParaRPr>
+          </a:p>
+        </p:txBody>
+      </p:sp>
+      <p:sp>
+        <p:nvSpPr>
+          <p:cNvPr id="40" name="Círculo: vacío 39">
+            <a:extLst>
+              <a:ext uri="{FF2B5EF4-FFF2-40B4-BE49-F238E27FC236}">
+                <a16:creationId xmlns:a16="http://schemas.microsoft.com/office/drawing/2014/main" id="{1EC28F02-87CC-0FA4-2090-5736026ED31B}"/>
+              </a:ext>
+            </a:extLst>
+          </p:cNvPr>
+          <p:cNvSpPr/>
+          <p:nvPr/>
+        </p:nvSpPr>
+        <p:spPr>
+          <a:xfrm>
+            <a:off x="3366460" y="1356907"/>
+            <a:ext cx="275208" cy="301841"/>
+          </a:xfrm>
+          <a:prstGeom prst="donut">
+            <a:avLst/>
+          </a:prstGeom>
+          <a:solidFill>
+            <a:srgbClr val="002060"/>
+          </a:solidFill>
+        </p:spPr>
+        <p:style>
+          <a:lnRef idx="2">
+            <a:schemeClr val="accent1">
+              <a:shade val="50000"/>
+            </a:schemeClr>
+          </a:lnRef>
+          <a:fillRef idx="1">
+            <a:schemeClr val="accent1"/>
+          </a:fillRef>
+          <a:effectRef idx="0">
+            <a:schemeClr val="accent1"/>
+          </a:effectRef>
+          <a:fontRef idx="minor">
+            <a:schemeClr val="lt1"/>
+          </a:fontRef>
+        </p:style>
+        <p:txBody>
+          <a:bodyPr rtlCol="0" anchor="ctr"/>
+          <a:lstStyle/>
+          <a:p>
+            <a:pPr algn="ctr"/>
+            <a:endParaRPr lang="es-ES" dirty="0">
+              <a:solidFill>
+                <a:schemeClr val="tx1"/>
+              </a:solidFill>
+            </a:endParaRPr>
+          </a:p>
+        </p:txBody>
+      </p:sp>
+      <p:sp>
+        <p:nvSpPr>
+          <p:cNvPr id="41" name="Círculo: vacío 40">
+            <a:extLst>
+              <a:ext uri="{FF2B5EF4-FFF2-40B4-BE49-F238E27FC236}">
+                <a16:creationId xmlns:a16="http://schemas.microsoft.com/office/drawing/2014/main" id="{85CB858B-413B-56BC-2156-2223C4DC0FCE}"/>
+              </a:ext>
+            </a:extLst>
+          </p:cNvPr>
+          <p:cNvSpPr/>
+          <p:nvPr/>
+        </p:nvSpPr>
+        <p:spPr>
+          <a:xfrm>
+            <a:off x="2902261" y="977892"/>
+            <a:ext cx="275208" cy="301841"/>
+          </a:xfrm>
+          <a:prstGeom prst="donut">
+            <a:avLst/>
+          </a:prstGeom>
+          <a:solidFill>
+            <a:srgbClr val="002060"/>
+          </a:solidFill>
+        </p:spPr>
+        <p:style>
+          <a:lnRef idx="2">
+            <a:schemeClr val="accent1">
+              <a:shade val="50000"/>
+            </a:schemeClr>
+          </a:lnRef>
+          <a:fillRef idx="1">
+            <a:schemeClr val="accent1"/>
+          </a:fillRef>
+          <a:effectRef idx="0">
+            <a:schemeClr val="accent1"/>
+          </a:effectRef>
+          <a:fontRef idx="minor">
+            <a:schemeClr val="lt1"/>
+          </a:fontRef>
+        </p:style>
+        <p:txBody>
+          <a:bodyPr rtlCol="0" anchor="ctr"/>
+          <a:lstStyle/>
+          <a:p>
+            <a:pPr algn="ctr"/>
+            <a:endParaRPr lang="es-ES" dirty="0">
+              <a:solidFill>
+                <a:schemeClr val="tx1"/>
+              </a:solidFill>
+            </a:endParaRPr>
+          </a:p>
+        </p:txBody>
+      </p:sp>
+      <p:cxnSp>
+        <p:nvCxnSpPr>
+          <p:cNvPr id="44" name="Conector recto de flecha 43">
+            <a:extLst>
+              <a:ext uri="{FF2B5EF4-FFF2-40B4-BE49-F238E27FC236}">
+                <a16:creationId xmlns:a16="http://schemas.microsoft.com/office/drawing/2014/main" id="{342D2CF9-3845-59B8-4787-11FD53159269}"/>
+              </a:ext>
+            </a:extLst>
+          </p:cNvPr>
+          <p:cNvCxnSpPr>
+            <a:cxnSpLocks/>
+            <a:stCxn id="6" idx="0"/>
+            <a:endCxn id="67" idx="4"/>
+          </p:cNvCxnSpPr>
+          <p:nvPr/>
+        </p:nvCxnSpPr>
+        <p:spPr>
+          <a:xfrm flipV="1">
+            <a:off x="6276513" y="3153339"/>
+            <a:ext cx="12318" cy="2732556"/>
+          </a:xfrm>
+          <a:prstGeom prst="straightConnector1">
+            <a:avLst/>
+          </a:prstGeom>
+          <a:ln>
+            <a:tailEnd type="triangle"/>
+          </a:ln>
+        </p:spPr>
+        <p:style>
+          <a:lnRef idx="1">
+            <a:schemeClr val="accent1"/>
+          </a:lnRef>
+          <a:fillRef idx="0">
+            <a:schemeClr val="accent1"/>
+          </a:fillRef>
+          <a:effectRef idx="0">
+            <a:schemeClr val="accent1"/>
+          </a:effectRef>
+          <a:fontRef idx="minor">
+            <a:schemeClr val="tx1"/>
+          </a:fontRef>
+        </p:style>
+      </p:cxnSp>
+      <p:cxnSp>
+        <p:nvCxnSpPr>
+          <p:cNvPr id="47" name="Conector recto de flecha 46">
+            <a:extLst>
+              <a:ext uri="{FF2B5EF4-FFF2-40B4-BE49-F238E27FC236}">
+                <a16:creationId xmlns:a16="http://schemas.microsoft.com/office/drawing/2014/main" id="{8F11F5F0-6824-C4E1-8271-B128284F07A3}"/>
+              </a:ext>
+            </a:extLst>
+          </p:cNvPr>
+          <p:cNvCxnSpPr>
+            <a:cxnSpLocks/>
+            <a:stCxn id="24" idx="6"/>
+            <a:endCxn id="25" idx="2"/>
+          </p:cNvCxnSpPr>
+          <p:nvPr/>
+        </p:nvCxnSpPr>
+        <p:spPr>
+          <a:xfrm>
+            <a:off x="6665721" y="2247692"/>
+            <a:ext cx="221872" cy="20426"/>
+          </a:xfrm>
+          <a:prstGeom prst="straightConnector1">
+            <a:avLst/>
+          </a:prstGeom>
+          <a:ln>
+            <a:tailEnd type="triangle"/>
+          </a:ln>
+        </p:spPr>
+        <p:style>
+          <a:lnRef idx="1">
+            <a:schemeClr val="accent1"/>
+          </a:lnRef>
+          <a:fillRef idx="0">
+            <a:schemeClr val="accent1"/>
+          </a:fillRef>
+          <a:effectRef idx="0">
+            <a:schemeClr val="accent1"/>
+          </a:effectRef>
+          <a:fontRef idx="minor">
+            <a:schemeClr val="tx1"/>
+          </a:fontRef>
+        </p:style>
+      </p:cxnSp>
+      <p:sp>
+        <p:nvSpPr>
+          <p:cNvPr id="50" name="Círculo: vacío 49">
+            <a:extLst>
+              <a:ext uri="{FF2B5EF4-FFF2-40B4-BE49-F238E27FC236}">
+                <a16:creationId xmlns:a16="http://schemas.microsoft.com/office/drawing/2014/main" id="{16D544F4-75E6-6FC3-A551-CA13B5EACD43}"/>
+              </a:ext>
+            </a:extLst>
+          </p:cNvPr>
+          <p:cNvSpPr/>
+          <p:nvPr/>
+        </p:nvSpPr>
+        <p:spPr>
+          <a:xfrm>
+            <a:off x="9394180" y="5172145"/>
+            <a:ext cx="275208" cy="301841"/>
+          </a:xfrm>
+          <a:prstGeom prst="donut">
+            <a:avLst/>
+          </a:prstGeom>
+          <a:solidFill>
+            <a:srgbClr val="FF0000"/>
+          </a:solidFill>
+        </p:spPr>
+        <p:style>
+          <a:lnRef idx="2">
+            <a:schemeClr val="accent1">
+              <a:shade val="50000"/>
+            </a:schemeClr>
+          </a:lnRef>
+          <a:fillRef idx="1">
+            <a:schemeClr val="accent1"/>
+          </a:fillRef>
+          <a:effectRef idx="0">
+            <a:schemeClr val="accent1"/>
+          </a:effectRef>
+          <a:fontRef idx="minor">
+            <a:schemeClr val="lt1"/>
+          </a:fontRef>
+        </p:style>
+        <p:txBody>
+          <a:bodyPr rtlCol="0" anchor="ctr"/>
+          <a:lstStyle/>
+          <a:p>
+            <a:pPr algn="ctr"/>
+            <a:endParaRPr lang="es-ES">
+              <a:solidFill>
+                <a:schemeClr val="tx1"/>
+              </a:solidFill>
+            </a:endParaRPr>
+          </a:p>
+        </p:txBody>
+      </p:sp>
+      <p:cxnSp>
+        <p:nvCxnSpPr>
+          <p:cNvPr id="52" name="Conector recto de flecha 51">
+            <a:extLst>
+              <a:ext uri="{FF2B5EF4-FFF2-40B4-BE49-F238E27FC236}">
+                <a16:creationId xmlns:a16="http://schemas.microsoft.com/office/drawing/2014/main" id="{E16268D6-96C2-F6C1-8567-24FAC690DF44}"/>
+              </a:ext>
+            </a:extLst>
+          </p:cNvPr>
+          <p:cNvCxnSpPr/>
+          <p:nvPr/>
+        </p:nvCxnSpPr>
+        <p:spPr>
+          <a:xfrm flipH="1">
+            <a:off x="9332697" y="3063630"/>
+            <a:ext cx="719092" cy="2542619"/>
+          </a:xfrm>
+          <a:prstGeom prst="straightConnector1">
+            <a:avLst/>
+          </a:prstGeom>
+          <a:ln>
+            <a:tailEnd type="triangle"/>
+          </a:ln>
+        </p:spPr>
+        <p:style>
+          <a:lnRef idx="1">
+            <a:schemeClr val="accent1"/>
+          </a:lnRef>
+          <a:fillRef idx="0">
+            <a:schemeClr val="accent1"/>
+          </a:fillRef>
+          <a:effectRef idx="0">
+            <a:schemeClr val="accent1"/>
+          </a:effectRef>
+          <a:fontRef idx="minor">
+            <a:schemeClr val="tx1"/>
+          </a:fontRef>
+        </p:style>
+      </p:cxnSp>
+      <p:cxnSp>
+        <p:nvCxnSpPr>
+          <p:cNvPr id="55" name="Conector recto de flecha 54">
+            <a:extLst>
+              <a:ext uri="{FF2B5EF4-FFF2-40B4-BE49-F238E27FC236}">
+                <a16:creationId xmlns:a16="http://schemas.microsoft.com/office/drawing/2014/main" id="{E3B4DACC-E2EA-103F-8DA5-7EB37BA7A5DB}"/>
+              </a:ext>
+            </a:extLst>
+          </p:cNvPr>
+          <p:cNvCxnSpPr>
+            <a:cxnSpLocks/>
+          </p:cNvCxnSpPr>
+          <p:nvPr/>
+        </p:nvCxnSpPr>
+        <p:spPr>
+          <a:xfrm>
+            <a:off x="9048889" y="3583617"/>
+            <a:ext cx="709472" cy="2145570"/>
+          </a:xfrm>
+          <a:prstGeom prst="straightConnector1">
+            <a:avLst/>
+          </a:prstGeom>
+          <a:ln>
+            <a:solidFill>
+              <a:srgbClr val="FFC000"/>
+            </a:solidFill>
+            <a:tailEnd type="triangle"/>
+          </a:ln>
+        </p:spPr>
+        <p:style>
+          <a:lnRef idx="1">
+            <a:schemeClr val="accent1"/>
+          </a:lnRef>
+          <a:fillRef idx="0">
+            <a:schemeClr val="accent1"/>
+          </a:fillRef>
+          <a:effectRef idx="0">
+            <a:schemeClr val="accent1"/>
+          </a:effectRef>
+          <a:fontRef idx="minor">
+            <a:schemeClr val="tx1"/>
+          </a:fontRef>
+        </p:style>
+      </p:cxnSp>
+      <p:cxnSp>
+        <p:nvCxnSpPr>
+          <p:cNvPr id="56" name="Conector recto de flecha 55">
+            <a:extLst>
+              <a:ext uri="{FF2B5EF4-FFF2-40B4-BE49-F238E27FC236}">
+                <a16:creationId xmlns:a16="http://schemas.microsoft.com/office/drawing/2014/main" id="{6853F5C0-F099-9A2F-794A-D5414FDAA615}"/>
+              </a:ext>
+            </a:extLst>
+          </p:cNvPr>
+          <p:cNvCxnSpPr>
+            <a:cxnSpLocks/>
+            <a:stCxn id="17" idx="0"/>
+            <a:endCxn id="20" idx="4"/>
+          </p:cNvCxnSpPr>
+          <p:nvPr/>
+        </p:nvCxnSpPr>
+        <p:spPr>
+          <a:xfrm flipH="1" flipV="1">
+            <a:off x="6643087" y="3337589"/>
+            <a:ext cx="92175" cy="246029"/>
+          </a:xfrm>
+          <a:prstGeom prst="straightConnector1">
+            <a:avLst/>
+          </a:prstGeom>
+          <a:ln>
+            <a:solidFill>
+              <a:srgbClr val="FFC000"/>
+            </a:solidFill>
+            <a:tailEnd type="triangle"/>
+          </a:ln>
+        </p:spPr>
+        <p:style>
+          <a:lnRef idx="1">
+            <a:schemeClr val="accent1"/>
+          </a:lnRef>
+          <a:fillRef idx="0">
+            <a:schemeClr val="accent1"/>
+          </a:fillRef>
+          <a:effectRef idx="0">
+            <a:schemeClr val="accent1"/>
+          </a:effectRef>
+          <a:fontRef idx="minor">
+            <a:schemeClr val="tx1"/>
+          </a:fontRef>
+        </p:style>
+      </p:cxnSp>
+      <p:sp>
+        <p:nvSpPr>
+          <p:cNvPr id="59" name="Círculo: vacío 58">
+            <a:extLst>
+              <a:ext uri="{FF2B5EF4-FFF2-40B4-BE49-F238E27FC236}">
+                <a16:creationId xmlns:a16="http://schemas.microsoft.com/office/drawing/2014/main" id="{94B31D4E-40A3-9596-B9DE-066857FED16C}"/>
+              </a:ext>
+            </a:extLst>
+          </p:cNvPr>
+          <p:cNvSpPr/>
+          <p:nvPr/>
+        </p:nvSpPr>
+        <p:spPr>
+          <a:xfrm>
+            <a:off x="6810501" y="4397530"/>
+            <a:ext cx="275208" cy="301841"/>
+          </a:xfrm>
+          <a:prstGeom prst="donut">
+            <a:avLst/>
+          </a:prstGeom>
+          <a:solidFill>
+            <a:srgbClr val="00B050"/>
+          </a:solidFill>
+        </p:spPr>
+        <p:style>
+          <a:lnRef idx="2">
+            <a:schemeClr val="accent1">
+              <a:shade val="50000"/>
+            </a:schemeClr>
+          </a:lnRef>
+          <a:fillRef idx="1">
+            <a:schemeClr val="accent1"/>
+          </a:fillRef>
+          <a:effectRef idx="0">
+            <a:schemeClr val="accent1"/>
+          </a:effectRef>
+          <a:fontRef idx="minor">
+            <a:schemeClr val="lt1"/>
+          </a:fontRef>
+        </p:style>
+        <p:txBody>
+          <a:bodyPr rtlCol="0" anchor="ctr"/>
+          <a:lstStyle/>
+          <a:p>
+            <a:pPr algn="ctr"/>
+            <a:endParaRPr lang="es-ES">
+              <a:solidFill>
+                <a:schemeClr val="tx1"/>
+              </a:solidFill>
+            </a:endParaRPr>
+          </a:p>
+        </p:txBody>
+      </p:sp>
+      <p:cxnSp>
+        <p:nvCxnSpPr>
+          <p:cNvPr id="60" name="Conector recto de flecha 59">
+            <a:extLst>
+              <a:ext uri="{FF2B5EF4-FFF2-40B4-BE49-F238E27FC236}">
+                <a16:creationId xmlns:a16="http://schemas.microsoft.com/office/drawing/2014/main" id="{AA48D189-1A28-DC6A-BC2F-BC80F10CB1B3}"/>
+              </a:ext>
+            </a:extLst>
+          </p:cNvPr>
+          <p:cNvCxnSpPr>
+            <a:cxnSpLocks/>
+            <a:stCxn id="20" idx="5"/>
+            <a:endCxn id="59" idx="0"/>
+          </p:cNvCxnSpPr>
+          <p:nvPr/>
+        </p:nvCxnSpPr>
+        <p:spPr>
+          <a:xfrm>
+            <a:off x="6740388" y="3293385"/>
+            <a:ext cx="207717" cy="1104145"/>
+          </a:xfrm>
+          <a:prstGeom prst="straightConnector1">
+            <a:avLst/>
+          </a:prstGeom>
+          <a:ln>
+            <a:solidFill>
+              <a:srgbClr val="FFC000"/>
+            </a:solidFill>
+            <a:tailEnd type="triangle"/>
+          </a:ln>
+        </p:spPr>
+        <p:style>
+          <a:lnRef idx="1">
+            <a:schemeClr val="accent1"/>
+          </a:lnRef>
+          <a:fillRef idx="0">
+            <a:schemeClr val="accent1"/>
+          </a:fillRef>
+          <a:effectRef idx="0">
+            <a:schemeClr val="accent1"/>
+          </a:effectRef>
+          <a:fontRef idx="minor">
+            <a:schemeClr val="tx1"/>
+          </a:fontRef>
+        </p:style>
+      </p:cxnSp>
+      <p:sp>
+        <p:nvSpPr>
+          <p:cNvPr id="63" name="Círculo: vacío 62">
+            <a:extLst>
+              <a:ext uri="{FF2B5EF4-FFF2-40B4-BE49-F238E27FC236}">
+                <a16:creationId xmlns:a16="http://schemas.microsoft.com/office/drawing/2014/main" id="{F13C2028-468B-2917-4AB4-A020D61CBC48}"/>
+              </a:ext>
+            </a:extLst>
+          </p:cNvPr>
+          <p:cNvSpPr/>
+          <p:nvPr/>
+        </p:nvSpPr>
+        <p:spPr>
+          <a:xfrm>
+            <a:off x="6886240" y="5296431"/>
+            <a:ext cx="275208" cy="301841"/>
+          </a:xfrm>
+          <a:prstGeom prst="donut">
+            <a:avLst/>
+          </a:prstGeom>
+          <a:solidFill>
+            <a:srgbClr val="00B050"/>
+          </a:solidFill>
+        </p:spPr>
+        <p:style>
+          <a:lnRef idx="2">
+            <a:schemeClr val="accent1">
+              <a:shade val="50000"/>
+            </a:schemeClr>
+          </a:lnRef>
+          <a:fillRef idx="1">
+            <a:schemeClr val="accent1"/>
+          </a:fillRef>
+          <a:effectRef idx="0">
+            <a:schemeClr val="accent1"/>
+          </a:effectRef>
+          <a:fontRef idx="minor">
+            <a:schemeClr val="lt1"/>
+          </a:fontRef>
+        </p:style>
+        <p:txBody>
+          <a:bodyPr rtlCol="0" anchor="ctr"/>
+          <a:lstStyle/>
+          <a:p>
+            <a:pPr algn="ctr"/>
+            <a:endParaRPr lang="es-ES">
+              <a:solidFill>
+                <a:schemeClr val="tx1"/>
+              </a:solidFill>
+            </a:endParaRPr>
+          </a:p>
+        </p:txBody>
+      </p:sp>
+      <p:sp>
+        <p:nvSpPr>
+          <p:cNvPr id="66" name="Círculo: vacío 65">
+            <a:extLst>
+              <a:ext uri="{FF2B5EF4-FFF2-40B4-BE49-F238E27FC236}">
+                <a16:creationId xmlns:a16="http://schemas.microsoft.com/office/drawing/2014/main" id="{AF82E0FE-9073-0E3E-E43C-B16D8413E7BA}"/>
+              </a:ext>
+            </a:extLst>
+          </p:cNvPr>
+          <p:cNvSpPr/>
+          <p:nvPr/>
+        </p:nvSpPr>
+        <p:spPr>
+          <a:xfrm>
+            <a:off x="6683408" y="5645965"/>
+            <a:ext cx="275208" cy="301841"/>
+          </a:xfrm>
+          <a:prstGeom prst="donut">
+            <a:avLst/>
+          </a:prstGeom>
+          <a:solidFill>
+            <a:srgbClr val="00B050"/>
+          </a:solidFill>
+        </p:spPr>
+        <p:style>
+          <a:lnRef idx="2">
+            <a:schemeClr val="accent1">
+              <a:shade val="50000"/>
+            </a:schemeClr>
+          </a:lnRef>
+          <a:fillRef idx="1">
+            <a:schemeClr val="accent1"/>
+          </a:fillRef>
+          <a:effectRef idx="0">
+            <a:schemeClr val="accent1"/>
+          </a:effectRef>
+          <a:fontRef idx="minor">
+            <a:schemeClr val="lt1"/>
+          </a:fontRef>
+        </p:style>
+        <p:txBody>
+          <a:bodyPr rtlCol="0" anchor="ctr"/>
+          <a:lstStyle/>
+          <a:p>
+            <a:pPr algn="ctr"/>
+            <a:endParaRPr lang="es-ES">
+              <a:solidFill>
+                <a:schemeClr val="tx1"/>
+              </a:solidFill>
+            </a:endParaRPr>
+          </a:p>
+        </p:txBody>
+      </p:sp>
+      <p:sp>
+        <p:nvSpPr>
+          <p:cNvPr id="67" name="Círculo: vacío 66">
+            <a:extLst>
+              <a:ext uri="{FF2B5EF4-FFF2-40B4-BE49-F238E27FC236}">
+                <a16:creationId xmlns:a16="http://schemas.microsoft.com/office/drawing/2014/main" id="{5E8F0B74-22BE-29D9-8296-B0705EAA1D05}"/>
+              </a:ext>
+            </a:extLst>
+          </p:cNvPr>
+          <p:cNvSpPr/>
+          <p:nvPr/>
+        </p:nvSpPr>
+        <p:spPr>
+          <a:xfrm>
+            <a:off x="6151227" y="2851498"/>
+            <a:ext cx="275208" cy="301841"/>
+          </a:xfrm>
+          <a:prstGeom prst="donut">
+            <a:avLst/>
+          </a:prstGeom>
+          <a:solidFill>
+            <a:srgbClr val="FF0000"/>
+          </a:solidFill>
+        </p:spPr>
+        <p:style>
+          <a:lnRef idx="2">
+            <a:schemeClr val="accent1">
+              <a:shade val="50000"/>
+            </a:schemeClr>
+          </a:lnRef>
+          <a:fillRef idx="1">
+            <a:schemeClr val="accent1"/>
+          </a:fillRef>
+          <a:effectRef idx="0">
+            <a:schemeClr val="accent1"/>
+          </a:effectRef>
+          <a:fontRef idx="minor">
+            <a:schemeClr val="lt1"/>
+          </a:fontRef>
+        </p:style>
+        <p:txBody>
+          <a:bodyPr rtlCol="0" anchor="ctr"/>
+          <a:lstStyle/>
+          <a:p>
+            <a:pPr algn="ctr"/>
+            <a:endParaRPr lang="es-ES">
+              <a:solidFill>
+                <a:schemeClr val="tx1"/>
+              </a:solidFill>
+            </a:endParaRPr>
+          </a:p>
+        </p:txBody>
+      </p:sp>
+      <p:sp>
+        <p:nvSpPr>
+          <p:cNvPr id="68" name="Círculo: vacío 67">
+            <a:extLst>
+              <a:ext uri="{FF2B5EF4-FFF2-40B4-BE49-F238E27FC236}">
+                <a16:creationId xmlns:a16="http://schemas.microsoft.com/office/drawing/2014/main" id="{A982FD72-CAC2-402C-7B0D-1B232D3FCC80}"/>
+              </a:ext>
+            </a:extLst>
+          </p:cNvPr>
+          <p:cNvSpPr/>
+          <p:nvPr/>
+        </p:nvSpPr>
+        <p:spPr>
+          <a:xfrm>
+            <a:off x="6109405" y="2502309"/>
+            <a:ext cx="275208" cy="301841"/>
+          </a:xfrm>
+          <a:prstGeom prst="donut">
+            <a:avLst/>
+          </a:prstGeom>
+          <a:solidFill>
+            <a:srgbClr val="FF0000"/>
+          </a:solidFill>
+        </p:spPr>
+        <p:style>
+          <a:lnRef idx="2">
+            <a:schemeClr val="accent1">
+              <a:shade val="50000"/>
+            </a:schemeClr>
+          </a:lnRef>
+          <a:fillRef idx="1">
+            <a:schemeClr val="accent1"/>
+          </a:fillRef>
+          <a:effectRef idx="0">
+            <a:schemeClr val="accent1"/>
+          </a:effectRef>
+          <a:fontRef idx="minor">
+            <a:schemeClr val="lt1"/>
+          </a:fontRef>
+        </p:style>
+        <p:txBody>
+          <a:bodyPr rtlCol="0" anchor="ctr"/>
+          <a:lstStyle/>
+          <a:p>
+            <a:pPr algn="ctr"/>
+            <a:endParaRPr lang="es-ES">
+              <a:solidFill>
+                <a:schemeClr val="tx1"/>
+              </a:solidFill>
+            </a:endParaRPr>
+          </a:p>
+        </p:txBody>
+      </p:sp>
+      <p:cxnSp>
+        <p:nvCxnSpPr>
+          <p:cNvPr id="70" name="Conector recto de flecha 69">
+            <a:extLst>
+              <a:ext uri="{FF2B5EF4-FFF2-40B4-BE49-F238E27FC236}">
+                <a16:creationId xmlns:a16="http://schemas.microsoft.com/office/drawing/2014/main" id="{B7F5DA39-4CDF-6877-8B4A-BC059D245029}"/>
+              </a:ext>
+            </a:extLst>
+          </p:cNvPr>
+          <p:cNvCxnSpPr>
+            <a:cxnSpLocks/>
+            <a:stCxn id="67" idx="0"/>
+            <a:endCxn id="68" idx="4"/>
+          </p:cNvCxnSpPr>
+          <p:nvPr/>
+        </p:nvCxnSpPr>
+        <p:spPr>
+          <a:xfrm flipH="1" flipV="1">
+            <a:off x="6247009" y="2804150"/>
+            <a:ext cx="41822" cy="47348"/>
+          </a:xfrm>
+          <a:prstGeom prst="straightConnector1">
+            <a:avLst/>
+          </a:prstGeom>
+          <a:ln>
+            <a:tailEnd type="triangle"/>
+          </a:ln>
+        </p:spPr>
+        <p:style>
+          <a:lnRef idx="1">
+            <a:schemeClr val="accent1"/>
+          </a:lnRef>
+          <a:fillRef idx="0">
+            <a:schemeClr val="accent1"/>
+          </a:fillRef>
+          <a:effectRef idx="0">
+            <a:schemeClr val="accent1"/>
+          </a:effectRef>
+          <a:fontRef idx="minor">
+            <a:schemeClr val="tx1"/>
+          </a:fontRef>
+        </p:style>
+      </p:cxnSp>
+      <p:cxnSp>
+        <p:nvCxnSpPr>
+          <p:cNvPr id="73" name="Conector recto de flecha 72">
+            <a:extLst>
+              <a:ext uri="{FF2B5EF4-FFF2-40B4-BE49-F238E27FC236}">
+                <a16:creationId xmlns:a16="http://schemas.microsoft.com/office/drawing/2014/main" id="{555FA6C8-EC42-95AE-9D18-B34BFE4F6470}"/>
+              </a:ext>
+            </a:extLst>
+          </p:cNvPr>
+          <p:cNvCxnSpPr>
+            <a:cxnSpLocks/>
+            <a:stCxn id="68" idx="7"/>
+            <a:endCxn id="24" idx="3"/>
+          </p:cNvCxnSpPr>
+          <p:nvPr/>
+        </p:nvCxnSpPr>
+        <p:spPr>
+          <a:xfrm flipV="1">
+            <a:off x="6344310" y="2354408"/>
+            <a:ext cx="86506" cy="192105"/>
+          </a:xfrm>
+          <a:prstGeom prst="straightConnector1">
+            <a:avLst/>
+          </a:prstGeom>
+          <a:ln>
+            <a:tailEnd type="triangle"/>
+          </a:ln>
+        </p:spPr>
+        <p:style>
+          <a:lnRef idx="1">
+            <a:schemeClr val="accent1"/>
+          </a:lnRef>
+          <a:fillRef idx="0">
+            <a:schemeClr val="accent1"/>
+          </a:fillRef>
+          <a:effectRef idx="0">
+            <a:schemeClr val="accent1"/>
+          </a:effectRef>
+          <a:fontRef idx="minor">
+            <a:schemeClr val="tx1"/>
+          </a:fontRef>
+        </p:style>
+      </p:cxnSp>
+      <p:sp>
+        <p:nvSpPr>
+          <p:cNvPr id="77" name="Círculo: vacío 76">
+            <a:extLst>
+              <a:ext uri="{FF2B5EF4-FFF2-40B4-BE49-F238E27FC236}">
+                <a16:creationId xmlns:a16="http://schemas.microsoft.com/office/drawing/2014/main" id="{8E11C312-845E-F435-CBBD-94F7C87A4B56}"/>
+              </a:ext>
+            </a:extLst>
+          </p:cNvPr>
+          <p:cNvSpPr/>
+          <p:nvPr/>
+        </p:nvSpPr>
+        <p:spPr>
+          <a:xfrm>
+            <a:off x="6498478" y="4731897"/>
+            <a:ext cx="275208" cy="301841"/>
+          </a:xfrm>
+          <a:prstGeom prst="donut">
+            <a:avLst/>
+          </a:prstGeom>
+          <a:solidFill>
+            <a:srgbClr val="00B050"/>
+          </a:solidFill>
+        </p:spPr>
+        <p:style>
+          <a:lnRef idx="2">
+            <a:schemeClr val="accent1">
+              <a:shade val="50000"/>
+            </a:schemeClr>
+          </a:lnRef>
+          <a:fillRef idx="1">
+            <a:schemeClr val="accent1"/>
+          </a:fillRef>
+          <a:effectRef idx="0">
+            <a:schemeClr val="accent1"/>
+          </a:effectRef>
+          <a:fontRef idx="minor">
+            <a:schemeClr val="lt1"/>
+          </a:fontRef>
+        </p:style>
+        <p:txBody>
+          <a:bodyPr rtlCol="0" anchor="ctr"/>
+          <a:lstStyle/>
+          <a:p>
+            <a:pPr algn="ctr"/>
+            <a:endParaRPr lang="es-ES">
+              <a:solidFill>
+                <a:schemeClr val="tx1"/>
+              </a:solidFill>
+            </a:endParaRPr>
+          </a:p>
+        </p:txBody>
+      </p:sp>
+      <p:cxnSp>
+        <p:nvCxnSpPr>
+          <p:cNvPr id="78" name="Conector recto de flecha 77">
+            <a:extLst>
+              <a:ext uri="{FF2B5EF4-FFF2-40B4-BE49-F238E27FC236}">
+                <a16:creationId xmlns:a16="http://schemas.microsoft.com/office/drawing/2014/main" id="{DC4C559E-CA0D-D5DD-0A55-EFCE1D69E974}"/>
+              </a:ext>
+            </a:extLst>
+          </p:cNvPr>
+          <p:cNvCxnSpPr>
+            <a:cxnSpLocks/>
+            <a:stCxn id="59" idx="4"/>
+            <a:endCxn id="63" idx="0"/>
+          </p:cNvCxnSpPr>
+          <p:nvPr/>
+        </p:nvCxnSpPr>
+        <p:spPr>
+          <a:xfrm>
+            <a:off x="6948105" y="4699371"/>
+            <a:ext cx="75739" cy="597060"/>
+          </a:xfrm>
+          <a:prstGeom prst="straightConnector1">
+            <a:avLst/>
+          </a:prstGeom>
+          <a:ln>
+            <a:solidFill>
+              <a:srgbClr val="FFC000"/>
+            </a:solidFill>
+            <a:tailEnd type="triangle"/>
+          </a:ln>
+        </p:spPr>
+        <p:style>
+          <a:lnRef idx="1">
+            <a:schemeClr val="accent1"/>
+          </a:lnRef>
+          <a:fillRef idx="0">
+            <a:schemeClr val="accent1"/>
+          </a:fillRef>
+          <a:effectRef idx="0">
+            <a:schemeClr val="accent1"/>
+          </a:effectRef>
+          <a:fontRef idx="minor">
+            <a:schemeClr val="tx1"/>
+          </a:fontRef>
+        </p:style>
+      </p:cxnSp>
+      <p:cxnSp>
+        <p:nvCxnSpPr>
+          <p:cNvPr id="81" name="Conector recto de flecha 80">
+            <a:extLst>
+              <a:ext uri="{FF2B5EF4-FFF2-40B4-BE49-F238E27FC236}">
+                <a16:creationId xmlns:a16="http://schemas.microsoft.com/office/drawing/2014/main" id="{A2A9FD5E-FBBB-3C5F-CF6E-5CF736C90E5C}"/>
+              </a:ext>
+            </a:extLst>
+          </p:cNvPr>
+          <p:cNvCxnSpPr>
+            <a:cxnSpLocks/>
+            <a:stCxn id="63" idx="7"/>
+            <a:endCxn id="23" idx="5"/>
+          </p:cNvCxnSpPr>
+          <p:nvPr/>
+        </p:nvCxnSpPr>
+        <p:spPr>
+          <a:xfrm flipH="1" flipV="1">
+            <a:off x="6970167" y="2868529"/>
+            <a:ext cx="150978" cy="2472106"/>
+          </a:xfrm>
+          <a:prstGeom prst="straightConnector1">
+            <a:avLst/>
+          </a:prstGeom>
+          <a:ln>
+            <a:solidFill>
+              <a:srgbClr val="FFC000"/>
+            </a:solidFill>
+            <a:tailEnd type="triangle"/>
+          </a:ln>
+        </p:spPr>
+        <p:style>
+          <a:lnRef idx="1">
+            <a:schemeClr val="accent1"/>
+          </a:lnRef>
+          <a:fillRef idx="0">
+            <a:schemeClr val="accent1"/>
+          </a:fillRef>
+          <a:effectRef idx="0">
+            <a:schemeClr val="accent1"/>
+          </a:effectRef>
+          <a:fontRef idx="minor">
+            <a:schemeClr val="tx1"/>
+          </a:fontRef>
+        </p:style>
+      </p:cxnSp>
+      <p:sp>
+        <p:nvSpPr>
+          <p:cNvPr id="84" name="Círculo: vacío 83">
+            <a:extLst>
+              <a:ext uri="{FF2B5EF4-FFF2-40B4-BE49-F238E27FC236}">
+                <a16:creationId xmlns:a16="http://schemas.microsoft.com/office/drawing/2014/main" id="{A76855A7-6339-AF6F-6724-A5A3A920869C}"/>
+              </a:ext>
+            </a:extLst>
+          </p:cNvPr>
+          <p:cNvSpPr/>
+          <p:nvPr/>
+        </p:nvSpPr>
+        <p:spPr>
+          <a:xfrm>
+            <a:off x="6292520" y="4368696"/>
+            <a:ext cx="275208" cy="301841"/>
+          </a:xfrm>
+          <a:prstGeom prst="donut">
+            <a:avLst/>
+          </a:prstGeom>
+          <a:solidFill>
+            <a:srgbClr val="00B050"/>
+          </a:solidFill>
+        </p:spPr>
+        <p:style>
+          <a:lnRef idx="2">
+            <a:schemeClr val="accent1">
+              <a:shade val="50000"/>
+            </a:schemeClr>
+          </a:lnRef>
+          <a:fillRef idx="1">
+            <a:schemeClr val="accent1"/>
+          </a:fillRef>
+          <a:effectRef idx="0">
+            <a:schemeClr val="accent1"/>
+          </a:effectRef>
+          <a:fontRef idx="minor">
+            <a:schemeClr val="lt1"/>
+          </a:fontRef>
+        </p:style>
+        <p:txBody>
+          <a:bodyPr rtlCol="0" anchor="ctr"/>
+          <a:lstStyle/>
+          <a:p>
+            <a:pPr algn="ctr"/>
+            <a:endParaRPr lang="es-ES">
+              <a:solidFill>
+                <a:schemeClr val="tx1"/>
+              </a:solidFill>
+            </a:endParaRPr>
+          </a:p>
+        </p:txBody>
+      </p:sp>
+      <p:cxnSp>
+        <p:nvCxnSpPr>
+          <p:cNvPr id="85" name="Conector recto de flecha 84">
+            <a:extLst>
+              <a:ext uri="{FF2B5EF4-FFF2-40B4-BE49-F238E27FC236}">
+                <a16:creationId xmlns:a16="http://schemas.microsoft.com/office/drawing/2014/main" id="{B82881A9-37FF-BCDB-97B3-9F78BD541507}"/>
+              </a:ext>
+            </a:extLst>
+          </p:cNvPr>
+          <p:cNvCxnSpPr>
+            <a:cxnSpLocks/>
+            <a:stCxn id="23" idx="4"/>
+            <a:endCxn id="84" idx="0"/>
+          </p:cNvCxnSpPr>
+          <p:nvPr/>
+        </p:nvCxnSpPr>
+        <p:spPr>
+          <a:xfrm flipH="1">
+            <a:off x="6430124" y="2912733"/>
+            <a:ext cx="442742" cy="1455963"/>
+          </a:xfrm>
+          <a:prstGeom prst="straightConnector1">
+            <a:avLst/>
+          </a:prstGeom>
+          <a:ln>
+            <a:solidFill>
+              <a:srgbClr val="FFC000"/>
+            </a:solidFill>
+            <a:tailEnd type="triangle"/>
+          </a:ln>
+        </p:spPr>
+        <p:style>
+          <a:lnRef idx="1">
+            <a:schemeClr val="accent1"/>
+          </a:lnRef>
+          <a:fillRef idx="0">
+            <a:schemeClr val="accent1"/>
+          </a:fillRef>
+          <a:effectRef idx="0">
+            <a:schemeClr val="accent1"/>
+          </a:effectRef>
+          <a:fontRef idx="minor">
+            <a:schemeClr val="tx1"/>
+          </a:fontRef>
+        </p:style>
+      </p:cxnSp>
+      <p:cxnSp>
+        <p:nvCxnSpPr>
+          <p:cNvPr id="88" name="Conector recto de flecha 87">
+            <a:extLst>
+              <a:ext uri="{FF2B5EF4-FFF2-40B4-BE49-F238E27FC236}">
+                <a16:creationId xmlns:a16="http://schemas.microsoft.com/office/drawing/2014/main" id="{D4CE6C48-F476-8E30-4A30-707616A2E4DE}"/>
+              </a:ext>
+            </a:extLst>
+          </p:cNvPr>
+          <p:cNvCxnSpPr>
+            <a:cxnSpLocks/>
+            <a:stCxn id="84" idx="5"/>
+            <a:endCxn id="66" idx="2"/>
+          </p:cNvCxnSpPr>
+          <p:nvPr/>
+        </p:nvCxnSpPr>
+        <p:spPr>
+          <a:xfrm>
+            <a:off x="6527425" y="4626333"/>
+            <a:ext cx="155983" cy="1170553"/>
+          </a:xfrm>
+          <a:prstGeom prst="straightConnector1">
+            <a:avLst/>
+          </a:prstGeom>
+          <a:ln>
+            <a:solidFill>
+              <a:srgbClr val="FFC000"/>
+            </a:solidFill>
+            <a:tailEnd type="triangle"/>
+          </a:ln>
+        </p:spPr>
+        <p:style>
+          <a:lnRef idx="1">
+            <a:schemeClr val="accent1"/>
+          </a:lnRef>
+          <a:fillRef idx="0">
+            <a:schemeClr val="accent1"/>
+          </a:fillRef>
+          <a:effectRef idx="0">
+            <a:schemeClr val="accent1"/>
+          </a:effectRef>
+          <a:fontRef idx="minor">
+            <a:schemeClr val="tx1"/>
+          </a:fontRef>
+        </p:style>
+      </p:cxnSp>
+      <p:cxnSp>
+        <p:nvCxnSpPr>
+          <p:cNvPr id="91" name="Conector recto de flecha 90">
+            <a:extLst>
+              <a:ext uri="{FF2B5EF4-FFF2-40B4-BE49-F238E27FC236}">
+                <a16:creationId xmlns:a16="http://schemas.microsoft.com/office/drawing/2014/main" id="{DC35AF52-C589-D530-4F53-E09EF8B1DDB3}"/>
+              </a:ext>
+            </a:extLst>
+          </p:cNvPr>
+          <p:cNvCxnSpPr>
+            <a:cxnSpLocks/>
+            <a:stCxn id="66" idx="0"/>
+            <a:endCxn id="77" idx="5"/>
+          </p:cNvCxnSpPr>
+          <p:nvPr/>
+        </p:nvCxnSpPr>
+        <p:spPr>
+          <a:xfrm flipH="1" flipV="1">
+            <a:off x="6733383" y="4989534"/>
+            <a:ext cx="87629" cy="656431"/>
+          </a:xfrm>
+          <a:prstGeom prst="straightConnector1">
+            <a:avLst/>
+          </a:prstGeom>
+          <a:ln>
+            <a:solidFill>
+              <a:srgbClr val="FFC000"/>
+            </a:solidFill>
+            <a:tailEnd type="triangle"/>
+          </a:ln>
+        </p:spPr>
+        <p:style>
+          <a:lnRef idx="1">
+            <a:schemeClr val="accent1"/>
+          </a:lnRef>
+          <a:fillRef idx="0">
+            <a:schemeClr val="accent1"/>
+          </a:fillRef>
+          <a:effectRef idx="0">
+            <a:schemeClr val="accent1"/>
+          </a:effectRef>
+          <a:fontRef idx="minor">
+            <a:schemeClr val="tx1"/>
+          </a:fontRef>
+        </p:style>
+      </p:cxnSp>
+      <p:sp>
+        <p:nvSpPr>
+          <p:cNvPr id="61" name="Signo de multiplicación 60">
+            <a:extLst>
+              <a:ext uri="{FF2B5EF4-FFF2-40B4-BE49-F238E27FC236}">
+                <a16:creationId xmlns:a16="http://schemas.microsoft.com/office/drawing/2014/main" id="{6472FD59-AB39-9F8F-47D8-7B8DDF2B3A99}"/>
+              </a:ext>
+            </a:extLst>
+          </p:cNvPr>
+          <p:cNvSpPr/>
+          <p:nvPr/>
+        </p:nvSpPr>
+        <p:spPr>
+          <a:xfrm>
+            <a:off x="479875" y="1606801"/>
+            <a:ext cx="275208" cy="204187"/>
+          </a:xfrm>
+          <a:prstGeom prst="mathMultiply">
+            <a:avLst/>
+          </a:prstGeom>
+          <a:solidFill>
+            <a:srgbClr val="00B0F0"/>
+          </a:solidFill>
+        </p:spPr>
+        <p:style>
+          <a:lnRef idx="2">
+            <a:schemeClr val="accent1">
+              <a:shade val="50000"/>
+            </a:schemeClr>
+          </a:lnRef>
+          <a:fillRef idx="1">
+            <a:schemeClr val="accent1"/>
+          </a:fillRef>
+          <a:effectRef idx="0">
+            <a:schemeClr val="accent1"/>
+          </a:effectRef>
+          <a:fontRef idx="minor">
+            <a:schemeClr val="lt1"/>
+          </a:fontRef>
+        </p:style>
+        <p:txBody>
+          <a:bodyPr rtlCol="0" anchor="ctr"/>
+          <a:lstStyle/>
+          <a:p>
+            <a:pPr algn="ctr"/>
+            <a:endParaRPr lang="es-ES" dirty="0"/>
+          </a:p>
+        </p:txBody>
+      </p:sp>
+    </p:spTree>
+    <p:extLst>
+      <p:ext uri="{BB962C8B-B14F-4D97-AF65-F5344CB8AC3E}">
+        <p14:creationId xmlns:p14="http://schemas.microsoft.com/office/powerpoint/2010/main" val="1187465137"/>
+      </p:ext>
+    </p:extLst>
+  </p:cSld>
+  <p:clrMapOvr>
+    <a:masterClrMapping/>
+  </p:clrMapOvr>
+</p:sld>
+</file>
+
 <file path=ppt/theme/theme1.xml><?xml version="1.0" encoding="utf-8"?>
 <a:theme xmlns:a="http://schemas.openxmlformats.org/drawingml/2006/main" name="Tema de Office">
   <a:themeElements>

</xml_diff>

<commit_message>
Empezado el incremento de los ficheros, permite añadir y actualizar la foto de perfil, colgar y eliminar ficheros en el perfil del usuario, En las mentorizaciones se pueden descargar los ficheros de los otros usuarios.
</commit_message>
<xml_diff>
--- a/Diseños/aquitectura.pptx
+++ b/Diseños/aquitectura.pptx
@@ -265,7 +265,7 @@
           <a:p>
             <a:fld id="{3E1544B7-206C-4EA6-AC0C-B0859B395411}" type="datetimeFigureOut">
               <a:rPr lang="es-ES" smtClean="0"/>
-              <a:t>17/05/2022</a:t>
+              <a:t>25/05/2022</a:t>
             </a:fld>
             <a:endParaRPr lang="es-ES"/>
           </a:p>
@@ -463,7 +463,7 @@
           <a:p>
             <a:fld id="{3E1544B7-206C-4EA6-AC0C-B0859B395411}" type="datetimeFigureOut">
               <a:rPr lang="es-ES" smtClean="0"/>
-              <a:t>17/05/2022</a:t>
+              <a:t>25/05/2022</a:t>
             </a:fld>
             <a:endParaRPr lang="es-ES"/>
           </a:p>
@@ -671,7 +671,7 @@
           <a:p>
             <a:fld id="{3E1544B7-206C-4EA6-AC0C-B0859B395411}" type="datetimeFigureOut">
               <a:rPr lang="es-ES" smtClean="0"/>
-              <a:t>17/05/2022</a:t>
+              <a:t>25/05/2022</a:t>
             </a:fld>
             <a:endParaRPr lang="es-ES"/>
           </a:p>
@@ -869,7 +869,7 @@
           <a:p>
             <a:fld id="{3E1544B7-206C-4EA6-AC0C-B0859B395411}" type="datetimeFigureOut">
               <a:rPr lang="es-ES" smtClean="0"/>
-              <a:t>17/05/2022</a:t>
+              <a:t>25/05/2022</a:t>
             </a:fld>
             <a:endParaRPr lang="es-ES"/>
           </a:p>
@@ -1144,7 +1144,7 @@
           <a:p>
             <a:fld id="{3E1544B7-206C-4EA6-AC0C-B0859B395411}" type="datetimeFigureOut">
               <a:rPr lang="es-ES" smtClean="0"/>
-              <a:t>17/05/2022</a:t>
+              <a:t>25/05/2022</a:t>
             </a:fld>
             <a:endParaRPr lang="es-ES"/>
           </a:p>
@@ -1409,7 +1409,7 @@
           <a:p>
             <a:fld id="{3E1544B7-206C-4EA6-AC0C-B0859B395411}" type="datetimeFigureOut">
               <a:rPr lang="es-ES" smtClean="0"/>
-              <a:t>17/05/2022</a:t>
+              <a:t>25/05/2022</a:t>
             </a:fld>
             <a:endParaRPr lang="es-ES"/>
           </a:p>
@@ -1821,7 +1821,7 @@
           <a:p>
             <a:fld id="{3E1544B7-206C-4EA6-AC0C-B0859B395411}" type="datetimeFigureOut">
               <a:rPr lang="es-ES" smtClean="0"/>
-              <a:t>17/05/2022</a:t>
+              <a:t>25/05/2022</a:t>
             </a:fld>
             <a:endParaRPr lang="es-ES"/>
           </a:p>
@@ -1962,7 +1962,7 @@
           <a:p>
             <a:fld id="{3E1544B7-206C-4EA6-AC0C-B0859B395411}" type="datetimeFigureOut">
               <a:rPr lang="es-ES" smtClean="0"/>
-              <a:t>17/05/2022</a:t>
+              <a:t>25/05/2022</a:t>
             </a:fld>
             <a:endParaRPr lang="es-ES"/>
           </a:p>
@@ -2075,7 +2075,7 @@
           <a:p>
             <a:fld id="{3E1544B7-206C-4EA6-AC0C-B0859B395411}" type="datetimeFigureOut">
               <a:rPr lang="es-ES" smtClean="0"/>
-              <a:t>17/05/2022</a:t>
+              <a:t>25/05/2022</a:t>
             </a:fld>
             <a:endParaRPr lang="es-ES"/>
           </a:p>
@@ -2386,7 +2386,7 @@
           <a:p>
             <a:fld id="{3E1544B7-206C-4EA6-AC0C-B0859B395411}" type="datetimeFigureOut">
               <a:rPr lang="es-ES" smtClean="0"/>
-              <a:t>17/05/2022</a:t>
+              <a:t>25/05/2022</a:t>
             </a:fld>
             <a:endParaRPr lang="es-ES"/>
           </a:p>
@@ -2674,7 +2674,7 @@
           <a:p>
             <a:fld id="{3E1544B7-206C-4EA6-AC0C-B0859B395411}" type="datetimeFigureOut">
               <a:rPr lang="es-ES" smtClean="0"/>
-              <a:t>17/05/2022</a:t>
+              <a:t>25/05/2022</a:t>
             </a:fld>
             <a:endParaRPr lang="es-ES"/>
           </a:p>
@@ -2915,7 +2915,7 @@
           <a:p>
             <a:fld id="{3E1544B7-206C-4EA6-AC0C-B0859B395411}" type="datetimeFigureOut">
               <a:rPr lang="es-ES" smtClean="0"/>
-              <a:t>17/05/2022</a:t>
+              <a:t>25/05/2022</a:t>
             </a:fld>
             <a:endParaRPr lang="es-ES"/>
           </a:p>
@@ -3438,7 +3438,7 @@
         </p:nvSpPr>
         <p:spPr>
           <a:xfrm>
-            <a:off x="1722545" y="1790674"/>
+            <a:off x="1731653" y="1790674"/>
             <a:ext cx="1740023" cy="1051102"/>
           </a:xfrm>
           <a:prstGeom prst="rect">
@@ -3491,7 +3491,7 @@
         <p:spPr>
           <a:xfrm>
             <a:off x="1715188" y="1791854"/>
-            <a:ext cx="696345" cy="314514"/>
+            <a:ext cx="1658652" cy="307777"/>
           </a:xfrm>
           <a:prstGeom prst="rect">
             <a:avLst/>
@@ -3506,7 +3506,7 @@
           <a:p>
             <a:r>
               <a:rPr lang="es-ES" sz="1400" dirty="0"/>
-              <a:t>Chat</a:t>
+              <a:t>Chat/Notificaciones</a:t>
             </a:r>
           </a:p>
         </p:txBody>
@@ -3525,8 +3525,8 @@
         </p:nvSpPr>
         <p:spPr>
           <a:xfrm>
-            <a:off x="4865746" y="895772"/>
-            <a:ext cx="4180600" cy="3454286"/>
+            <a:off x="4865746" y="895771"/>
+            <a:ext cx="4180600" cy="5548617"/>
           </a:xfrm>
           <a:prstGeom prst="rect">
             <a:avLst/>
@@ -3577,7 +3577,7 @@
         </p:nvSpPr>
         <p:spPr>
           <a:xfrm>
-            <a:off x="4935039" y="5116868"/>
+            <a:off x="6607439" y="4175197"/>
             <a:ext cx="1770537" cy="1337247"/>
           </a:xfrm>
           <a:prstGeom prst="rect">
@@ -3707,50 +3707,6 @@
           </a:p>
         </p:txBody>
       </p:sp>
-      <p:cxnSp>
-        <p:nvCxnSpPr>
-          <p:cNvPr id="13" name="Conector recto de flecha 12">
-            <a:extLst>
-              <a:ext uri="{FF2B5EF4-FFF2-40B4-BE49-F238E27FC236}">
-                <a16:creationId xmlns:a16="http://schemas.microsoft.com/office/drawing/2014/main" id="{0246293D-2E04-49E2-ACB1-C4813EF571BA}"/>
-              </a:ext>
-            </a:extLst>
-          </p:cNvPr>
-          <p:cNvCxnSpPr>
-            <a:cxnSpLocks/>
-            <a:stCxn id="9" idx="0"/>
-            <a:endCxn id="25" idx="2"/>
-          </p:cNvCxnSpPr>
-          <p:nvPr/>
-        </p:nvCxnSpPr>
-        <p:spPr>
-          <a:xfrm flipV="1">
-            <a:off x="5820308" y="4101482"/>
-            <a:ext cx="0" cy="1015386"/>
-          </a:xfrm>
-          <a:prstGeom prst="straightConnector1">
-            <a:avLst/>
-          </a:prstGeom>
-          <a:ln>
-            <a:headEnd type="triangle"/>
-            <a:tailEnd type="triangle"/>
-          </a:ln>
-        </p:spPr>
-        <p:style>
-          <a:lnRef idx="1">
-            <a:schemeClr val="dk1"/>
-          </a:lnRef>
-          <a:fillRef idx="0">
-            <a:schemeClr val="dk1"/>
-          </a:fillRef>
-          <a:effectRef idx="0">
-            <a:schemeClr val="dk1"/>
-          </a:effectRef>
-          <a:fontRef idx="minor">
-            <a:schemeClr val="tx1"/>
-          </a:fontRef>
-        </p:style>
-      </p:cxnSp>
       <p:cxnSp>
         <p:nvCxnSpPr>
           <p:cNvPr id="15" name="Conector recto de flecha 14">
@@ -3811,8 +3767,8 @@
         </p:nvCxnSpPr>
         <p:spPr>
           <a:xfrm rot="16200000" flipH="1">
-            <a:off x="2291940" y="3142393"/>
-            <a:ext cx="2943716" cy="2342482"/>
+            <a:off x="3603530" y="1839911"/>
+            <a:ext cx="2002045" cy="4005774"/>
           </a:xfrm>
           <a:prstGeom prst="bentConnector2">
             <a:avLst/>
@@ -3853,55 +3809,6 @@
           <a:xfrm>
             <a:off x="10759736" y="895772"/>
             <a:ext cx="751542" cy="1109709"/>
-          </a:xfrm>
-          <a:prstGeom prst="can">
-            <a:avLst/>
-          </a:prstGeom>
-          <a:ln w="28575">
-            <a:solidFill>
-              <a:schemeClr val="tx1"/>
-            </a:solidFill>
-          </a:ln>
-        </p:spPr>
-        <p:style>
-          <a:lnRef idx="2">
-            <a:schemeClr val="accent6"/>
-          </a:lnRef>
-          <a:fillRef idx="1">
-            <a:schemeClr val="lt1"/>
-          </a:fillRef>
-          <a:effectRef idx="0">
-            <a:schemeClr val="accent6"/>
-          </a:effectRef>
-          <a:fontRef idx="minor">
-            <a:schemeClr val="dk1"/>
-          </a:fontRef>
-        </p:style>
-        <p:txBody>
-          <a:bodyPr rtlCol="0" anchor="ctr"/>
-          <a:lstStyle/>
-          <a:p>
-            <a:pPr algn="ctr"/>
-            <a:endParaRPr lang="es-ES"/>
-          </a:p>
-        </p:txBody>
-      </p:sp>
-      <p:sp>
-        <p:nvSpPr>
-          <p:cNvPr id="23" name="Cilindro 22">
-            <a:extLst>
-              <a:ext uri="{FF2B5EF4-FFF2-40B4-BE49-F238E27FC236}">
-                <a16:creationId xmlns:a16="http://schemas.microsoft.com/office/drawing/2014/main" id="{F79AFA72-A497-4842-A2B9-C96FA003DE9B}"/>
-              </a:ext>
-            </a:extLst>
-          </p:cNvPr>
-          <p:cNvSpPr/>
-          <p:nvPr/>
-        </p:nvSpPr>
-        <p:spPr>
-          <a:xfrm>
-            <a:off x="9650027" y="5220913"/>
-            <a:ext cx="665825" cy="1109709"/>
           </a:xfrm>
           <a:prstGeom prst="can">
             <a:avLst/>
@@ -4310,50 +4217,6 @@
           </a:fontRef>
         </p:style>
       </p:cxnSp>
-      <p:cxnSp>
-        <p:nvCxnSpPr>
-          <p:cNvPr id="43" name="Conector recto de flecha 42">
-            <a:extLst>
-              <a:ext uri="{FF2B5EF4-FFF2-40B4-BE49-F238E27FC236}">
-                <a16:creationId xmlns:a16="http://schemas.microsoft.com/office/drawing/2014/main" id="{96F1E1EA-E4EE-4B40-B3A0-8FAA21C6D8DF}"/>
-              </a:ext>
-            </a:extLst>
-          </p:cNvPr>
-          <p:cNvCxnSpPr>
-            <a:cxnSpLocks/>
-            <a:stCxn id="9" idx="3"/>
-            <a:endCxn id="23" idx="2"/>
-          </p:cNvCxnSpPr>
-          <p:nvPr/>
-        </p:nvCxnSpPr>
-        <p:spPr>
-          <a:xfrm flipV="1">
-            <a:off x="6705576" y="5775768"/>
-            <a:ext cx="2944451" cy="9724"/>
-          </a:xfrm>
-          <a:prstGeom prst="straightConnector1">
-            <a:avLst/>
-          </a:prstGeom>
-          <a:ln>
-            <a:headEnd type="triangle"/>
-            <a:tailEnd type="triangle"/>
-          </a:ln>
-        </p:spPr>
-        <p:style>
-          <a:lnRef idx="1">
-            <a:schemeClr val="dk1"/>
-          </a:lnRef>
-          <a:fillRef idx="0">
-            <a:schemeClr val="dk1"/>
-          </a:fillRef>
-          <a:effectRef idx="0">
-            <a:schemeClr val="dk1"/>
-          </a:effectRef>
-          <a:fontRef idx="minor">
-            <a:schemeClr val="tx1"/>
-          </a:fontRef>
-        </p:style>
-      </p:cxnSp>
       <p:sp>
         <p:nvSpPr>
           <p:cNvPr id="53" name="CuadroTexto 52">
@@ -4473,7 +4336,7 @@
         </p:nvSpPr>
         <p:spPr>
           <a:xfrm>
-            <a:off x="2626725" y="5458679"/>
+            <a:off x="3197553" y="4809902"/>
             <a:ext cx="1125706" cy="261610"/>
           </a:xfrm>
           <a:prstGeom prst="rect">
@@ -4496,10 +4359,10 @@
       </p:sp>
       <p:sp>
         <p:nvSpPr>
-          <p:cNvPr id="58" name="CuadroTexto 57">
-            <a:extLst>
-              <a:ext uri="{FF2B5EF4-FFF2-40B4-BE49-F238E27FC236}">
-                <a16:creationId xmlns:a16="http://schemas.microsoft.com/office/drawing/2014/main" id="{36BDC38F-4C22-42D6-BCFD-1BB5D9FED827}"/>
+          <p:cNvPr id="62" name="CuadroTexto 61">
+            <a:extLst>
+              <a:ext uri="{FF2B5EF4-FFF2-40B4-BE49-F238E27FC236}">
+                <a16:creationId xmlns:a16="http://schemas.microsoft.com/office/drawing/2014/main" id="{86EB4137-2489-43E0-97ED-923D3D06F60F}"/>
               </a:ext>
             </a:extLst>
           </p:cNvPr>
@@ -4508,8 +4371,8 @@
         </p:nvSpPr>
         <p:spPr>
           <a:xfrm>
-            <a:off x="5609623" y="4537039"/>
-            <a:ext cx="1125706" cy="261610"/>
+            <a:off x="6933921" y="2045934"/>
+            <a:ext cx="1125706" cy="430887"/>
           </a:xfrm>
           <a:prstGeom prst="rect">
             <a:avLst/>
@@ -4524,17 +4387,17 @@
           <a:p>
             <a:r>
               <a:rPr lang="es-ES" sz="1100" dirty="0"/>
-              <a:t>Autentificación</a:t>
-            </a:r>
-          </a:p>
-        </p:txBody>
-      </p:sp>
-      <p:sp>
-        <p:nvSpPr>
-          <p:cNvPr id="62" name="CuadroTexto 61">
-            <a:extLst>
-              <a:ext uri="{FF2B5EF4-FFF2-40B4-BE49-F238E27FC236}">
-                <a16:creationId xmlns:a16="http://schemas.microsoft.com/office/drawing/2014/main" id="{86EB4137-2489-43E0-97ED-923D3D06F60F}"/>
+              <a:t>Datos de usuarios</a:t>
+            </a:r>
+          </a:p>
+        </p:txBody>
+      </p:sp>
+      <p:sp>
+        <p:nvSpPr>
+          <p:cNvPr id="63" name="CuadroTexto 62">
+            <a:extLst>
+              <a:ext uri="{FF2B5EF4-FFF2-40B4-BE49-F238E27FC236}">
+                <a16:creationId xmlns:a16="http://schemas.microsoft.com/office/drawing/2014/main" id="{C1DBC361-A0C9-4AAC-AFC9-B911712E799E}"/>
               </a:ext>
             </a:extLst>
           </p:cNvPr>
@@ -4543,7 +4406,7 @@
         </p:nvSpPr>
         <p:spPr>
           <a:xfrm>
-            <a:off x="6933921" y="2045934"/>
+            <a:off x="6607439" y="3246619"/>
             <a:ext cx="1125706" cy="430887"/>
           </a:xfrm>
           <a:prstGeom prst="rect">
@@ -4559,17 +4422,17 @@
           <a:p>
             <a:r>
               <a:rPr lang="es-ES" sz="1100" dirty="0"/>
-              <a:t>Datos de usuarios</a:t>
-            </a:r>
-          </a:p>
-        </p:txBody>
-      </p:sp>
-      <p:sp>
-        <p:nvSpPr>
-          <p:cNvPr id="63" name="CuadroTexto 62">
-            <a:extLst>
-              <a:ext uri="{FF2B5EF4-FFF2-40B4-BE49-F238E27FC236}">
-                <a16:creationId xmlns:a16="http://schemas.microsoft.com/office/drawing/2014/main" id="{C1DBC361-A0C9-4AAC-AFC9-B911712E799E}"/>
+              <a:t>Datos de autentificación</a:t>
+            </a:r>
+          </a:p>
+        </p:txBody>
+      </p:sp>
+      <p:sp>
+        <p:nvSpPr>
+          <p:cNvPr id="64" name="CuadroTexto 63">
+            <a:extLst>
+              <a:ext uri="{FF2B5EF4-FFF2-40B4-BE49-F238E27FC236}">
+                <a16:creationId xmlns:a16="http://schemas.microsoft.com/office/drawing/2014/main" id="{F5CAD642-62CB-4CFA-A441-0FC4578E067F}"/>
               </a:ext>
             </a:extLst>
           </p:cNvPr>
@@ -4578,7 +4441,7 @@
         </p:nvSpPr>
         <p:spPr>
           <a:xfrm>
-            <a:off x="6607439" y="3246619"/>
+            <a:off x="9602009" y="2162672"/>
             <a:ext cx="1125706" cy="430887"/>
           </a:xfrm>
           <a:prstGeom prst="rect">
@@ -4594,117 +4457,7 @@
           <a:p>
             <a:r>
               <a:rPr lang="es-ES" sz="1100" dirty="0"/>
-              <a:t>Datos de autentificación</a:t>
-            </a:r>
-          </a:p>
-        </p:txBody>
-      </p:sp>
-      <p:sp>
-        <p:nvSpPr>
-          <p:cNvPr id="64" name="CuadroTexto 63">
-            <a:extLst>
-              <a:ext uri="{FF2B5EF4-FFF2-40B4-BE49-F238E27FC236}">
-                <a16:creationId xmlns:a16="http://schemas.microsoft.com/office/drawing/2014/main" id="{F5CAD642-62CB-4CFA-A441-0FC4578E067F}"/>
-              </a:ext>
-            </a:extLst>
-          </p:cNvPr>
-          <p:cNvSpPr txBox="1"/>
-          <p:nvPr/>
-        </p:nvSpPr>
-        <p:spPr>
-          <a:xfrm>
-            <a:off x="9602009" y="2162672"/>
-            <a:ext cx="1125706" cy="430887"/>
-          </a:xfrm>
-          <a:prstGeom prst="rect">
-            <a:avLst/>
-          </a:prstGeom>
-          <a:noFill/>
-        </p:spPr>
-        <p:txBody>
-          <a:bodyPr wrap="square" rtlCol="0">
-            <a:spAutoFit/>
-          </a:bodyPr>
-          <a:lstStyle/>
-          <a:p>
-            <a:r>
-              <a:rPr lang="es-ES" sz="1100" dirty="0"/>
               <a:t>Datos de la aplicación</a:t>
-            </a:r>
-          </a:p>
-        </p:txBody>
-      </p:sp>
-      <p:sp>
-        <p:nvSpPr>
-          <p:cNvPr id="66" name="CuadroTexto 65">
-            <a:extLst>
-              <a:ext uri="{FF2B5EF4-FFF2-40B4-BE49-F238E27FC236}">
-                <a16:creationId xmlns:a16="http://schemas.microsoft.com/office/drawing/2014/main" id="{BF370D17-BB72-4857-B932-30E044B1452C}"/>
-              </a:ext>
-            </a:extLst>
-          </p:cNvPr>
-          <p:cNvSpPr txBox="1"/>
-          <p:nvPr/>
-        </p:nvSpPr>
-        <p:spPr>
-          <a:xfrm>
-            <a:off x="9364601" y="6333145"/>
-            <a:ext cx="1395135" cy="430887"/>
-          </a:xfrm>
-          <a:prstGeom prst="rect">
-            <a:avLst/>
-          </a:prstGeom>
-          <a:noFill/>
-        </p:spPr>
-        <p:txBody>
-          <a:bodyPr wrap="square" rtlCol="0">
-            <a:spAutoFit/>
-          </a:bodyPr>
-          <a:lstStyle/>
-          <a:p>
-            <a:r>
-              <a:rPr lang="es-ES" sz="1100" dirty="0"/>
-              <a:t>Almacenamiento propio de </a:t>
-            </a:r>
-            <a:r>
-              <a:rPr lang="es-ES" sz="1100" dirty="0" err="1"/>
-              <a:t>Ejabberd</a:t>
-            </a:r>
-            <a:endParaRPr lang="es-ES" sz="1100" dirty="0"/>
-          </a:p>
-        </p:txBody>
-      </p:sp>
-      <p:sp>
-        <p:nvSpPr>
-          <p:cNvPr id="67" name="CuadroTexto 66">
-            <a:extLst>
-              <a:ext uri="{FF2B5EF4-FFF2-40B4-BE49-F238E27FC236}">
-                <a16:creationId xmlns:a16="http://schemas.microsoft.com/office/drawing/2014/main" id="{D9D93071-E78E-4CC1-9B2D-DC6172A1DBF1}"/>
-              </a:ext>
-            </a:extLst>
-          </p:cNvPr>
-          <p:cNvSpPr txBox="1"/>
-          <p:nvPr/>
-        </p:nvSpPr>
-        <p:spPr>
-          <a:xfrm>
-            <a:off x="7654768" y="5430781"/>
-            <a:ext cx="1125706" cy="261610"/>
-          </a:xfrm>
-          <a:prstGeom prst="rect">
-            <a:avLst/>
-          </a:prstGeom>
-          <a:noFill/>
-        </p:spPr>
-        <p:txBody>
-          <a:bodyPr wrap="square" rtlCol="0">
-            <a:spAutoFit/>
-          </a:bodyPr>
-          <a:lstStyle/>
-          <a:p>
-            <a:r>
-              <a:rPr lang="es-ES" sz="1100" dirty="0"/>
-              <a:t>Mensajes</a:t>
             </a:r>
           </a:p>
         </p:txBody>
@@ -4890,10 +4643,10 @@
       </p:pic>
       <p:pic>
         <p:nvPicPr>
-          <p:cNvPr id="29" name="Imagen 28" descr="Icono&#10;&#10;Descripción generada automáticamente">
-            <a:extLst>
-              <a:ext uri="{FF2B5EF4-FFF2-40B4-BE49-F238E27FC236}">
-                <a16:creationId xmlns:a16="http://schemas.microsoft.com/office/drawing/2014/main" id="{BEB5B2D7-2900-4DB1-B0C6-415C5D0AAA8E}"/>
+          <p:cNvPr id="36" name="Imagen 35" descr="Logotipo, nombre de la empresa&#10;&#10;Descripción generada automáticamente">
+            <a:extLst>
+              <a:ext uri="{FF2B5EF4-FFF2-40B4-BE49-F238E27FC236}">
+                <a16:creationId xmlns:a16="http://schemas.microsoft.com/office/drawing/2014/main" id="{28F771DF-F2EF-41ED-A139-AD8325DC4646}"/>
               </a:ext>
             </a:extLst>
           </p:cNvPr>
@@ -4916,8 +4669,8 @@
         </p:blipFill>
         <p:spPr>
           <a:xfrm>
-            <a:off x="2244336" y="1837233"/>
-            <a:ext cx="764777" cy="764777"/>
+            <a:off x="5104965" y="3376923"/>
+            <a:ext cx="1419940" cy="596375"/>
           </a:xfrm>
           <a:prstGeom prst="rect">
             <a:avLst/>
@@ -4926,10 +4679,10 @@
       </p:pic>
       <p:pic>
         <p:nvPicPr>
-          <p:cNvPr id="32" name="Imagen 31" descr="Icono&#10;&#10;Descripción generada automáticamente">
-            <a:extLst>
-              <a:ext uri="{FF2B5EF4-FFF2-40B4-BE49-F238E27FC236}">
-                <a16:creationId xmlns:a16="http://schemas.microsoft.com/office/drawing/2014/main" id="{553B6474-7AA3-4533-84AA-E745ECADDBF2}"/>
+          <p:cNvPr id="40" name="Imagen 39" descr="Imagen que contiene Icono&#10;&#10;Descripción generada automáticamente">
+            <a:extLst>
+              <a:ext uri="{FF2B5EF4-FFF2-40B4-BE49-F238E27FC236}">
+                <a16:creationId xmlns:a16="http://schemas.microsoft.com/office/drawing/2014/main" id="{11DE6E8F-B885-47FE-9483-31D703813075}"/>
               </a:ext>
             </a:extLst>
           </p:cNvPr>
@@ -4952,8 +4705,8 @@
         </p:blipFill>
         <p:spPr>
           <a:xfrm>
-            <a:off x="5362247" y="5185353"/>
-            <a:ext cx="938764" cy="938764"/>
+            <a:off x="7439335" y="905736"/>
+            <a:ext cx="1556572" cy="778286"/>
           </a:xfrm>
           <a:prstGeom prst="rect">
             <a:avLst/>
@@ -4962,10 +4715,10 @@
       </p:pic>
       <p:pic>
         <p:nvPicPr>
-          <p:cNvPr id="36" name="Imagen 35" descr="Logotipo, nombre de la empresa&#10;&#10;Descripción generada automáticamente">
-            <a:extLst>
-              <a:ext uri="{FF2B5EF4-FFF2-40B4-BE49-F238E27FC236}">
-                <a16:creationId xmlns:a16="http://schemas.microsoft.com/office/drawing/2014/main" id="{28F771DF-F2EF-41ED-A139-AD8325DC4646}"/>
+          <p:cNvPr id="75" name="Imagen 74" descr="Logotipo&#10;&#10;Descripción generada automáticamente">
+            <a:extLst>
+              <a:ext uri="{FF2B5EF4-FFF2-40B4-BE49-F238E27FC236}">
+                <a16:creationId xmlns:a16="http://schemas.microsoft.com/office/drawing/2014/main" id="{068750B0-4428-41FD-B61B-B35554022605}"/>
               </a:ext>
             </a:extLst>
           </p:cNvPr>
@@ -4988,8 +4741,8 @@
         </p:blipFill>
         <p:spPr>
           <a:xfrm>
-            <a:off x="5104965" y="3376923"/>
-            <a:ext cx="1419940" cy="596375"/>
+            <a:off x="7624635" y="2256113"/>
+            <a:ext cx="1234919" cy="617460"/>
           </a:xfrm>
           <a:prstGeom prst="rect">
             <a:avLst/>
@@ -4998,10 +4751,10 @@
       </p:pic>
       <p:pic>
         <p:nvPicPr>
-          <p:cNvPr id="40" name="Imagen 39" descr="Imagen que contiene Icono&#10;&#10;Descripción generada automáticamente">
-            <a:extLst>
-              <a:ext uri="{FF2B5EF4-FFF2-40B4-BE49-F238E27FC236}">
-                <a16:creationId xmlns:a16="http://schemas.microsoft.com/office/drawing/2014/main" id="{11DE6E8F-B885-47FE-9483-31D703813075}"/>
+          <p:cNvPr id="77" name="Imagen 76" descr="Logotipo&#10;&#10;Descripción generada automáticamente">
+            <a:extLst>
+              <a:ext uri="{FF2B5EF4-FFF2-40B4-BE49-F238E27FC236}">
+                <a16:creationId xmlns:a16="http://schemas.microsoft.com/office/drawing/2014/main" id="{25971166-BF82-4C76-9B49-ABE5A10E5AEF}"/>
               </a:ext>
             </a:extLst>
           </p:cNvPr>
@@ -5024,8 +4777,8 @@
         </p:blipFill>
         <p:spPr>
           <a:xfrm>
-            <a:off x="7439335" y="905736"/>
-            <a:ext cx="1556572" cy="778286"/>
+            <a:off x="5119881" y="1203265"/>
+            <a:ext cx="1707096" cy="785264"/>
           </a:xfrm>
           <a:prstGeom prst="rect">
             <a:avLst/>
@@ -5034,10 +4787,10 @@
       </p:pic>
       <p:pic>
         <p:nvPicPr>
-          <p:cNvPr id="75" name="Imagen 74" descr="Logotipo&#10;&#10;Descripción generada automáticamente">
-            <a:extLst>
-              <a:ext uri="{FF2B5EF4-FFF2-40B4-BE49-F238E27FC236}">
-                <a16:creationId xmlns:a16="http://schemas.microsoft.com/office/drawing/2014/main" id="{068750B0-4428-41FD-B61B-B35554022605}"/>
+          <p:cNvPr id="79" name="Imagen 78" descr="Logotipo, nombre de la empresa&#10;&#10;Descripción generada automáticamente">
+            <a:extLst>
+              <a:ext uri="{FF2B5EF4-FFF2-40B4-BE49-F238E27FC236}">
+                <a16:creationId xmlns:a16="http://schemas.microsoft.com/office/drawing/2014/main" id="{BE6ED93B-2244-4800-9EF1-0FC292D38929}"/>
               </a:ext>
             </a:extLst>
           </p:cNvPr>
@@ -5060,8 +4813,8 @@
         </p:blipFill>
         <p:spPr>
           <a:xfrm>
-            <a:off x="7624635" y="2256113"/>
-            <a:ext cx="1234919" cy="617460"/>
+            <a:off x="5629215" y="1962588"/>
+            <a:ext cx="539558" cy="540637"/>
           </a:xfrm>
           <a:prstGeom prst="rect">
             <a:avLst/>
@@ -5070,10 +4823,10 @@
       </p:pic>
       <p:pic>
         <p:nvPicPr>
-          <p:cNvPr id="77" name="Imagen 76" descr="Logotipo&#10;&#10;Descripción generada automáticamente">
-            <a:extLst>
-              <a:ext uri="{FF2B5EF4-FFF2-40B4-BE49-F238E27FC236}">
-                <a16:creationId xmlns:a16="http://schemas.microsoft.com/office/drawing/2014/main" id="{25971166-BF82-4C76-9B49-ABE5A10E5AEF}"/>
+          <p:cNvPr id="81" name="Imagen 80" descr="Imagen que contiene luz&#10;&#10;Descripción generada automáticamente">
+            <a:extLst>
+              <a:ext uri="{FF2B5EF4-FFF2-40B4-BE49-F238E27FC236}">
+                <a16:creationId xmlns:a16="http://schemas.microsoft.com/office/drawing/2014/main" id="{692D2194-9763-473A-93DD-A41910C10916}"/>
               </a:ext>
             </a:extLst>
           </p:cNvPr>
@@ -5096,8 +4849,8 @@
         </p:blipFill>
         <p:spPr>
           <a:xfrm>
-            <a:off x="5119881" y="1203265"/>
-            <a:ext cx="1707096" cy="785264"/>
+            <a:off x="10802594" y="1194944"/>
+            <a:ext cx="665825" cy="665825"/>
           </a:xfrm>
           <a:prstGeom prst="rect">
             <a:avLst/>
@@ -5106,10 +4859,10 @@
       </p:pic>
       <p:pic>
         <p:nvPicPr>
-          <p:cNvPr id="79" name="Imagen 78" descr="Logotipo, nombre de la empresa&#10;&#10;Descripción generada automáticamente">
-            <a:extLst>
-              <a:ext uri="{FF2B5EF4-FFF2-40B4-BE49-F238E27FC236}">
-                <a16:creationId xmlns:a16="http://schemas.microsoft.com/office/drawing/2014/main" id="{BE6ED93B-2244-4800-9EF1-0FC292D38929}"/>
+          <p:cNvPr id="83" name="Imagen 82" descr="Logotipo, Icono&#10;&#10;Descripción generada automáticamente con confianza media">
+            <a:extLst>
+              <a:ext uri="{FF2B5EF4-FFF2-40B4-BE49-F238E27FC236}">
+                <a16:creationId xmlns:a16="http://schemas.microsoft.com/office/drawing/2014/main" id="{7ECE13CF-EEF2-4CC9-AEDC-8675745B5FE9}"/>
               </a:ext>
             </a:extLst>
           </p:cNvPr>
@@ -5132,86 +4885,14 @@
         </p:blipFill>
         <p:spPr>
           <a:xfrm>
-            <a:off x="5629215" y="1962588"/>
-            <a:ext cx="539558" cy="540637"/>
+            <a:off x="5067469" y="5629750"/>
+            <a:ext cx="686783" cy="686783"/>
           </a:xfrm>
           <a:prstGeom prst="rect">
             <a:avLst/>
           </a:prstGeom>
         </p:spPr>
       </p:pic>
-      <p:pic>
-        <p:nvPicPr>
-          <p:cNvPr id="81" name="Imagen 80" descr="Imagen que contiene luz&#10;&#10;Descripción generada automáticamente">
-            <a:extLst>
-              <a:ext uri="{FF2B5EF4-FFF2-40B4-BE49-F238E27FC236}">
-                <a16:creationId xmlns:a16="http://schemas.microsoft.com/office/drawing/2014/main" id="{692D2194-9763-473A-93DD-A41910C10916}"/>
-              </a:ext>
-            </a:extLst>
-          </p:cNvPr>
-          <p:cNvPicPr>
-            <a:picLocks noChangeAspect="1"/>
-          </p:cNvPicPr>
-          <p:nvPr/>
-        </p:nvPicPr>
-        <p:blipFill>
-          <a:blip r:embed="rId14">
-            <a:extLst>
-              <a:ext uri="{28A0092B-C50C-407E-A947-70E740481C1C}">
-                <a14:useLocalDpi xmlns:a14="http://schemas.microsoft.com/office/drawing/2010/main" val="0"/>
-              </a:ext>
-            </a:extLst>
-          </a:blip>
-          <a:stretch>
-            <a:fillRect/>
-          </a:stretch>
-        </p:blipFill>
-        <p:spPr>
-          <a:xfrm>
-            <a:off x="10802594" y="1194944"/>
-            <a:ext cx="665825" cy="665825"/>
-          </a:xfrm>
-          <a:prstGeom prst="rect">
-            <a:avLst/>
-          </a:prstGeom>
-        </p:spPr>
-      </p:pic>
-      <p:pic>
-        <p:nvPicPr>
-          <p:cNvPr id="83" name="Imagen 82" descr="Logotipo, Icono&#10;&#10;Descripción generada automáticamente con confianza media">
-            <a:extLst>
-              <a:ext uri="{FF2B5EF4-FFF2-40B4-BE49-F238E27FC236}">
-                <a16:creationId xmlns:a16="http://schemas.microsoft.com/office/drawing/2014/main" id="{7ECE13CF-EEF2-4CC9-AEDC-8675745B5FE9}"/>
-              </a:ext>
-            </a:extLst>
-          </p:cNvPr>
-          <p:cNvPicPr>
-            <a:picLocks noChangeAspect="1"/>
-          </p:cNvPicPr>
-          <p:nvPr/>
-        </p:nvPicPr>
-        <p:blipFill>
-          <a:blip r:embed="rId15">
-            <a:extLst>
-              <a:ext uri="{28A0092B-C50C-407E-A947-70E740481C1C}">
-                <a14:useLocalDpi xmlns:a14="http://schemas.microsoft.com/office/drawing/2010/main" val="0"/>
-              </a:ext>
-            </a:extLst>
-          </a:blip>
-          <a:stretch>
-            <a:fillRect/>
-          </a:stretch>
-        </p:blipFill>
-        <p:spPr>
-          <a:xfrm>
-            <a:off x="6707930" y="3645076"/>
-            <a:ext cx="686783" cy="686783"/>
-          </a:xfrm>
-          <a:prstGeom prst="rect">
-            <a:avLst/>
-          </a:prstGeom>
-        </p:spPr>
-      </p:pic>
       <p:sp>
         <p:nvSpPr>
           <p:cNvPr id="50" name="Rectángulo 49">
@@ -5226,7 +4907,7 @@
         </p:nvSpPr>
         <p:spPr>
           <a:xfrm>
-            <a:off x="10168078" y="3118938"/>
+            <a:off x="10194970" y="5113828"/>
             <a:ext cx="1439121" cy="1212921"/>
           </a:xfrm>
           <a:prstGeom prst="rect">
@@ -5278,7 +4959,7 @@
         </p:nvSpPr>
         <p:spPr>
           <a:xfrm>
-            <a:off x="10145576" y="3092730"/>
+            <a:off x="10172468" y="5087620"/>
             <a:ext cx="1580225" cy="369332"/>
           </a:xfrm>
           <a:prstGeom prst="rect">
@@ -5314,7 +4995,7 @@
           <p:nvPr/>
         </p:nvPicPr>
         <p:blipFill>
-          <a:blip r:embed="rId16">
+          <a:blip r:embed="rId14">
             <a:extLst>
               <a:ext uri="{28A0092B-C50C-407E-A947-70E740481C1C}">
                 <a14:useLocalDpi xmlns:a14="http://schemas.microsoft.com/office/drawing/2010/main" val="0"/>
@@ -5327,7 +5008,7 @@
         </p:blipFill>
         <p:spPr>
           <a:xfrm>
-            <a:off x="8375840" y="3740502"/>
+            <a:off x="8361293" y="5818787"/>
             <a:ext cx="600548" cy="609556"/>
           </a:xfrm>
           <a:prstGeom prst="rect">
@@ -5349,7 +5030,7 @@
         </p:nvSpPr>
         <p:spPr>
           <a:xfrm>
-            <a:off x="8262542" y="3694278"/>
+            <a:off x="8247995" y="5772563"/>
             <a:ext cx="783804" cy="655780"/>
           </a:xfrm>
           <a:prstGeom prst="rect">
@@ -5405,8 +5086,8 @@
         </p:nvCxnSpPr>
         <p:spPr>
           <a:xfrm flipV="1">
-            <a:off x="9046346" y="3725399"/>
-            <a:ext cx="1121732" cy="296769"/>
+            <a:off x="9031799" y="5720289"/>
+            <a:ext cx="1163171" cy="380164"/>
           </a:xfrm>
           <a:prstGeom prst="straightConnector1">
             <a:avLst/>
@@ -5446,7 +5127,7 @@
           <p:nvPr/>
         </p:nvPicPr>
         <p:blipFill>
-          <a:blip r:embed="rId17">
+          <a:blip r:embed="rId15">
             <a:extLst>
               <a:ext uri="{28A0092B-C50C-407E-A947-70E740481C1C}">
                 <a14:useLocalDpi xmlns:a14="http://schemas.microsoft.com/office/drawing/2010/main" val="0"/>
@@ -5459,7 +5140,7 @@
         </p:blipFill>
         <p:spPr>
           <a:xfrm>
-            <a:off x="10427393" y="3260282"/>
+            <a:off x="10454285" y="5255172"/>
             <a:ext cx="920489" cy="920489"/>
           </a:xfrm>
           <a:prstGeom prst="rect">
@@ -5481,7 +5162,7 @@
         </p:nvSpPr>
         <p:spPr>
           <a:xfrm>
-            <a:off x="10395337" y="4024082"/>
+            <a:off x="10473777" y="6021772"/>
             <a:ext cx="1580225" cy="307777"/>
           </a:xfrm>
           <a:prstGeom prst="rect">
@@ -5508,10 +5189,10 @@
       </p:sp>
       <p:sp>
         <p:nvSpPr>
-          <p:cNvPr id="61" name="CuadroTexto 60">
-            <a:extLst>
-              <a:ext uri="{FF2B5EF4-FFF2-40B4-BE49-F238E27FC236}">
-                <a16:creationId xmlns:a16="http://schemas.microsoft.com/office/drawing/2014/main" id="{E576F930-A713-4F1D-BB3B-009FB281A4A8}"/>
+          <p:cNvPr id="68" name="CuadroTexto 67">
+            <a:extLst>
+              <a:ext uri="{FF2B5EF4-FFF2-40B4-BE49-F238E27FC236}">
+                <a16:creationId xmlns:a16="http://schemas.microsoft.com/office/drawing/2014/main" id="{403BC9A9-41BB-4242-8F26-1E83B2BBC132}"/>
               </a:ext>
             </a:extLst>
           </p:cNvPr>
@@ -5520,51 +5201,7 @@
         </p:nvSpPr>
         <p:spPr>
           <a:xfrm>
-            <a:off x="5436722" y="6119145"/>
-            <a:ext cx="1580225" cy="307777"/>
-          </a:xfrm>
-          <a:prstGeom prst="rect">
-            <a:avLst/>
-          </a:prstGeom>
-          <a:noFill/>
-        </p:spPr>
-        <p:txBody>
-          <a:bodyPr wrap="square" rtlCol="0">
-            <a:spAutoFit/>
-          </a:bodyPr>
-          <a:lstStyle/>
-          <a:p>
-            <a:r>
-              <a:rPr lang="es-ES" sz="1400" dirty="0" err="1">
-                <a:solidFill>
-                  <a:srgbClr val="0070C0"/>
-                </a:solidFill>
-              </a:rPr>
-              <a:t>Ejabberd</a:t>
-            </a:r>
-            <a:endParaRPr lang="es-ES" sz="1400" dirty="0">
-              <a:solidFill>
-                <a:srgbClr val="0070C0"/>
-              </a:solidFill>
-            </a:endParaRPr>
-          </a:p>
-        </p:txBody>
-      </p:sp>
-      <p:sp>
-        <p:nvSpPr>
-          <p:cNvPr id="68" name="CuadroTexto 67">
-            <a:extLst>
-              <a:ext uri="{FF2B5EF4-FFF2-40B4-BE49-F238E27FC236}">
-                <a16:creationId xmlns:a16="http://schemas.microsoft.com/office/drawing/2014/main" id="{403BC9A9-41BB-4242-8F26-1E83B2BBC132}"/>
-              </a:ext>
-            </a:extLst>
-          </p:cNvPr>
-          <p:cNvSpPr txBox="1"/>
-          <p:nvPr/>
-        </p:nvSpPr>
-        <p:spPr>
-          <a:xfrm>
-            <a:off x="2107290" y="2542557"/>
+            <a:off x="1821055" y="2471356"/>
             <a:ext cx="1580225" cy="307777"/>
           </a:xfrm>
           <a:prstGeom prst="rect">
@@ -5584,7 +5221,7 @@
                   <a:srgbClr val="0070C0"/>
                 </a:solidFill>
               </a:rPr>
-              <a:t>Converse.js</a:t>
+              <a:t>Stomp.js y sockjs.js</a:t>
             </a:r>
           </a:p>
         </p:txBody>
@@ -5603,7 +5240,7 @@
         </p:nvSpPr>
         <p:spPr>
           <a:xfrm>
-            <a:off x="9144483" y="3449654"/>
+            <a:off x="9148955" y="5359287"/>
             <a:ext cx="1125706" cy="261610"/>
           </a:xfrm>
           <a:prstGeom prst="rect">
@@ -5722,7 +5359,7 @@
           <p:nvPr/>
         </p:nvPicPr>
         <p:blipFill>
-          <a:blip r:embed="rId18">
+          <a:blip r:embed="rId16">
             <a:extLst>
               <a:ext uri="{28A0092B-C50C-407E-A947-70E740481C1C}">
                 <a14:useLocalDpi xmlns:a14="http://schemas.microsoft.com/office/drawing/2010/main" val="0"/>
@@ -5735,8 +5372,122 @@
         </p:blipFill>
         <p:spPr>
           <a:xfrm>
-            <a:off x="7516809" y="3706182"/>
+            <a:off x="6012928" y="5646822"/>
             <a:ext cx="593101" cy="593101"/>
+          </a:xfrm>
+          <a:prstGeom prst="rect">
+            <a:avLst/>
+          </a:prstGeom>
+        </p:spPr>
+      </p:pic>
+      <p:cxnSp>
+        <p:nvCxnSpPr>
+          <p:cNvPr id="76" name="Conector: angular 75">
+            <a:extLst>
+              <a:ext uri="{FF2B5EF4-FFF2-40B4-BE49-F238E27FC236}">
+                <a16:creationId xmlns:a16="http://schemas.microsoft.com/office/drawing/2014/main" id="{BEB115FB-A7DD-7429-0120-17AB2AEC4F65}"/>
+              </a:ext>
+            </a:extLst>
+          </p:cNvPr>
+          <p:cNvCxnSpPr>
+            <a:cxnSpLocks/>
+            <a:stCxn id="4" idx="2"/>
+          </p:cNvCxnSpPr>
+          <p:nvPr/>
+        </p:nvCxnSpPr>
+        <p:spPr>
+          <a:xfrm rot="16200000" flipH="1">
+            <a:off x="3060684" y="1734225"/>
+            <a:ext cx="2437795" cy="4652896"/>
+          </a:xfrm>
+          <a:prstGeom prst="bentConnector2">
+            <a:avLst/>
+          </a:prstGeom>
+          <a:ln>
+            <a:headEnd type="triangle" w="med" len="med"/>
+            <a:tailEnd type="none" w="med" len="med"/>
+          </a:ln>
+        </p:spPr>
+        <p:style>
+          <a:lnRef idx="1">
+            <a:schemeClr val="dk1"/>
+          </a:lnRef>
+          <a:fillRef idx="0">
+            <a:schemeClr val="dk1"/>
+          </a:fillRef>
+          <a:effectRef idx="0">
+            <a:schemeClr val="dk1"/>
+          </a:effectRef>
+          <a:fontRef idx="minor">
+            <a:schemeClr val="tx1"/>
+          </a:fontRef>
+        </p:style>
+      </p:cxnSp>
+      <p:sp>
+        <p:nvSpPr>
+          <p:cNvPr id="80" name="CuadroTexto 79">
+            <a:extLst>
+              <a:ext uri="{FF2B5EF4-FFF2-40B4-BE49-F238E27FC236}">
+                <a16:creationId xmlns:a16="http://schemas.microsoft.com/office/drawing/2014/main" id="{8AC54AC2-F965-6313-5E1C-5E655F353088}"/>
+              </a:ext>
+            </a:extLst>
+          </p:cNvPr>
+          <p:cNvSpPr txBox="1"/>
+          <p:nvPr/>
+        </p:nvSpPr>
+        <p:spPr>
+          <a:xfrm>
+            <a:off x="2908823" y="5272286"/>
+            <a:ext cx="1125706" cy="261610"/>
+          </a:xfrm>
+          <a:prstGeom prst="rect">
+            <a:avLst/>
+          </a:prstGeom>
+          <a:noFill/>
+        </p:spPr>
+        <p:txBody>
+          <a:bodyPr wrap="square" rtlCol="0">
+            <a:spAutoFit/>
+          </a:bodyPr>
+          <a:lstStyle/>
+          <a:p>
+            <a:r>
+              <a:rPr lang="es-ES" sz="1100" dirty="0"/>
+              <a:t>Notificaciones</a:t>
+            </a:r>
+          </a:p>
+        </p:txBody>
+      </p:sp>
+      <p:pic>
+        <p:nvPicPr>
+          <p:cNvPr id="82" name="Imagen 81" descr="Logotipo&#10;&#10;Descripción generada automáticamente">
+            <a:extLst>
+              <a:ext uri="{FF2B5EF4-FFF2-40B4-BE49-F238E27FC236}">
+                <a16:creationId xmlns:a16="http://schemas.microsoft.com/office/drawing/2014/main" id="{C6EA9589-0138-CDCD-1DDC-79B5E5E5E782}"/>
+              </a:ext>
+            </a:extLst>
+          </p:cNvPr>
+          <p:cNvPicPr>
+            <a:picLocks noChangeAspect="1"/>
+          </p:cNvPicPr>
+          <p:nvPr/>
+        </p:nvPicPr>
+        <p:blipFill>
+          <a:blip r:embed="rId17">
+            <a:extLst>
+              <a:ext uri="{28A0092B-C50C-407E-A947-70E740481C1C}">
+                <a14:useLocalDpi xmlns:a14="http://schemas.microsoft.com/office/drawing/2010/main" val="0"/>
+              </a:ext>
+            </a:extLst>
+          </a:blip>
+          <a:stretch>
+            <a:fillRect/>
+          </a:stretch>
+        </p:blipFill>
+        <p:spPr>
+          <a:xfrm>
+            <a:off x="6622585" y="4386125"/>
+            <a:ext cx="1659714" cy="1082422"/>
           </a:xfrm>
           <a:prstGeom prst="rect">
             <a:avLst/>
@@ -5912,7 +5663,7 @@
           <a:p>
             <a:r>
               <a:rPr lang="es-ES" sz="1100" dirty="0" err="1"/>
-              <a:t>Ejabberd</a:t>
+              <a:t>WebSockect</a:t>
             </a:r>
             <a:r>
               <a:rPr lang="es-ES" sz="1100" dirty="0"/>
@@ -5922,7 +5673,7 @@
               <a:rPr lang="es-ES" sz="1100" dirty="0">
                 <a:hlinkClick r:id="rId8"/>
               </a:rPr>
-              <a:t>https://ugeek.github.io/blog/post/2019-02-10-servidor-ejabberd-xmpp-en-tu-raspberry-mediante-docker-y-dockerfile.html</a:t>
+              <a:t>https://imgur.com/gallery/HhWJGX4</a:t>
             </a:r>
             <a:endParaRPr lang="es-ES" sz="1100" dirty="0"/>
           </a:p>
@@ -10667,6 +10418,61 @@
           </p:txBody>
         </p:sp>
       </p:grpSp>
+      <p:sp>
+        <p:nvSpPr>
+          <p:cNvPr id="9" name="Flecha: hacia abajo 8">
+            <a:extLst>
+              <a:ext uri="{FF2B5EF4-FFF2-40B4-BE49-F238E27FC236}">
+                <a16:creationId xmlns:a16="http://schemas.microsoft.com/office/drawing/2014/main" id="{16B919BC-1977-800D-C4E7-75F78C686E0D}"/>
+              </a:ext>
+            </a:extLst>
+          </p:cNvPr>
+          <p:cNvSpPr/>
+          <p:nvPr/>
+        </p:nvSpPr>
+        <p:spPr>
+          <a:xfrm>
+            <a:off x="1997477" y="1301522"/>
+            <a:ext cx="328962" cy="367480"/>
+          </a:xfrm>
+          <a:prstGeom prst="downArrow">
+            <a:avLst/>
+          </a:prstGeom>
+          <a:noFill/>
+          <a:ln w="28575">
+            <a:solidFill>
+              <a:schemeClr val="tx1"/>
+            </a:solidFill>
+          </a:ln>
+          <a:effectLst>
+            <a:softEdge rad="0"/>
+          </a:effectLst>
+        </p:spPr>
+        <p:style>
+          <a:lnRef idx="2">
+            <a:schemeClr val="accent1">
+              <a:shade val="50000"/>
+            </a:schemeClr>
+          </a:lnRef>
+          <a:fillRef idx="1">
+            <a:schemeClr val="accent1"/>
+          </a:fillRef>
+          <a:effectRef idx="0">
+            <a:schemeClr val="accent1"/>
+          </a:effectRef>
+          <a:fontRef idx="minor">
+            <a:schemeClr val="lt1"/>
+          </a:fontRef>
+        </p:style>
+        <p:txBody>
+          <a:bodyPr rtlCol="0" anchor="ctr"/>
+          <a:lstStyle/>
+          <a:p>
+            <a:pPr algn="ctr"/>
+            <a:endParaRPr lang="es-ES"/>
+          </a:p>
+        </p:txBody>
+      </p:sp>
     </p:spTree>
     <p:extLst>
       <p:ext uri="{BB962C8B-B14F-4D97-AF65-F5344CB8AC3E}">

</xml_diff>

<commit_message>
Fin incremento ficheros, fin del desarrollo de momento, comienzo de la elaboración de la memoria.
</commit_message>
<xml_diff>
--- a/Diseños/aquitectura.pptx
+++ b/Diseños/aquitectura.pptx
@@ -8,10 +8,12 @@
     <p:sldId id="256" r:id="rId2"/>
     <p:sldId id="259" r:id="rId3"/>
     <p:sldId id="257" r:id="rId4"/>
-    <p:sldId id="258" r:id="rId5"/>
-    <p:sldId id="260" r:id="rId6"/>
-    <p:sldId id="261" r:id="rId7"/>
-    <p:sldId id="262" r:id="rId8"/>
+    <p:sldId id="264" r:id="rId5"/>
+    <p:sldId id="258" r:id="rId6"/>
+    <p:sldId id="263" r:id="rId7"/>
+    <p:sldId id="260" r:id="rId8"/>
+    <p:sldId id="261" r:id="rId9"/>
+    <p:sldId id="262" r:id="rId10"/>
   </p:sldIdLst>
   <p:sldSz cx="12192000" cy="6858000"/>
   <p:notesSz cx="6858000" cy="9144000"/>
@@ -265,7 +267,7 @@
           <a:p>
             <a:fld id="{3E1544B7-206C-4EA6-AC0C-B0859B395411}" type="datetimeFigureOut">
               <a:rPr lang="es-ES" smtClean="0"/>
-              <a:t>25/05/2022</a:t>
+              <a:t>31/05/2022</a:t>
             </a:fld>
             <a:endParaRPr lang="es-ES"/>
           </a:p>
@@ -463,7 +465,7 @@
           <a:p>
             <a:fld id="{3E1544B7-206C-4EA6-AC0C-B0859B395411}" type="datetimeFigureOut">
               <a:rPr lang="es-ES" smtClean="0"/>
-              <a:t>25/05/2022</a:t>
+              <a:t>31/05/2022</a:t>
             </a:fld>
             <a:endParaRPr lang="es-ES"/>
           </a:p>
@@ -671,7 +673,7 @@
           <a:p>
             <a:fld id="{3E1544B7-206C-4EA6-AC0C-B0859B395411}" type="datetimeFigureOut">
               <a:rPr lang="es-ES" smtClean="0"/>
-              <a:t>25/05/2022</a:t>
+              <a:t>31/05/2022</a:t>
             </a:fld>
             <a:endParaRPr lang="es-ES"/>
           </a:p>
@@ -869,7 +871,7 @@
           <a:p>
             <a:fld id="{3E1544B7-206C-4EA6-AC0C-B0859B395411}" type="datetimeFigureOut">
               <a:rPr lang="es-ES" smtClean="0"/>
-              <a:t>25/05/2022</a:t>
+              <a:t>31/05/2022</a:t>
             </a:fld>
             <a:endParaRPr lang="es-ES"/>
           </a:p>
@@ -1144,7 +1146,7 @@
           <a:p>
             <a:fld id="{3E1544B7-206C-4EA6-AC0C-B0859B395411}" type="datetimeFigureOut">
               <a:rPr lang="es-ES" smtClean="0"/>
-              <a:t>25/05/2022</a:t>
+              <a:t>31/05/2022</a:t>
             </a:fld>
             <a:endParaRPr lang="es-ES"/>
           </a:p>
@@ -1409,7 +1411,7 @@
           <a:p>
             <a:fld id="{3E1544B7-206C-4EA6-AC0C-B0859B395411}" type="datetimeFigureOut">
               <a:rPr lang="es-ES" smtClean="0"/>
-              <a:t>25/05/2022</a:t>
+              <a:t>31/05/2022</a:t>
             </a:fld>
             <a:endParaRPr lang="es-ES"/>
           </a:p>
@@ -1821,7 +1823,7 @@
           <a:p>
             <a:fld id="{3E1544B7-206C-4EA6-AC0C-B0859B395411}" type="datetimeFigureOut">
               <a:rPr lang="es-ES" smtClean="0"/>
-              <a:t>25/05/2022</a:t>
+              <a:t>31/05/2022</a:t>
             </a:fld>
             <a:endParaRPr lang="es-ES"/>
           </a:p>
@@ -1962,7 +1964,7 @@
           <a:p>
             <a:fld id="{3E1544B7-206C-4EA6-AC0C-B0859B395411}" type="datetimeFigureOut">
               <a:rPr lang="es-ES" smtClean="0"/>
-              <a:t>25/05/2022</a:t>
+              <a:t>31/05/2022</a:t>
             </a:fld>
             <a:endParaRPr lang="es-ES"/>
           </a:p>
@@ -2075,7 +2077,7 @@
           <a:p>
             <a:fld id="{3E1544B7-206C-4EA6-AC0C-B0859B395411}" type="datetimeFigureOut">
               <a:rPr lang="es-ES" smtClean="0"/>
-              <a:t>25/05/2022</a:t>
+              <a:t>31/05/2022</a:t>
             </a:fld>
             <a:endParaRPr lang="es-ES"/>
           </a:p>
@@ -2386,7 +2388,7 @@
           <a:p>
             <a:fld id="{3E1544B7-206C-4EA6-AC0C-B0859B395411}" type="datetimeFigureOut">
               <a:rPr lang="es-ES" smtClean="0"/>
-              <a:t>25/05/2022</a:t>
+              <a:t>31/05/2022</a:t>
             </a:fld>
             <a:endParaRPr lang="es-ES"/>
           </a:p>
@@ -2674,7 +2676,7 @@
           <a:p>
             <a:fld id="{3E1544B7-206C-4EA6-AC0C-B0859B395411}" type="datetimeFigureOut">
               <a:rPr lang="es-ES" smtClean="0"/>
-              <a:t>25/05/2022</a:t>
+              <a:t>31/05/2022</a:t>
             </a:fld>
             <a:endParaRPr lang="es-ES"/>
           </a:p>
@@ -2915,7 +2917,7 @@
           <a:p>
             <a:fld id="{3E1544B7-206C-4EA6-AC0C-B0859B395411}" type="datetimeFigureOut">
               <a:rPr lang="es-ES" smtClean="0"/>
-              <a:t>25/05/2022</a:t>
+              <a:t>31/05/2022</a:t>
             </a:fld>
             <a:endParaRPr lang="es-ES"/>
           </a:p>
@@ -5201,7 +5203,7 @@
         </p:nvSpPr>
         <p:spPr>
           <a:xfrm>
-            <a:off x="1821055" y="2471356"/>
+            <a:off x="2185769" y="2392062"/>
             <a:ext cx="1580225" cy="307777"/>
           </a:xfrm>
           <a:prstGeom prst="rect">
@@ -5216,13 +5218,18 @@
           <a:lstStyle/>
           <a:p>
             <a:r>
-              <a:rPr lang="es-ES" sz="1400" dirty="0">
+              <a:rPr lang="es-ES" sz="1400" dirty="0" err="1">
                 <a:solidFill>
                   <a:srgbClr val="0070C0"/>
                 </a:solidFill>
               </a:rPr>
-              <a:t>Stomp.js y sockjs.js</a:t>
-            </a:r>
+              <a:t>Sockjs</a:t>
+            </a:r>
+            <a:endParaRPr lang="es-ES" sz="1400" dirty="0">
+              <a:solidFill>
+                <a:srgbClr val="0070C0"/>
+              </a:solidFill>
+            </a:endParaRPr>
           </a:p>
         </p:txBody>
       </p:sp>
@@ -5494,6 +5501,159 @@
           </a:prstGeom>
         </p:spPr>
       </p:pic>
+      <p:pic>
+        <p:nvPicPr>
+          <p:cNvPr id="12" name="Imagen 11" descr="Texto&#10;&#10;Descripción generada automáticamente">
+            <a:extLst>
+              <a:ext uri="{FF2B5EF4-FFF2-40B4-BE49-F238E27FC236}">
+                <a16:creationId xmlns:a16="http://schemas.microsoft.com/office/drawing/2014/main" id="{0BA50A00-40E7-7D87-DA37-00BE01989B2A}"/>
+              </a:ext>
+            </a:extLst>
+          </p:cNvPr>
+          <p:cNvPicPr>
+            <a:picLocks noChangeAspect="1"/>
+          </p:cNvPicPr>
+          <p:nvPr/>
+        </p:nvPicPr>
+        <p:blipFill>
+          <a:blip r:embed="rId18">
+            <a:extLst>
+              <a:ext uri="{28A0092B-C50C-407E-A947-70E740481C1C}">
+                <a14:useLocalDpi xmlns:a14="http://schemas.microsoft.com/office/drawing/2010/main" val="0"/>
+              </a:ext>
+            </a:extLst>
+          </a:blip>
+          <a:stretch>
+            <a:fillRect/>
+          </a:stretch>
+        </p:blipFill>
+        <p:spPr>
+          <a:xfrm>
+            <a:off x="1799063" y="1969806"/>
+            <a:ext cx="1476719" cy="408309"/>
+          </a:xfrm>
+          <a:prstGeom prst="rect">
+            <a:avLst/>
+          </a:prstGeom>
+        </p:spPr>
+      </p:pic>
+      <p:pic>
+        <p:nvPicPr>
+          <p:cNvPr id="18" name="Imagen 17" descr="Forma&#10;&#10;Descripción generada automáticamente con confianza baja">
+            <a:extLst>
+              <a:ext uri="{FF2B5EF4-FFF2-40B4-BE49-F238E27FC236}">
+                <a16:creationId xmlns:a16="http://schemas.microsoft.com/office/drawing/2014/main" id="{5253B777-6D4A-619A-C515-056E0F0098CE}"/>
+              </a:ext>
+            </a:extLst>
+          </p:cNvPr>
+          <p:cNvPicPr>
+            <a:picLocks noChangeAspect="1"/>
+          </p:cNvPicPr>
+          <p:nvPr/>
+        </p:nvPicPr>
+        <p:blipFill>
+          <a:blip r:embed="rId19">
+            <a:extLst>
+              <a:ext uri="{28A0092B-C50C-407E-A947-70E740481C1C}">
+                <a14:useLocalDpi xmlns:a14="http://schemas.microsoft.com/office/drawing/2010/main" val="0"/>
+              </a:ext>
+            </a:extLst>
+          </a:blip>
+          <a:stretch>
+            <a:fillRect/>
+          </a:stretch>
+        </p:blipFill>
+        <p:spPr>
+          <a:xfrm>
+            <a:off x="1897566" y="2361986"/>
+            <a:ext cx="361733" cy="361733"/>
+          </a:xfrm>
+          <a:prstGeom prst="rect">
+            <a:avLst/>
+          </a:prstGeom>
+        </p:spPr>
+      </p:pic>
+      <p:cxnSp>
+        <p:nvCxnSpPr>
+          <p:cNvPr id="58" name="Conector: angular 57">
+            <a:extLst>
+              <a:ext uri="{FF2B5EF4-FFF2-40B4-BE49-F238E27FC236}">
+                <a16:creationId xmlns:a16="http://schemas.microsoft.com/office/drawing/2014/main" id="{91610AD7-0F73-41CB-DCBD-D65C677B6F4B}"/>
+              </a:ext>
+            </a:extLst>
+          </p:cNvPr>
+          <p:cNvCxnSpPr>
+            <a:cxnSpLocks/>
+            <a:stCxn id="24" idx="2"/>
+            <a:endCxn id="9" idx="0"/>
+          </p:cNvCxnSpPr>
+          <p:nvPr/>
+        </p:nvCxnSpPr>
+        <p:spPr>
+          <a:xfrm rot="5400000">
+            <a:off x="7435353" y="3338321"/>
+            <a:ext cx="894231" cy="779520"/>
+          </a:xfrm>
+          <a:prstGeom prst="bentConnector3">
+            <a:avLst>
+              <a:gd name="adj1" fmla="val 50000"/>
+            </a:avLst>
+          </a:prstGeom>
+          <a:ln>
+            <a:headEnd type="triangle"/>
+            <a:tailEnd type="triangle"/>
+          </a:ln>
+        </p:spPr>
+        <p:style>
+          <a:lnRef idx="1">
+            <a:schemeClr val="dk1"/>
+          </a:lnRef>
+          <a:fillRef idx="0">
+            <a:schemeClr val="dk1"/>
+          </a:fillRef>
+          <a:effectRef idx="0">
+            <a:schemeClr val="dk1"/>
+          </a:effectRef>
+          <a:fontRef idx="minor">
+            <a:schemeClr val="tx1"/>
+          </a:fontRef>
+        </p:style>
+      </p:cxnSp>
+      <p:sp>
+        <p:nvSpPr>
+          <p:cNvPr id="61" name="CuadroTexto 60">
+            <a:extLst>
+              <a:ext uri="{FF2B5EF4-FFF2-40B4-BE49-F238E27FC236}">
+                <a16:creationId xmlns:a16="http://schemas.microsoft.com/office/drawing/2014/main" id="{681E686E-06A3-2B03-59A2-346F2F9C6B3F}"/>
+              </a:ext>
+            </a:extLst>
+          </p:cNvPr>
+          <p:cNvSpPr txBox="1"/>
+          <p:nvPr/>
+        </p:nvSpPr>
+        <p:spPr>
+          <a:xfrm>
+            <a:off x="7475579" y="3756450"/>
+            <a:ext cx="1125706" cy="261610"/>
+          </a:xfrm>
+          <a:prstGeom prst="rect">
+            <a:avLst/>
+          </a:prstGeom>
+          <a:noFill/>
+        </p:spPr>
+        <p:txBody>
+          <a:bodyPr wrap="square" rtlCol="0">
+            <a:spAutoFit/>
+          </a:bodyPr>
+          <a:lstStyle/>
+          <a:p>
+            <a:r>
+              <a:rPr lang="es-ES" sz="1100" dirty="0"/>
+              <a:t>Mensajes</a:t>
+            </a:r>
+          </a:p>
+        </p:txBody>
+      </p:sp>
     </p:spTree>
     <p:extLst>
       <p:ext uri="{BB962C8B-B14F-4D97-AF65-F5344CB8AC3E}">
@@ -5576,7 +5736,7 @@
         </p:spPr>
         <p:txBody>
           <a:bodyPr>
-            <a:normAutofit fontScale="92500" lnSpcReduction="10000"/>
+            <a:normAutofit fontScale="92500" lnSpcReduction="20000"/>
           </a:bodyPr>
           <a:lstStyle/>
           <a:p>
@@ -5647,13 +5807,13 @@
           <a:p>
             <a:r>
               <a:rPr lang="es-ES" sz="1100" dirty="0"/>
-              <a:t>Converse.js: </a:t>
+              <a:t>Stomp.js: </a:t>
             </a:r>
             <a:r>
               <a:rPr lang="es-ES" sz="1100" dirty="0">
                 <a:hlinkClick r:id="rId7"/>
               </a:rPr>
-              <a:t>https://open-store.io/app/conversejs.povoq</a:t>
+              <a:t>https://www.drouiz.com/blog/2018/09/05/stomp-js-vs-websocket/</a:t>
             </a:r>
             <a:r>
               <a:rPr lang="es-ES" sz="1100" dirty="0"/>
@@ -5829,7 +5989,33 @@
           <a:p>
             <a:r>
               <a:rPr lang="es-ES" sz="1100" dirty="0"/>
-              <a:t>Java: https://www.flaticon.es/icono-gratis/java_226777?term=java&amp;page=1&amp;position=1&amp;page=1&amp;position=1&amp;related_id=226777&amp;origin=search</a:t>
+              <a:t>Java: </a:t>
+            </a:r>
+            <a:r>
+              <a:rPr lang="es-ES" sz="1100" dirty="0">
+                <a:hlinkClick r:id="rId18"/>
+              </a:rPr>
+              <a:t>https://www.flaticon.es/icono-gratis/java_226777?term=java&amp;page=1&amp;position=1&amp;page=1&amp;position=1&amp;related_id=226777&amp;origin=search</a:t>
+            </a:r>
+            <a:r>
+              <a:rPr lang="es-ES" sz="1100" dirty="0"/>
+              <a:t> </a:t>
+            </a:r>
+          </a:p>
+          <a:p>
+            <a:r>
+              <a:rPr lang="es-ES" sz="1100" dirty="0"/>
+              <a:t>Sockjs.js: </a:t>
+            </a:r>
+            <a:r>
+              <a:rPr lang="es-ES" sz="1100" dirty="0">
+                <a:hlinkClick r:id="rId19"/>
+              </a:rPr>
+              <a:t>https://github.com/sockjs</a:t>
+            </a:r>
+            <a:r>
+              <a:rPr lang="es-ES" sz="1100" dirty="0"/>
+              <a:t> </a:t>
             </a:r>
           </a:p>
           <a:p>
@@ -6681,7 +6867,7 @@
         </p:nvSpPr>
         <p:spPr>
           <a:xfrm>
-            <a:off x="787815" y="687304"/>
+            <a:off x="4922667" y="185034"/>
             <a:ext cx="994299" cy="843379"/>
           </a:xfrm>
           <a:prstGeom prst="rect">
@@ -6730,10 +6916,10 @@
       </p:sp>
       <p:sp>
         <p:nvSpPr>
-          <p:cNvPr id="6" name="Rectángulo 5">
-            <a:extLst>
-              <a:ext uri="{FF2B5EF4-FFF2-40B4-BE49-F238E27FC236}">
-                <a16:creationId xmlns:a16="http://schemas.microsoft.com/office/drawing/2014/main" id="{D4F86132-126A-4480-95F6-FA849270D971}"/>
+          <p:cNvPr id="7" name="Elipse 6">
+            <a:extLst>
+              <a:ext uri="{FF2B5EF4-FFF2-40B4-BE49-F238E27FC236}">
+                <a16:creationId xmlns:a16="http://schemas.microsoft.com/office/drawing/2014/main" id="{17723A70-21E8-4B8C-8D41-0E8B049ABDE4}"/>
               </a:ext>
             </a:extLst>
           </p:cNvPr>
@@ -6742,7 +6928,424 @@
         </p:nvSpPr>
         <p:spPr>
           <a:xfrm>
-            <a:off x="555044" y="4926536"/>
+            <a:off x="3906175" y="2334827"/>
+            <a:ext cx="3027285" cy="1766656"/>
+          </a:xfrm>
+          <a:prstGeom prst="ellipse">
+            <a:avLst/>
+          </a:prstGeom>
+          <a:solidFill>
+            <a:schemeClr val="bg1"/>
+          </a:solidFill>
+          <a:ln>
+            <a:solidFill>
+              <a:schemeClr val="tx1"/>
+            </a:solidFill>
+          </a:ln>
+        </p:spPr>
+        <p:style>
+          <a:lnRef idx="2">
+            <a:schemeClr val="accent1">
+              <a:shade val="50000"/>
+            </a:schemeClr>
+          </a:lnRef>
+          <a:fillRef idx="1">
+            <a:schemeClr val="accent1"/>
+          </a:fillRef>
+          <a:effectRef idx="0">
+            <a:schemeClr val="accent1"/>
+          </a:effectRef>
+          <a:fontRef idx="minor">
+            <a:schemeClr val="lt1"/>
+          </a:fontRef>
+        </p:style>
+        <p:txBody>
+          <a:bodyPr rtlCol="0" anchor="ctr"/>
+          <a:lstStyle/>
+          <a:p>
+            <a:pPr algn="ctr"/>
+            <a:r>
+              <a:rPr lang="es-ES" sz="1400" dirty="0">
+                <a:solidFill>
+                  <a:schemeClr val="tx1"/>
+                </a:solidFill>
+              </a:rPr>
+              <a:t>0. Sistema de Gestión de la Mentorización</a:t>
+            </a:r>
+          </a:p>
+        </p:txBody>
+      </p:sp>
+      <p:sp>
+        <p:nvSpPr>
+          <p:cNvPr id="9" name="Es igual a 8">
+            <a:extLst>
+              <a:ext uri="{FF2B5EF4-FFF2-40B4-BE49-F238E27FC236}">
+                <a16:creationId xmlns:a16="http://schemas.microsoft.com/office/drawing/2014/main" id="{0F257B7B-115D-4D5E-B1D3-ADD72286A28A}"/>
+              </a:ext>
+            </a:extLst>
+          </p:cNvPr>
+          <p:cNvSpPr/>
+          <p:nvPr/>
+        </p:nvSpPr>
+        <p:spPr>
+          <a:xfrm>
+            <a:off x="1769087" y="5271444"/>
+            <a:ext cx="1819276" cy="967387"/>
+          </a:xfrm>
+          <a:prstGeom prst="mathEqual">
+            <a:avLst>
+              <a:gd name="adj1" fmla="val 0"/>
+              <a:gd name="adj2" fmla="val 52960"/>
+            </a:avLst>
+          </a:prstGeom>
+          <a:solidFill>
+            <a:schemeClr val="tx1"/>
+          </a:solidFill>
+          <a:ln w="0"/>
+        </p:spPr>
+        <p:style>
+          <a:lnRef idx="2">
+            <a:schemeClr val="accent1">
+              <a:shade val="50000"/>
+            </a:schemeClr>
+          </a:lnRef>
+          <a:fillRef idx="1">
+            <a:schemeClr val="accent1"/>
+          </a:fillRef>
+          <a:effectRef idx="0">
+            <a:schemeClr val="accent1"/>
+          </a:effectRef>
+          <a:fontRef idx="minor">
+            <a:schemeClr val="lt1"/>
+          </a:fontRef>
+        </p:style>
+        <p:txBody>
+          <a:bodyPr rtlCol="0" anchor="ctr"/>
+          <a:lstStyle/>
+          <a:p>
+            <a:pPr algn="ctr"/>
+            <a:r>
+              <a:rPr lang="es-ES" sz="1200" dirty="0">
+                <a:solidFill>
+                  <a:schemeClr val="tx1"/>
+                </a:solidFill>
+              </a:rPr>
+              <a:t>Usuarios</a:t>
+            </a:r>
+          </a:p>
+        </p:txBody>
+      </p:sp>
+      <p:sp>
+        <p:nvSpPr>
+          <p:cNvPr id="10" name="Es igual a 9">
+            <a:extLst>
+              <a:ext uri="{FF2B5EF4-FFF2-40B4-BE49-F238E27FC236}">
+                <a16:creationId xmlns:a16="http://schemas.microsoft.com/office/drawing/2014/main" id="{48231637-8356-4589-98F2-0BBB70845204}"/>
+              </a:ext>
+            </a:extLst>
+          </p:cNvPr>
+          <p:cNvSpPr/>
+          <p:nvPr/>
+        </p:nvSpPr>
+        <p:spPr>
+          <a:xfrm>
+            <a:off x="7517780" y="5272318"/>
+            <a:ext cx="1819276" cy="967387"/>
+          </a:xfrm>
+          <a:prstGeom prst="mathEqual">
+            <a:avLst>
+              <a:gd name="adj1" fmla="val 0"/>
+              <a:gd name="adj2" fmla="val 52960"/>
+            </a:avLst>
+          </a:prstGeom>
+          <a:solidFill>
+            <a:schemeClr val="tx1"/>
+          </a:solidFill>
+          <a:ln w="0"/>
+        </p:spPr>
+        <p:style>
+          <a:lnRef idx="2">
+            <a:schemeClr val="accent1">
+              <a:shade val="50000"/>
+            </a:schemeClr>
+          </a:lnRef>
+          <a:fillRef idx="1">
+            <a:schemeClr val="accent1"/>
+          </a:fillRef>
+          <a:effectRef idx="0">
+            <a:schemeClr val="accent1"/>
+          </a:effectRef>
+          <a:fontRef idx="minor">
+            <a:schemeClr val="lt1"/>
+          </a:fontRef>
+        </p:style>
+        <p:txBody>
+          <a:bodyPr rtlCol="0" anchor="ctr"/>
+          <a:lstStyle/>
+          <a:p>
+            <a:pPr algn="ctr"/>
+            <a:r>
+              <a:rPr lang="es-ES" sz="1200" dirty="0">
+                <a:solidFill>
+                  <a:schemeClr val="tx1"/>
+                </a:solidFill>
+              </a:rPr>
+              <a:t>Mensajes</a:t>
+            </a:r>
+          </a:p>
+        </p:txBody>
+      </p:sp>
+      <p:cxnSp>
+        <p:nvCxnSpPr>
+          <p:cNvPr id="12" name="Conector recto de flecha 11">
+            <a:extLst>
+              <a:ext uri="{FF2B5EF4-FFF2-40B4-BE49-F238E27FC236}">
+                <a16:creationId xmlns:a16="http://schemas.microsoft.com/office/drawing/2014/main" id="{5A797F23-89DA-4515-A9E9-38DB63D77AB5}"/>
+              </a:ext>
+            </a:extLst>
+          </p:cNvPr>
+          <p:cNvCxnSpPr>
+            <a:stCxn id="7" idx="5"/>
+            <a:endCxn id="10" idx="5"/>
+          </p:cNvCxnSpPr>
+          <p:nvPr/>
+        </p:nvCxnSpPr>
+        <p:spPr>
+          <a:xfrm>
+            <a:off x="6490124" y="3842762"/>
+            <a:ext cx="1937294" cy="1657085"/>
+          </a:xfrm>
+          <a:prstGeom prst="straightConnector1">
+            <a:avLst/>
+          </a:prstGeom>
+          <a:ln>
+            <a:headEnd type="triangle"/>
+            <a:tailEnd type="triangle"/>
+          </a:ln>
+        </p:spPr>
+        <p:style>
+          <a:lnRef idx="1">
+            <a:schemeClr val="dk1"/>
+          </a:lnRef>
+          <a:fillRef idx="0">
+            <a:schemeClr val="dk1"/>
+          </a:fillRef>
+          <a:effectRef idx="0">
+            <a:schemeClr val="dk1"/>
+          </a:effectRef>
+          <a:fontRef idx="minor">
+            <a:schemeClr val="tx1"/>
+          </a:fontRef>
+        </p:style>
+      </p:cxnSp>
+      <p:cxnSp>
+        <p:nvCxnSpPr>
+          <p:cNvPr id="13" name="Conector recto de flecha 12">
+            <a:extLst>
+              <a:ext uri="{FF2B5EF4-FFF2-40B4-BE49-F238E27FC236}">
+                <a16:creationId xmlns:a16="http://schemas.microsoft.com/office/drawing/2014/main" id="{0E1641BB-1188-4E56-BA71-5E18849F0361}"/>
+              </a:ext>
+            </a:extLst>
+          </p:cNvPr>
+          <p:cNvCxnSpPr>
+            <a:cxnSpLocks/>
+            <a:stCxn id="7" idx="3"/>
+            <a:endCxn id="9" idx="5"/>
+          </p:cNvCxnSpPr>
+          <p:nvPr/>
+        </p:nvCxnSpPr>
+        <p:spPr>
+          <a:xfrm flipH="1">
+            <a:off x="2678725" y="3842762"/>
+            <a:ext cx="1670786" cy="1656211"/>
+          </a:xfrm>
+          <a:prstGeom prst="straightConnector1">
+            <a:avLst/>
+          </a:prstGeom>
+          <a:ln>
+            <a:headEnd type="triangle"/>
+            <a:tailEnd type="triangle"/>
+          </a:ln>
+        </p:spPr>
+        <p:style>
+          <a:lnRef idx="1">
+            <a:schemeClr val="dk1"/>
+          </a:lnRef>
+          <a:fillRef idx="0">
+            <a:schemeClr val="dk1"/>
+          </a:fillRef>
+          <a:effectRef idx="0">
+            <a:schemeClr val="dk1"/>
+          </a:effectRef>
+          <a:fontRef idx="minor">
+            <a:schemeClr val="tx1"/>
+          </a:fontRef>
+        </p:style>
+      </p:cxnSp>
+      <p:cxnSp>
+        <p:nvCxnSpPr>
+          <p:cNvPr id="14" name="Conector recto de flecha 13">
+            <a:extLst>
+              <a:ext uri="{FF2B5EF4-FFF2-40B4-BE49-F238E27FC236}">
+                <a16:creationId xmlns:a16="http://schemas.microsoft.com/office/drawing/2014/main" id="{E381BCD1-D7FD-465D-A1AC-1B5BF53DF3FF}"/>
+              </a:ext>
+            </a:extLst>
+          </p:cNvPr>
+          <p:cNvCxnSpPr>
+            <a:cxnSpLocks/>
+            <a:stCxn id="4" idx="2"/>
+            <a:endCxn id="7" idx="0"/>
+          </p:cNvCxnSpPr>
+          <p:nvPr/>
+        </p:nvCxnSpPr>
+        <p:spPr>
+          <a:xfrm>
+            <a:off x="5419817" y="1028413"/>
+            <a:ext cx="1" cy="1306414"/>
+          </a:xfrm>
+          <a:prstGeom prst="straightConnector1">
+            <a:avLst/>
+          </a:prstGeom>
+          <a:ln>
+            <a:headEnd type="triangle"/>
+            <a:tailEnd type="triangle"/>
+          </a:ln>
+        </p:spPr>
+        <p:style>
+          <a:lnRef idx="1">
+            <a:schemeClr val="dk1"/>
+          </a:lnRef>
+          <a:fillRef idx="0">
+            <a:schemeClr val="dk1"/>
+          </a:fillRef>
+          <a:effectRef idx="0">
+            <a:schemeClr val="dk1"/>
+          </a:effectRef>
+          <a:fontRef idx="minor">
+            <a:schemeClr val="tx1"/>
+          </a:fontRef>
+        </p:style>
+      </p:cxnSp>
+      <p:sp>
+        <p:nvSpPr>
+          <p:cNvPr id="25" name="CuadroTexto 24">
+            <a:extLst>
+              <a:ext uri="{FF2B5EF4-FFF2-40B4-BE49-F238E27FC236}">
+                <a16:creationId xmlns:a16="http://schemas.microsoft.com/office/drawing/2014/main" id="{1D6C2673-940E-4FE7-AAFC-4708B11FD480}"/>
+              </a:ext>
+            </a:extLst>
+          </p:cNvPr>
+          <p:cNvSpPr txBox="1"/>
+          <p:nvPr/>
+        </p:nvSpPr>
+        <p:spPr>
+          <a:xfrm>
+            <a:off x="4710375" y="1427704"/>
+            <a:ext cx="1599501" cy="253916"/>
+          </a:xfrm>
+          <a:prstGeom prst="rect">
+            <a:avLst/>
+          </a:prstGeom>
+          <a:noFill/>
+        </p:spPr>
+        <p:txBody>
+          <a:bodyPr wrap="square" rtlCol="0">
+            <a:spAutoFit/>
+          </a:bodyPr>
+          <a:lstStyle/>
+          <a:p>
+            <a:r>
+              <a:rPr lang="es-ES" sz="1050" dirty="0"/>
+              <a:t>Interacción con usuarios</a:t>
+            </a:r>
+          </a:p>
+        </p:txBody>
+      </p:sp>
+      <p:sp>
+        <p:nvSpPr>
+          <p:cNvPr id="31" name="CuadroTexto 30">
+            <a:extLst>
+              <a:ext uri="{FF2B5EF4-FFF2-40B4-BE49-F238E27FC236}">
+                <a16:creationId xmlns:a16="http://schemas.microsoft.com/office/drawing/2014/main" id="{DC877ECE-8B5B-4762-BF69-FC4F4898C10A}"/>
+              </a:ext>
+            </a:extLst>
+          </p:cNvPr>
+          <p:cNvSpPr txBox="1"/>
+          <p:nvPr/>
+        </p:nvSpPr>
+        <p:spPr>
+          <a:xfrm rot="18876220">
+            <a:off x="2787909" y="4344455"/>
+            <a:ext cx="1599501" cy="253916"/>
+          </a:xfrm>
+          <a:prstGeom prst="rect">
+            <a:avLst/>
+          </a:prstGeom>
+          <a:noFill/>
+        </p:spPr>
+        <p:txBody>
+          <a:bodyPr wrap="square" rtlCol="0">
+            <a:spAutoFit/>
+          </a:bodyPr>
+          <a:lstStyle/>
+          <a:p>
+            <a:r>
+              <a:rPr lang="es-ES" sz="1050" dirty="0"/>
+              <a:t>Datos de usuarios</a:t>
+            </a:r>
+          </a:p>
+        </p:txBody>
+      </p:sp>
+      <p:sp>
+        <p:nvSpPr>
+          <p:cNvPr id="36" name="CuadroTexto 35">
+            <a:extLst>
+              <a:ext uri="{FF2B5EF4-FFF2-40B4-BE49-F238E27FC236}">
+                <a16:creationId xmlns:a16="http://schemas.microsoft.com/office/drawing/2014/main" id="{4C55EDBB-CD5C-4F18-B6A4-923BE2D2E10D}"/>
+              </a:ext>
+            </a:extLst>
+          </p:cNvPr>
+          <p:cNvSpPr txBox="1"/>
+          <p:nvPr/>
+        </p:nvSpPr>
+        <p:spPr>
+          <a:xfrm rot="2437552">
+            <a:off x="6902292" y="4575080"/>
+            <a:ext cx="1599501" cy="253916"/>
+          </a:xfrm>
+          <a:prstGeom prst="rect">
+            <a:avLst/>
+          </a:prstGeom>
+          <a:noFill/>
+        </p:spPr>
+        <p:txBody>
+          <a:bodyPr wrap="square" rtlCol="0">
+            <a:spAutoFit/>
+          </a:bodyPr>
+          <a:lstStyle/>
+          <a:p>
+            <a:r>
+              <a:rPr lang="es-ES" sz="1050" dirty="0"/>
+              <a:t>Mensajes</a:t>
+            </a:r>
+          </a:p>
+        </p:txBody>
+      </p:sp>
+      <p:sp>
+        <p:nvSpPr>
+          <p:cNvPr id="16" name="Rectángulo 15">
+            <a:extLst>
+              <a:ext uri="{FF2B5EF4-FFF2-40B4-BE49-F238E27FC236}">
+                <a16:creationId xmlns:a16="http://schemas.microsoft.com/office/drawing/2014/main" id="{B3EDCE97-D81F-4DEC-B83F-6D8BF59960A0}"/>
+              </a:ext>
+            </a:extLst>
+          </p:cNvPr>
+          <p:cNvSpPr/>
+          <p:nvPr/>
+        </p:nvSpPr>
+        <p:spPr>
+          <a:xfrm>
+            <a:off x="8979313" y="2796465"/>
             <a:ext cx="994299" cy="843379"/>
           </a:xfrm>
           <a:prstGeom prst="rect">
@@ -6784,6 +7387,237 @@
                   <a:schemeClr val="tx1"/>
                 </a:solidFill>
               </a:rPr>
+              <a:t>Gmail SMTP</a:t>
+            </a:r>
+          </a:p>
+        </p:txBody>
+      </p:sp>
+      <p:cxnSp>
+        <p:nvCxnSpPr>
+          <p:cNvPr id="17" name="Conector recto de flecha 16">
+            <a:extLst>
+              <a:ext uri="{FF2B5EF4-FFF2-40B4-BE49-F238E27FC236}">
+                <a16:creationId xmlns:a16="http://schemas.microsoft.com/office/drawing/2014/main" id="{8AB342A0-C2BC-4142-A799-4A993B6ED382}"/>
+              </a:ext>
+            </a:extLst>
+          </p:cNvPr>
+          <p:cNvCxnSpPr>
+            <a:cxnSpLocks/>
+            <a:stCxn id="7" idx="6"/>
+            <a:endCxn id="16" idx="1"/>
+          </p:cNvCxnSpPr>
+          <p:nvPr/>
+        </p:nvCxnSpPr>
+        <p:spPr>
+          <a:xfrm>
+            <a:off x="6933460" y="3218155"/>
+            <a:ext cx="2045853" cy="0"/>
+          </a:xfrm>
+          <a:prstGeom prst="straightConnector1">
+            <a:avLst/>
+          </a:prstGeom>
+          <a:ln>
+            <a:headEnd type="none" w="med" len="med"/>
+            <a:tailEnd type="triangle" w="med" len="med"/>
+          </a:ln>
+        </p:spPr>
+        <p:style>
+          <a:lnRef idx="1">
+            <a:schemeClr val="dk1"/>
+          </a:lnRef>
+          <a:fillRef idx="0">
+            <a:schemeClr val="dk1"/>
+          </a:fillRef>
+          <a:effectRef idx="0">
+            <a:schemeClr val="dk1"/>
+          </a:effectRef>
+          <a:fontRef idx="minor">
+            <a:schemeClr val="tx1"/>
+          </a:fontRef>
+        </p:style>
+      </p:cxnSp>
+      <p:sp>
+        <p:nvSpPr>
+          <p:cNvPr id="19" name="CuadroTexto 18">
+            <a:extLst>
+              <a:ext uri="{FF2B5EF4-FFF2-40B4-BE49-F238E27FC236}">
+                <a16:creationId xmlns:a16="http://schemas.microsoft.com/office/drawing/2014/main" id="{84B4DE42-78B8-4189-8DAB-BA9C889B4D50}"/>
+              </a:ext>
+            </a:extLst>
+          </p:cNvPr>
+          <p:cNvSpPr txBox="1"/>
+          <p:nvPr/>
+        </p:nvSpPr>
+        <p:spPr>
+          <a:xfrm>
+            <a:off x="7379812" y="2897792"/>
+            <a:ext cx="1599501" cy="253916"/>
+          </a:xfrm>
+          <a:prstGeom prst="rect">
+            <a:avLst/>
+          </a:prstGeom>
+          <a:noFill/>
+        </p:spPr>
+        <p:txBody>
+          <a:bodyPr wrap="square" rtlCol="0">
+            <a:spAutoFit/>
+          </a:bodyPr>
+          <a:lstStyle/>
+          <a:p>
+            <a:r>
+              <a:rPr lang="es-ES" sz="1050" dirty="0"/>
+              <a:t>Correo electrónico</a:t>
+            </a:r>
+          </a:p>
+        </p:txBody>
+      </p:sp>
+    </p:spTree>
+    <p:extLst>
+      <p:ext uri="{BB962C8B-B14F-4D97-AF65-F5344CB8AC3E}">
+        <p14:creationId xmlns:p14="http://schemas.microsoft.com/office/powerpoint/2010/main" val="1808039253"/>
+      </p:ext>
+    </p:extLst>
+  </p:cSld>
+  <p:clrMapOvr>
+    <a:masterClrMapping/>
+  </p:clrMapOvr>
+</p:sld>
+</file>
+
+<file path=ppt/slides/slide5.xml><?xml version="1.0" encoding="utf-8"?>
+<p:sld xmlns:a="http://schemas.openxmlformats.org/drawingml/2006/main" xmlns:r="http://schemas.openxmlformats.org/officeDocument/2006/relationships" xmlns:p="http://schemas.openxmlformats.org/presentationml/2006/main">
+  <p:cSld>
+    <p:spTree>
+      <p:nvGrpSpPr>
+        <p:cNvPr id="1" name=""/>
+        <p:cNvGrpSpPr/>
+        <p:nvPr/>
+      </p:nvGrpSpPr>
+      <p:grpSpPr>
+        <a:xfrm>
+          <a:off x="0" y="0"/>
+          <a:ext cx="0" cy="0"/>
+          <a:chOff x="0" y="0"/>
+          <a:chExt cx="0" cy="0"/>
+        </a:xfrm>
+      </p:grpSpPr>
+      <p:sp>
+        <p:nvSpPr>
+          <p:cNvPr id="4" name="Rectángulo 3">
+            <a:extLst>
+              <a:ext uri="{FF2B5EF4-FFF2-40B4-BE49-F238E27FC236}">
+                <a16:creationId xmlns:a16="http://schemas.microsoft.com/office/drawing/2014/main" id="{14F7F12B-3121-4970-A5CD-FDFEA18F166E}"/>
+              </a:ext>
+            </a:extLst>
+          </p:cNvPr>
+          <p:cNvSpPr/>
+          <p:nvPr/>
+        </p:nvSpPr>
+        <p:spPr>
+          <a:xfrm>
+            <a:off x="787815" y="687304"/>
+            <a:ext cx="994299" cy="843379"/>
+          </a:xfrm>
+          <a:prstGeom prst="rect">
+            <a:avLst/>
+          </a:prstGeom>
+          <a:solidFill>
+            <a:schemeClr val="bg1"/>
+          </a:solidFill>
+          <a:ln w="12700">
+            <a:solidFill>
+              <a:schemeClr val="tx1"/>
+            </a:solidFill>
+          </a:ln>
+        </p:spPr>
+        <p:style>
+          <a:lnRef idx="2">
+            <a:schemeClr val="accent1">
+              <a:shade val="50000"/>
+            </a:schemeClr>
+          </a:lnRef>
+          <a:fillRef idx="1">
+            <a:schemeClr val="accent1"/>
+          </a:fillRef>
+          <a:effectRef idx="0">
+            <a:schemeClr val="accent1"/>
+          </a:effectRef>
+          <a:fontRef idx="minor">
+            <a:schemeClr val="lt1"/>
+          </a:fontRef>
+        </p:style>
+        <p:txBody>
+          <a:bodyPr rtlCol="0" anchor="ctr"/>
+          <a:lstStyle/>
+          <a:p>
+            <a:pPr algn="ctr"/>
+            <a:r>
+              <a:rPr lang="es-ES" sz="1100" dirty="0">
+                <a:solidFill>
+                  <a:schemeClr val="tx1"/>
+                </a:solidFill>
+              </a:rPr>
+              <a:t>Mentores y mentorizados</a:t>
+            </a:r>
+          </a:p>
+        </p:txBody>
+      </p:sp>
+      <p:sp>
+        <p:nvSpPr>
+          <p:cNvPr id="6" name="Rectángulo 5">
+            <a:extLst>
+              <a:ext uri="{FF2B5EF4-FFF2-40B4-BE49-F238E27FC236}">
+                <a16:creationId xmlns:a16="http://schemas.microsoft.com/office/drawing/2014/main" id="{D4F86132-126A-4480-95F6-FA849270D971}"/>
+              </a:ext>
+            </a:extLst>
+          </p:cNvPr>
+          <p:cNvSpPr/>
+          <p:nvPr/>
+        </p:nvSpPr>
+        <p:spPr>
+          <a:xfrm>
+            <a:off x="555044" y="4926536"/>
+            <a:ext cx="994299" cy="843379"/>
+          </a:xfrm>
+          <a:prstGeom prst="rect">
+            <a:avLst/>
+          </a:prstGeom>
+          <a:solidFill>
+            <a:schemeClr val="bg1"/>
+          </a:solidFill>
+          <a:ln w="12700">
+            <a:solidFill>
+              <a:schemeClr val="tx1"/>
+            </a:solidFill>
+          </a:ln>
+        </p:spPr>
+        <p:style>
+          <a:lnRef idx="2">
+            <a:schemeClr val="accent1">
+              <a:shade val="50000"/>
+            </a:schemeClr>
+          </a:lnRef>
+          <a:fillRef idx="1">
+            <a:schemeClr val="accent1"/>
+          </a:fillRef>
+          <a:effectRef idx="0">
+            <a:schemeClr val="accent1"/>
+          </a:effectRef>
+          <a:fontRef idx="minor">
+            <a:schemeClr val="lt1"/>
+          </a:fontRef>
+        </p:style>
+        <p:txBody>
+          <a:bodyPr rtlCol="0" anchor="ctr"/>
+          <a:lstStyle/>
+          <a:p>
+            <a:pPr algn="ctr"/>
+            <a:r>
+              <a:rPr lang="es-ES" sz="1100" dirty="0">
+                <a:solidFill>
+                  <a:schemeClr val="tx1"/>
+                </a:solidFill>
+              </a:rPr>
               <a:t>Responsables instituciones</a:t>
             </a:r>
           </a:p>
@@ -7968,7 +8802,7 @@
         </p:nvSpPr>
         <p:spPr>
           <a:xfrm rot="10800000">
-            <a:off x="10769523" y="348846"/>
+            <a:off x="8917512" y="440671"/>
             <a:ext cx="581025" cy="676916"/>
           </a:xfrm>
           <a:prstGeom prst="foldedCorner">
@@ -8021,8 +8855,8 @@
         </p:nvCxnSpPr>
         <p:spPr>
           <a:xfrm flipH="1">
-            <a:off x="7208795" y="687304"/>
-            <a:ext cx="3560728" cy="97272"/>
+            <a:off x="7208795" y="779129"/>
+            <a:ext cx="1708717" cy="5447"/>
           </a:xfrm>
           <a:prstGeom prst="straightConnector1">
             <a:avLst/>
@@ -8061,7 +8895,7 @@
         </p:nvSpPr>
         <p:spPr>
           <a:xfrm>
-            <a:off x="10286999" y="999100"/>
+            <a:off x="8438753" y="1096609"/>
             <a:ext cx="1762126" cy="276999"/>
           </a:xfrm>
           <a:prstGeom prst="rect">
@@ -8096,7 +8930,7 @@
         </p:nvSpPr>
         <p:spPr>
           <a:xfrm>
-            <a:off x="8788313" y="440671"/>
+            <a:off x="7687931" y="477815"/>
             <a:ext cx="936325" cy="276999"/>
           </a:xfrm>
           <a:prstGeom prst="rect">
@@ -9066,7 +9900,2048 @@
 </p:sld>
 </file>
 
-<file path=ppt/slides/slide5.xml><?xml version="1.0" encoding="utf-8"?>
+<file path=ppt/slides/slide6.xml><?xml version="1.0" encoding="utf-8"?>
+<p:sld xmlns:a="http://schemas.openxmlformats.org/drawingml/2006/main" xmlns:r="http://schemas.openxmlformats.org/officeDocument/2006/relationships" xmlns:p="http://schemas.openxmlformats.org/presentationml/2006/main">
+  <p:cSld>
+    <p:spTree>
+      <p:nvGrpSpPr>
+        <p:cNvPr id="1" name=""/>
+        <p:cNvGrpSpPr/>
+        <p:nvPr/>
+      </p:nvGrpSpPr>
+      <p:grpSpPr>
+        <a:xfrm>
+          <a:off x="0" y="0"/>
+          <a:ext cx="0" cy="0"/>
+          <a:chOff x="0" y="0"/>
+          <a:chExt cx="0" cy="0"/>
+        </a:xfrm>
+      </p:grpSpPr>
+      <p:sp>
+        <p:nvSpPr>
+          <p:cNvPr id="4" name="Rectángulo 3">
+            <a:extLst>
+              <a:ext uri="{FF2B5EF4-FFF2-40B4-BE49-F238E27FC236}">
+                <a16:creationId xmlns:a16="http://schemas.microsoft.com/office/drawing/2014/main" id="{14F7F12B-3121-4970-A5CD-FDFEA18F166E}"/>
+              </a:ext>
+            </a:extLst>
+          </p:cNvPr>
+          <p:cNvSpPr/>
+          <p:nvPr/>
+        </p:nvSpPr>
+        <p:spPr>
+          <a:xfrm>
+            <a:off x="581304" y="3350409"/>
+            <a:ext cx="994299" cy="843379"/>
+          </a:xfrm>
+          <a:prstGeom prst="rect">
+            <a:avLst/>
+          </a:prstGeom>
+          <a:solidFill>
+            <a:schemeClr val="bg1"/>
+          </a:solidFill>
+          <a:ln w="12700">
+            <a:solidFill>
+              <a:schemeClr val="tx1"/>
+            </a:solidFill>
+          </a:ln>
+        </p:spPr>
+        <p:style>
+          <a:lnRef idx="2">
+            <a:schemeClr val="accent1">
+              <a:shade val="50000"/>
+            </a:schemeClr>
+          </a:lnRef>
+          <a:fillRef idx="1">
+            <a:schemeClr val="accent1"/>
+          </a:fillRef>
+          <a:effectRef idx="0">
+            <a:schemeClr val="accent1"/>
+          </a:effectRef>
+          <a:fontRef idx="minor">
+            <a:schemeClr val="lt1"/>
+          </a:fontRef>
+        </p:style>
+        <p:txBody>
+          <a:bodyPr rtlCol="0" anchor="ctr"/>
+          <a:lstStyle/>
+          <a:p>
+            <a:pPr algn="ctr"/>
+            <a:r>
+              <a:rPr lang="es-ES" sz="1100" dirty="0">
+                <a:solidFill>
+                  <a:schemeClr val="tx1"/>
+                </a:solidFill>
+              </a:rPr>
+              <a:t>Mentores y mentorizados</a:t>
+            </a:r>
+          </a:p>
+        </p:txBody>
+      </p:sp>
+      <p:sp>
+        <p:nvSpPr>
+          <p:cNvPr id="9" name="Es igual a 8">
+            <a:extLst>
+              <a:ext uri="{FF2B5EF4-FFF2-40B4-BE49-F238E27FC236}">
+                <a16:creationId xmlns:a16="http://schemas.microsoft.com/office/drawing/2014/main" id="{0F257B7B-115D-4D5E-B1D3-ADD72286A28A}"/>
+              </a:ext>
+            </a:extLst>
+          </p:cNvPr>
+          <p:cNvSpPr/>
+          <p:nvPr/>
+        </p:nvSpPr>
+        <p:spPr>
+          <a:xfrm>
+            <a:off x="10106882" y="432854"/>
+            <a:ext cx="1819276" cy="967387"/>
+          </a:xfrm>
+          <a:prstGeom prst="mathEqual">
+            <a:avLst>
+              <a:gd name="adj1" fmla="val 0"/>
+              <a:gd name="adj2" fmla="val 52960"/>
+            </a:avLst>
+          </a:prstGeom>
+          <a:solidFill>
+            <a:schemeClr val="tx1"/>
+          </a:solidFill>
+          <a:ln w="0"/>
+        </p:spPr>
+        <p:style>
+          <a:lnRef idx="2">
+            <a:schemeClr val="accent1">
+              <a:shade val="50000"/>
+            </a:schemeClr>
+          </a:lnRef>
+          <a:fillRef idx="1">
+            <a:schemeClr val="accent1"/>
+          </a:fillRef>
+          <a:effectRef idx="0">
+            <a:schemeClr val="accent1"/>
+          </a:effectRef>
+          <a:fontRef idx="minor">
+            <a:schemeClr val="lt1"/>
+          </a:fontRef>
+        </p:style>
+        <p:txBody>
+          <a:bodyPr rtlCol="0" anchor="ctr"/>
+          <a:lstStyle/>
+          <a:p>
+            <a:pPr algn="ctr"/>
+            <a:r>
+              <a:rPr lang="es-ES" sz="1200" dirty="0">
+                <a:solidFill>
+                  <a:schemeClr val="tx1"/>
+                </a:solidFill>
+              </a:rPr>
+              <a:t>Usuarios</a:t>
+            </a:r>
+          </a:p>
+        </p:txBody>
+      </p:sp>
+      <p:sp>
+        <p:nvSpPr>
+          <p:cNvPr id="10" name="Es igual a 9">
+            <a:extLst>
+              <a:ext uri="{FF2B5EF4-FFF2-40B4-BE49-F238E27FC236}">
+                <a16:creationId xmlns:a16="http://schemas.microsoft.com/office/drawing/2014/main" id="{48231637-8356-4589-98F2-0BBB70845204}"/>
+              </a:ext>
+            </a:extLst>
+          </p:cNvPr>
+          <p:cNvSpPr/>
+          <p:nvPr/>
+        </p:nvSpPr>
+        <p:spPr>
+          <a:xfrm>
+            <a:off x="10098709" y="2491334"/>
+            <a:ext cx="1819276" cy="967387"/>
+          </a:xfrm>
+          <a:prstGeom prst="mathEqual">
+            <a:avLst>
+              <a:gd name="adj1" fmla="val 0"/>
+              <a:gd name="adj2" fmla="val 52960"/>
+            </a:avLst>
+          </a:prstGeom>
+          <a:solidFill>
+            <a:schemeClr val="tx1"/>
+          </a:solidFill>
+          <a:ln w="0"/>
+        </p:spPr>
+        <p:style>
+          <a:lnRef idx="2">
+            <a:schemeClr val="accent1">
+              <a:shade val="50000"/>
+            </a:schemeClr>
+          </a:lnRef>
+          <a:fillRef idx="1">
+            <a:schemeClr val="accent1"/>
+          </a:fillRef>
+          <a:effectRef idx="0">
+            <a:schemeClr val="accent1"/>
+          </a:effectRef>
+          <a:fontRef idx="minor">
+            <a:schemeClr val="lt1"/>
+          </a:fontRef>
+        </p:style>
+        <p:txBody>
+          <a:bodyPr rtlCol="0" anchor="ctr"/>
+          <a:lstStyle/>
+          <a:p>
+            <a:pPr algn="ctr"/>
+            <a:r>
+              <a:rPr lang="es-ES" sz="1200" dirty="0">
+                <a:solidFill>
+                  <a:schemeClr val="tx1"/>
+                </a:solidFill>
+              </a:rPr>
+              <a:t>Mensajes</a:t>
+            </a:r>
+          </a:p>
+        </p:txBody>
+      </p:sp>
+      <p:cxnSp>
+        <p:nvCxnSpPr>
+          <p:cNvPr id="12" name="Conector recto de flecha 11">
+            <a:extLst>
+              <a:ext uri="{FF2B5EF4-FFF2-40B4-BE49-F238E27FC236}">
+                <a16:creationId xmlns:a16="http://schemas.microsoft.com/office/drawing/2014/main" id="{5A797F23-89DA-4515-A9E9-38DB63D77AB5}"/>
+              </a:ext>
+            </a:extLst>
+          </p:cNvPr>
+          <p:cNvCxnSpPr>
+            <a:cxnSpLocks/>
+            <a:stCxn id="18" idx="3"/>
+            <a:endCxn id="10" idx="5"/>
+          </p:cNvCxnSpPr>
+          <p:nvPr/>
+        </p:nvCxnSpPr>
+        <p:spPr>
+          <a:xfrm>
+            <a:off x="9999201" y="2038835"/>
+            <a:ext cx="1009146" cy="680028"/>
+          </a:xfrm>
+          <a:prstGeom prst="straightConnector1">
+            <a:avLst/>
+          </a:prstGeom>
+          <a:ln>
+            <a:headEnd type="triangle"/>
+            <a:tailEnd type="triangle"/>
+          </a:ln>
+        </p:spPr>
+        <p:style>
+          <a:lnRef idx="1">
+            <a:schemeClr val="dk1"/>
+          </a:lnRef>
+          <a:fillRef idx="0">
+            <a:schemeClr val="dk1"/>
+          </a:fillRef>
+          <a:effectRef idx="0">
+            <a:schemeClr val="dk1"/>
+          </a:effectRef>
+          <a:fontRef idx="minor">
+            <a:schemeClr val="tx1"/>
+          </a:fontRef>
+        </p:style>
+      </p:cxnSp>
+      <p:cxnSp>
+        <p:nvCxnSpPr>
+          <p:cNvPr id="13" name="Conector recto de flecha 12">
+            <a:extLst>
+              <a:ext uri="{FF2B5EF4-FFF2-40B4-BE49-F238E27FC236}">
+                <a16:creationId xmlns:a16="http://schemas.microsoft.com/office/drawing/2014/main" id="{0E1641BB-1188-4E56-BA71-5E18849F0361}"/>
+              </a:ext>
+            </a:extLst>
+          </p:cNvPr>
+          <p:cNvCxnSpPr>
+            <a:cxnSpLocks/>
+            <a:stCxn id="18" idx="3"/>
+            <a:endCxn id="9" idx="2"/>
+          </p:cNvCxnSpPr>
+          <p:nvPr/>
+        </p:nvCxnSpPr>
+        <p:spPr>
+          <a:xfrm flipV="1">
+            <a:off x="9999201" y="1172712"/>
+            <a:ext cx="1017319" cy="866123"/>
+          </a:xfrm>
+          <a:prstGeom prst="straightConnector1">
+            <a:avLst/>
+          </a:prstGeom>
+          <a:ln>
+            <a:headEnd type="triangle"/>
+            <a:tailEnd type="triangle"/>
+          </a:ln>
+        </p:spPr>
+        <p:style>
+          <a:lnRef idx="1">
+            <a:schemeClr val="dk1"/>
+          </a:lnRef>
+          <a:fillRef idx="0">
+            <a:schemeClr val="dk1"/>
+          </a:fillRef>
+          <a:effectRef idx="0">
+            <a:schemeClr val="dk1"/>
+          </a:effectRef>
+          <a:fontRef idx="minor">
+            <a:schemeClr val="tx1"/>
+          </a:fontRef>
+        </p:style>
+      </p:cxnSp>
+      <p:cxnSp>
+        <p:nvCxnSpPr>
+          <p:cNvPr id="14" name="Conector recto de flecha 13">
+            <a:extLst>
+              <a:ext uri="{FF2B5EF4-FFF2-40B4-BE49-F238E27FC236}">
+                <a16:creationId xmlns:a16="http://schemas.microsoft.com/office/drawing/2014/main" id="{E381BCD1-D7FD-465D-A1AC-1B5BF53DF3FF}"/>
+              </a:ext>
+            </a:extLst>
+          </p:cNvPr>
+          <p:cNvCxnSpPr>
+            <a:cxnSpLocks/>
+            <a:stCxn id="4" idx="3"/>
+            <a:endCxn id="22" idx="1"/>
+          </p:cNvCxnSpPr>
+          <p:nvPr/>
+        </p:nvCxnSpPr>
+        <p:spPr>
+          <a:xfrm>
+            <a:off x="1575603" y="3772099"/>
+            <a:ext cx="882591" cy="1"/>
+          </a:xfrm>
+          <a:prstGeom prst="straightConnector1">
+            <a:avLst/>
+          </a:prstGeom>
+          <a:ln>
+            <a:headEnd type="triangle"/>
+            <a:tailEnd type="triangle"/>
+          </a:ln>
+        </p:spPr>
+        <p:style>
+          <a:lnRef idx="1">
+            <a:schemeClr val="dk1"/>
+          </a:lnRef>
+          <a:fillRef idx="0">
+            <a:schemeClr val="dk1"/>
+          </a:fillRef>
+          <a:effectRef idx="0">
+            <a:schemeClr val="dk1"/>
+          </a:effectRef>
+          <a:fontRef idx="minor">
+            <a:schemeClr val="tx1"/>
+          </a:fontRef>
+        </p:style>
+      </p:cxnSp>
+      <p:sp>
+        <p:nvSpPr>
+          <p:cNvPr id="11" name="Diagrama de flujo: almacenamiento interno 10">
+            <a:extLst>
+              <a:ext uri="{FF2B5EF4-FFF2-40B4-BE49-F238E27FC236}">
+                <a16:creationId xmlns:a16="http://schemas.microsoft.com/office/drawing/2014/main" id="{43A8E824-BC4E-495A-B10C-BD06903DCE27}"/>
+              </a:ext>
+            </a:extLst>
+          </p:cNvPr>
+          <p:cNvSpPr/>
+          <p:nvPr/>
+        </p:nvSpPr>
+        <p:spPr>
+          <a:xfrm>
+            <a:off x="5667934" y="2941279"/>
+            <a:ext cx="1571625" cy="1177589"/>
+          </a:xfrm>
+          <a:prstGeom prst="flowChartInternalStorage">
+            <a:avLst/>
+          </a:prstGeom>
+          <a:solidFill>
+            <a:schemeClr val="bg1"/>
+          </a:solidFill>
+          <a:ln>
+            <a:solidFill>
+              <a:schemeClr val="tx1"/>
+            </a:solidFill>
+          </a:ln>
+        </p:spPr>
+        <p:style>
+          <a:lnRef idx="2">
+            <a:schemeClr val="accent1">
+              <a:shade val="50000"/>
+            </a:schemeClr>
+          </a:lnRef>
+          <a:fillRef idx="1">
+            <a:schemeClr val="accent1"/>
+          </a:fillRef>
+          <a:effectRef idx="0">
+            <a:schemeClr val="accent1"/>
+          </a:effectRef>
+          <a:fontRef idx="minor">
+            <a:schemeClr val="lt1"/>
+          </a:fontRef>
+        </p:style>
+        <p:txBody>
+          <a:bodyPr rtlCol="0" anchor="t"/>
+          <a:lstStyle/>
+          <a:p>
+            <a:pPr algn="ctr"/>
+            <a:r>
+              <a:rPr lang="es-ES" sz="1200" dirty="0">
+                <a:solidFill>
+                  <a:schemeClr val="tx1"/>
+                </a:solidFill>
+              </a:rPr>
+              <a:t>&lt;&lt;Subsistema&gt;&gt;</a:t>
+            </a:r>
+          </a:p>
+          <a:p>
+            <a:pPr algn="ctr"/>
+            <a:r>
+              <a:rPr lang="es-ES" sz="1200" dirty="0">
+                <a:solidFill>
+                  <a:schemeClr val="tx1"/>
+                </a:solidFill>
+              </a:rPr>
+              <a:t>1.Gestión de usuarios</a:t>
+            </a:r>
+          </a:p>
+        </p:txBody>
+      </p:sp>
+      <p:sp>
+        <p:nvSpPr>
+          <p:cNvPr id="18" name="Diagrama de flujo: almacenamiento interno 17">
+            <a:extLst>
+              <a:ext uri="{FF2B5EF4-FFF2-40B4-BE49-F238E27FC236}">
+                <a16:creationId xmlns:a16="http://schemas.microsoft.com/office/drawing/2014/main" id="{66909D24-C713-47CA-BA2B-6A0D7D3E68C0}"/>
+              </a:ext>
+            </a:extLst>
+          </p:cNvPr>
+          <p:cNvSpPr/>
+          <p:nvPr/>
+        </p:nvSpPr>
+        <p:spPr>
+          <a:xfrm>
+            <a:off x="8427576" y="1450040"/>
+            <a:ext cx="1571625" cy="1177589"/>
+          </a:xfrm>
+          <a:prstGeom prst="flowChartInternalStorage">
+            <a:avLst/>
+          </a:prstGeom>
+          <a:solidFill>
+            <a:schemeClr val="bg1"/>
+          </a:solidFill>
+          <a:ln>
+            <a:solidFill>
+              <a:schemeClr val="tx1"/>
+            </a:solidFill>
+          </a:ln>
+        </p:spPr>
+        <p:style>
+          <a:lnRef idx="2">
+            <a:schemeClr val="accent1">
+              <a:shade val="50000"/>
+            </a:schemeClr>
+          </a:lnRef>
+          <a:fillRef idx="1">
+            <a:schemeClr val="accent1"/>
+          </a:fillRef>
+          <a:effectRef idx="0">
+            <a:schemeClr val="accent1"/>
+          </a:effectRef>
+          <a:fontRef idx="minor">
+            <a:schemeClr val="lt1"/>
+          </a:fontRef>
+        </p:style>
+        <p:txBody>
+          <a:bodyPr rtlCol="0" anchor="t"/>
+          <a:lstStyle/>
+          <a:p>
+            <a:pPr algn="ctr"/>
+            <a:r>
+              <a:rPr lang="es-ES" sz="1200" dirty="0">
+                <a:solidFill>
+                  <a:schemeClr val="tx1"/>
+                </a:solidFill>
+              </a:rPr>
+              <a:t>&lt;&lt;Subsistema&gt;&gt;</a:t>
+            </a:r>
+          </a:p>
+          <a:p>
+            <a:pPr algn="ctr"/>
+            <a:r>
+              <a:rPr lang="es-ES" sz="1200" dirty="0">
+                <a:solidFill>
+                  <a:schemeClr val="tx1"/>
+                </a:solidFill>
+              </a:rPr>
+              <a:t>2.Gestión de datos</a:t>
+            </a:r>
+          </a:p>
+        </p:txBody>
+      </p:sp>
+      <p:sp>
+        <p:nvSpPr>
+          <p:cNvPr id="20" name="Diagrama de flujo: almacenamiento interno 19">
+            <a:extLst>
+              <a:ext uri="{FF2B5EF4-FFF2-40B4-BE49-F238E27FC236}">
+                <a16:creationId xmlns:a16="http://schemas.microsoft.com/office/drawing/2014/main" id="{BF673DF3-8179-4251-8C34-A0D18F901D88}"/>
+              </a:ext>
+            </a:extLst>
+          </p:cNvPr>
+          <p:cNvSpPr/>
+          <p:nvPr/>
+        </p:nvSpPr>
+        <p:spPr>
+          <a:xfrm>
+            <a:off x="5667933" y="5125620"/>
+            <a:ext cx="1571625" cy="1177589"/>
+          </a:xfrm>
+          <a:prstGeom prst="flowChartInternalStorage">
+            <a:avLst/>
+          </a:prstGeom>
+          <a:solidFill>
+            <a:schemeClr val="bg1"/>
+          </a:solidFill>
+          <a:ln>
+            <a:solidFill>
+              <a:schemeClr val="tx1"/>
+            </a:solidFill>
+          </a:ln>
+        </p:spPr>
+        <p:style>
+          <a:lnRef idx="2">
+            <a:schemeClr val="accent1">
+              <a:shade val="50000"/>
+            </a:schemeClr>
+          </a:lnRef>
+          <a:fillRef idx="1">
+            <a:schemeClr val="accent1"/>
+          </a:fillRef>
+          <a:effectRef idx="0">
+            <a:schemeClr val="accent1"/>
+          </a:effectRef>
+          <a:fontRef idx="minor">
+            <a:schemeClr val="lt1"/>
+          </a:fontRef>
+        </p:style>
+        <p:txBody>
+          <a:bodyPr rtlCol="0" anchor="t"/>
+          <a:lstStyle/>
+          <a:p>
+            <a:pPr algn="ctr"/>
+            <a:r>
+              <a:rPr lang="es-ES" sz="1200" dirty="0">
+                <a:solidFill>
+                  <a:schemeClr val="tx1"/>
+                </a:solidFill>
+              </a:rPr>
+              <a:t>&lt;&lt;Subsistema&gt;&gt;</a:t>
+            </a:r>
+          </a:p>
+          <a:p>
+            <a:pPr algn="ctr"/>
+            <a:r>
+              <a:rPr lang="es-ES" sz="1200" dirty="0">
+                <a:solidFill>
+                  <a:schemeClr val="tx1"/>
+                </a:solidFill>
+              </a:rPr>
+              <a:t>4.Gestión de los chats</a:t>
+            </a:r>
+          </a:p>
+        </p:txBody>
+      </p:sp>
+      <p:sp>
+        <p:nvSpPr>
+          <p:cNvPr id="22" name="Diagrama de flujo: almacenamiento interno 21">
+            <a:extLst>
+              <a:ext uri="{FF2B5EF4-FFF2-40B4-BE49-F238E27FC236}">
+                <a16:creationId xmlns:a16="http://schemas.microsoft.com/office/drawing/2014/main" id="{0B444698-338A-4D5E-B783-3EB28FD99A57}"/>
+              </a:ext>
+            </a:extLst>
+          </p:cNvPr>
+          <p:cNvSpPr/>
+          <p:nvPr/>
+        </p:nvSpPr>
+        <p:spPr>
+          <a:xfrm>
+            <a:off x="2458194" y="3183305"/>
+            <a:ext cx="1571625" cy="1177589"/>
+          </a:xfrm>
+          <a:prstGeom prst="flowChartInternalStorage">
+            <a:avLst/>
+          </a:prstGeom>
+          <a:solidFill>
+            <a:schemeClr val="bg1"/>
+          </a:solidFill>
+          <a:ln>
+            <a:solidFill>
+              <a:schemeClr val="tx1"/>
+            </a:solidFill>
+          </a:ln>
+        </p:spPr>
+        <p:style>
+          <a:lnRef idx="2">
+            <a:schemeClr val="accent1">
+              <a:shade val="50000"/>
+            </a:schemeClr>
+          </a:lnRef>
+          <a:fillRef idx="1">
+            <a:schemeClr val="accent1"/>
+          </a:fillRef>
+          <a:effectRef idx="0">
+            <a:schemeClr val="accent1"/>
+          </a:effectRef>
+          <a:fontRef idx="minor">
+            <a:schemeClr val="lt1"/>
+          </a:fontRef>
+        </p:style>
+        <p:txBody>
+          <a:bodyPr rtlCol="0" anchor="t"/>
+          <a:lstStyle/>
+          <a:p>
+            <a:pPr algn="ctr"/>
+            <a:r>
+              <a:rPr lang="es-ES" sz="1200" dirty="0">
+                <a:solidFill>
+                  <a:schemeClr val="tx1"/>
+                </a:solidFill>
+              </a:rPr>
+              <a:t>&lt;&lt;Interfaz&gt;&gt;</a:t>
+            </a:r>
+          </a:p>
+          <a:p>
+            <a:pPr algn="ctr"/>
+            <a:r>
+              <a:rPr lang="es-ES" sz="1200" dirty="0">
+                <a:solidFill>
+                  <a:schemeClr val="tx1"/>
+                </a:solidFill>
+              </a:rPr>
+              <a:t>Usuarios</a:t>
+            </a:r>
+          </a:p>
+        </p:txBody>
+      </p:sp>
+      <p:cxnSp>
+        <p:nvCxnSpPr>
+          <p:cNvPr id="27" name="Conector recto de flecha 26">
+            <a:extLst>
+              <a:ext uri="{FF2B5EF4-FFF2-40B4-BE49-F238E27FC236}">
+                <a16:creationId xmlns:a16="http://schemas.microsoft.com/office/drawing/2014/main" id="{D0729A01-D722-4C4D-AE00-B0BAD0B2AE59}"/>
+              </a:ext>
+            </a:extLst>
+          </p:cNvPr>
+          <p:cNvCxnSpPr>
+            <a:cxnSpLocks/>
+            <a:stCxn id="11" idx="3"/>
+            <a:endCxn id="18" idx="1"/>
+          </p:cNvCxnSpPr>
+          <p:nvPr/>
+        </p:nvCxnSpPr>
+        <p:spPr>
+          <a:xfrm flipV="1">
+            <a:off x="7239559" y="2038835"/>
+            <a:ext cx="1188017" cy="1491239"/>
+          </a:xfrm>
+          <a:prstGeom prst="straightConnector1">
+            <a:avLst/>
+          </a:prstGeom>
+          <a:ln>
+            <a:headEnd type="triangle"/>
+            <a:tailEnd type="triangle"/>
+          </a:ln>
+        </p:spPr>
+        <p:style>
+          <a:lnRef idx="1">
+            <a:schemeClr val="dk1"/>
+          </a:lnRef>
+          <a:fillRef idx="0">
+            <a:schemeClr val="dk1"/>
+          </a:fillRef>
+          <a:effectRef idx="0">
+            <a:schemeClr val="dk1"/>
+          </a:effectRef>
+          <a:fontRef idx="minor">
+            <a:schemeClr val="tx1"/>
+          </a:fontRef>
+        </p:style>
+      </p:cxnSp>
+      <p:cxnSp>
+        <p:nvCxnSpPr>
+          <p:cNvPr id="30" name="Conector recto de flecha 29">
+            <a:extLst>
+              <a:ext uri="{FF2B5EF4-FFF2-40B4-BE49-F238E27FC236}">
+                <a16:creationId xmlns:a16="http://schemas.microsoft.com/office/drawing/2014/main" id="{79D59880-BD72-40A2-BCB9-7D9058E56F6F}"/>
+              </a:ext>
+            </a:extLst>
+          </p:cNvPr>
+          <p:cNvCxnSpPr>
+            <a:cxnSpLocks/>
+            <a:stCxn id="22" idx="3"/>
+            <a:endCxn id="20" idx="1"/>
+          </p:cNvCxnSpPr>
+          <p:nvPr/>
+        </p:nvCxnSpPr>
+        <p:spPr>
+          <a:xfrm>
+            <a:off x="4029819" y="3772100"/>
+            <a:ext cx="1638114" cy="1942315"/>
+          </a:xfrm>
+          <a:prstGeom prst="straightConnector1">
+            <a:avLst/>
+          </a:prstGeom>
+          <a:ln>
+            <a:headEnd type="triangle"/>
+            <a:tailEnd type="triangle"/>
+          </a:ln>
+        </p:spPr>
+        <p:style>
+          <a:lnRef idx="1">
+            <a:schemeClr val="dk1"/>
+          </a:lnRef>
+          <a:fillRef idx="0">
+            <a:schemeClr val="dk1"/>
+          </a:fillRef>
+          <a:effectRef idx="0">
+            <a:schemeClr val="dk1"/>
+          </a:effectRef>
+          <a:fontRef idx="minor">
+            <a:schemeClr val="tx1"/>
+          </a:fontRef>
+        </p:style>
+      </p:cxnSp>
+      <p:cxnSp>
+        <p:nvCxnSpPr>
+          <p:cNvPr id="33" name="Conector recto de flecha 32">
+            <a:extLst>
+              <a:ext uri="{FF2B5EF4-FFF2-40B4-BE49-F238E27FC236}">
+                <a16:creationId xmlns:a16="http://schemas.microsoft.com/office/drawing/2014/main" id="{11A5D5A2-13A9-4836-AB0B-2A24740776A7}"/>
+              </a:ext>
+            </a:extLst>
+          </p:cNvPr>
+          <p:cNvCxnSpPr>
+            <a:cxnSpLocks/>
+            <a:stCxn id="18" idx="2"/>
+            <a:endCxn id="20" idx="0"/>
+          </p:cNvCxnSpPr>
+          <p:nvPr/>
+        </p:nvCxnSpPr>
+        <p:spPr>
+          <a:xfrm flipH="1">
+            <a:off x="6453746" y="2627629"/>
+            <a:ext cx="2759643" cy="2497991"/>
+          </a:xfrm>
+          <a:prstGeom prst="straightConnector1">
+            <a:avLst/>
+          </a:prstGeom>
+          <a:ln>
+            <a:headEnd type="none"/>
+            <a:tailEnd type="triangle"/>
+          </a:ln>
+        </p:spPr>
+        <p:style>
+          <a:lnRef idx="1">
+            <a:schemeClr val="dk1"/>
+          </a:lnRef>
+          <a:fillRef idx="0">
+            <a:schemeClr val="dk1"/>
+          </a:fillRef>
+          <a:effectRef idx="0">
+            <a:schemeClr val="dk1"/>
+          </a:effectRef>
+          <a:fontRef idx="minor">
+            <a:schemeClr val="tx1"/>
+          </a:fontRef>
+        </p:style>
+      </p:cxnSp>
+      <p:sp>
+        <p:nvSpPr>
+          <p:cNvPr id="45" name="Rectángulo 44">
+            <a:extLst>
+              <a:ext uri="{FF2B5EF4-FFF2-40B4-BE49-F238E27FC236}">
+                <a16:creationId xmlns:a16="http://schemas.microsoft.com/office/drawing/2014/main" id="{0B2A8CB1-5276-4A7D-862E-0612D61F10B4}"/>
+              </a:ext>
+            </a:extLst>
+          </p:cNvPr>
+          <p:cNvSpPr/>
+          <p:nvPr/>
+        </p:nvSpPr>
+        <p:spPr>
+          <a:xfrm>
+            <a:off x="2264638" y="111462"/>
+            <a:ext cx="7779136" cy="6550757"/>
+          </a:xfrm>
+          <a:prstGeom prst="rect">
+            <a:avLst/>
+          </a:prstGeom>
+          <a:noFill/>
+          <a:ln w="12700">
+            <a:solidFill>
+              <a:schemeClr val="tx1"/>
+            </a:solidFill>
+            <a:prstDash val="dash"/>
+          </a:ln>
+        </p:spPr>
+        <p:style>
+          <a:lnRef idx="2">
+            <a:schemeClr val="accent1">
+              <a:shade val="50000"/>
+            </a:schemeClr>
+          </a:lnRef>
+          <a:fillRef idx="1">
+            <a:schemeClr val="accent1"/>
+          </a:fillRef>
+          <a:effectRef idx="0">
+            <a:schemeClr val="accent1"/>
+          </a:effectRef>
+          <a:fontRef idx="minor">
+            <a:schemeClr val="lt1"/>
+          </a:fontRef>
+        </p:style>
+        <p:txBody>
+          <a:bodyPr rtlCol="0" anchor="ctr"/>
+          <a:lstStyle/>
+          <a:p>
+            <a:pPr algn="ctr"/>
+            <a:endParaRPr lang="es-ES" sz="1100" dirty="0">
+              <a:solidFill>
+                <a:schemeClr val="tx1"/>
+              </a:solidFill>
+            </a:endParaRPr>
+          </a:p>
+        </p:txBody>
+      </p:sp>
+      <p:sp>
+        <p:nvSpPr>
+          <p:cNvPr id="48" name="Diagrama de flujo: almacenamiento interno 47">
+            <a:extLst>
+              <a:ext uri="{FF2B5EF4-FFF2-40B4-BE49-F238E27FC236}">
+                <a16:creationId xmlns:a16="http://schemas.microsoft.com/office/drawing/2014/main" id="{93DF2846-D755-4818-BB39-CB34065EB3E8}"/>
+              </a:ext>
+            </a:extLst>
+          </p:cNvPr>
+          <p:cNvSpPr/>
+          <p:nvPr/>
+        </p:nvSpPr>
+        <p:spPr>
+          <a:xfrm>
+            <a:off x="5695496" y="766734"/>
+            <a:ext cx="1571625" cy="1177589"/>
+          </a:xfrm>
+          <a:prstGeom prst="flowChartInternalStorage">
+            <a:avLst/>
+          </a:prstGeom>
+          <a:solidFill>
+            <a:schemeClr val="bg1"/>
+          </a:solidFill>
+          <a:ln>
+            <a:solidFill>
+              <a:schemeClr val="tx1"/>
+            </a:solidFill>
+          </a:ln>
+        </p:spPr>
+        <p:style>
+          <a:lnRef idx="2">
+            <a:schemeClr val="accent1">
+              <a:shade val="50000"/>
+            </a:schemeClr>
+          </a:lnRef>
+          <a:fillRef idx="1">
+            <a:schemeClr val="accent1"/>
+          </a:fillRef>
+          <a:effectRef idx="0">
+            <a:schemeClr val="accent1"/>
+          </a:effectRef>
+          <a:fontRef idx="minor">
+            <a:schemeClr val="lt1"/>
+          </a:fontRef>
+        </p:style>
+        <p:txBody>
+          <a:bodyPr rtlCol="0" anchor="t"/>
+          <a:lstStyle/>
+          <a:p>
+            <a:pPr algn="ctr"/>
+            <a:r>
+              <a:rPr lang="es-ES" sz="1200" dirty="0">
+                <a:solidFill>
+                  <a:schemeClr val="tx1"/>
+                </a:solidFill>
+              </a:rPr>
+              <a:t>&lt;&lt;Subsistema&gt;&gt;</a:t>
+            </a:r>
+          </a:p>
+          <a:p>
+            <a:pPr algn="ctr"/>
+            <a:r>
+              <a:rPr lang="es-ES" sz="1200" dirty="0">
+                <a:solidFill>
+                  <a:schemeClr val="tx1"/>
+                </a:solidFill>
+              </a:rPr>
+              <a:t>5.Gestión de ficheros</a:t>
+            </a:r>
+          </a:p>
+        </p:txBody>
+      </p:sp>
+      <p:cxnSp>
+        <p:nvCxnSpPr>
+          <p:cNvPr id="66" name="Conector recto de flecha 65">
+            <a:extLst>
+              <a:ext uri="{FF2B5EF4-FFF2-40B4-BE49-F238E27FC236}">
+                <a16:creationId xmlns:a16="http://schemas.microsoft.com/office/drawing/2014/main" id="{DEABE2FB-E2BC-4829-A907-09A4170EA9EE}"/>
+              </a:ext>
+            </a:extLst>
+          </p:cNvPr>
+          <p:cNvCxnSpPr>
+            <a:cxnSpLocks/>
+            <a:stCxn id="11" idx="1"/>
+            <a:endCxn id="22" idx="3"/>
+          </p:cNvCxnSpPr>
+          <p:nvPr/>
+        </p:nvCxnSpPr>
+        <p:spPr>
+          <a:xfrm flipH="1">
+            <a:off x="4029819" y="3530074"/>
+            <a:ext cx="1638115" cy="242026"/>
+          </a:xfrm>
+          <a:prstGeom prst="straightConnector1">
+            <a:avLst/>
+          </a:prstGeom>
+          <a:ln>
+            <a:headEnd type="triangle"/>
+            <a:tailEnd type="triangle"/>
+          </a:ln>
+        </p:spPr>
+        <p:style>
+          <a:lnRef idx="1">
+            <a:schemeClr val="dk1"/>
+          </a:lnRef>
+          <a:fillRef idx="0">
+            <a:schemeClr val="dk1"/>
+          </a:fillRef>
+          <a:effectRef idx="0">
+            <a:schemeClr val="dk1"/>
+          </a:effectRef>
+          <a:fontRef idx="minor">
+            <a:schemeClr val="tx1"/>
+          </a:fontRef>
+        </p:style>
+      </p:cxnSp>
+      <p:cxnSp>
+        <p:nvCxnSpPr>
+          <p:cNvPr id="81" name="Conector recto de flecha 80">
+            <a:extLst>
+              <a:ext uri="{FF2B5EF4-FFF2-40B4-BE49-F238E27FC236}">
+                <a16:creationId xmlns:a16="http://schemas.microsoft.com/office/drawing/2014/main" id="{85A275B3-9D06-4D73-86B8-F6A8A18824B9}"/>
+              </a:ext>
+            </a:extLst>
+          </p:cNvPr>
+          <p:cNvCxnSpPr>
+            <a:cxnSpLocks/>
+            <a:stCxn id="48" idx="1"/>
+            <a:endCxn id="22" idx="3"/>
+          </p:cNvCxnSpPr>
+          <p:nvPr/>
+        </p:nvCxnSpPr>
+        <p:spPr>
+          <a:xfrm flipH="1">
+            <a:off x="4029819" y="1355529"/>
+            <a:ext cx="1665677" cy="2416571"/>
+          </a:xfrm>
+          <a:prstGeom prst="straightConnector1">
+            <a:avLst/>
+          </a:prstGeom>
+          <a:ln>
+            <a:headEnd type="triangle"/>
+            <a:tailEnd type="triangle"/>
+          </a:ln>
+        </p:spPr>
+        <p:style>
+          <a:lnRef idx="1">
+            <a:schemeClr val="dk1"/>
+          </a:lnRef>
+          <a:fillRef idx="0">
+            <a:schemeClr val="dk1"/>
+          </a:fillRef>
+          <a:effectRef idx="0">
+            <a:schemeClr val="dk1"/>
+          </a:effectRef>
+          <a:fontRef idx="minor">
+            <a:schemeClr val="tx1"/>
+          </a:fontRef>
+        </p:style>
+      </p:cxnSp>
+      <p:sp>
+        <p:nvSpPr>
+          <p:cNvPr id="87" name="Rectángulo: esquina doblada 86">
+            <a:extLst>
+              <a:ext uri="{FF2B5EF4-FFF2-40B4-BE49-F238E27FC236}">
+                <a16:creationId xmlns:a16="http://schemas.microsoft.com/office/drawing/2014/main" id="{088D0337-6AF1-40EA-8AC4-C314CE87F1B9}"/>
+              </a:ext>
+            </a:extLst>
+          </p:cNvPr>
+          <p:cNvSpPr/>
+          <p:nvPr/>
+        </p:nvSpPr>
+        <p:spPr>
+          <a:xfrm rot="10800000">
+            <a:off x="8829035" y="354935"/>
+            <a:ext cx="581025" cy="676916"/>
+          </a:xfrm>
+          <a:prstGeom prst="foldedCorner">
+            <a:avLst>
+              <a:gd name="adj" fmla="val 24864"/>
+            </a:avLst>
+          </a:prstGeom>
+          <a:noFill/>
+        </p:spPr>
+        <p:style>
+          <a:lnRef idx="2">
+            <a:schemeClr val="dk1">
+              <a:shade val="50000"/>
+            </a:schemeClr>
+          </a:lnRef>
+          <a:fillRef idx="1">
+            <a:schemeClr val="dk1"/>
+          </a:fillRef>
+          <a:effectRef idx="0">
+            <a:schemeClr val="dk1"/>
+          </a:effectRef>
+          <a:fontRef idx="minor">
+            <a:schemeClr val="lt1"/>
+          </a:fontRef>
+        </p:style>
+        <p:txBody>
+          <a:bodyPr rtlCol="0" anchor="ctr"/>
+          <a:lstStyle/>
+          <a:p>
+            <a:pPr algn="ctr"/>
+            <a:endParaRPr lang="es-ES"/>
+          </a:p>
+        </p:txBody>
+      </p:sp>
+      <p:cxnSp>
+        <p:nvCxnSpPr>
+          <p:cNvPr id="88" name="Conector recto de flecha 87">
+            <a:extLst>
+              <a:ext uri="{FF2B5EF4-FFF2-40B4-BE49-F238E27FC236}">
+                <a16:creationId xmlns:a16="http://schemas.microsoft.com/office/drawing/2014/main" id="{DD2F3BD5-9FC0-413A-88A6-95514252EDC1}"/>
+              </a:ext>
+            </a:extLst>
+          </p:cNvPr>
+          <p:cNvCxnSpPr>
+            <a:cxnSpLocks/>
+            <a:stCxn id="87" idx="3"/>
+            <a:endCxn id="48" idx="3"/>
+          </p:cNvCxnSpPr>
+          <p:nvPr/>
+        </p:nvCxnSpPr>
+        <p:spPr>
+          <a:xfrm flipH="1">
+            <a:off x="7267121" y="693393"/>
+            <a:ext cx="1561914" cy="662136"/>
+          </a:xfrm>
+          <a:prstGeom prst="straightConnector1">
+            <a:avLst/>
+          </a:prstGeom>
+          <a:ln>
+            <a:headEnd type="triangle"/>
+            <a:tailEnd type="triangle"/>
+          </a:ln>
+        </p:spPr>
+        <p:style>
+          <a:lnRef idx="1">
+            <a:schemeClr val="dk1"/>
+          </a:lnRef>
+          <a:fillRef idx="0">
+            <a:schemeClr val="dk1"/>
+          </a:fillRef>
+          <a:effectRef idx="0">
+            <a:schemeClr val="dk1"/>
+          </a:effectRef>
+          <a:fontRef idx="minor">
+            <a:schemeClr val="tx1"/>
+          </a:fontRef>
+        </p:style>
+      </p:cxnSp>
+      <p:sp>
+        <p:nvSpPr>
+          <p:cNvPr id="91" name="CuadroTexto 90">
+            <a:extLst>
+              <a:ext uri="{FF2B5EF4-FFF2-40B4-BE49-F238E27FC236}">
+                <a16:creationId xmlns:a16="http://schemas.microsoft.com/office/drawing/2014/main" id="{A5E70198-9926-4736-A5F8-F1FA0924E7FF}"/>
+              </a:ext>
+            </a:extLst>
+          </p:cNvPr>
+          <p:cNvSpPr txBox="1"/>
+          <p:nvPr/>
+        </p:nvSpPr>
+        <p:spPr>
+          <a:xfrm>
+            <a:off x="8346552" y="1052506"/>
+            <a:ext cx="1762126" cy="276999"/>
+          </a:xfrm>
+          <a:prstGeom prst="rect">
+            <a:avLst/>
+          </a:prstGeom>
+          <a:noFill/>
+        </p:spPr>
+        <p:txBody>
+          <a:bodyPr wrap="square" rtlCol="0">
+            <a:spAutoFit/>
+          </a:bodyPr>
+          <a:lstStyle/>
+          <a:p>
+            <a:r>
+              <a:rPr lang="es-ES" sz="1200" dirty="0"/>
+              <a:t>Ficheros de los usuarios</a:t>
+            </a:r>
+          </a:p>
+        </p:txBody>
+      </p:sp>
+      <p:sp>
+        <p:nvSpPr>
+          <p:cNvPr id="92" name="CuadroTexto 91">
+            <a:extLst>
+              <a:ext uri="{FF2B5EF4-FFF2-40B4-BE49-F238E27FC236}">
+                <a16:creationId xmlns:a16="http://schemas.microsoft.com/office/drawing/2014/main" id="{F44B337A-2757-4C09-B0DB-945BFB73FC52}"/>
+              </a:ext>
+            </a:extLst>
+          </p:cNvPr>
+          <p:cNvSpPr txBox="1"/>
+          <p:nvPr/>
+        </p:nvSpPr>
+        <p:spPr>
+          <a:xfrm>
+            <a:off x="7784700" y="613186"/>
+            <a:ext cx="936325" cy="276999"/>
+          </a:xfrm>
+          <a:prstGeom prst="rect">
+            <a:avLst/>
+          </a:prstGeom>
+          <a:noFill/>
+        </p:spPr>
+        <p:txBody>
+          <a:bodyPr wrap="square" rtlCol="0">
+            <a:spAutoFit/>
+          </a:bodyPr>
+          <a:lstStyle/>
+          <a:p>
+            <a:r>
+              <a:rPr lang="es-ES" sz="1200" dirty="0"/>
+              <a:t>Ficheros</a:t>
+            </a:r>
+          </a:p>
+        </p:txBody>
+      </p:sp>
+      <p:sp>
+        <p:nvSpPr>
+          <p:cNvPr id="94" name="CuadroTexto 93">
+            <a:extLst>
+              <a:ext uri="{FF2B5EF4-FFF2-40B4-BE49-F238E27FC236}">
+                <a16:creationId xmlns:a16="http://schemas.microsoft.com/office/drawing/2014/main" id="{3920C25D-70C2-4579-AE72-9C8548AA62CE}"/>
+              </a:ext>
+            </a:extLst>
+          </p:cNvPr>
+          <p:cNvSpPr txBox="1"/>
+          <p:nvPr/>
+        </p:nvSpPr>
+        <p:spPr>
+          <a:xfrm>
+            <a:off x="7123964" y="1953096"/>
+            <a:ext cx="1298424" cy="276999"/>
+          </a:xfrm>
+          <a:prstGeom prst="rect">
+            <a:avLst/>
+          </a:prstGeom>
+          <a:noFill/>
+        </p:spPr>
+        <p:txBody>
+          <a:bodyPr wrap="square" rtlCol="0">
+            <a:spAutoFit/>
+          </a:bodyPr>
+          <a:lstStyle/>
+          <a:p>
+            <a:r>
+              <a:rPr lang="es-ES" sz="1200" dirty="0"/>
+              <a:t>Datos de usuarios</a:t>
+            </a:r>
+          </a:p>
+        </p:txBody>
+      </p:sp>
+      <p:sp>
+        <p:nvSpPr>
+          <p:cNvPr id="99" name="CuadroTexto 98">
+            <a:extLst>
+              <a:ext uri="{FF2B5EF4-FFF2-40B4-BE49-F238E27FC236}">
+                <a16:creationId xmlns:a16="http://schemas.microsoft.com/office/drawing/2014/main" id="{67B62028-F736-4EBD-8BBB-7FBDAFABEB8A}"/>
+              </a:ext>
+            </a:extLst>
+          </p:cNvPr>
+          <p:cNvSpPr txBox="1"/>
+          <p:nvPr/>
+        </p:nvSpPr>
+        <p:spPr>
+          <a:xfrm rot="19105473">
+            <a:off x="10069910" y="1503623"/>
+            <a:ext cx="1298424" cy="276999"/>
+          </a:xfrm>
+          <a:prstGeom prst="rect">
+            <a:avLst/>
+          </a:prstGeom>
+          <a:noFill/>
+        </p:spPr>
+        <p:txBody>
+          <a:bodyPr wrap="square" rtlCol="0">
+            <a:spAutoFit/>
+          </a:bodyPr>
+          <a:lstStyle/>
+          <a:p>
+            <a:r>
+              <a:rPr lang="es-ES" sz="1200" dirty="0"/>
+              <a:t>Datos de usuarios</a:t>
+            </a:r>
+          </a:p>
+        </p:txBody>
+      </p:sp>
+      <p:sp>
+        <p:nvSpPr>
+          <p:cNvPr id="100" name="CuadroTexto 99">
+            <a:extLst>
+              <a:ext uri="{FF2B5EF4-FFF2-40B4-BE49-F238E27FC236}">
+                <a16:creationId xmlns:a16="http://schemas.microsoft.com/office/drawing/2014/main" id="{BCE856EE-AE28-40D1-9B1C-3108DA0EE308}"/>
+              </a:ext>
+            </a:extLst>
+          </p:cNvPr>
+          <p:cNvSpPr txBox="1"/>
+          <p:nvPr/>
+        </p:nvSpPr>
+        <p:spPr>
+          <a:xfrm rot="18937200">
+            <a:off x="7558909" y="3097176"/>
+            <a:ext cx="1298424" cy="276999"/>
+          </a:xfrm>
+          <a:prstGeom prst="rect">
+            <a:avLst/>
+          </a:prstGeom>
+          <a:noFill/>
+        </p:spPr>
+        <p:txBody>
+          <a:bodyPr wrap="square" rtlCol="0">
+            <a:spAutoFit/>
+          </a:bodyPr>
+          <a:lstStyle/>
+          <a:p>
+            <a:r>
+              <a:rPr lang="es-ES" sz="1200" dirty="0"/>
+              <a:t>Datos de usuarios</a:t>
+            </a:r>
+          </a:p>
+        </p:txBody>
+      </p:sp>
+      <p:sp>
+        <p:nvSpPr>
+          <p:cNvPr id="104" name="CuadroTexto 103">
+            <a:extLst>
+              <a:ext uri="{FF2B5EF4-FFF2-40B4-BE49-F238E27FC236}">
+                <a16:creationId xmlns:a16="http://schemas.microsoft.com/office/drawing/2014/main" id="{45F8EE46-3663-4583-AAE7-EC23986629BF}"/>
+              </a:ext>
+            </a:extLst>
+          </p:cNvPr>
+          <p:cNvSpPr txBox="1"/>
+          <p:nvPr/>
+        </p:nvSpPr>
+        <p:spPr>
+          <a:xfrm rot="2056530">
+            <a:off x="10243079" y="2303467"/>
+            <a:ext cx="1298424" cy="276999"/>
+          </a:xfrm>
+          <a:prstGeom prst="rect">
+            <a:avLst/>
+          </a:prstGeom>
+          <a:noFill/>
+        </p:spPr>
+        <p:txBody>
+          <a:bodyPr wrap="square" rtlCol="0">
+            <a:spAutoFit/>
+          </a:bodyPr>
+          <a:lstStyle/>
+          <a:p>
+            <a:r>
+              <a:rPr lang="es-ES" sz="1200" dirty="0"/>
+              <a:t>Mensajes</a:t>
+            </a:r>
+          </a:p>
+        </p:txBody>
+      </p:sp>
+      <p:sp>
+        <p:nvSpPr>
+          <p:cNvPr id="117" name="CuadroTexto 116">
+            <a:extLst>
+              <a:ext uri="{FF2B5EF4-FFF2-40B4-BE49-F238E27FC236}">
+                <a16:creationId xmlns:a16="http://schemas.microsoft.com/office/drawing/2014/main" id="{D4CE8771-4F08-4FC8-8BC4-E67A33A795E8}"/>
+              </a:ext>
+            </a:extLst>
+          </p:cNvPr>
+          <p:cNvSpPr txBox="1"/>
+          <p:nvPr/>
+        </p:nvSpPr>
+        <p:spPr>
+          <a:xfrm rot="18408964">
+            <a:off x="4430531" y="2038054"/>
+            <a:ext cx="936325" cy="276999"/>
+          </a:xfrm>
+          <a:prstGeom prst="rect">
+            <a:avLst/>
+          </a:prstGeom>
+          <a:noFill/>
+        </p:spPr>
+        <p:txBody>
+          <a:bodyPr wrap="square" rtlCol="0">
+            <a:spAutoFit/>
+          </a:bodyPr>
+          <a:lstStyle/>
+          <a:p>
+            <a:r>
+              <a:rPr lang="es-ES" sz="1200" dirty="0"/>
+              <a:t>Ficheros</a:t>
+            </a:r>
+          </a:p>
+        </p:txBody>
+      </p:sp>
+      <p:sp>
+        <p:nvSpPr>
+          <p:cNvPr id="118" name="CuadroTexto 117">
+            <a:extLst>
+              <a:ext uri="{FF2B5EF4-FFF2-40B4-BE49-F238E27FC236}">
+                <a16:creationId xmlns:a16="http://schemas.microsoft.com/office/drawing/2014/main" id="{2EE21E99-B419-4DFB-AD66-D77F2F0BA910}"/>
+              </a:ext>
+            </a:extLst>
+          </p:cNvPr>
+          <p:cNvSpPr txBox="1"/>
+          <p:nvPr/>
+        </p:nvSpPr>
+        <p:spPr>
+          <a:xfrm rot="21238030">
+            <a:off x="4341948" y="3305380"/>
+            <a:ext cx="1298424" cy="276999"/>
+          </a:xfrm>
+          <a:prstGeom prst="rect">
+            <a:avLst/>
+          </a:prstGeom>
+          <a:noFill/>
+        </p:spPr>
+        <p:txBody>
+          <a:bodyPr wrap="square" rtlCol="0">
+            <a:spAutoFit/>
+          </a:bodyPr>
+          <a:lstStyle/>
+          <a:p>
+            <a:r>
+              <a:rPr lang="es-ES" sz="1200" dirty="0"/>
+              <a:t>Datos de usuarios</a:t>
+            </a:r>
+          </a:p>
+        </p:txBody>
+      </p:sp>
+      <p:sp>
+        <p:nvSpPr>
+          <p:cNvPr id="119" name="CuadroTexto 118">
+            <a:extLst>
+              <a:ext uri="{FF2B5EF4-FFF2-40B4-BE49-F238E27FC236}">
+                <a16:creationId xmlns:a16="http://schemas.microsoft.com/office/drawing/2014/main" id="{33196978-B3CF-4BC0-8684-EB3D35563799}"/>
+              </a:ext>
+            </a:extLst>
+          </p:cNvPr>
+          <p:cNvSpPr txBox="1"/>
+          <p:nvPr/>
+        </p:nvSpPr>
+        <p:spPr>
+          <a:xfrm rot="2858237">
+            <a:off x="4324184" y="4564851"/>
+            <a:ext cx="1298424" cy="276999"/>
+          </a:xfrm>
+          <a:prstGeom prst="rect">
+            <a:avLst/>
+          </a:prstGeom>
+          <a:noFill/>
+        </p:spPr>
+        <p:txBody>
+          <a:bodyPr wrap="square" rtlCol="0">
+            <a:spAutoFit/>
+          </a:bodyPr>
+          <a:lstStyle/>
+          <a:p>
+            <a:r>
+              <a:rPr lang="es-ES" sz="1200" dirty="0"/>
+              <a:t>Mensajes</a:t>
+            </a:r>
+          </a:p>
+        </p:txBody>
+      </p:sp>
+      <p:sp>
+        <p:nvSpPr>
+          <p:cNvPr id="46" name="Rectángulo 45">
+            <a:extLst>
+              <a:ext uri="{FF2B5EF4-FFF2-40B4-BE49-F238E27FC236}">
+                <a16:creationId xmlns:a16="http://schemas.microsoft.com/office/drawing/2014/main" id="{37BBCEFB-0BAF-4703-8C16-20547820C7C9}"/>
+              </a:ext>
+            </a:extLst>
+          </p:cNvPr>
+          <p:cNvSpPr/>
+          <p:nvPr/>
+        </p:nvSpPr>
+        <p:spPr>
+          <a:xfrm>
+            <a:off x="11008347" y="4137155"/>
+            <a:ext cx="994299" cy="843379"/>
+          </a:xfrm>
+          <a:prstGeom prst="rect">
+            <a:avLst/>
+          </a:prstGeom>
+          <a:solidFill>
+            <a:schemeClr val="bg1"/>
+          </a:solidFill>
+          <a:ln w="12700">
+            <a:solidFill>
+              <a:schemeClr val="tx1"/>
+            </a:solidFill>
+          </a:ln>
+        </p:spPr>
+        <p:style>
+          <a:lnRef idx="2">
+            <a:schemeClr val="accent1">
+              <a:shade val="50000"/>
+            </a:schemeClr>
+          </a:lnRef>
+          <a:fillRef idx="1">
+            <a:schemeClr val="accent1"/>
+          </a:fillRef>
+          <a:effectRef idx="0">
+            <a:schemeClr val="accent1"/>
+          </a:effectRef>
+          <a:fontRef idx="minor">
+            <a:schemeClr val="lt1"/>
+          </a:fontRef>
+        </p:style>
+        <p:txBody>
+          <a:bodyPr rtlCol="0" anchor="ctr"/>
+          <a:lstStyle/>
+          <a:p>
+            <a:pPr algn="ctr"/>
+            <a:r>
+              <a:rPr lang="es-ES" sz="1100" dirty="0">
+                <a:solidFill>
+                  <a:schemeClr val="tx1"/>
+                </a:solidFill>
+              </a:rPr>
+              <a:t>Correo Gmail de la aplicación</a:t>
+            </a:r>
+          </a:p>
+        </p:txBody>
+      </p:sp>
+      <p:sp>
+        <p:nvSpPr>
+          <p:cNvPr id="51" name="Diagrama de flujo: almacenamiento interno 50">
+            <a:extLst>
+              <a:ext uri="{FF2B5EF4-FFF2-40B4-BE49-F238E27FC236}">
+                <a16:creationId xmlns:a16="http://schemas.microsoft.com/office/drawing/2014/main" id="{2E51D576-9686-459E-BB91-A09E883C3807}"/>
+              </a:ext>
+            </a:extLst>
+          </p:cNvPr>
+          <p:cNvSpPr/>
+          <p:nvPr/>
+        </p:nvSpPr>
+        <p:spPr>
+          <a:xfrm>
+            <a:off x="8353009" y="3975558"/>
+            <a:ext cx="1571625" cy="1177589"/>
+          </a:xfrm>
+          <a:prstGeom prst="flowChartInternalStorage">
+            <a:avLst/>
+          </a:prstGeom>
+          <a:solidFill>
+            <a:schemeClr val="bg1"/>
+          </a:solidFill>
+          <a:ln>
+            <a:solidFill>
+              <a:schemeClr val="tx1"/>
+            </a:solidFill>
+          </a:ln>
+        </p:spPr>
+        <p:style>
+          <a:lnRef idx="2">
+            <a:schemeClr val="accent1">
+              <a:shade val="50000"/>
+            </a:schemeClr>
+          </a:lnRef>
+          <a:fillRef idx="1">
+            <a:schemeClr val="accent1"/>
+          </a:fillRef>
+          <a:effectRef idx="0">
+            <a:schemeClr val="accent1"/>
+          </a:effectRef>
+          <a:fontRef idx="minor">
+            <a:schemeClr val="lt1"/>
+          </a:fontRef>
+        </p:style>
+        <p:txBody>
+          <a:bodyPr rtlCol="0" anchor="t"/>
+          <a:lstStyle/>
+          <a:p>
+            <a:pPr algn="ctr"/>
+            <a:r>
+              <a:rPr lang="es-ES" sz="1200" dirty="0">
+                <a:solidFill>
+                  <a:schemeClr val="tx1"/>
+                </a:solidFill>
+              </a:rPr>
+              <a:t>&lt;&lt; Subsistema &gt;&gt;</a:t>
+            </a:r>
+          </a:p>
+          <a:p>
+            <a:pPr algn="ctr"/>
+            <a:r>
+              <a:rPr lang="es-ES" sz="1200" dirty="0">
+                <a:solidFill>
+                  <a:schemeClr val="tx1"/>
+                </a:solidFill>
+              </a:rPr>
+              <a:t>3.Gestión de la mensajería</a:t>
+            </a:r>
+          </a:p>
+        </p:txBody>
+      </p:sp>
+      <p:cxnSp>
+        <p:nvCxnSpPr>
+          <p:cNvPr id="52" name="Conector recto de flecha 51">
+            <a:extLst>
+              <a:ext uri="{FF2B5EF4-FFF2-40B4-BE49-F238E27FC236}">
+                <a16:creationId xmlns:a16="http://schemas.microsoft.com/office/drawing/2014/main" id="{269BE920-5B4D-40DF-A8C1-CF74579BCD2F}"/>
+              </a:ext>
+            </a:extLst>
+          </p:cNvPr>
+          <p:cNvCxnSpPr>
+            <a:cxnSpLocks/>
+            <a:stCxn id="51" idx="1"/>
+            <a:endCxn id="20" idx="3"/>
+          </p:cNvCxnSpPr>
+          <p:nvPr/>
+        </p:nvCxnSpPr>
+        <p:spPr>
+          <a:xfrm flipH="1">
+            <a:off x="7239558" y="4564353"/>
+            <a:ext cx="1113451" cy="1150062"/>
+          </a:xfrm>
+          <a:prstGeom prst="straightConnector1">
+            <a:avLst/>
+          </a:prstGeom>
+          <a:ln>
+            <a:headEnd type="triangle"/>
+            <a:tailEnd type="none"/>
+          </a:ln>
+        </p:spPr>
+        <p:style>
+          <a:lnRef idx="1">
+            <a:schemeClr val="dk1"/>
+          </a:lnRef>
+          <a:fillRef idx="0">
+            <a:schemeClr val="dk1"/>
+          </a:fillRef>
+          <a:effectRef idx="0">
+            <a:schemeClr val="dk1"/>
+          </a:effectRef>
+          <a:fontRef idx="minor">
+            <a:schemeClr val="tx1"/>
+          </a:fontRef>
+        </p:style>
+      </p:cxnSp>
+      <p:cxnSp>
+        <p:nvCxnSpPr>
+          <p:cNvPr id="64" name="Conector recto de flecha 63">
+            <a:extLst>
+              <a:ext uri="{FF2B5EF4-FFF2-40B4-BE49-F238E27FC236}">
+                <a16:creationId xmlns:a16="http://schemas.microsoft.com/office/drawing/2014/main" id="{7B98CBB9-0DF5-49C7-B2E0-E294F0344585}"/>
+              </a:ext>
+            </a:extLst>
+          </p:cNvPr>
+          <p:cNvCxnSpPr>
+            <a:cxnSpLocks/>
+            <a:stCxn id="51" idx="1"/>
+            <a:endCxn id="11" idx="3"/>
+          </p:cNvCxnSpPr>
+          <p:nvPr/>
+        </p:nvCxnSpPr>
+        <p:spPr>
+          <a:xfrm flipH="1" flipV="1">
+            <a:off x="7239559" y="3530074"/>
+            <a:ext cx="1113450" cy="1034279"/>
+          </a:xfrm>
+          <a:prstGeom prst="straightConnector1">
+            <a:avLst/>
+          </a:prstGeom>
+          <a:ln>
+            <a:headEnd type="triangle"/>
+            <a:tailEnd type="none"/>
+          </a:ln>
+        </p:spPr>
+        <p:style>
+          <a:lnRef idx="1">
+            <a:schemeClr val="dk1"/>
+          </a:lnRef>
+          <a:fillRef idx="0">
+            <a:schemeClr val="dk1"/>
+          </a:fillRef>
+          <a:effectRef idx="0">
+            <a:schemeClr val="dk1"/>
+          </a:effectRef>
+          <a:fontRef idx="minor">
+            <a:schemeClr val="tx1"/>
+          </a:fontRef>
+        </p:style>
+      </p:cxnSp>
+      <p:sp>
+        <p:nvSpPr>
+          <p:cNvPr id="70" name="CuadroTexto 69">
+            <a:extLst>
+              <a:ext uri="{FF2B5EF4-FFF2-40B4-BE49-F238E27FC236}">
+                <a16:creationId xmlns:a16="http://schemas.microsoft.com/office/drawing/2014/main" id="{49AC8758-01DD-4520-BCBE-0EF37F451B8D}"/>
+              </a:ext>
+            </a:extLst>
+          </p:cNvPr>
+          <p:cNvSpPr txBox="1"/>
+          <p:nvPr/>
+        </p:nvSpPr>
+        <p:spPr>
+          <a:xfrm>
+            <a:off x="7622995" y="4366453"/>
+            <a:ext cx="1298424" cy="461665"/>
+          </a:xfrm>
+          <a:prstGeom prst="rect">
+            <a:avLst/>
+          </a:prstGeom>
+          <a:noFill/>
+        </p:spPr>
+        <p:txBody>
+          <a:bodyPr wrap="square" rtlCol="0">
+            <a:spAutoFit/>
+          </a:bodyPr>
+          <a:lstStyle/>
+          <a:p>
+            <a:r>
+              <a:rPr lang="es-ES" sz="1200" dirty="0"/>
+              <a:t>Correo </a:t>
+            </a:r>
+          </a:p>
+          <a:p>
+            <a:r>
+              <a:rPr lang="es-ES" sz="1200" dirty="0"/>
+              <a:t>a enviar</a:t>
+            </a:r>
+          </a:p>
+        </p:txBody>
+      </p:sp>
+      <p:cxnSp>
+        <p:nvCxnSpPr>
+          <p:cNvPr id="72" name="Conector recto de flecha 71">
+            <a:extLst>
+              <a:ext uri="{FF2B5EF4-FFF2-40B4-BE49-F238E27FC236}">
+                <a16:creationId xmlns:a16="http://schemas.microsoft.com/office/drawing/2014/main" id="{EA210FD6-16FC-490B-9809-54EFCDCD6658}"/>
+              </a:ext>
+            </a:extLst>
+          </p:cNvPr>
+          <p:cNvCxnSpPr>
+            <a:cxnSpLocks/>
+            <a:stCxn id="46" idx="1"/>
+            <a:endCxn id="51" idx="3"/>
+          </p:cNvCxnSpPr>
+          <p:nvPr/>
+        </p:nvCxnSpPr>
+        <p:spPr>
+          <a:xfrm flipH="1">
+            <a:off x="9924634" y="4558845"/>
+            <a:ext cx="1083713" cy="5508"/>
+          </a:xfrm>
+          <a:prstGeom prst="straightConnector1">
+            <a:avLst/>
+          </a:prstGeom>
+          <a:ln>
+            <a:headEnd type="triangle"/>
+            <a:tailEnd type="none"/>
+          </a:ln>
+        </p:spPr>
+        <p:style>
+          <a:lnRef idx="1">
+            <a:schemeClr val="dk1"/>
+          </a:lnRef>
+          <a:fillRef idx="0">
+            <a:schemeClr val="dk1"/>
+          </a:fillRef>
+          <a:effectRef idx="0">
+            <a:schemeClr val="dk1"/>
+          </a:effectRef>
+          <a:fontRef idx="minor">
+            <a:schemeClr val="tx1"/>
+          </a:fontRef>
+        </p:style>
+      </p:cxnSp>
+      <p:sp>
+        <p:nvSpPr>
+          <p:cNvPr id="77" name="CuadroTexto 76">
+            <a:extLst>
+              <a:ext uri="{FF2B5EF4-FFF2-40B4-BE49-F238E27FC236}">
+                <a16:creationId xmlns:a16="http://schemas.microsoft.com/office/drawing/2014/main" id="{9B8C6A60-E16B-41FC-9553-6BC417491EAB}"/>
+              </a:ext>
+            </a:extLst>
+          </p:cNvPr>
+          <p:cNvSpPr txBox="1"/>
+          <p:nvPr/>
+        </p:nvSpPr>
+        <p:spPr>
+          <a:xfrm>
+            <a:off x="9969225" y="4584561"/>
+            <a:ext cx="1298424" cy="276999"/>
+          </a:xfrm>
+          <a:prstGeom prst="rect">
+            <a:avLst/>
+          </a:prstGeom>
+          <a:noFill/>
+        </p:spPr>
+        <p:txBody>
+          <a:bodyPr wrap="square" rtlCol="0">
+            <a:spAutoFit/>
+          </a:bodyPr>
+          <a:lstStyle/>
+          <a:p>
+            <a:r>
+              <a:rPr lang="es-ES" sz="1200" dirty="0"/>
+              <a:t>Correo a enviar</a:t>
+            </a:r>
+          </a:p>
+        </p:txBody>
+      </p:sp>
+      <p:cxnSp>
+        <p:nvCxnSpPr>
+          <p:cNvPr id="83" name="Conector recto de flecha 82">
+            <a:extLst>
+              <a:ext uri="{FF2B5EF4-FFF2-40B4-BE49-F238E27FC236}">
+                <a16:creationId xmlns:a16="http://schemas.microsoft.com/office/drawing/2014/main" id="{85AD3AB5-2035-6F15-07F7-FA1A8A45B991}"/>
+              </a:ext>
+            </a:extLst>
+          </p:cNvPr>
+          <p:cNvCxnSpPr>
+            <a:cxnSpLocks/>
+            <a:stCxn id="18" idx="1"/>
+            <a:endCxn id="48" idx="3"/>
+          </p:cNvCxnSpPr>
+          <p:nvPr/>
+        </p:nvCxnSpPr>
+        <p:spPr>
+          <a:xfrm flipH="1" flipV="1">
+            <a:off x="7267121" y="1355529"/>
+            <a:ext cx="1160455" cy="683306"/>
+          </a:xfrm>
+          <a:prstGeom prst="straightConnector1">
+            <a:avLst/>
+          </a:prstGeom>
+          <a:ln>
+            <a:headEnd type="triangle"/>
+            <a:tailEnd type="triangle"/>
+          </a:ln>
+        </p:spPr>
+        <p:style>
+          <a:lnRef idx="1">
+            <a:schemeClr val="dk1"/>
+          </a:lnRef>
+          <a:fillRef idx="0">
+            <a:schemeClr val="dk1"/>
+          </a:fillRef>
+          <a:effectRef idx="0">
+            <a:schemeClr val="dk1"/>
+          </a:effectRef>
+          <a:fontRef idx="minor">
+            <a:schemeClr val="tx1"/>
+          </a:fontRef>
+        </p:style>
+      </p:cxnSp>
+      <p:cxnSp>
+        <p:nvCxnSpPr>
+          <p:cNvPr id="103" name="Conector recto de flecha 102">
+            <a:extLst>
+              <a:ext uri="{FF2B5EF4-FFF2-40B4-BE49-F238E27FC236}">
+                <a16:creationId xmlns:a16="http://schemas.microsoft.com/office/drawing/2014/main" id="{F1A29B09-3911-BAA1-6A67-EAA98F1D4754}"/>
+              </a:ext>
+            </a:extLst>
+          </p:cNvPr>
+          <p:cNvCxnSpPr>
+            <a:cxnSpLocks/>
+            <a:stCxn id="20" idx="0"/>
+            <a:endCxn id="11" idx="2"/>
+          </p:cNvCxnSpPr>
+          <p:nvPr/>
+        </p:nvCxnSpPr>
+        <p:spPr>
+          <a:xfrm flipV="1">
+            <a:off x="6453746" y="4118868"/>
+            <a:ext cx="1" cy="1006752"/>
+          </a:xfrm>
+          <a:prstGeom prst="straightConnector1">
+            <a:avLst/>
+          </a:prstGeom>
+          <a:ln>
+            <a:headEnd type="triangle"/>
+            <a:tailEnd type="none"/>
+          </a:ln>
+        </p:spPr>
+        <p:style>
+          <a:lnRef idx="1">
+            <a:schemeClr val="dk1"/>
+          </a:lnRef>
+          <a:fillRef idx="0">
+            <a:schemeClr val="dk1"/>
+          </a:fillRef>
+          <a:effectRef idx="0">
+            <a:schemeClr val="dk1"/>
+          </a:effectRef>
+          <a:fontRef idx="minor">
+            <a:schemeClr val="tx1"/>
+          </a:fontRef>
+        </p:style>
+      </p:cxnSp>
+      <p:sp>
+        <p:nvSpPr>
+          <p:cNvPr id="105" name="CuadroTexto 104">
+            <a:extLst>
+              <a:ext uri="{FF2B5EF4-FFF2-40B4-BE49-F238E27FC236}">
+                <a16:creationId xmlns:a16="http://schemas.microsoft.com/office/drawing/2014/main" id="{E19BBF5F-FDF2-7D59-F068-BCCDB8B4B558}"/>
+              </a:ext>
+            </a:extLst>
+          </p:cNvPr>
+          <p:cNvSpPr txBox="1"/>
+          <p:nvPr/>
+        </p:nvSpPr>
+        <p:spPr>
+          <a:xfrm>
+            <a:off x="6423422" y="4056063"/>
+            <a:ext cx="1298424" cy="461665"/>
+          </a:xfrm>
+          <a:prstGeom prst="rect">
+            <a:avLst/>
+          </a:prstGeom>
+          <a:noFill/>
+        </p:spPr>
+        <p:txBody>
+          <a:bodyPr wrap="square" rtlCol="0">
+            <a:spAutoFit/>
+          </a:bodyPr>
+          <a:lstStyle/>
+          <a:p>
+            <a:r>
+              <a:rPr lang="es-ES" sz="1200" dirty="0"/>
+              <a:t>Apertura/cierre de chats</a:t>
+            </a:r>
+          </a:p>
+        </p:txBody>
+      </p:sp>
+      <p:sp>
+        <p:nvSpPr>
+          <p:cNvPr id="40" name="CuadroTexto 39">
+            <a:extLst>
+              <a:ext uri="{FF2B5EF4-FFF2-40B4-BE49-F238E27FC236}">
+                <a16:creationId xmlns:a16="http://schemas.microsoft.com/office/drawing/2014/main" id="{096755AA-D543-1C6C-657C-B7C30CF52ABC}"/>
+              </a:ext>
+            </a:extLst>
+          </p:cNvPr>
+          <p:cNvSpPr txBox="1"/>
+          <p:nvPr/>
+        </p:nvSpPr>
+        <p:spPr>
+          <a:xfrm rot="19064998">
+            <a:off x="8159871" y="3105444"/>
+            <a:ext cx="1826488" cy="276999"/>
+          </a:xfrm>
+          <a:prstGeom prst="rect">
+            <a:avLst/>
+          </a:prstGeom>
+          <a:noFill/>
+        </p:spPr>
+        <p:txBody>
+          <a:bodyPr wrap="square" rtlCol="0">
+            <a:spAutoFit/>
+          </a:bodyPr>
+          <a:lstStyle/>
+          <a:p>
+            <a:r>
+              <a:rPr lang="es-ES" sz="1200" dirty="0"/>
+              <a:t>Mensajes y notificaciones</a:t>
+            </a:r>
+          </a:p>
+        </p:txBody>
+      </p:sp>
+      <p:cxnSp>
+        <p:nvCxnSpPr>
+          <p:cNvPr id="41" name="Conector recto de flecha 40">
+            <a:extLst>
+              <a:ext uri="{FF2B5EF4-FFF2-40B4-BE49-F238E27FC236}">
+                <a16:creationId xmlns:a16="http://schemas.microsoft.com/office/drawing/2014/main" id="{D3E1EE3C-1B38-8AEE-5FB2-DAA17D095CFD}"/>
+              </a:ext>
+            </a:extLst>
+          </p:cNvPr>
+          <p:cNvCxnSpPr>
+            <a:cxnSpLocks/>
+          </p:cNvCxnSpPr>
+          <p:nvPr/>
+        </p:nvCxnSpPr>
+        <p:spPr>
+          <a:xfrm flipH="1">
+            <a:off x="6745549" y="2619556"/>
+            <a:ext cx="2759643" cy="2497991"/>
+          </a:xfrm>
+          <a:prstGeom prst="straightConnector1">
+            <a:avLst/>
+          </a:prstGeom>
+          <a:ln>
+            <a:headEnd type="triangle" w="med" len="med"/>
+            <a:tailEnd type="triangle" w="med" len="med"/>
+          </a:ln>
+        </p:spPr>
+        <p:style>
+          <a:lnRef idx="1">
+            <a:schemeClr val="dk1"/>
+          </a:lnRef>
+          <a:fillRef idx="0">
+            <a:schemeClr val="dk1"/>
+          </a:fillRef>
+          <a:effectRef idx="0">
+            <a:schemeClr val="dk1"/>
+          </a:effectRef>
+          <a:fontRef idx="minor">
+            <a:schemeClr val="tx1"/>
+          </a:fontRef>
+        </p:style>
+      </p:cxnSp>
+      <p:cxnSp>
+        <p:nvCxnSpPr>
+          <p:cNvPr id="49" name="Conector recto de flecha 48">
+            <a:extLst>
+              <a:ext uri="{FF2B5EF4-FFF2-40B4-BE49-F238E27FC236}">
+                <a16:creationId xmlns:a16="http://schemas.microsoft.com/office/drawing/2014/main" id="{6A8975E7-EB7C-9737-9A97-4850B5236ED8}"/>
+              </a:ext>
+            </a:extLst>
+          </p:cNvPr>
+          <p:cNvCxnSpPr>
+            <a:cxnSpLocks/>
+          </p:cNvCxnSpPr>
+          <p:nvPr/>
+        </p:nvCxnSpPr>
+        <p:spPr>
+          <a:xfrm>
+            <a:off x="4029819" y="4064259"/>
+            <a:ext cx="1638114" cy="1942315"/>
+          </a:xfrm>
+          <a:prstGeom prst="straightConnector1">
+            <a:avLst/>
+          </a:prstGeom>
+          <a:ln>
+            <a:headEnd type="triangle" w="med" len="med"/>
+            <a:tailEnd type="none" w="med" len="med"/>
+          </a:ln>
+        </p:spPr>
+        <p:style>
+          <a:lnRef idx="1">
+            <a:schemeClr val="dk1"/>
+          </a:lnRef>
+          <a:fillRef idx="0">
+            <a:schemeClr val="dk1"/>
+          </a:fillRef>
+          <a:effectRef idx="0">
+            <a:schemeClr val="dk1"/>
+          </a:effectRef>
+          <a:fontRef idx="minor">
+            <a:schemeClr val="tx1"/>
+          </a:fontRef>
+        </p:style>
+      </p:cxnSp>
+      <p:sp>
+        <p:nvSpPr>
+          <p:cNvPr id="50" name="CuadroTexto 49">
+            <a:extLst>
+              <a:ext uri="{FF2B5EF4-FFF2-40B4-BE49-F238E27FC236}">
+                <a16:creationId xmlns:a16="http://schemas.microsoft.com/office/drawing/2014/main" id="{A6467F02-7BD6-C0F4-61B1-864AFBA5797B}"/>
+              </a:ext>
+            </a:extLst>
+          </p:cNvPr>
+          <p:cNvSpPr txBox="1"/>
+          <p:nvPr/>
+        </p:nvSpPr>
+        <p:spPr>
+          <a:xfrm rot="2858237">
+            <a:off x="4147134" y="4979048"/>
+            <a:ext cx="1298424" cy="276999"/>
+          </a:xfrm>
+          <a:prstGeom prst="rect">
+            <a:avLst/>
+          </a:prstGeom>
+          <a:noFill/>
+        </p:spPr>
+        <p:txBody>
+          <a:bodyPr wrap="square" rtlCol="0">
+            <a:spAutoFit/>
+          </a:bodyPr>
+          <a:lstStyle/>
+          <a:p>
+            <a:r>
+              <a:rPr lang="es-ES" sz="1200" dirty="0"/>
+              <a:t>Notificaciones</a:t>
+            </a:r>
+          </a:p>
+        </p:txBody>
+      </p:sp>
+      <p:sp>
+        <p:nvSpPr>
+          <p:cNvPr id="54" name="CuadroTexto 53">
+            <a:extLst>
+              <a:ext uri="{FF2B5EF4-FFF2-40B4-BE49-F238E27FC236}">
+                <a16:creationId xmlns:a16="http://schemas.microsoft.com/office/drawing/2014/main" id="{22A06D19-57E7-E59D-CFEB-CC6BAB4C0EAF}"/>
+              </a:ext>
+            </a:extLst>
+          </p:cNvPr>
+          <p:cNvSpPr txBox="1"/>
+          <p:nvPr/>
+        </p:nvSpPr>
+        <p:spPr>
+          <a:xfrm>
+            <a:off x="5305529" y="4129176"/>
+            <a:ext cx="1298424" cy="461665"/>
+          </a:xfrm>
+          <a:prstGeom prst="rect">
+            <a:avLst/>
+          </a:prstGeom>
+          <a:noFill/>
+        </p:spPr>
+        <p:txBody>
+          <a:bodyPr wrap="square" rtlCol="0">
+            <a:spAutoFit/>
+          </a:bodyPr>
+          <a:lstStyle/>
+          <a:p>
+            <a:r>
+              <a:rPr lang="es-ES" sz="1200" dirty="0"/>
+              <a:t>Notificaciones a enviar</a:t>
+            </a:r>
+          </a:p>
+        </p:txBody>
+      </p:sp>
+    </p:spTree>
+    <p:extLst>
+      <p:ext uri="{BB962C8B-B14F-4D97-AF65-F5344CB8AC3E}">
+        <p14:creationId xmlns:p14="http://schemas.microsoft.com/office/powerpoint/2010/main" val="1026304390"/>
+      </p:ext>
+    </p:extLst>
+  </p:cSld>
+  <p:clrMapOvr>
+    <a:masterClrMapping/>
+  </p:clrMapOvr>
+</p:sld>
+</file>
+
+<file path=ppt/slides/slide7.xml><?xml version="1.0" encoding="utf-8"?>
 <p:sld xmlns:a="http://schemas.openxmlformats.org/drawingml/2006/main" xmlns:r="http://schemas.openxmlformats.org/officeDocument/2006/relationships" xmlns:p="http://schemas.openxmlformats.org/presentationml/2006/main">
   <p:cSld>
     <p:spTree>
@@ -10486,7 +13361,7 @@
 </p:sld>
 </file>
 
-<file path=ppt/slides/slide6.xml><?xml version="1.0" encoding="utf-8"?>
+<file path=ppt/slides/slide8.xml><?xml version="1.0" encoding="utf-8"?>
 <p:sld xmlns:a="http://schemas.openxmlformats.org/drawingml/2006/main" xmlns:r="http://schemas.openxmlformats.org/officeDocument/2006/relationships" xmlns:p="http://schemas.openxmlformats.org/presentationml/2006/main">
   <p:cSld>
     <p:bg>
@@ -10596,7 +13471,7 @@
 </p:sld>
 </file>
 
-<file path=ppt/slides/slide7.xml><?xml version="1.0" encoding="utf-8"?>
+<file path=ppt/slides/slide9.xml><?xml version="1.0" encoding="utf-8"?>
 <p:sld xmlns:a="http://schemas.openxmlformats.org/drawingml/2006/main" xmlns:r="http://schemas.openxmlformats.org/officeDocument/2006/relationships" xmlns:p="http://schemas.openxmlformats.org/presentationml/2006/main">
   <p:cSld>
     <p:spTree>
@@ -11601,10 +14476,10 @@
       </p:sp>
       <p:sp>
         <p:nvSpPr>
-          <p:cNvPr id="26" name="Círculo: vacío 25">
-            <a:extLst>
-              <a:ext uri="{FF2B5EF4-FFF2-40B4-BE49-F238E27FC236}">
-                <a16:creationId xmlns:a16="http://schemas.microsoft.com/office/drawing/2014/main" id="{295FBAFE-E185-481B-F499-0CE71B83832D}"/>
+          <p:cNvPr id="27" name="Círculo: vacío 26">
+            <a:extLst>
+              <a:ext uri="{FF2B5EF4-FFF2-40B4-BE49-F238E27FC236}">
+                <a16:creationId xmlns:a16="http://schemas.microsoft.com/office/drawing/2014/main" id="{5DD98A11-7342-C432-A7F5-462234B22F93}"/>
               </a:ext>
             </a:extLst>
           </p:cNvPr>
@@ -11613,7 +14488,7 @@
         </p:nvSpPr>
         <p:spPr>
           <a:xfrm>
-            <a:off x="1673512" y="409575"/>
+            <a:off x="2046510" y="1337511"/>
             <a:ext cx="275208" cy="301841"/>
           </a:xfrm>
           <a:prstGeom prst="donut">
@@ -11654,10 +14529,10 @@
       </p:sp>
       <p:sp>
         <p:nvSpPr>
-          <p:cNvPr id="27" name="Círculo: vacío 26">
-            <a:extLst>
-              <a:ext uri="{FF2B5EF4-FFF2-40B4-BE49-F238E27FC236}">
-                <a16:creationId xmlns:a16="http://schemas.microsoft.com/office/drawing/2014/main" id="{5DD98A11-7342-C432-A7F5-462234B22F93}"/>
+          <p:cNvPr id="28" name="Círculo: vacío 27">
+            <a:extLst>
+              <a:ext uri="{FF2B5EF4-FFF2-40B4-BE49-F238E27FC236}">
+                <a16:creationId xmlns:a16="http://schemas.microsoft.com/office/drawing/2014/main" id="{991805F0-C61F-A597-6CBF-39D9B81B3895}"/>
               </a:ext>
             </a:extLst>
           </p:cNvPr>
@@ -11666,7 +14541,7 @@
         </p:nvSpPr>
         <p:spPr>
           <a:xfrm>
-            <a:off x="2046510" y="1337511"/>
+            <a:off x="2046510" y="2518443"/>
             <a:ext cx="275208" cy="301841"/>
           </a:xfrm>
           <a:prstGeom prst="donut">
@@ -11707,10 +14582,10 @@
       </p:sp>
       <p:sp>
         <p:nvSpPr>
-          <p:cNvPr id="28" name="Círculo: vacío 27">
-            <a:extLst>
-              <a:ext uri="{FF2B5EF4-FFF2-40B4-BE49-F238E27FC236}">
-                <a16:creationId xmlns:a16="http://schemas.microsoft.com/office/drawing/2014/main" id="{991805F0-C61F-A597-6CBF-39D9B81B3895}"/>
+          <p:cNvPr id="29" name="Círculo: vacío 28">
+            <a:extLst>
+              <a:ext uri="{FF2B5EF4-FFF2-40B4-BE49-F238E27FC236}">
+                <a16:creationId xmlns:a16="http://schemas.microsoft.com/office/drawing/2014/main" id="{03620EA9-8E0B-6896-AEDF-A9B74F8BFF50}"/>
               </a:ext>
             </a:extLst>
           </p:cNvPr>
@@ -11719,7 +14594,7 @@
         </p:nvSpPr>
         <p:spPr>
           <a:xfrm>
-            <a:off x="2046510" y="2518443"/>
+            <a:off x="1815021" y="2979707"/>
             <a:ext cx="275208" cy="301841"/>
           </a:xfrm>
           <a:prstGeom prst="donut">
@@ -11760,10 +14635,10 @@
       </p:sp>
       <p:sp>
         <p:nvSpPr>
-          <p:cNvPr id="29" name="Círculo: vacío 28">
-            <a:extLst>
-              <a:ext uri="{FF2B5EF4-FFF2-40B4-BE49-F238E27FC236}">
-                <a16:creationId xmlns:a16="http://schemas.microsoft.com/office/drawing/2014/main" id="{03620EA9-8E0B-6896-AEDF-A9B74F8BFF50}"/>
+          <p:cNvPr id="30" name="Círculo: vacío 29">
+            <a:extLst>
+              <a:ext uri="{FF2B5EF4-FFF2-40B4-BE49-F238E27FC236}">
+                <a16:creationId xmlns:a16="http://schemas.microsoft.com/office/drawing/2014/main" id="{7FCAB538-25F9-FFC2-4A7C-BF3D078906EB}"/>
               </a:ext>
             </a:extLst>
           </p:cNvPr>
@@ -11772,7 +14647,7 @@
         </p:nvSpPr>
         <p:spPr>
           <a:xfrm>
-            <a:off x="1815021" y="2979707"/>
+            <a:off x="1668611" y="3702220"/>
             <a:ext cx="275208" cy="301841"/>
           </a:xfrm>
           <a:prstGeom prst="donut">
@@ -11813,10 +14688,10 @@
       </p:sp>
       <p:sp>
         <p:nvSpPr>
-          <p:cNvPr id="30" name="Círculo: vacío 29">
-            <a:extLst>
-              <a:ext uri="{FF2B5EF4-FFF2-40B4-BE49-F238E27FC236}">
-                <a16:creationId xmlns:a16="http://schemas.microsoft.com/office/drawing/2014/main" id="{7FCAB538-25F9-FFC2-4A7C-BF3D078906EB}"/>
+          <p:cNvPr id="31" name="Círculo: vacío 30">
+            <a:extLst>
+              <a:ext uri="{FF2B5EF4-FFF2-40B4-BE49-F238E27FC236}">
+                <a16:creationId xmlns:a16="http://schemas.microsoft.com/office/drawing/2014/main" id="{5E0238D1-3758-2051-4DF8-82AB466D8763}"/>
               </a:ext>
             </a:extLst>
           </p:cNvPr>
@@ -11825,7 +14700,7 @@
         </p:nvSpPr>
         <p:spPr>
           <a:xfrm>
-            <a:off x="1668611" y="3702220"/>
+            <a:off x="1694642" y="4749553"/>
             <a:ext cx="275208" cy="301841"/>
           </a:xfrm>
           <a:prstGeom prst="donut">
@@ -11866,10 +14741,10 @@
       </p:sp>
       <p:sp>
         <p:nvSpPr>
-          <p:cNvPr id="31" name="Círculo: vacío 30">
-            <a:extLst>
-              <a:ext uri="{FF2B5EF4-FFF2-40B4-BE49-F238E27FC236}">
-                <a16:creationId xmlns:a16="http://schemas.microsoft.com/office/drawing/2014/main" id="{5E0238D1-3758-2051-4DF8-82AB466D8763}"/>
+          <p:cNvPr id="32" name="Círculo: vacío 31">
+            <a:extLst>
+              <a:ext uri="{FF2B5EF4-FFF2-40B4-BE49-F238E27FC236}">
+                <a16:creationId xmlns:a16="http://schemas.microsoft.com/office/drawing/2014/main" id="{DD5DEB2F-3FA4-887F-F3C9-6F26B371DA4F}"/>
               </a:ext>
             </a:extLst>
           </p:cNvPr>
@@ -11878,14 +14753,14 @@
         </p:nvSpPr>
         <p:spPr>
           <a:xfrm>
-            <a:off x="1694642" y="4749553"/>
+            <a:off x="2478593" y="2610892"/>
             <a:ext cx="275208" cy="301841"/>
           </a:xfrm>
           <a:prstGeom prst="donut">
             <a:avLst/>
           </a:prstGeom>
           <a:solidFill>
-            <a:srgbClr val="002060"/>
+            <a:srgbClr val="00B0F0"/>
           </a:solidFill>
         </p:spPr>
         <p:style>
@@ -11919,10 +14794,10 @@
       </p:sp>
       <p:sp>
         <p:nvSpPr>
-          <p:cNvPr id="32" name="Círculo: vacío 31">
-            <a:extLst>
-              <a:ext uri="{FF2B5EF4-FFF2-40B4-BE49-F238E27FC236}">
-                <a16:creationId xmlns:a16="http://schemas.microsoft.com/office/drawing/2014/main" id="{DD5DEB2F-3FA4-887F-F3C9-6F26B371DA4F}"/>
+          <p:cNvPr id="33" name="Círculo: vacío 32">
+            <a:extLst>
+              <a:ext uri="{FF2B5EF4-FFF2-40B4-BE49-F238E27FC236}">
+                <a16:creationId xmlns:a16="http://schemas.microsoft.com/office/drawing/2014/main" id="{B26844D8-8B0D-2F2D-4652-08BA80F76731}"/>
               </a:ext>
             </a:extLst>
           </p:cNvPr>
@@ -11931,7 +14806,7 @@
         </p:nvSpPr>
         <p:spPr>
           <a:xfrm>
-            <a:off x="2478593" y="2610892"/>
+            <a:off x="2764367" y="3583617"/>
             <a:ext cx="275208" cy="301841"/>
           </a:xfrm>
           <a:prstGeom prst="donut">
@@ -11972,10 +14847,10 @@
       </p:sp>
       <p:sp>
         <p:nvSpPr>
-          <p:cNvPr id="33" name="Círculo: vacío 32">
-            <a:extLst>
-              <a:ext uri="{FF2B5EF4-FFF2-40B4-BE49-F238E27FC236}">
-                <a16:creationId xmlns:a16="http://schemas.microsoft.com/office/drawing/2014/main" id="{B26844D8-8B0D-2F2D-4652-08BA80F76731}"/>
+          <p:cNvPr id="34" name="Círculo: vacío 33">
+            <a:extLst>
+              <a:ext uri="{FF2B5EF4-FFF2-40B4-BE49-F238E27FC236}">
+                <a16:creationId xmlns:a16="http://schemas.microsoft.com/office/drawing/2014/main" id="{D9D64F15-D1D0-F56F-D918-54DE4B8735FA}"/>
               </a:ext>
             </a:extLst>
           </p:cNvPr>
@@ -11984,7 +14859,7 @@
         </p:nvSpPr>
         <p:spPr>
           <a:xfrm>
-            <a:off x="2764367" y="3583617"/>
+            <a:off x="3156024" y="4581109"/>
             <a:ext cx="275208" cy="301841"/>
           </a:xfrm>
           <a:prstGeom prst="donut">
@@ -12025,10 +14900,10 @@
       </p:sp>
       <p:sp>
         <p:nvSpPr>
-          <p:cNvPr id="34" name="Círculo: vacío 33">
-            <a:extLst>
-              <a:ext uri="{FF2B5EF4-FFF2-40B4-BE49-F238E27FC236}">
-                <a16:creationId xmlns:a16="http://schemas.microsoft.com/office/drawing/2014/main" id="{D9D64F15-D1D0-F56F-D918-54DE4B8735FA}"/>
+          <p:cNvPr id="35" name="Círculo: vacío 34">
+            <a:extLst>
+              <a:ext uri="{FF2B5EF4-FFF2-40B4-BE49-F238E27FC236}">
+                <a16:creationId xmlns:a16="http://schemas.microsoft.com/office/drawing/2014/main" id="{1DD610F1-22D5-F79C-66F8-98B58B01C001}"/>
               </a:ext>
             </a:extLst>
           </p:cNvPr>
@@ -12037,7 +14912,7 @@
         </p:nvSpPr>
         <p:spPr>
           <a:xfrm>
-            <a:off x="3156024" y="4581109"/>
+            <a:off x="2705784" y="4998128"/>
             <a:ext cx="275208" cy="301841"/>
           </a:xfrm>
           <a:prstGeom prst="donut">
@@ -12078,10 +14953,10 @@
       </p:sp>
       <p:sp>
         <p:nvSpPr>
-          <p:cNvPr id="35" name="Círculo: vacío 34">
-            <a:extLst>
-              <a:ext uri="{FF2B5EF4-FFF2-40B4-BE49-F238E27FC236}">
-                <a16:creationId xmlns:a16="http://schemas.microsoft.com/office/drawing/2014/main" id="{1DD610F1-22D5-F79C-66F8-98B58B01C001}"/>
+          <p:cNvPr id="36" name="Círculo: vacío 35">
+            <a:extLst>
+              <a:ext uri="{FF2B5EF4-FFF2-40B4-BE49-F238E27FC236}">
+                <a16:creationId xmlns:a16="http://schemas.microsoft.com/office/drawing/2014/main" id="{BF59BFA2-D732-85C3-CD76-96463ECC5EB3}"/>
               </a:ext>
             </a:extLst>
           </p:cNvPr>
@@ -12090,7 +14965,7 @@
         </p:nvSpPr>
         <p:spPr>
           <a:xfrm>
-            <a:off x="2705784" y="4998128"/>
+            <a:off x="3169040" y="5924365"/>
             <a:ext cx="275208" cy="301841"/>
           </a:xfrm>
           <a:prstGeom prst="donut">
@@ -12131,10 +15006,10 @@
       </p:sp>
       <p:sp>
         <p:nvSpPr>
-          <p:cNvPr id="36" name="Círculo: vacío 35">
-            <a:extLst>
-              <a:ext uri="{FF2B5EF4-FFF2-40B4-BE49-F238E27FC236}">
-                <a16:creationId xmlns:a16="http://schemas.microsoft.com/office/drawing/2014/main" id="{BF59BFA2-D732-85C3-CD76-96463ECC5EB3}"/>
+          <p:cNvPr id="37" name="Círculo: vacío 36">
+            <a:extLst>
+              <a:ext uri="{FF2B5EF4-FFF2-40B4-BE49-F238E27FC236}">
+                <a16:creationId xmlns:a16="http://schemas.microsoft.com/office/drawing/2014/main" id="{460E5001-7238-9014-3AC5-9331B3010E6A}"/>
               </a:ext>
             </a:extLst>
           </p:cNvPr>
@@ -12143,7 +15018,7 @@
         </p:nvSpPr>
         <p:spPr>
           <a:xfrm>
-            <a:off x="3169040" y="5924365"/>
+            <a:off x="2380951" y="5609207"/>
             <a:ext cx="275208" cy="301841"/>
           </a:xfrm>
           <a:prstGeom prst="donut">
@@ -12184,10 +15059,10 @@
       </p:sp>
       <p:sp>
         <p:nvSpPr>
-          <p:cNvPr id="37" name="Círculo: vacío 36">
-            <a:extLst>
-              <a:ext uri="{FF2B5EF4-FFF2-40B4-BE49-F238E27FC236}">
-                <a16:creationId xmlns:a16="http://schemas.microsoft.com/office/drawing/2014/main" id="{460E5001-7238-9014-3AC5-9331B3010E6A}"/>
+          <p:cNvPr id="38" name="Círculo: vacío 37">
+            <a:extLst>
+              <a:ext uri="{FF2B5EF4-FFF2-40B4-BE49-F238E27FC236}">
+                <a16:creationId xmlns:a16="http://schemas.microsoft.com/office/drawing/2014/main" id="{2D3BEF8B-5523-D784-4523-EE8192A6726B}"/>
               </a:ext>
             </a:extLst>
           </p:cNvPr>
@@ -12196,7 +15071,7 @@
         </p:nvSpPr>
         <p:spPr>
           <a:xfrm>
-            <a:off x="2380951" y="5609207"/>
+            <a:off x="1778439" y="5796886"/>
             <a:ext cx="275208" cy="301841"/>
           </a:xfrm>
           <a:prstGeom prst="donut">
@@ -12237,10 +15112,10 @@
       </p:sp>
       <p:sp>
         <p:nvSpPr>
-          <p:cNvPr id="38" name="Círculo: vacío 37">
-            <a:extLst>
-              <a:ext uri="{FF2B5EF4-FFF2-40B4-BE49-F238E27FC236}">
-                <a16:creationId xmlns:a16="http://schemas.microsoft.com/office/drawing/2014/main" id="{2D3BEF8B-5523-D784-4523-EE8192A6726B}"/>
+          <p:cNvPr id="39" name="Círculo: vacío 38">
+            <a:extLst>
+              <a:ext uri="{FF2B5EF4-FFF2-40B4-BE49-F238E27FC236}">
+                <a16:creationId xmlns:a16="http://schemas.microsoft.com/office/drawing/2014/main" id="{0E0E2E9C-BECB-BD13-6905-36248D7FA28B}"/>
               </a:ext>
             </a:extLst>
           </p:cNvPr>
@@ -12249,14 +15124,14 @@
         </p:nvSpPr>
         <p:spPr>
           <a:xfrm>
-            <a:off x="1778439" y="5796886"/>
+            <a:off x="2329062" y="1624223"/>
             <a:ext cx="275208" cy="301841"/>
           </a:xfrm>
           <a:prstGeom prst="donut">
             <a:avLst/>
           </a:prstGeom>
           <a:solidFill>
-            <a:srgbClr val="00B0F0"/>
+            <a:srgbClr val="002060"/>
           </a:solidFill>
         </p:spPr>
         <p:style>
@@ -12290,10 +15165,10 @@
       </p:sp>
       <p:sp>
         <p:nvSpPr>
-          <p:cNvPr id="39" name="Círculo: vacío 38">
-            <a:extLst>
-              <a:ext uri="{FF2B5EF4-FFF2-40B4-BE49-F238E27FC236}">
-                <a16:creationId xmlns:a16="http://schemas.microsoft.com/office/drawing/2014/main" id="{0E0E2E9C-BECB-BD13-6905-36248D7FA28B}"/>
+          <p:cNvPr id="40" name="Círculo: vacío 39">
+            <a:extLst>
+              <a:ext uri="{FF2B5EF4-FFF2-40B4-BE49-F238E27FC236}">
+                <a16:creationId xmlns:a16="http://schemas.microsoft.com/office/drawing/2014/main" id="{1EC28F02-87CC-0FA4-2090-5736026ED31B}"/>
               </a:ext>
             </a:extLst>
           </p:cNvPr>
@@ -12302,7 +15177,7 @@
         </p:nvSpPr>
         <p:spPr>
           <a:xfrm>
-            <a:off x="2329062" y="1624223"/>
+            <a:off x="3366460" y="1356907"/>
             <a:ext cx="275208" cy="301841"/>
           </a:xfrm>
           <a:prstGeom prst="donut">
@@ -12343,10 +15218,10 @@
       </p:sp>
       <p:sp>
         <p:nvSpPr>
-          <p:cNvPr id="40" name="Círculo: vacío 39">
-            <a:extLst>
-              <a:ext uri="{FF2B5EF4-FFF2-40B4-BE49-F238E27FC236}">
-                <a16:creationId xmlns:a16="http://schemas.microsoft.com/office/drawing/2014/main" id="{1EC28F02-87CC-0FA4-2090-5736026ED31B}"/>
+          <p:cNvPr id="41" name="Círculo: vacío 40">
+            <a:extLst>
+              <a:ext uri="{FF2B5EF4-FFF2-40B4-BE49-F238E27FC236}">
+                <a16:creationId xmlns:a16="http://schemas.microsoft.com/office/drawing/2014/main" id="{85CB858B-413B-56BC-2156-2223C4DC0FCE}"/>
               </a:ext>
             </a:extLst>
           </p:cNvPr>
@@ -12355,7 +15230,7 @@
         </p:nvSpPr>
         <p:spPr>
           <a:xfrm>
-            <a:off x="3366460" y="1356907"/>
+            <a:off x="2902261" y="977892"/>
             <a:ext cx="275208" cy="301841"/>
           </a:xfrm>
           <a:prstGeom prst="donut">
@@ -12394,59 +15269,6 @@
           </a:p>
         </p:txBody>
       </p:sp>
-      <p:sp>
-        <p:nvSpPr>
-          <p:cNvPr id="41" name="Círculo: vacío 40">
-            <a:extLst>
-              <a:ext uri="{FF2B5EF4-FFF2-40B4-BE49-F238E27FC236}">
-                <a16:creationId xmlns:a16="http://schemas.microsoft.com/office/drawing/2014/main" id="{85CB858B-413B-56BC-2156-2223C4DC0FCE}"/>
-              </a:ext>
-            </a:extLst>
-          </p:cNvPr>
-          <p:cNvSpPr/>
-          <p:nvPr/>
-        </p:nvSpPr>
-        <p:spPr>
-          <a:xfrm>
-            <a:off x="2902261" y="977892"/>
-            <a:ext cx="275208" cy="301841"/>
-          </a:xfrm>
-          <a:prstGeom prst="donut">
-            <a:avLst/>
-          </a:prstGeom>
-          <a:solidFill>
-            <a:srgbClr val="002060"/>
-          </a:solidFill>
-        </p:spPr>
-        <p:style>
-          <a:lnRef idx="2">
-            <a:schemeClr val="accent1">
-              <a:shade val="50000"/>
-            </a:schemeClr>
-          </a:lnRef>
-          <a:fillRef idx="1">
-            <a:schemeClr val="accent1"/>
-          </a:fillRef>
-          <a:effectRef idx="0">
-            <a:schemeClr val="accent1"/>
-          </a:effectRef>
-          <a:fontRef idx="minor">
-            <a:schemeClr val="lt1"/>
-          </a:fontRef>
-        </p:style>
-        <p:txBody>
-          <a:bodyPr rtlCol="0" anchor="ctr"/>
-          <a:lstStyle/>
-          <a:p>
-            <a:pPr algn="ctr"/>
-            <a:endParaRPr lang="es-ES" dirty="0">
-              <a:solidFill>
-                <a:schemeClr val="tx1"/>
-              </a:solidFill>
-            </a:endParaRPr>
-          </a:p>
-        </p:txBody>
-      </p:sp>
       <p:cxnSp>
         <p:nvCxnSpPr>
           <p:cNvPr id="44" name="Conector recto de flecha 43">
@@ -13470,6 +16292,55 @@
           </a:prstGeom>
           <a:solidFill>
             <a:srgbClr val="00B0F0"/>
+          </a:solidFill>
+        </p:spPr>
+        <p:style>
+          <a:lnRef idx="2">
+            <a:schemeClr val="accent1">
+              <a:shade val="50000"/>
+            </a:schemeClr>
+          </a:lnRef>
+          <a:fillRef idx="1">
+            <a:schemeClr val="accent1"/>
+          </a:fillRef>
+          <a:effectRef idx="0">
+            <a:schemeClr val="accent1"/>
+          </a:effectRef>
+          <a:fontRef idx="minor">
+            <a:schemeClr val="lt1"/>
+          </a:fontRef>
+        </p:style>
+        <p:txBody>
+          <a:bodyPr rtlCol="0" anchor="ctr"/>
+          <a:lstStyle/>
+          <a:p>
+            <a:pPr algn="ctr"/>
+            <a:endParaRPr lang="es-ES" dirty="0"/>
+          </a:p>
+        </p:txBody>
+      </p:sp>
+      <p:sp>
+        <p:nvSpPr>
+          <p:cNvPr id="62" name="Signo de multiplicación 61">
+            <a:extLst>
+              <a:ext uri="{FF2B5EF4-FFF2-40B4-BE49-F238E27FC236}">
+                <a16:creationId xmlns:a16="http://schemas.microsoft.com/office/drawing/2014/main" id="{C8278AF5-8FDF-3547-F039-9CEADF6D527D}"/>
+              </a:ext>
+            </a:extLst>
+          </p:cNvPr>
+          <p:cNvSpPr/>
+          <p:nvPr/>
+        </p:nvSpPr>
+        <p:spPr>
+          <a:xfrm>
+            <a:off x="1659612" y="409575"/>
+            <a:ext cx="275208" cy="204187"/>
+          </a:xfrm>
+          <a:prstGeom prst="mathMultiply">
+            <a:avLst/>
+          </a:prstGeom>
+          <a:solidFill>
+            <a:srgbClr val="002060"/>
           </a:solidFill>
         </p:spPr>
         <p:style>

</xml_diff>

<commit_message>
Se continúa elaborando la memoria. Mejoras menores en la aplicación y solución de pequeños errores.
</commit_message>
<xml_diff>
--- a/Diseños/aquitectura.pptx
+++ b/Diseños/aquitectura.pptx
@@ -17,9 +17,12 @@
     <p:sldId id="266" r:id="rId11"/>
     <p:sldId id="267" r:id="rId12"/>
     <p:sldId id="269" r:id="rId13"/>
-    <p:sldId id="270" r:id="rId14"/>
-    <p:sldId id="271" r:id="rId15"/>
-    <p:sldId id="262" r:id="rId16"/>
+    <p:sldId id="272" r:id="rId14"/>
+    <p:sldId id="270" r:id="rId15"/>
+    <p:sldId id="271" r:id="rId16"/>
+    <p:sldId id="273" r:id="rId17"/>
+    <p:sldId id="274" r:id="rId18"/>
+    <p:sldId id="262" r:id="rId19"/>
   </p:sldIdLst>
   <p:sldSz cx="12192000" cy="6858000"/>
   <p:notesSz cx="6858000" cy="9144000"/>
@@ -273,7 +276,7 @@
           <a:p>
             <a:fld id="{3E1544B7-206C-4EA6-AC0C-B0859B395411}" type="datetimeFigureOut">
               <a:rPr lang="es-ES" smtClean="0"/>
-              <a:t>04/06/2022</a:t>
+              <a:t>09/06/2022</a:t>
             </a:fld>
             <a:endParaRPr lang="es-ES"/>
           </a:p>
@@ -471,7 +474,7 @@
           <a:p>
             <a:fld id="{3E1544B7-206C-4EA6-AC0C-B0859B395411}" type="datetimeFigureOut">
               <a:rPr lang="es-ES" smtClean="0"/>
-              <a:t>04/06/2022</a:t>
+              <a:t>09/06/2022</a:t>
             </a:fld>
             <a:endParaRPr lang="es-ES"/>
           </a:p>
@@ -679,7 +682,7 @@
           <a:p>
             <a:fld id="{3E1544B7-206C-4EA6-AC0C-B0859B395411}" type="datetimeFigureOut">
               <a:rPr lang="es-ES" smtClean="0"/>
-              <a:t>04/06/2022</a:t>
+              <a:t>09/06/2022</a:t>
             </a:fld>
             <a:endParaRPr lang="es-ES"/>
           </a:p>
@@ -877,7 +880,7 @@
           <a:p>
             <a:fld id="{3E1544B7-206C-4EA6-AC0C-B0859B395411}" type="datetimeFigureOut">
               <a:rPr lang="es-ES" smtClean="0"/>
-              <a:t>04/06/2022</a:t>
+              <a:t>09/06/2022</a:t>
             </a:fld>
             <a:endParaRPr lang="es-ES"/>
           </a:p>
@@ -1152,7 +1155,7 @@
           <a:p>
             <a:fld id="{3E1544B7-206C-4EA6-AC0C-B0859B395411}" type="datetimeFigureOut">
               <a:rPr lang="es-ES" smtClean="0"/>
-              <a:t>04/06/2022</a:t>
+              <a:t>09/06/2022</a:t>
             </a:fld>
             <a:endParaRPr lang="es-ES"/>
           </a:p>
@@ -1417,7 +1420,7 @@
           <a:p>
             <a:fld id="{3E1544B7-206C-4EA6-AC0C-B0859B395411}" type="datetimeFigureOut">
               <a:rPr lang="es-ES" smtClean="0"/>
-              <a:t>04/06/2022</a:t>
+              <a:t>09/06/2022</a:t>
             </a:fld>
             <a:endParaRPr lang="es-ES"/>
           </a:p>
@@ -1829,7 +1832,7 @@
           <a:p>
             <a:fld id="{3E1544B7-206C-4EA6-AC0C-B0859B395411}" type="datetimeFigureOut">
               <a:rPr lang="es-ES" smtClean="0"/>
-              <a:t>04/06/2022</a:t>
+              <a:t>09/06/2022</a:t>
             </a:fld>
             <a:endParaRPr lang="es-ES"/>
           </a:p>
@@ -1970,7 +1973,7 @@
           <a:p>
             <a:fld id="{3E1544B7-206C-4EA6-AC0C-B0859B395411}" type="datetimeFigureOut">
               <a:rPr lang="es-ES" smtClean="0"/>
-              <a:t>04/06/2022</a:t>
+              <a:t>09/06/2022</a:t>
             </a:fld>
             <a:endParaRPr lang="es-ES"/>
           </a:p>
@@ -2083,7 +2086,7 @@
           <a:p>
             <a:fld id="{3E1544B7-206C-4EA6-AC0C-B0859B395411}" type="datetimeFigureOut">
               <a:rPr lang="es-ES" smtClean="0"/>
-              <a:t>04/06/2022</a:t>
+              <a:t>09/06/2022</a:t>
             </a:fld>
             <a:endParaRPr lang="es-ES"/>
           </a:p>
@@ -2394,7 +2397,7 @@
           <a:p>
             <a:fld id="{3E1544B7-206C-4EA6-AC0C-B0859B395411}" type="datetimeFigureOut">
               <a:rPr lang="es-ES" smtClean="0"/>
-              <a:t>04/06/2022</a:t>
+              <a:t>09/06/2022</a:t>
             </a:fld>
             <a:endParaRPr lang="es-ES"/>
           </a:p>
@@ -2682,7 +2685,7 @@
           <a:p>
             <a:fld id="{3E1544B7-206C-4EA6-AC0C-B0859B395411}" type="datetimeFigureOut">
               <a:rPr lang="es-ES" smtClean="0"/>
-              <a:t>04/06/2022</a:t>
+              <a:t>09/06/2022</a:t>
             </a:fld>
             <a:endParaRPr lang="es-ES"/>
           </a:p>
@@ -2923,7 +2926,7 @@
           <a:p>
             <a:fld id="{3E1544B7-206C-4EA6-AC0C-B0859B395411}" type="datetimeFigureOut">
               <a:rPr lang="es-ES" smtClean="0"/>
-              <a:t>04/06/2022</a:t>
+              <a:t>09/06/2022</a:t>
             </a:fld>
             <a:endParaRPr lang="es-ES"/>
           </a:p>
@@ -4983,7 +4986,7 @@
           <a:p>
             <a:r>
               <a:rPr lang="es-ES" dirty="0"/>
-              <a:t>Servidor email</a:t>
+              <a:t>Servidor SMTP</a:t>
             </a:r>
           </a:p>
         </p:txBody>
@@ -5120,42 +5123,6 @@
           </a:fontRef>
         </p:style>
       </p:cxnSp>
-      <p:pic>
-        <p:nvPicPr>
-          <p:cNvPr id="30" name="Imagen 29" descr="Icono&#10;&#10;Descripción generada automáticamente">
-            <a:extLst>
-              <a:ext uri="{FF2B5EF4-FFF2-40B4-BE49-F238E27FC236}">
-                <a16:creationId xmlns:a16="http://schemas.microsoft.com/office/drawing/2014/main" id="{D7133743-1C46-4337-919F-CBB88A4A6459}"/>
-              </a:ext>
-            </a:extLst>
-          </p:cNvPr>
-          <p:cNvPicPr>
-            <a:picLocks noChangeAspect="1"/>
-          </p:cNvPicPr>
-          <p:nvPr/>
-        </p:nvPicPr>
-        <p:blipFill>
-          <a:blip r:embed="rId15">
-            <a:extLst>
-              <a:ext uri="{28A0092B-C50C-407E-A947-70E740481C1C}">
-                <a14:useLocalDpi xmlns:a14="http://schemas.microsoft.com/office/drawing/2010/main" val="0"/>
-              </a:ext>
-            </a:extLst>
-          </a:blip>
-          <a:stretch>
-            <a:fillRect/>
-          </a:stretch>
-        </p:blipFill>
-        <p:spPr>
-          <a:xfrm>
-            <a:off x="10454285" y="5255172"/>
-            <a:ext cx="920489" cy="920489"/>
-          </a:xfrm>
-          <a:prstGeom prst="rect">
-            <a:avLst/>
-          </a:prstGeom>
-        </p:spPr>
-      </p:pic>
       <p:sp>
         <p:nvSpPr>
           <p:cNvPr id="60" name="CuadroTexto 59">
@@ -5190,7 +5157,7 @@
                   <a:srgbClr val="0070C0"/>
                 </a:solidFill>
               </a:rPr>
-              <a:t>Gmail SMTP</a:t>
+              <a:t>GMX SMTP</a:t>
             </a:r>
           </a:p>
         </p:txBody>
@@ -5372,7 +5339,7 @@
           <p:nvPr/>
         </p:nvPicPr>
         <p:blipFill>
-          <a:blip r:embed="rId16">
+          <a:blip r:embed="rId15">
             <a:extLst>
               <a:ext uri="{28A0092B-C50C-407E-A947-70E740481C1C}">
                 <a14:useLocalDpi xmlns:a14="http://schemas.microsoft.com/office/drawing/2010/main" val="0"/>
@@ -5486,7 +5453,7 @@
           <p:nvPr/>
         </p:nvPicPr>
         <p:blipFill>
-          <a:blip r:embed="rId17">
+          <a:blip r:embed="rId16">
             <a:extLst>
               <a:ext uri="{28A0092B-C50C-407E-A947-70E740481C1C}">
                 <a14:useLocalDpi xmlns:a14="http://schemas.microsoft.com/office/drawing/2010/main" val="0"/>
@@ -5522,7 +5489,7 @@
           <p:nvPr/>
         </p:nvPicPr>
         <p:blipFill>
-          <a:blip r:embed="rId18">
+          <a:blip r:embed="rId17">
             <a:extLst>
               <a:ext uri="{28A0092B-C50C-407E-A947-70E740481C1C}">
                 <a14:useLocalDpi xmlns:a14="http://schemas.microsoft.com/office/drawing/2010/main" val="0"/>
@@ -5558,7 +5525,7 @@
           <p:nvPr/>
         </p:nvPicPr>
         <p:blipFill>
-          <a:blip r:embed="rId19">
+          <a:blip r:embed="rId18">
             <a:extLst>
               <a:ext uri="{28A0092B-C50C-407E-A947-70E740481C1C}">
                 <a14:useLocalDpi xmlns:a14="http://schemas.microsoft.com/office/drawing/2010/main" val="0"/>
@@ -5660,6 +5627,42 @@
           </a:p>
         </p:txBody>
       </p:sp>
+      <p:pic>
+        <p:nvPicPr>
+          <p:cNvPr id="13" name="Imagen 12" descr="Texto&#10;&#10;Descripción generada automáticamente">
+            <a:extLst>
+              <a:ext uri="{FF2B5EF4-FFF2-40B4-BE49-F238E27FC236}">
+                <a16:creationId xmlns:a16="http://schemas.microsoft.com/office/drawing/2014/main" id="{4DA56059-4CB0-F367-FF30-38A3B45B62B5}"/>
+              </a:ext>
+            </a:extLst>
+          </p:cNvPr>
+          <p:cNvPicPr>
+            <a:picLocks noChangeAspect="1"/>
+          </p:cNvPicPr>
+          <p:nvPr/>
+        </p:nvPicPr>
+        <p:blipFill>
+          <a:blip r:embed="rId19">
+            <a:extLst>
+              <a:ext uri="{28A0092B-C50C-407E-A947-70E740481C1C}">
+                <a14:useLocalDpi xmlns:a14="http://schemas.microsoft.com/office/drawing/2010/main" val="0"/>
+              </a:ext>
+            </a:extLst>
+          </a:blip>
+          <a:stretch>
+            <a:fillRect/>
+          </a:stretch>
+        </p:blipFill>
+        <p:spPr>
+          <a:xfrm>
+            <a:off x="10591888" y="5397283"/>
+            <a:ext cx="670121" cy="670121"/>
+          </a:xfrm>
+          <a:prstGeom prst="rect">
+            <a:avLst/>
+          </a:prstGeom>
+        </p:spPr>
+      </p:pic>
     </p:spTree>
     <p:extLst>
       <p:ext uri="{BB962C8B-B14F-4D97-AF65-F5344CB8AC3E}">
@@ -6245,10 +6248,10 @@
       </p:grpSpPr>
       <p:pic>
         <p:nvPicPr>
-          <p:cNvPr id="3" name="Imagen 2" descr="Interfaz de usuario gráfica, Aplicación&#10;&#10;Descripción generada automáticamente">
-            <a:extLst>
-              <a:ext uri="{FF2B5EF4-FFF2-40B4-BE49-F238E27FC236}">
-                <a16:creationId xmlns:a16="http://schemas.microsoft.com/office/drawing/2014/main" id="{16A6931D-2D57-4648-F0A1-D97E54FBC24D}"/>
+          <p:cNvPr id="3" name="Imagen 2">
+            <a:extLst>
+              <a:ext uri="{FF2B5EF4-FFF2-40B4-BE49-F238E27FC236}">
+                <a16:creationId xmlns:a16="http://schemas.microsoft.com/office/drawing/2014/main" id="{BA8C21B0-1220-8EDF-1E0D-536F9121D503}"/>
               </a:ext>
             </a:extLst>
           </p:cNvPr>
@@ -6271,8 +6274,8 @@
         </p:blipFill>
         <p:spPr>
           <a:xfrm>
-            <a:off x="319169" y="270297"/>
-            <a:ext cx="7528691" cy="1754719"/>
+            <a:off x="104435" y="1608567"/>
+            <a:ext cx="5715495" cy="693480"/>
           </a:xfrm>
           <a:prstGeom prst="rect">
             <a:avLst/>
@@ -6281,10 +6284,10 @@
       </p:pic>
       <p:pic>
         <p:nvPicPr>
-          <p:cNvPr id="5" name="Imagen 4">
-            <a:extLst>
-              <a:ext uri="{FF2B5EF4-FFF2-40B4-BE49-F238E27FC236}">
-                <a16:creationId xmlns:a16="http://schemas.microsoft.com/office/drawing/2014/main" id="{B658BC41-7BB9-B7CE-B8EB-722A42CB4E5F}"/>
+          <p:cNvPr id="5" name="Imagen 4" descr="Interfaz de usuario gráfica, Texto, Aplicación&#10;&#10;Descripción generada automáticamente">
+            <a:extLst>
+              <a:ext uri="{FF2B5EF4-FFF2-40B4-BE49-F238E27FC236}">
+                <a16:creationId xmlns:a16="http://schemas.microsoft.com/office/drawing/2014/main" id="{CA0C1A28-7497-40FE-C402-309F1288F457}"/>
               </a:ext>
             </a:extLst>
           </p:cNvPr>
@@ -6307,8 +6310,8 @@
         </p:blipFill>
         <p:spPr>
           <a:xfrm>
-            <a:off x="319169" y="2025016"/>
-            <a:ext cx="9962041" cy="585019"/>
+            <a:off x="104435" y="269241"/>
+            <a:ext cx="5715495" cy="1339326"/>
           </a:xfrm>
           <a:prstGeom prst="rect">
             <a:avLst/>
@@ -6317,10 +6320,10 @@
       </p:pic>
       <p:pic>
         <p:nvPicPr>
-          <p:cNvPr id="6" name="Imagen 5" descr="Interfaz de usuario gráfica, Aplicación&#10;&#10;Descripción generada automáticamente">
-            <a:extLst>
-              <a:ext uri="{FF2B5EF4-FFF2-40B4-BE49-F238E27FC236}">
-                <a16:creationId xmlns:a16="http://schemas.microsoft.com/office/drawing/2014/main" id="{147AF024-3FE2-FB82-3039-8D768AFCC03E}"/>
+          <p:cNvPr id="4" name="Imagen 3" descr="Interfaz de usuario gráfica, Texto, Aplicación&#10;&#10;Descripción generada automáticamente">
+            <a:extLst>
+              <a:ext uri="{FF2B5EF4-FFF2-40B4-BE49-F238E27FC236}">
+                <a16:creationId xmlns:a16="http://schemas.microsoft.com/office/drawing/2014/main" id="{E02691A6-7540-1B29-1317-742CC3B92A7A}"/>
               </a:ext>
             </a:extLst>
           </p:cNvPr>
@@ -6330,20 +6333,20 @@
           <p:nvPr/>
         </p:nvPicPr>
         <p:blipFill rotWithShape="1">
-          <a:blip r:embed="rId2">
+          <a:blip r:embed="rId4">
             <a:extLst>
               <a:ext uri="{28A0092B-C50C-407E-A947-70E740481C1C}">
                 <a14:useLocalDpi xmlns:a14="http://schemas.microsoft.com/office/drawing/2010/main" val="0"/>
               </a:ext>
             </a:extLst>
           </a:blip>
-          <a:srcRect l="67954"/>
+          <a:srcRect b="36334"/>
           <a:stretch/>
         </p:blipFill>
         <p:spPr>
           <a:xfrm>
-            <a:off x="7847860" y="270297"/>
-            <a:ext cx="2412635" cy="1754719"/>
+            <a:off x="181559" y="3209329"/>
+            <a:ext cx="4602879" cy="1067383"/>
           </a:xfrm>
           <a:prstGeom prst="rect">
             <a:avLst/>
@@ -6352,10 +6355,10 @@
       </p:pic>
       <p:pic>
         <p:nvPicPr>
-          <p:cNvPr id="8" name="Imagen 7">
-            <a:extLst>
-              <a:ext uri="{FF2B5EF4-FFF2-40B4-BE49-F238E27FC236}">
-                <a16:creationId xmlns:a16="http://schemas.microsoft.com/office/drawing/2014/main" id="{29E1B8D5-1186-E149-00BB-80A54501A898}"/>
+          <p:cNvPr id="6" name="Imagen 5">
+            <a:extLst>
+              <a:ext uri="{FF2B5EF4-FFF2-40B4-BE49-F238E27FC236}">
+                <a16:creationId xmlns:a16="http://schemas.microsoft.com/office/drawing/2014/main" id="{7360E70D-924D-2088-BE05-10DE1A2726C1}"/>
               </a:ext>
             </a:extLst>
           </p:cNvPr>
@@ -6365,7 +6368,7 @@
           <p:nvPr/>
         </p:nvPicPr>
         <p:blipFill>
-          <a:blip r:embed="rId4">
+          <a:blip r:embed="rId2">
             <a:extLst>
               <a:ext uri="{28A0092B-C50C-407E-A947-70E740481C1C}">
                 <a14:useLocalDpi xmlns:a14="http://schemas.microsoft.com/office/drawing/2010/main" val="0"/>
@@ -6378,8 +6381,8 @@
         </p:blipFill>
         <p:spPr>
           <a:xfrm>
-            <a:off x="1523604" y="3656462"/>
-            <a:ext cx="9099068" cy="525826"/>
+            <a:off x="181559" y="4276712"/>
+            <a:ext cx="4602879" cy="558483"/>
           </a:xfrm>
           <a:prstGeom prst="rect">
             <a:avLst/>
@@ -6388,10 +6391,10 @@
       </p:pic>
       <p:pic>
         <p:nvPicPr>
-          <p:cNvPr id="10" name="Imagen 9">
-            <a:extLst>
-              <a:ext uri="{FF2B5EF4-FFF2-40B4-BE49-F238E27FC236}">
-                <a16:creationId xmlns:a16="http://schemas.microsoft.com/office/drawing/2014/main" id="{3C29B4B1-58C2-F542-0C98-D9811AD8D83A}"/>
+          <p:cNvPr id="7" name="Imagen 6" descr="Imagen que contiene Texto&#10;&#10;Descripción generada automáticamente">
+            <a:extLst>
+              <a:ext uri="{FF2B5EF4-FFF2-40B4-BE49-F238E27FC236}">
+                <a16:creationId xmlns:a16="http://schemas.microsoft.com/office/drawing/2014/main" id="{F5595916-059F-A68F-E980-0C7894270F94}"/>
               </a:ext>
             </a:extLst>
           </p:cNvPr>
@@ -6414,8 +6417,152 @@
         </p:blipFill>
         <p:spPr>
           <a:xfrm>
-            <a:off x="1523604" y="4182288"/>
-            <a:ext cx="9121930" cy="533446"/>
+            <a:off x="7942994" y="4276712"/>
+            <a:ext cx="3421677" cy="1531753"/>
+          </a:xfrm>
+          <a:prstGeom prst="rect">
+            <a:avLst/>
+          </a:prstGeom>
+        </p:spPr>
+      </p:pic>
+      <p:pic>
+        <p:nvPicPr>
+          <p:cNvPr id="11" name="Imagen 10" descr="Interfaz de usuario gráfica, Texto&#10;&#10;Descripción generada automáticamente">
+            <a:extLst>
+              <a:ext uri="{FF2B5EF4-FFF2-40B4-BE49-F238E27FC236}">
+                <a16:creationId xmlns:a16="http://schemas.microsoft.com/office/drawing/2014/main" id="{265C4BE1-F0E1-5103-E5EF-A4BF27FF428A}"/>
+              </a:ext>
+            </a:extLst>
+          </p:cNvPr>
+          <p:cNvPicPr>
+            <a:picLocks noChangeAspect="1"/>
+          </p:cNvPicPr>
+          <p:nvPr/>
+        </p:nvPicPr>
+        <p:blipFill>
+          <a:blip r:embed="rId6">
+            <a:extLst>
+              <a:ext uri="{28A0092B-C50C-407E-A947-70E740481C1C}">
+                <a14:useLocalDpi xmlns:a14="http://schemas.microsoft.com/office/drawing/2010/main" val="0"/>
+              </a:ext>
+            </a:extLst>
+          </a:blip>
+          <a:stretch>
+            <a:fillRect/>
+          </a:stretch>
+        </p:blipFill>
+        <p:spPr>
+          <a:xfrm>
+            <a:off x="4849006" y="4276712"/>
+            <a:ext cx="3093988" cy="1531753"/>
+          </a:xfrm>
+          <a:prstGeom prst="rect">
+            <a:avLst/>
+          </a:prstGeom>
+        </p:spPr>
+      </p:pic>
+      <p:pic>
+        <p:nvPicPr>
+          <p:cNvPr id="13" name="Imagen 12" descr="Texto&#10;&#10;Descripción generada automáticamente">
+            <a:extLst>
+              <a:ext uri="{FF2B5EF4-FFF2-40B4-BE49-F238E27FC236}">
+                <a16:creationId xmlns:a16="http://schemas.microsoft.com/office/drawing/2014/main" id="{6844989F-0F2A-0948-1771-5EC9552970F4}"/>
+              </a:ext>
+            </a:extLst>
+          </p:cNvPr>
+          <p:cNvPicPr>
+            <a:picLocks noChangeAspect="1"/>
+          </p:cNvPicPr>
+          <p:nvPr/>
+        </p:nvPicPr>
+        <p:blipFill>
+          <a:blip r:embed="rId7">
+            <a:extLst>
+              <a:ext uri="{28A0092B-C50C-407E-A947-70E740481C1C}">
+                <a14:useLocalDpi xmlns:a14="http://schemas.microsoft.com/office/drawing/2010/main" val="0"/>
+              </a:ext>
+            </a:extLst>
+          </a:blip>
+          <a:stretch>
+            <a:fillRect/>
+          </a:stretch>
+        </p:blipFill>
+        <p:spPr>
+          <a:xfrm>
+            <a:off x="8590560" y="1608567"/>
+            <a:ext cx="3200677" cy="952583"/>
+          </a:xfrm>
+          <a:prstGeom prst="rect">
+            <a:avLst/>
+          </a:prstGeom>
+        </p:spPr>
+      </p:pic>
+      <p:pic>
+        <p:nvPicPr>
+          <p:cNvPr id="15" name="Imagen 14" descr="Imagen que contiene Texto&#10;&#10;Descripción generada automáticamente">
+            <a:extLst>
+              <a:ext uri="{FF2B5EF4-FFF2-40B4-BE49-F238E27FC236}">
+                <a16:creationId xmlns:a16="http://schemas.microsoft.com/office/drawing/2014/main" id="{F507C580-EDB2-9B80-ACCB-596D89A6A6FB}"/>
+              </a:ext>
+            </a:extLst>
+          </p:cNvPr>
+          <p:cNvPicPr>
+            <a:picLocks noChangeAspect="1"/>
+          </p:cNvPicPr>
+          <p:nvPr/>
+        </p:nvPicPr>
+        <p:blipFill>
+          <a:blip r:embed="rId8">
+            <a:extLst>
+              <a:ext uri="{28A0092B-C50C-407E-A947-70E740481C1C}">
+                <a14:useLocalDpi xmlns:a14="http://schemas.microsoft.com/office/drawing/2010/main" val="0"/>
+              </a:ext>
+            </a:extLst>
+          </a:blip>
+          <a:stretch>
+            <a:fillRect/>
+          </a:stretch>
+        </p:blipFill>
+        <p:spPr>
+          <a:xfrm>
+            <a:off x="8590560" y="953190"/>
+            <a:ext cx="3200677" cy="655377"/>
+          </a:xfrm>
+          <a:prstGeom prst="rect">
+            <a:avLst/>
+          </a:prstGeom>
+        </p:spPr>
+      </p:pic>
+      <p:pic>
+        <p:nvPicPr>
+          <p:cNvPr id="17" name="Imagen 16" descr="Interfaz de usuario gráfica, Texto, Aplicación&#10;&#10;Descripción generada automáticamente">
+            <a:extLst>
+              <a:ext uri="{FF2B5EF4-FFF2-40B4-BE49-F238E27FC236}">
+                <a16:creationId xmlns:a16="http://schemas.microsoft.com/office/drawing/2014/main" id="{5FA5E27D-A542-37CA-7EF3-AE3896005F37}"/>
+              </a:ext>
+            </a:extLst>
+          </p:cNvPr>
+          <p:cNvPicPr>
+            <a:picLocks noChangeAspect="1"/>
+          </p:cNvPicPr>
+          <p:nvPr/>
+        </p:nvPicPr>
+        <p:blipFill>
+          <a:blip r:embed="rId9">
+            <a:extLst>
+              <a:ext uri="{28A0092B-C50C-407E-A947-70E740481C1C}">
+                <a14:useLocalDpi xmlns:a14="http://schemas.microsoft.com/office/drawing/2010/main" val="0"/>
+              </a:ext>
+            </a:extLst>
+          </a:blip>
+          <a:stretch>
+            <a:fillRect/>
+          </a:stretch>
+        </p:blipFill>
+        <p:spPr>
+          <a:xfrm>
+            <a:off x="5176030" y="948482"/>
+            <a:ext cx="3414530" cy="1612667"/>
           </a:xfrm>
           <a:prstGeom prst="rect">
             <a:avLst/>
@@ -6425,7 +6572,7 @@
     </p:spTree>
     <p:extLst>
       <p:ext uri="{BB962C8B-B14F-4D97-AF65-F5344CB8AC3E}">
-        <p14:creationId xmlns:p14="http://schemas.microsoft.com/office/powerpoint/2010/main" val="889065760"/>
+        <p14:creationId xmlns:p14="http://schemas.microsoft.com/office/powerpoint/2010/main" val="1072981292"/>
       </p:ext>
     </p:extLst>
   </p:cSld>
@@ -6462,6 +6609,223 @@
       </p:grpSpPr>
       <p:pic>
         <p:nvPicPr>
+          <p:cNvPr id="3" name="Imagen 2" descr="Interfaz de usuario gráfica, Aplicación&#10;&#10;Descripción generada automáticamente">
+            <a:extLst>
+              <a:ext uri="{FF2B5EF4-FFF2-40B4-BE49-F238E27FC236}">
+                <a16:creationId xmlns:a16="http://schemas.microsoft.com/office/drawing/2014/main" id="{16A6931D-2D57-4648-F0A1-D97E54FBC24D}"/>
+              </a:ext>
+            </a:extLst>
+          </p:cNvPr>
+          <p:cNvPicPr>
+            <a:picLocks noChangeAspect="1"/>
+          </p:cNvPicPr>
+          <p:nvPr/>
+        </p:nvPicPr>
+        <p:blipFill>
+          <a:blip r:embed="rId2">
+            <a:extLst>
+              <a:ext uri="{28A0092B-C50C-407E-A947-70E740481C1C}">
+                <a14:useLocalDpi xmlns:a14="http://schemas.microsoft.com/office/drawing/2010/main" val="0"/>
+              </a:ext>
+            </a:extLst>
+          </a:blip>
+          <a:stretch>
+            <a:fillRect/>
+          </a:stretch>
+        </p:blipFill>
+        <p:spPr>
+          <a:xfrm>
+            <a:off x="319169" y="270297"/>
+            <a:ext cx="7528691" cy="1754719"/>
+          </a:xfrm>
+          <a:prstGeom prst="rect">
+            <a:avLst/>
+          </a:prstGeom>
+        </p:spPr>
+      </p:pic>
+      <p:pic>
+        <p:nvPicPr>
+          <p:cNvPr id="5" name="Imagen 4">
+            <a:extLst>
+              <a:ext uri="{FF2B5EF4-FFF2-40B4-BE49-F238E27FC236}">
+                <a16:creationId xmlns:a16="http://schemas.microsoft.com/office/drawing/2014/main" id="{B658BC41-7BB9-B7CE-B8EB-722A42CB4E5F}"/>
+              </a:ext>
+            </a:extLst>
+          </p:cNvPr>
+          <p:cNvPicPr>
+            <a:picLocks noChangeAspect="1"/>
+          </p:cNvPicPr>
+          <p:nvPr/>
+        </p:nvPicPr>
+        <p:blipFill>
+          <a:blip r:embed="rId3">
+            <a:extLst>
+              <a:ext uri="{28A0092B-C50C-407E-A947-70E740481C1C}">
+                <a14:useLocalDpi xmlns:a14="http://schemas.microsoft.com/office/drawing/2010/main" val="0"/>
+              </a:ext>
+            </a:extLst>
+          </a:blip>
+          <a:stretch>
+            <a:fillRect/>
+          </a:stretch>
+        </p:blipFill>
+        <p:spPr>
+          <a:xfrm>
+            <a:off x="319169" y="2025016"/>
+            <a:ext cx="9962041" cy="585019"/>
+          </a:xfrm>
+          <a:prstGeom prst="rect">
+            <a:avLst/>
+          </a:prstGeom>
+        </p:spPr>
+      </p:pic>
+      <p:pic>
+        <p:nvPicPr>
+          <p:cNvPr id="6" name="Imagen 5" descr="Interfaz de usuario gráfica, Aplicación&#10;&#10;Descripción generada automáticamente">
+            <a:extLst>
+              <a:ext uri="{FF2B5EF4-FFF2-40B4-BE49-F238E27FC236}">
+                <a16:creationId xmlns:a16="http://schemas.microsoft.com/office/drawing/2014/main" id="{147AF024-3FE2-FB82-3039-8D768AFCC03E}"/>
+              </a:ext>
+            </a:extLst>
+          </p:cNvPr>
+          <p:cNvPicPr>
+            <a:picLocks noChangeAspect="1"/>
+          </p:cNvPicPr>
+          <p:nvPr/>
+        </p:nvPicPr>
+        <p:blipFill rotWithShape="1">
+          <a:blip r:embed="rId2">
+            <a:extLst>
+              <a:ext uri="{28A0092B-C50C-407E-A947-70E740481C1C}">
+                <a14:useLocalDpi xmlns:a14="http://schemas.microsoft.com/office/drawing/2010/main" val="0"/>
+              </a:ext>
+            </a:extLst>
+          </a:blip>
+          <a:srcRect l="67954"/>
+          <a:stretch/>
+        </p:blipFill>
+        <p:spPr>
+          <a:xfrm>
+            <a:off x="7847860" y="270297"/>
+            <a:ext cx="2412635" cy="1754719"/>
+          </a:xfrm>
+          <a:prstGeom prst="rect">
+            <a:avLst/>
+          </a:prstGeom>
+        </p:spPr>
+      </p:pic>
+      <p:pic>
+        <p:nvPicPr>
+          <p:cNvPr id="8" name="Imagen 7">
+            <a:extLst>
+              <a:ext uri="{FF2B5EF4-FFF2-40B4-BE49-F238E27FC236}">
+                <a16:creationId xmlns:a16="http://schemas.microsoft.com/office/drawing/2014/main" id="{29E1B8D5-1186-E149-00BB-80A54501A898}"/>
+              </a:ext>
+            </a:extLst>
+          </p:cNvPr>
+          <p:cNvPicPr>
+            <a:picLocks noChangeAspect="1"/>
+          </p:cNvPicPr>
+          <p:nvPr/>
+        </p:nvPicPr>
+        <p:blipFill>
+          <a:blip r:embed="rId4">
+            <a:extLst>
+              <a:ext uri="{28A0092B-C50C-407E-A947-70E740481C1C}">
+                <a14:useLocalDpi xmlns:a14="http://schemas.microsoft.com/office/drawing/2010/main" val="0"/>
+              </a:ext>
+            </a:extLst>
+          </a:blip>
+          <a:stretch>
+            <a:fillRect/>
+          </a:stretch>
+        </p:blipFill>
+        <p:spPr>
+          <a:xfrm>
+            <a:off x="1523604" y="3656462"/>
+            <a:ext cx="9099068" cy="525826"/>
+          </a:xfrm>
+          <a:prstGeom prst="rect">
+            <a:avLst/>
+          </a:prstGeom>
+        </p:spPr>
+      </p:pic>
+      <p:pic>
+        <p:nvPicPr>
+          <p:cNvPr id="10" name="Imagen 9">
+            <a:extLst>
+              <a:ext uri="{FF2B5EF4-FFF2-40B4-BE49-F238E27FC236}">
+                <a16:creationId xmlns:a16="http://schemas.microsoft.com/office/drawing/2014/main" id="{3C29B4B1-58C2-F542-0C98-D9811AD8D83A}"/>
+              </a:ext>
+            </a:extLst>
+          </p:cNvPr>
+          <p:cNvPicPr>
+            <a:picLocks noChangeAspect="1"/>
+          </p:cNvPicPr>
+          <p:nvPr/>
+        </p:nvPicPr>
+        <p:blipFill>
+          <a:blip r:embed="rId5">
+            <a:extLst>
+              <a:ext uri="{28A0092B-C50C-407E-A947-70E740481C1C}">
+                <a14:useLocalDpi xmlns:a14="http://schemas.microsoft.com/office/drawing/2010/main" val="0"/>
+              </a:ext>
+            </a:extLst>
+          </a:blip>
+          <a:stretch>
+            <a:fillRect/>
+          </a:stretch>
+        </p:blipFill>
+        <p:spPr>
+          <a:xfrm>
+            <a:off x="1523604" y="4182288"/>
+            <a:ext cx="9121930" cy="533446"/>
+          </a:xfrm>
+          <a:prstGeom prst="rect">
+            <a:avLst/>
+          </a:prstGeom>
+        </p:spPr>
+      </p:pic>
+    </p:spTree>
+    <p:extLst>
+      <p:ext uri="{BB962C8B-B14F-4D97-AF65-F5344CB8AC3E}">
+        <p14:creationId xmlns:p14="http://schemas.microsoft.com/office/powerpoint/2010/main" val="889065760"/>
+      </p:ext>
+    </p:extLst>
+  </p:cSld>
+  <p:clrMapOvr>
+    <a:masterClrMapping/>
+  </p:clrMapOvr>
+</p:sld>
+</file>
+
+<file path=ppt/slides/slide15.xml><?xml version="1.0" encoding="utf-8"?>
+<p:sld xmlns:a="http://schemas.openxmlformats.org/drawingml/2006/main" xmlns:r="http://schemas.openxmlformats.org/officeDocument/2006/relationships" xmlns:p="http://schemas.openxmlformats.org/presentationml/2006/main">
+  <p:cSld>
+    <p:bg>
+      <p:bgPr>
+        <a:solidFill>
+          <a:schemeClr val="bg1"/>
+        </a:solidFill>
+        <a:effectLst/>
+      </p:bgPr>
+    </p:bg>
+    <p:spTree>
+      <p:nvGrpSpPr>
+        <p:cNvPr id="1" name=""/>
+        <p:cNvGrpSpPr/>
+        <p:nvPr/>
+      </p:nvGrpSpPr>
+      <p:grpSpPr>
+        <a:xfrm>
+          <a:off x="0" y="0"/>
+          <a:ext cx="0" cy="0"/>
+          <a:chOff x="0" y="0"/>
+          <a:chExt cx="0" cy="0"/>
+        </a:xfrm>
+      </p:grpSpPr>
+      <p:pic>
+        <p:nvPicPr>
           <p:cNvPr id="3" name="Imagen 2" descr="Interfaz de usuario gráfica, Texto, Aplicación&#10;&#10;Descripción generada automáticamente">
             <a:extLst>
               <a:ext uri="{FF2B5EF4-FFF2-40B4-BE49-F238E27FC236}">
@@ -6615,7 +6979,261 @@
 </p:sld>
 </file>
 
-<file path=ppt/slides/slide15.xml><?xml version="1.0" encoding="utf-8"?>
+<file path=ppt/slides/slide16.xml><?xml version="1.0" encoding="utf-8"?>
+<p:sld xmlns:a="http://schemas.openxmlformats.org/drawingml/2006/main" xmlns:r="http://schemas.openxmlformats.org/officeDocument/2006/relationships" xmlns:p="http://schemas.openxmlformats.org/presentationml/2006/main">
+  <p:cSld>
+    <p:bg>
+      <p:bgPr>
+        <a:solidFill>
+          <a:schemeClr val="bg1"/>
+        </a:solidFill>
+        <a:effectLst/>
+      </p:bgPr>
+    </p:bg>
+    <p:spTree>
+      <p:nvGrpSpPr>
+        <p:cNvPr id="1" name=""/>
+        <p:cNvGrpSpPr/>
+        <p:nvPr/>
+      </p:nvGrpSpPr>
+      <p:grpSpPr>
+        <a:xfrm>
+          <a:off x="0" y="0"/>
+          <a:ext cx="0" cy="0"/>
+          <a:chOff x="0" y="0"/>
+          <a:chExt cx="0" cy="0"/>
+        </a:xfrm>
+      </p:grpSpPr>
+      <p:pic>
+        <p:nvPicPr>
+          <p:cNvPr id="15" name="Imagen 14" descr="Interfaz de usuario gráfica, Texto, Aplicación, Correo electrónico&#10;&#10;Descripción generada automáticamente">
+            <a:extLst>
+              <a:ext uri="{FF2B5EF4-FFF2-40B4-BE49-F238E27FC236}">
+                <a16:creationId xmlns:a16="http://schemas.microsoft.com/office/drawing/2014/main" id="{94507F62-2206-00FF-F6C0-B9D28BA068A2}"/>
+              </a:ext>
+            </a:extLst>
+          </p:cNvPr>
+          <p:cNvPicPr>
+            <a:picLocks noChangeAspect="1"/>
+          </p:cNvPicPr>
+          <p:nvPr/>
+        </p:nvPicPr>
+        <p:blipFill>
+          <a:blip r:embed="rId2">
+            <a:extLst>
+              <a:ext uri="{28A0092B-C50C-407E-A947-70E740481C1C}">
+                <a14:useLocalDpi xmlns:a14="http://schemas.microsoft.com/office/drawing/2010/main" val="0"/>
+              </a:ext>
+            </a:extLst>
+          </a:blip>
+          <a:stretch>
+            <a:fillRect/>
+          </a:stretch>
+        </p:blipFill>
+        <p:spPr>
+          <a:xfrm>
+            <a:off x="2955760" y="2019178"/>
+            <a:ext cx="4106227" cy="2507102"/>
+          </a:xfrm>
+          <a:prstGeom prst="rect">
+            <a:avLst/>
+          </a:prstGeom>
+        </p:spPr>
+      </p:pic>
+      <p:pic>
+        <p:nvPicPr>
+          <p:cNvPr id="17" name="Imagen 16" descr="Interfaz de usuario gráfica, Texto, Aplicación, Correo electrónico&#10;&#10;Descripción generada automáticamente">
+            <a:extLst>
+              <a:ext uri="{FF2B5EF4-FFF2-40B4-BE49-F238E27FC236}">
+                <a16:creationId xmlns:a16="http://schemas.microsoft.com/office/drawing/2014/main" id="{647161DF-3011-E1FE-8E1B-5BB95A04BE9A}"/>
+              </a:ext>
+            </a:extLst>
+          </p:cNvPr>
+          <p:cNvPicPr>
+            <a:picLocks noChangeAspect="1"/>
+          </p:cNvPicPr>
+          <p:nvPr/>
+        </p:nvPicPr>
+        <p:blipFill>
+          <a:blip r:embed="rId3">
+            <a:extLst>
+              <a:ext uri="{28A0092B-C50C-407E-A947-70E740481C1C}">
+                <a14:useLocalDpi xmlns:a14="http://schemas.microsoft.com/office/drawing/2010/main" val="0"/>
+              </a:ext>
+            </a:extLst>
+          </a:blip>
+          <a:stretch>
+            <a:fillRect/>
+          </a:stretch>
+        </p:blipFill>
+        <p:spPr>
+          <a:xfrm>
+            <a:off x="7061987" y="2019178"/>
+            <a:ext cx="3983452" cy="2806822"/>
+          </a:xfrm>
+          <a:prstGeom prst="rect">
+            <a:avLst/>
+          </a:prstGeom>
+        </p:spPr>
+      </p:pic>
+      <p:pic>
+        <p:nvPicPr>
+          <p:cNvPr id="18" name="Imagen 17" descr="Interfaz de usuario gráfica, Texto, Aplicación, Correo electrónico&#10;&#10;Descripción generada automáticamente">
+            <a:extLst>
+              <a:ext uri="{FF2B5EF4-FFF2-40B4-BE49-F238E27FC236}">
+                <a16:creationId xmlns:a16="http://schemas.microsoft.com/office/drawing/2014/main" id="{F423878E-1B5B-4602-3159-FD09D83ED148}"/>
+              </a:ext>
+            </a:extLst>
+          </p:cNvPr>
+          <p:cNvPicPr>
+            <a:picLocks noChangeAspect="1"/>
+          </p:cNvPicPr>
+          <p:nvPr/>
+        </p:nvPicPr>
+        <p:blipFill rotWithShape="1">
+          <a:blip r:embed="rId3">
+            <a:extLst>
+              <a:ext uri="{28A0092B-C50C-407E-A947-70E740481C1C}">
+                <a14:useLocalDpi xmlns:a14="http://schemas.microsoft.com/office/drawing/2010/main" val="0"/>
+              </a:ext>
+            </a:extLst>
+          </a:blip>
+          <a:srcRect t="48599" b="41042"/>
+          <a:stretch/>
+        </p:blipFill>
+        <p:spPr>
+          <a:xfrm>
+            <a:off x="2955759" y="4526279"/>
+            <a:ext cx="4106227" cy="299721"/>
+          </a:xfrm>
+          <a:prstGeom prst="rect">
+            <a:avLst/>
+          </a:prstGeom>
+        </p:spPr>
+      </p:pic>
+    </p:spTree>
+    <p:extLst>
+      <p:ext uri="{BB962C8B-B14F-4D97-AF65-F5344CB8AC3E}">
+        <p14:creationId xmlns:p14="http://schemas.microsoft.com/office/powerpoint/2010/main" val="1937853185"/>
+      </p:ext>
+    </p:extLst>
+  </p:cSld>
+  <p:clrMapOvr>
+    <a:masterClrMapping/>
+  </p:clrMapOvr>
+</p:sld>
+</file>
+
+<file path=ppt/slides/slide17.xml><?xml version="1.0" encoding="utf-8"?>
+<p:sld xmlns:a="http://schemas.openxmlformats.org/drawingml/2006/main" xmlns:r="http://schemas.openxmlformats.org/officeDocument/2006/relationships" xmlns:p="http://schemas.openxmlformats.org/presentationml/2006/main">
+  <p:cSld>
+    <p:bg>
+      <p:bgPr>
+        <a:solidFill>
+          <a:schemeClr val="bg1"/>
+        </a:solidFill>
+        <a:effectLst/>
+      </p:bgPr>
+    </p:bg>
+    <p:spTree>
+      <p:nvGrpSpPr>
+        <p:cNvPr id="1" name=""/>
+        <p:cNvGrpSpPr/>
+        <p:nvPr/>
+      </p:nvGrpSpPr>
+      <p:grpSpPr>
+        <a:xfrm>
+          <a:off x="0" y="0"/>
+          <a:ext cx="0" cy="0"/>
+          <a:chOff x="0" y="0"/>
+          <a:chExt cx="0" cy="0"/>
+        </a:xfrm>
+      </p:grpSpPr>
+      <p:pic>
+        <p:nvPicPr>
+          <p:cNvPr id="4" name="Imagen 3" descr="Interfaz de usuario gráfica, Aplicación&#10;&#10;Descripción generada automáticamente">
+            <a:extLst>
+              <a:ext uri="{FF2B5EF4-FFF2-40B4-BE49-F238E27FC236}">
+                <a16:creationId xmlns:a16="http://schemas.microsoft.com/office/drawing/2014/main" id="{1F1F7AE3-11FD-1C62-B07F-C24ED0EE1EBE}"/>
+              </a:ext>
+            </a:extLst>
+          </p:cNvPr>
+          <p:cNvPicPr>
+            <a:picLocks noChangeAspect="1"/>
+          </p:cNvPicPr>
+          <p:nvPr/>
+        </p:nvPicPr>
+        <p:blipFill>
+          <a:blip r:embed="rId2">
+            <a:extLst>
+              <a:ext uri="{28A0092B-C50C-407E-A947-70E740481C1C}">
+                <a14:useLocalDpi xmlns:a14="http://schemas.microsoft.com/office/drawing/2010/main" val="0"/>
+              </a:ext>
+            </a:extLst>
+          </a:blip>
+          <a:stretch>
+            <a:fillRect/>
+          </a:stretch>
+        </p:blipFill>
+        <p:spPr>
+          <a:xfrm>
+            <a:off x="3840868" y="2779018"/>
+            <a:ext cx="5236457" cy="3183476"/>
+          </a:xfrm>
+          <a:prstGeom prst="rect">
+            <a:avLst/>
+          </a:prstGeom>
+        </p:spPr>
+      </p:pic>
+      <p:pic>
+        <p:nvPicPr>
+          <p:cNvPr id="13" name="Imagen 12" descr="Interfaz de usuario gráfica, Texto, Aplicación, Correo electrónico&#10;&#10;Descripción generada automáticamente">
+            <a:extLst>
+              <a:ext uri="{FF2B5EF4-FFF2-40B4-BE49-F238E27FC236}">
+                <a16:creationId xmlns:a16="http://schemas.microsoft.com/office/drawing/2014/main" id="{93039D17-7BB9-60C3-78F3-3A093BE78556}"/>
+              </a:ext>
+            </a:extLst>
+          </p:cNvPr>
+          <p:cNvPicPr>
+            <a:picLocks noChangeAspect="1"/>
+          </p:cNvPicPr>
+          <p:nvPr/>
+        </p:nvPicPr>
+        <p:blipFill rotWithShape="1">
+          <a:blip r:embed="rId3">
+            <a:extLst>
+              <a:ext uri="{28A0092B-C50C-407E-A947-70E740481C1C}">
+                <a14:useLocalDpi xmlns:a14="http://schemas.microsoft.com/office/drawing/2010/main" val="0"/>
+              </a:ext>
+            </a:extLst>
+          </a:blip>
+          <a:srcRect t="391" r="832" b="27298"/>
+          <a:stretch/>
+        </p:blipFill>
+        <p:spPr>
+          <a:xfrm>
+            <a:off x="3840868" y="439035"/>
+            <a:ext cx="5236457" cy="2323216"/>
+          </a:xfrm>
+          <a:prstGeom prst="rect">
+            <a:avLst/>
+          </a:prstGeom>
+        </p:spPr>
+      </p:pic>
+    </p:spTree>
+    <p:extLst>
+      <p:ext uri="{BB962C8B-B14F-4D97-AF65-F5344CB8AC3E}">
+        <p14:creationId xmlns:p14="http://schemas.microsoft.com/office/powerpoint/2010/main" val="295274902"/>
+      </p:ext>
+    </p:extLst>
+  </p:cSld>
+  <p:clrMapOvr>
+    <a:masterClrMapping/>
+  </p:clrMapOvr>
+</p:sld>
+</file>
+
+<file path=ppt/slides/slide18.xml><?xml version="1.0" encoding="utf-8"?>
 <p:sld xmlns:a="http://schemas.openxmlformats.org/drawingml/2006/main" xmlns:r="http://schemas.openxmlformats.org/officeDocument/2006/relationships" xmlns:p="http://schemas.openxmlformats.org/presentationml/2006/main">
   <p:cSld>
     <p:spTree>
@@ -10597,7 +11215,7 @@
                   <a:schemeClr val="tx1"/>
                 </a:solidFill>
               </a:rPr>
-              <a:t>Gmail SMTP</a:t>
+              <a:t>GMX SMTP</a:t>
             </a:r>
           </a:p>
         </p:txBody>
@@ -11245,7 +11863,7 @@
                   <a:schemeClr val="tx1"/>
                 </a:solidFill>
               </a:rPr>
-              <a:t>Gmail SMTP</a:t>
+              <a:t>GMX SMTP</a:t>
             </a:r>
           </a:p>
         </p:txBody>
@@ -15189,7 +15807,7 @@
                   <a:schemeClr val="tx1"/>
                 </a:solidFill>
               </a:rPr>
-              <a:t>Correo Gmail de la aplicación</a:t>
+              <a:t>Correo GMX de la aplicación</a:t>
             </a:r>
           </a:p>
         </p:txBody>

</xml_diff>

<commit_message>
Presentación y cambios necesarios en la aplicación.
</commit_message>
<xml_diff>
--- a/Diseños/aquitectura.pptx
+++ b/Diseños/aquitectura.pptx
@@ -15,14 +15,21 @@
     <p:sldId id="261" r:id="rId9"/>
     <p:sldId id="268" r:id="rId10"/>
     <p:sldId id="266" r:id="rId11"/>
-    <p:sldId id="267" r:id="rId12"/>
-    <p:sldId id="269" r:id="rId13"/>
-    <p:sldId id="272" r:id="rId14"/>
-    <p:sldId id="270" r:id="rId15"/>
-    <p:sldId id="271" r:id="rId16"/>
-    <p:sldId id="273" r:id="rId17"/>
-    <p:sldId id="274" r:id="rId18"/>
-    <p:sldId id="262" r:id="rId19"/>
+    <p:sldId id="279" r:id="rId12"/>
+    <p:sldId id="275" r:id="rId13"/>
+    <p:sldId id="281" r:id="rId14"/>
+    <p:sldId id="280" r:id="rId15"/>
+    <p:sldId id="278" r:id="rId16"/>
+    <p:sldId id="277" r:id="rId17"/>
+    <p:sldId id="276" r:id="rId18"/>
+    <p:sldId id="267" r:id="rId19"/>
+    <p:sldId id="269" r:id="rId20"/>
+    <p:sldId id="272" r:id="rId21"/>
+    <p:sldId id="270" r:id="rId22"/>
+    <p:sldId id="271" r:id="rId23"/>
+    <p:sldId id="273" r:id="rId24"/>
+    <p:sldId id="274" r:id="rId25"/>
+    <p:sldId id="262" r:id="rId26"/>
   </p:sldIdLst>
   <p:sldSz cx="12192000" cy="6858000"/>
   <p:notesSz cx="6858000" cy="9144000"/>
@@ -276,7 +283,7 @@
           <a:p>
             <a:fld id="{3E1544B7-206C-4EA6-AC0C-B0859B395411}" type="datetimeFigureOut">
               <a:rPr lang="es-ES" smtClean="0"/>
-              <a:t>09/06/2022</a:t>
+              <a:t>30/06/2022</a:t>
             </a:fld>
             <a:endParaRPr lang="es-ES"/>
           </a:p>
@@ -474,7 +481,7 @@
           <a:p>
             <a:fld id="{3E1544B7-206C-4EA6-AC0C-B0859B395411}" type="datetimeFigureOut">
               <a:rPr lang="es-ES" smtClean="0"/>
-              <a:t>09/06/2022</a:t>
+              <a:t>30/06/2022</a:t>
             </a:fld>
             <a:endParaRPr lang="es-ES"/>
           </a:p>
@@ -682,7 +689,7 @@
           <a:p>
             <a:fld id="{3E1544B7-206C-4EA6-AC0C-B0859B395411}" type="datetimeFigureOut">
               <a:rPr lang="es-ES" smtClean="0"/>
-              <a:t>09/06/2022</a:t>
+              <a:t>30/06/2022</a:t>
             </a:fld>
             <a:endParaRPr lang="es-ES"/>
           </a:p>
@@ -880,7 +887,7 @@
           <a:p>
             <a:fld id="{3E1544B7-206C-4EA6-AC0C-B0859B395411}" type="datetimeFigureOut">
               <a:rPr lang="es-ES" smtClean="0"/>
-              <a:t>09/06/2022</a:t>
+              <a:t>30/06/2022</a:t>
             </a:fld>
             <a:endParaRPr lang="es-ES"/>
           </a:p>
@@ -1155,7 +1162,7 @@
           <a:p>
             <a:fld id="{3E1544B7-206C-4EA6-AC0C-B0859B395411}" type="datetimeFigureOut">
               <a:rPr lang="es-ES" smtClean="0"/>
-              <a:t>09/06/2022</a:t>
+              <a:t>30/06/2022</a:t>
             </a:fld>
             <a:endParaRPr lang="es-ES"/>
           </a:p>
@@ -1420,7 +1427,7 @@
           <a:p>
             <a:fld id="{3E1544B7-206C-4EA6-AC0C-B0859B395411}" type="datetimeFigureOut">
               <a:rPr lang="es-ES" smtClean="0"/>
-              <a:t>09/06/2022</a:t>
+              <a:t>30/06/2022</a:t>
             </a:fld>
             <a:endParaRPr lang="es-ES"/>
           </a:p>
@@ -1832,7 +1839,7 @@
           <a:p>
             <a:fld id="{3E1544B7-206C-4EA6-AC0C-B0859B395411}" type="datetimeFigureOut">
               <a:rPr lang="es-ES" smtClean="0"/>
-              <a:t>09/06/2022</a:t>
+              <a:t>30/06/2022</a:t>
             </a:fld>
             <a:endParaRPr lang="es-ES"/>
           </a:p>
@@ -1973,7 +1980,7 @@
           <a:p>
             <a:fld id="{3E1544B7-206C-4EA6-AC0C-B0859B395411}" type="datetimeFigureOut">
               <a:rPr lang="es-ES" smtClean="0"/>
-              <a:t>09/06/2022</a:t>
+              <a:t>30/06/2022</a:t>
             </a:fld>
             <a:endParaRPr lang="es-ES"/>
           </a:p>
@@ -2086,7 +2093,7 @@
           <a:p>
             <a:fld id="{3E1544B7-206C-4EA6-AC0C-B0859B395411}" type="datetimeFigureOut">
               <a:rPr lang="es-ES" smtClean="0"/>
-              <a:t>09/06/2022</a:t>
+              <a:t>30/06/2022</a:t>
             </a:fld>
             <a:endParaRPr lang="es-ES"/>
           </a:p>
@@ -2397,7 +2404,7 @@
           <a:p>
             <a:fld id="{3E1544B7-206C-4EA6-AC0C-B0859B395411}" type="datetimeFigureOut">
               <a:rPr lang="es-ES" smtClean="0"/>
-              <a:t>09/06/2022</a:t>
+              <a:t>30/06/2022</a:t>
             </a:fld>
             <a:endParaRPr lang="es-ES"/>
           </a:p>
@@ -2685,7 +2692,7 @@
           <a:p>
             <a:fld id="{3E1544B7-206C-4EA6-AC0C-B0859B395411}" type="datetimeFigureOut">
               <a:rPr lang="es-ES" smtClean="0"/>
-              <a:t>09/06/2022</a:t>
+              <a:t>30/06/2022</a:t>
             </a:fld>
             <a:endParaRPr lang="es-ES"/>
           </a:p>
@@ -2926,7 +2933,7 @@
           <a:p>
             <a:fld id="{3E1544B7-206C-4EA6-AC0C-B0859B395411}" type="datetimeFigureOut">
               <a:rPr lang="es-ES" smtClean="0"/>
-              <a:t>09/06/2022</a:t>
+              <a:t>30/06/2022</a:t>
             </a:fld>
             <a:endParaRPr lang="es-ES"/>
           </a:p>
@@ -5861,6 +5868,3561 @@
 <file path=ppt/slides/slide11.xml><?xml version="1.0" encoding="utf-8"?>
 <p:sld xmlns:a="http://schemas.openxmlformats.org/drawingml/2006/main" xmlns:r="http://schemas.openxmlformats.org/officeDocument/2006/relationships" xmlns:p="http://schemas.openxmlformats.org/presentationml/2006/main">
   <p:cSld>
+    <p:spTree>
+      <p:nvGrpSpPr>
+        <p:cNvPr id="1" name=""/>
+        <p:cNvGrpSpPr/>
+        <p:nvPr/>
+      </p:nvGrpSpPr>
+      <p:grpSpPr>
+        <a:xfrm>
+          <a:off x="0" y="0"/>
+          <a:ext cx="0" cy="0"/>
+          <a:chOff x="0" y="0"/>
+          <a:chExt cx="0" cy="0"/>
+        </a:xfrm>
+      </p:grpSpPr>
+      <p:sp>
+        <p:nvSpPr>
+          <p:cNvPr id="2" name="Título 1">
+            <a:extLst>
+              <a:ext uri="{FF2B5EF4-FFF2-40B4-BE49-F238E27FC236}">
+                <a16:creationId xmlns:a16="http://schemas.microsoft.com/office/drawing/2014/main" id="{2DD8C21F-D350-4941-98A5-59C59C6383EB}"/>
+              </a:ext>
+            </a:extLst>
+          </p:cNvPr>
+          <p:cNvSpPr>
+            <a:spLocks noGrp="1"/>
+          </p:cNvSpPr>
+          <p:nvPr>
+            <p:ph type="title"/>
+          </p:nvPr>
+        </p:nvSpPr>
+        <p:spPr/>
+        <p:txBody>
+          <a:bodyPr/>
+          <a:lstStyle/>
+          <a:p>
+            <a:r>
+              <a:rPr lang="es-ES" dirty="0"/>
+              <a:t>Origen figuras presentación </a:t>
+            </a:r>
+          </a:p>
+        </p:txBody>
+      </p:sp>
+      <p:sp>
+        <p:nvSpPr>
+          <p:cNvPr id="3" name="Marcador de contenido 2">
+            <a:extLst>
+              <a:ext uri="{FF2B5EF4-FFF2-40B4-BE49-F238E27FC236}">
+                <a16:creationId xmlns:a16="http://schemas.microsoft.com/office/drawing/2014/main" id="{AAC59212-EE18-4965-8F8A-7F54974FFCBA}"/>
+              </a:ext>
+            </a:extLst>
+          </p:cNvPr>
+          <p:cNvSpPr>
+            <a:spLocks noGrp="1"/>
+          </p:cNvSpPr>
+          <p:nvPr>
+            <p:ph idx="1"/>
+          </p:nvPr>
+        </p:nvSpPr>
+        <p:spPr>
+          <a:xfrm>
+            <a:off x="838200" y="1825625"/>
+            <a:ext cx="10515600" cy="4667250"/>
+          </a:xfrm>
+        </p:spPr>
+        <p:txBody>
+          <a:bodyPr>
+            <a:normAutofit/>
+          </a:bodyPr>
+          <a:lstStyle/>
+          <a:p>
+            <a:r>
+              <a:rPr lang="es-ES" sz="1100" dirty="0"/>
+              <a:t>Señor con pregunta: </a:t>
+            </a:r>
+            <a:r>
+              <a:rPr lang="es-ES" sz="1100" dirty="0">
+                <a:hlinkClick r:id="rId2"/>
+              </a:rPr>
+              <a:t>https://www.freepng.es/png-wf71pc/</a:t>
+            </a:r>
+            <a:endParaRPr lang="es-ES" sz="1100" dirty="0"/>
+          </a:p>
+          <a:p>
+            <a:r>
+              <a:rPr lang="es-ES" sz="1100" dirty="0"/>
+              <a:t>Plan negocio: </a:t>
+            </a:r>
+            <a:r>
+              <a:rPr lang="es-ES" sz="1100" dirty="0">
+                <a:hlinkClick r:id="rId3"/>
+              </a:rPr>
+              <a:t>https://es.vecteezy.com/arte-vectorial/350721-plan-de-negocios-vector-icono</a:t>
+            </a:r>
+            <a:endParaRPr lang="es-ES" sz="1100" dirty="0"/>
+          </a:p>
+          <a:p>
+            <a:r>
+              <a:rPr lang="es-ES" sz="1100" dirty="0"/>
+              <a:t>Aplicación web: </a:t>
+            </a:r>
+            <a:r>
+              <a:rPr lang="es-ES" sz="1100" dirty="0">
+                <a:hlinkClick r:id="rId4"/>
+              </a:rPr>
+              <a:t>https://www.pngegg.com/es/png-trfeh</a:t>
+            </a:r>
+            <a:endParaRPr lang="es-ES" sz="1100" dirty="0"/>
+          </a:p>
+          <a:p>
+            <a:r>
+              <a:rPr lang="es-ES" sz="1100" dirty="0"/>
+              <a:t>Descripción del sistema: </a:t>
+            </a:r>
+            <a:r>
+              <a:rPr lang="es-ES" sz="1100" dirty="0">
+                <a:hlinkClick r:id="rId5"/>
+              </a:rPr>
+              <a:t>https://www.flaticon.es/icono-gratis/sistema_2289316</a:t>
+            </a:r>
+            <a:r>
+              <a:rPr lang="es-ES" sz="1100" dirty="0"/>
+              <a:t> </a:t>
+            </a:r>
+          </a:p>
+          <a:p>
+            <a:r>
+              <a:rPr lang="es-ES" sz="1100" dirty="0"/>
+              <a:t>Objetivos: </a:t>
+            </a:r>
+            <a:r>
+              <a:rPr lang="es-ES" sz="1100" dirty="0">
+                <a:hlinkClick r:id="rId6"/>
+              </a:rPr>
+              <a:t>https://www.flaticon.es/icono-premium/lista-de-verificacion_4029449</a:t>
+            </a:r>
+            <a:endParaRPr lang="es-ES" sz="1100" dirty="0"/>
+          </a:p>
+          <a:p>
+            <a:r>
+              <a:rPr lang="es-ES" sz="1100" dirty="0"/>
+              <a:t>Patrón de diseño: </a:t>
+            </a:r>
+            <a:r>
+              <a:rPr lang="es-ES" sz="1100" dirty="0">
+                <a:hlinkClick r:id="rId7"/>
+              </a:rPr>
+              <a:t>https://www.flaticon.es/icono-gratis/patron-de-diseno_3527312</a:t>
+            </a:r>
+            <a:endParaRPr lang="es-ES" sz="1100" dirty="0"/>
+          </a:p>
+          <a:p>
+            <a:r>
+              <a:rPr lang="es-ES" sz="1100" dirty="0" err="1"/>
+              <a:t>AngularJs</a:t>
+            </a:r>
+            <a:r>
+              <a:rPr lang="es-ES" sz="1100"/>
+              <a:t>: https://www.vhv.rs/viewpic/hxRRwiJ_angular-angular-js-logo-png-transparent-png/</a:t>
+            </a:r>
+            <a:endParaRPr lang="es-ES" sz="1100" dirty="0"/>
+          </a:p>
+          <a:p>
+            <a:endParaRPr lang="es-ES" sz="1100" dirty="0"/>
+          </a:p>
+          <a:p>
+            <a:endParaRPr lang="es-ES" sz="1100" dirty="0"/>
+          </a:p>
+          <a:p>
+            <a:endParaRPr lang="es-ES" sz="1100" dirty="0"/>
+          </a:p>
+          <a:p>
+            <a:endParaRPr lang="es-ES" sz="1100" dirty="0"/>
+          </a:p>
+          <a:p>
+            <a:endParaRPr lang="es-ES" sz="1100" dirty="0"/>
+          </a:p>
+          <a:p>
+            <a:endParaRPr lang="es-ES" sz="1100" dirty="0"/>
+          </a:p>
+          <a:p>
+            <a:endParaRPr lang="es-ES" sz="1100" dirty="0"/>
+          </a:p>
+          <a:p>
+            <a:endParaRPr lang="es-ES" sz="1100" dirty="0"/>
+          </a:p>
+        </p:txBody>
+      </p:sp>
+    </p:spTree>
+    <p:extLst>
+      <p:ext uri="{BB962C8B-B14F-4D97-AF65-F5344CB8AC3E}">
+        <p14:creationId xmlns:p14="http://schemas.microsoft.com/office/powerpoint/2010/main" val="3750654778"/>
+      </p:ext>
+    </p:extLst>
+  </p:cSld>
+  <p:clrMapOvr>
+    <a:masterClrMapping/>
+  </p:clrMapOvr>
+</p:sld>
+</file>
+
+<file path=ppt/slides/slide12.xml><?xml version="1.0" encoding="utf-8"?>
+<p:sld xmlns:a="http://schemas.openxmlformats.org/drawingml/2006/main" xmlns:r="http://schemas.openxmlformats.org/officeDocument/2006/relationships" xmlns:p="http://schemas.openxmlformats.org/presentationml/2006/main">
+  <p:cSld>
+    <p:spTree>
+      <p:nvGrpSpPr>
+        <p:cNvPr id="1" name=""/>
+        <p:cNvGrpSpPr/>
+        <p:nvPr/>
+      </p:nvGrpSpPr>
+      <p:grpSpPr>
+        <a:xfrm>
+          <a:off x="0" y="0"/>
+          <a:ext cx="0" cy="0"/>
+          <a:chOff x="0" y="0"/>
+          <a:chExt cx="0" cy="0"/>
+        </a:xfrm>
+      </p:grpSpPr>
+      <p:pic>
+        <p:nvPicPr>
+          <p:cNvPr id="104" name="Gráfico 103" descr="Sobre contorno">
+            <a:extLst>
+              <a:ext uri="{FF2B5EF4-FFF2-40B4-BE49-F238E27FC236}">
+                <a16:creationId xmlns:a16="http://schemas.microsoft.com/office/drawing/2014/main" id="{CE312144-ACFD-BFE1-1CFB-8115A64B5BB4}"/>
+              </a:ext>
+            </a:extLst>
+          </p:cNvPr>
+          <p:cNvPicPr>
+            <a:picLocks noChangeAspect="1"/>
+          </p:cNvPicPr>
+          <p:nvPr/>
+        </p:nvPicPr>
+        <p:blipFill>
+          <a:blip r:embed="rId2">
+            <a:extLst>
+              <a:ext uri="{28A0092B-C50C-407E-A947-70E740481C1C}">
+                <a14:useLocalDpi xmlns:a14="http://schemas.microsoft.com/office/drawing/2010/main" val="0"/>
+              </a:ext>
+              <a:ext uri="{96DAC541-7B7A-43D3-8B79-37D633B846F1}">
+                <asvg:svgBlip xmlns:asvg="http://schemas.microsoft.com/office/drawing/2016/SVG/main" r:embed="rId3"/>
+              </a:ext>
+            </a:extLst>
+          </a:blip>
+          <a:stretch>
+            <a:fillRect/>
+          </a:stretch>
+        </p:blipFill>
+        <p:spPr>
+          <a:xfrm>
+            <a:off x="1890470" y="2971799"/>
+            <a:ext cx="914400" cy="914400"/>
+          </a:xfrm>
+          <a:prstGeom prst="rect">
+            <a:avLst/>
+          </a:prstGeom>
+        </p:spPr>
+      </p:pic>
+      <p:grpSp>
+        <p:nvGrpSpPr>
+          <p:cNvPr id="17" name="Grupo 16">
+            <a:extLst>
+              <a:ext uri="{FF2B5EF4-FFF2-40B4-BE49-F238E27FC236}">
+                <a16:creationId xmlns:a16="http://schemas.microsoft.com/office/drawing/2014/main" id="{A84868EB-9477-E3D0-4480-60A81D892C43}"/>
+              </a:ext>
+            </a:extLst>
+          </p:cNvPr>
+          <p:cNvGrpSpPr/>
+          <p:nvPr/>
+        </p:nvGrpSpPr>
+        <p:grpSpPr>
+          <a:xfrm>
+            <a:off x="1693821" y="3893816"/>
+            <a:ext cx="1312926" cy="1083677"/>
+            <a:chOff x="488641" y="3779668"/>
+            <a:chExt cx="1312926" cy="1083677"/>
+          </a:xfrm>
+        </p:grpSpPr>
+        <p:pic>
+          <p:nvPicPr>
+            <p:cNvPr id="3" name="Gráfico 2" descr="Usuario con relleno sólido">
+              <a:extLst>
+                <a:ext uri="{FF2B5EF4-FFF2-40B4-BE49-F238E27FC236}">
+                  <a16:creationId xmlns:a16="http://schemas.microsoft.com/office/drawing/2014/main" id="{B120A660-B34C-ACC0-24E9-A9E73DDFE4F4}"/>
+                </a:ext>
+              </a:extLst>
+            </p:cNvPr>
+            <p:cNvPicPr>
+              <a:picLocks noChangeAspect="1"/>
+            </p:cNvPicPr>
+            <p:nvPr/>
+          </p:nvPicPr>
+          <p:blipFill>
+            <a:blip r:embed="rId4">
+              <a:extLst>
+                <a:ext uri="{28A0092B-C50C-407E-A947-70E740481C1C}">
+                  <a14:useLocalDpi xmlns:a14="http://schemas.microsoft.com/office/drawing/2010/main" val="0"/>
+                </a:ext>
+                <a:ext uri="{96DAC541-7B7A-43D3-8B79-37D633B846F1}">
+                  <asvg:svgBlip xmlns:asvg="http://schemas.microsoft.com/office/drawing/2016/SVG/main" r:embed="rId5"/>
+                </a:ext>
+              </a:extLst>
+            </a:blip>
+            <a:stretch>
+              <a:fillRect/>
+            </a:stretch>
+          </p:blipFill>
+          <p:spPr>
+            <a:xfrm>
+              <a:off x="658427" y="3779668"/>
+              <a:ext cx="914400" cy="914400"/>
+            </a:xfrm>
+            <a:prstGeom prst="rect">
+              <a:avLst/>
+            </a:prstGeom>
+          </p:spPr>
+        </p:pic>
+        <p:sp>
+          <p:nvSpPr>
+            <p:cNvPr id="7" name="CuadroTexto 6">
+              <a:extLst>
+                <a:ext uri="{FF2B5EF4-FFF2-40B4-BE49-F238E27FC236}">
+                  <a16:creationId xmlns:a16="http://schemas.microsoft.com/office/drawing/2014/main" id="{469051E8-C1DA-CC8B-CDF3-C728DBF15B81}"/>
+                </a:ext>
+              </a:extLst>
+            </p:cNvPr>
+            <p:cNvSpPr txBox="1"/>
+            <p:nvPr/>
+          </p:nvSpPr>
+          <p:spPr>
+            <a:xfrm>
+              <a:off x="488641" y="4524791"/>
+              <a:ext cx="1312926" cy="338554"/>
+            </a:xfrm>
+            <a:prstGeom prst="rect">
+              <a:avLst/>
+            </a:prstGeom>
+            <a:noFill/>
+          </p:spPr>
+          <p:txBody>
+            <a:bodyPr wrap="square" rtlCol="0">
+              <a:spAutoFit/>
+            </a:bodyPr>
+            <a:lstStyle/>
+            <a:p>
+              <a:r>
+                <a:rPr lang="es-ES" sz="1600" dirty="0"/>
+                <a:t>Mentorizado</a:t>
+              </a:r>
+              <a:endParaRPr lang="es-ES" dirty="0"/>
+            </a:p>
+          </p:txBody>
+        </p:sp>
+      </p:grpSp>
+      <p:grpSp>
+        <p:nvGrpSpPr>
+          <p:cNvPr id="15" name="Grupo 14">
+            <a:extLst>
+              <a:ext uri="{FF2B5EF4-FFF2-40B4-BE49-F238E27FC236}">
+                <a16:creationId xmlns:a16="http://schemas.microsoft.com/office/drawing/2014/main" id="{ED22810D-2E70-332A-2A90-F9F1C9DFADFB}"/>
+              </a:ext>
+            </a:extLst>
+          </p:cNvPr>
+          <p:cNvGrpSpPr/>
+          <p:nvPr/>
+        </p:nvGrpSpPr>
+        <p:grpSpPr>
+          <a:xfrm>
+            <a:off x="3035545" y="2979436"/>
+            <a:ext cx="1440000" cy="1103531"/>
+            <a:chOff x="2285319" y="2896189"/>
+            <a:chExt cx="1440000" cy="1103531"/>
+          </a:xfrm>
+        </p:grpSpPr>
+        <p:pic>
+          <p:nvPicPr>
+            <p:cNvPr id="8" name="Gráfico 7" descr="Usuario con relleno sólido">
+              <a:extLst>
+                <a:ext uri="{FF2B5EF4-FFF2-40B4-BE49-F238E27FC236}">
+                  <a16:creationId xmlns:a16="http://schemas.microsoft.com/office/drawing/2014/main" id="{DA7DF097-D0F8-C4EB-13ED-BB9CE949AB6D}"/>
+                </a:ext>
+              </a:extLst>
+            </p:cNvPr>
+            <p:cNvPicPr>
+              <a:picLocks noChangeAspect="1"/>
+            </p:cNvPicPr>
+            <p:nvPr/>
+          </p:nvPicPr>
+          <p:blipFill>
+            <a:blip r:embed="rId6">
+              <a:extLst>
+                <a:ext uri="{28A0092B-C50C-407E-A947-70E740481C1C}">
+                  <a14:useLocalDpi xmlns:a14="http://schemas.microsoft.com/office/drawing/2010/main" val="0"/>
+                </a:ext>
+                <a:ext uri="{96DAC541-7B7A-43D3-8B79-37D633B846F1}">
+                  <asvg:svgBlip xmlns:asvg="http://schemas.microsoft.com/office/drawing/2016/SVG/main" r:embed="rId7"/>
+                </a:ext>
+              </a:extLst>
+            </a:blip>
+            <a:stretch>
+              <a:fillRect/>
+            </a:stretch>
+          </p:blipFill>
+          <p:spPr>
+            <a:xfrm>
+              <a:off x="2515340" y="2896189"/>
+              <a:ext cx="914400" cy="914400"/>
+            </a:xfrm>
+            <a:prstGeom prst="rect">
+              <a:avLst/>
+            </a:prstGeom>
+          </p:spPr>
+        </p:pic>
+        <p:sp>
+          <p:nvSpPr>
+            <p:cNvPr id="9" name="CuadroTexto 8">
+              <a:extLst>
+                <a:ext uri="{FF2B5EF4-FFF2-40B4-BE49-F238E27FC236}">
+                  <a16:creationId xmlns:a16="http://schemas.microsoft.com/office/drawing/2014/main" id="{62F61115-B928-A6B0-16A2-FC99817F478B}"/>
+                </a:ext>
+              </a:extLst>
+            </p:cNvPr>
+            <p:cNvSpPr txBox="1"/>
+            <p:nvPr/>
+          </p:nvSpPr>
+          <p:spPr>
+            <a:xfrm>
+              <a:off x="2285319" y="3661166"/>
+              <a:ext cx="1440000" cy="338554"/>
+            </a:xfrm>
+            <a:prstGeom prst="rect">
+              <a:avLst/>
+            </a:prstGeom>
+            <a:noFill/>
+          </p:spPr>
+          <p:txBody>
+            <a:bodyPr wrap="square" rtlCol="0">
+              <a:spAutoFit/>
+            </a:bodyPr>
+            <a:lstStyle/>
+            <a:p>
+              <a:r>
+                <a:rPr lang="es-ES" sz="1600" dirty="0"/>
+                <a:t>Administrador</a:t>
+              </a:r>
+            </a:p>
+          </p:txBody>
+        </p:sp>
+      </p:grpSp>
+      <p:cxnSp>
+        <p:nvCxnSpPr>
+          <p:cNvPr id="11" name="Conector recto de flecha 10">
+            <a:extLst>
+              <a:ext uri="{FF2B5EF4-FFF2-40B4-BE49-F238E27FC236}">
+                <a16:creationId xmlns:a16="http://schemas.microsoft.com/office/drawing/2014/main" id="{3428BA45-30FE-F1E9-8C34-B96B3BA1A934}"/>
+              </a:ext>
+            </a:extLst>
+          </p:cNvPr>
+          <p:cNvCxnSpPr>
+            <a:cxnSpLocks/>
+            <a:stCxn id="91" idx="3"/>
+            <a:endCxn id="8" idx="1"/>
+          </p:cNvCxnSpPr>
+          <p:nvPr/>
+        </p:nvCxnSpPr>
+        <p:spPr>
+          <a:xfrm>
+            <a:off x="2778007" y="2299735"/>
+            <a:ext cx="487559" cy="1136901"/>
+          </a:xfrm>
+          <a:prstGeom prst="straightConnector1">
+            <a:avLst/>
+          </a:prstGeom>
+          <a:ln>
+            <a:tailEnd type="triangle"/>
+          </a:ln>
+        </p:spPr>
+        <p:style>
+          <a:lnRef idx="1">
+            <a:schemeClr val="dk1"/>
+          </a:lnRef>
+          <a:fillRef idx="0">
+            <a:schemeClr val="dk1"/>
+          </a:fillRef>
+          <a:effectRef idx="0">
+            <a:schemeClr val="dk1"/>
+          </a:effectRef>
+          <a:fontRef idx="minor">
+            <a:schemeClr val="tx1"/>
+          </a:fontRef>
+        </p:style>
+      </p:cxnSp>
+      <p:cxnSp>
+        <p:nvCxnSpPr>
+          <p:cNvPr id="12" name="Conector recto de flecha 11">
+            <a:extLst>
+              <a:ext uri="{FF2B5EF4-FFF2-40B4-BE49-F238E27FC236}">
+                <a16:creationId xmlns:a16="http://schemas.microsoft.com/office/drawing/2014/main" id="{24E492C9-A473-959F-3AFC-869754EAFC00}"/>
+              </a:ext>
+            </a:extLst>
+          </p:cNvPr>
+          <p:cNvCxnSpPr>
+            <a:cxnSpLocks/>
+            <a:stCxn id="3" idx="3"/>
+            <a:endCxn id="8" idx="1"/>
+          </p:cNvCxnSpPr>
+          <p:nvPr/>
+        </p:nvCxnSpPr>
+        <p:spPr>
+          <a:xfrm flipV="1">
+            <a:off x="2778007" y="3436636"/>
+            <a:ext cx="487559" cy="914380"/>
+          </a:xfrm>
+          <a:prstGeom prst="straightConnector1">
+            <a:avLst/>
+          </a:prstGeom>
+          <a:ln>
+            <a:tailEnd type="triangle"/>
+          </a:ln>
+        </p:spPr>
+        <p:style>
+          <a:lnRef idx="1">
+            <a:schemeClr val="dk1"/>
+          </a:lnRef>
+          <a:fillRef idx="0">
+            <a:schemeClr val="dk1"/>
+          </a:fillRef>
+          <a:effectRef idx="0">
+            <a:schemeClr val="dk1"/>
+          </a:effectRef>
+          <a:fontRef idx="minor">
+            <a:schemeClr val="tx1"/>
+          </a:fontRef>
+        </p:style>
+      </p:cxnSp>
+      <p:sp>
+        <p:nvSpPr>
+          <p:cNvPr id="19" name="CuadroTexto 18">
+            <a:extLst>
+              <a:ext uri="{FF2B5EF4-FFF2-40B4-BE49-F238E27FC236}">
+                <a16:creationId xmlns:a16="http://schemas.microsoft.com/office/drawing/2014/main" id="{D8AB4FE5-913E-4BDD-3577-52BE0FB4997F}"/>
+              </a:ext>
+            </a:extLst>
+          </p:cNvPr>
+          <p:cNvSpPr txBox="1"/>
+          <p:nvPr/>
+        </p:nvSpPr>
+        <p:spPr>
+          <a:xfrm>
+            <a:off x="2048060" y="5002990"/>
+            <a:ext cx="1813360" cy="461665"/>
+          </a:xfrm>
+          <a:prstGeom prst="rect">
+            <a:avLst/>
+          </a:prstGeom>
+          <a:noFill/>
+        </p:spPr>
+        <p:txBody>
+          <a:bodyPr wrap="square" rtlCol="0">
+            <a:spAutoFit/>
+          </a:bodyPr>
+          <a:lstStyle/>
+          <a:p>
+            <a:r>
+              <a:rPr lang="es-ES" sz="2400" b="1" dirty="0"/>
+              <a:t>Inscripción</a:t>
+            </a:r>
+            <a:endParaRPr lang="es-ES" sz="2000" b="1" dirty="0"/>
+          </a:p>
+        </p:txBody>
+      </p:sp>
+      <p:sp>
+        <p:nvSpPr>
+          <p:cNvPr id="45" name="Flecha: a la derecha 44">
+            <a:extLst>
+              <a:ext uri="{FF2B5EF4-FFF2-40B4-BE49-F238E27FC236}">
+                <a16:creationId xmlns:a16="http://schemas.microsoft.com/office/drawing/2014/main" id="{023C9381-2277-A55F-4636-C3F54824A840}"/>
+              </a:ext>
+            </a:extLst>
+          </p:cNvPr>
+          <p:cNvSpPr/>
+          <p:nvPr/>
+        </p:nvSpPr>
+        <p:spPr>
+          <a:xfrm>
+            <a:off x="4401785" y="3272981"/>
+            <a:ext cx="484292" cy="281465"/>
+          </a:xfrm>
+          <a:prstGeom prst="rightArrow">
+            <a:avLst/>
+          </a:prstGeom>
+          <a:noFill/>
+          <a:ln>
+            <a:solidFill>
+              <a:srgbClr val="002060"/>
+            </a:solidFill>
+          </a:ln>
+        </p:spPr>
+        <p:style>
+          <a:lnRef idx="2">
+            <a:schemeClr val="accent1">
+              <a:shade val="50000"/>
+            </a:schemeClr>
+          </a:lnRef>
+          <a:fillRef idx="1">
+            <a:schemeClr val="accent1"/>
+          </a:fillRef>
+          <a:effectRef idx="0">
+            <a:schemeClr val="accent1"/>
+          </a:effectRef>
+          <a:fontRef idx="minor">
+            <a:schemeClr val="lt1"/>
+          </a:fontRef>
+        </p:style>
+        <p:txBody>
+          <a:bodyPr rtlCol="0" anchor="ctr"/>
+          <a:lstStyle/>
+          <a:p>
+            <a:pPr algn="ctr"/>
+            <a:endParaRPr lang="es-ES"/>
+          </a:p>
+        </p:txBody>
+      </p:sp>
+      <p:sp>
+        <p:nvSpPr>
+          <p:cNvPr id="75" name="Flecha: a la derecha 74">
+            <a:extLst>
+              <a:ext uri="{FF2B5EF4-FFF2-40B4-BE49-F238E27FC236}">
+                <a16:creationId xmlns:a16="http://schemas.microsoft.com/office/drawing/2014/main" id="{C2F2FD23-DA78-7930-327F-D97DD9E8C4C1}"/>
+              </a:ext>
+            </a:extLst>
+          </p:cNvPr>
+          <p:cNvSpPr/>
+          <p:nvPr/>
+        </p:nvSpPr>
+        <p:spPr>
+          <a:xfrm>
+            <a:off x="7840113" y="3288267"/>
+            <a:ext cx="484292" cy="281465"/>
+          </a:xfrm>
+          <a:prstGeom prst="rightArrow">
+            <a:avLst/>
+          </a:prstGeom>
+          <a:noFill/>
+          <a:ln>
+            <a:solidFill>
+              <a:srgbClr val="002060"/>
+            </a:solidFill>
+          </a:ln>
+        </p:spPr>
+        <p:style>
+          <a:lnRef idx="2">
+            <a:schemeClr val="accent1">
+              <a:shade val="50000"/>
+            </a:schemeClr>
+          </a:lnRef>
+          <a:fillRef idx="1">
+            <a:schemeClr val="accent1"/>
+          </a:fillRef>
+          <a:effectRef idx="0">
+            <a:schemeClr val="accent1"/>
+          </a:effectRef>
+          <a:fontRef idx="minor">
+            <a:schemeClr val="lt1"/>
+          </a:fontRef>
+        </p:style>
+        <p:txBody>
+          <a:bodyPr rtlCol="0" anchor="ctr"/>
+          <a:lstStyle/>
+          <a:p>
+            <a:pPr algn="ctr"/>
+            <a:endParaRPr lang="es-ES"/>
+          </a:p>
+        </p:txBody>
+      </p:sp>
+      <p:grpSp>
+        <p:nvGrpSpPr>
+          <p:cNvPr id="79" name="Grupo 78">
+            <a:extLst>
+              <a:ext uri="{FF2B5EF4-FFF2-40B4-BE49-F238E27FC236}">
+                <a16:creationId xmlns:a16="http://schemas.microsoft.com/office/drawing/2014/main" id="{822B65AB-09AE-93C9-665C-023357F16CB1}"/>
+              </a:ext>
+            </a:extLst>
+          </p:cNvPr>
+          <p:cNvGrpSpPr/>
+          <p:nvPr/>
+        </p:nvGrpSpPr>
+        <p:grpSpPr>
+          <a:xfrm>
+            <a:off x="8441691" y="3920533"/>
+            <a:ext cx="1312926" cy="1082457"/>
+            <a:chOff x="513657" y="3779668"/>
+            <a:chExt cx="1312926" cy="1082457"/>
+          </a:xfrm>
+        </p:grpSpPr>
+        <p:pic>
+          <p:nvPicPr>
+            <p:cNvPr id="80" name="Gráfico 79" descr="Usuario con relleno sólido">
+              <a:extLst>
+                <a:ext uri="{FF2B5EF4-FFF2-40B4-BE49-F238E27FC236}">
+                  <a16:creationId xmlns:a16="http://schemas.microsoft.com/office/drawing/2014/main" id="{F58D865B-639E-6A7E-FEA4-E9DD1D69DBC6}"/>
+                </a:ext>
+              </a:extLst>
+            </p:cNvPr>
+            <p:cNvPicPr>
+              <a:picLocks noChangeAspect="1"/>
+            </p:cNvPicPr>
+            <p:nvPr/>
+          </p:nvPicPr>
+          <p:blipFill>
+            <a:blip r:embed="rId4">
+              <a:extLst>
+                <a:ext uri="{28A0092B-C50C-407E-A947-70E740481C1C}">
+                  <a14:useLocalDpi xmlns:a14="http://schemas.microsoft.com/office/drawing/2010/main" val="0"/>
+                </a:ext>
+                <a:ext uri="{96DAC541-7B7A-43D3-8B79-37D633B846F1}">
+                  <asvg:svgBlip xmlns:asvg="http://schemas.microsoft.com/office/drawing/2016/SVG/main" r:embed="rId5"/>
+                </a:ext>
+              </a:extLst>
+            </a:blip>
+            <a:stretch>
+              <a:fillRect/>
+            </a:stretch>
+          </p:blipFill>
+          <p:spPr>
+            <a:xfrm>
+              <a:off x="658427" y="3779668"/>
+              <a:ext cx="914400" cy="914400"/>
+            </a:xfrm>
+            <a:prstGeom prst="rect">
+              <a:avLst/>
+            </a:prstGeom>
+          </p:spPr>
+        </p:pic>
+        <p:sp>
+          <p:nvSpPr>
+            <p:cNvPr id="81" name="CuadroTexto 80">
+              <a:extLst>
+                <a:ext uri="{FF2B5EF4-FFF2-40B4-BE49-F238E27FC236}">
+                  <a16:creationId xmlns:a16="http://schemas.microsoft.com/office/drawing/2014/main" id="{681E8AA8-56C0-B3B9-534D-B50B4BBC0CA5}"/>
+                </a:ext>
+              </a:extLst>
+            </p:cNvPr>
+            <p:cNvSpPr txBox="1"/>
+            <p:nvPr/>
+          </p:nvSpPr>
+          <p:spPr>
+            <a:xfrm>
+              <a:off x="513657" y="4523571"/>
+              <a:ext cx="1312926" cy="338554"/>
+            </a:xfrm>
+            <a:prstGeom prst="rect">
+              <a:avLst/>
+            </a:prstGeom>
+            <a:noFill/>
+          </p:spPr>
+          <p:txBody>
+            <a:bodyPr wrap="square" rtlCol="0">
+              <a:spAutoFit/>
+            </a:bodyPr>
+            <a:lstStyle/>
+            <a:p>
+              <a:r>
+                <a:rPr lang="es-ES" sz="1600" dirty="0"/>
+                <a:t>Mentorizado</a:t>
+              </a:r>
+              <a:endParaRPr lang="es-ES" dirty="0"/>
+            </a:p>
+          </p:txBody>
+        </p:sp>
+      </p:grpSp>
+      <p:cxnSp>
+        <p:nvCxnSpPr>
+          <p:cNvPr id="89" name="Conector recto de flecha 88">
+            <a:extLst>
+              <a:ext uri="{FF2B5EF4-FFF2-40B4-BE49-F238E27FC236}">
+                <a16:creationId xmlns:a16="http://schemas.microsoft.com/office/drawing/2014/main" id="{A0ABFBD6-A3C9-95FF-20FC-9043CC786C5C}"/>
+              </a:ext>
+            </a:extLst>
+          </p:cNvPr>
+          <p:cNvCxnSpPr>
+            <a:cxnSpLocks/>
+            <a:endCxn id="80" idx="0"/>
+          </p:cNvCxnSpPr>
+          <p:nvPr/>
+        </p:nvCxnSpPr>
+        <p:spPr>
+          <a:xfrm>
+            <a:off x="9043661" y="2949974"/>
+            <a:ext cx="0" cy="970559"/>
+          </a:xfrm>
+          <a:prstGeom prst="straightConnector1">
+            <a:avLst/>
+          </a:prstGeom>
+          <a:ln>
+            <a:solidFill>
+              <a:schemeClr val="tx1"/>
+            </a:solidFill>
+            <a:headEnd type="triangle"/>
+            <a:tailEnd type="triangle"/>
+          </a:ln>
+        </p:spPr>
+        <p:style>
+          <a:lnRef idx="1">
+            <a:schemeClr val="accent1"/>
+          </a:lnRef>
+          <a:fillRef idx="0">
+            <a:schemeClr val="accent1"/>
+          </a:fillRef>
+          <a:effectRef idx="0">
+            <a:schemeClr val="accent1"/>
+          </a:effectRef>
+          <a:fontRef idx="minor">
+            <a:schemeClr val="tx1"/>
+          </a:fontRef>
+        </p:style>
+      </p:cxnSp>
+      <p:grpSp>
+        <p:nvGrpSpPr>
+          <p:cNvPr id="90" name="Grupo 89">
+            <a:extLst>
+              <a:ext uri="{FF2B5EF4-FFF2-40B4-BE49-F238E27FC236}">
+                <a16:creationId xmlns:a16="http://schemas.microsoft.com/office/drawing/2014/main" id="{42002EE8-B3A7-4193-31DD-2091F90553A7}"/>
+              </a:ext>
+            </a:extLst>
+          </p:cNvPr>
+          <p:cNvGrpSpPr/>
+          <p:nvPr/>
+        </p:nvGrpSpPr>
+        <p:grpSpPr>
+          <a:xfrm>
+            <a:off x="1863607" y="1842535"/>
+            <a:ext cx="915693" cy="1067946"/>
+            <a:chOff x="658427" y="1607968"/>
+            <a:chExt cx="915693" cy="1067946"/>
+          </a:xfrm>
+        </p:grpSpPr>
+        <p:pic>
+          <p:nvPicPr>
+            <p:cNvPr id="91" name="Gráfico 90" descr="Usuario con relleno sólido">
+              <a:extLst>
+                <a:ext uri="{FF2B5EF4-FFF2-40B4-BE49-F238E27FC236}">
+                  <a16:creationId xmlns:a16="http://schemas.microsoft.com/office/drawing/2014/main" id="{4C668B73-D980-6E6C-961E-AA0053F5FB88}"/>
+                </a:ext>
+              </a:extLst>
+            </p:cNvPr>
+            <p:cNvPicPr>
+              <a:picLocks noChangeAspect="1"/>
+            </p:cNvPicPr>
+            <p:nvPr/>
+          </p:nvPicPr>
+          <p:blipFill>
+            <a:blip r:embed="rId8">
+              <a:extLst>
+                <a:ext uri="{28A0092B-C50C-407E-A947-70E740481C1C}">
+                  <a14:useLocalDpi xmlns:a14="http://schemas.microsoft.com/office/drawing/2010/main" val="0"/>
+                </a:ext>
+                <a:ext uri="{96DAC541-7B7A-43D3-8B79-37D633B846F1}">
+                  <asvg:svgBlip xmlns:asvg="http://schemas.microsoft.com/office/drawing/2016/SVG/main" r:embed="rId9"/>
+                </a:ext>
+              </a:extLst>
+            </a:blip>
+            <a:stretch>
+              <a:fillRect/>
+            </a:stretch>
+          </p:blipFill>
+          <p:spPr>
+            <a:xfrm>
+              <a:off x="658427" y="1607968"/>
+              <a:ext cx="914400" cy="914400"/>
+            </a:xfrm>
+            <a:prstGeom prst="rect">
+              <a:avLst/>
+            </a:prstGeom>
+          </p:spPr>
+        </p:pic>
+        <p:sp>
+          <p:nvSpPr>
+            <p:cNvPr id="92" name="CuadroTexto 91">
+              <a:extLst>
+                <a:ext uri="{FF2B5EF4-FFF2-40B4-BE49-F238E27FC236}">
+                  <a16:creationId xmlns:a16="http://schemas.microsoft.com/office/drawing/2014/main" id="{D6064FF4-4DCC-ECFD-4D62-57EC99FB0668}"/>
+                </a:ext>
+              </a:extLst>
+            </p:cNvPr>
+            <p:cNvSpPr txBox="1"/>
+            <p:nvPr/>
+          </p:nvSpPr>
+          <p:spPr>
+            <a:xfrm>
+              <a:off x="735320" y="2337360"/>
+              <a:ext cx="838800" cy="338554"/>
+            </a:xfrm>
+            <a:prstGeom prst="rect">
+              <a:avLst/>
+            </a:prstGeom>
+            <a:noFill/>
+          </p:spPr>
+          <p:txBody>
+            <a:bodyPr wrap="square" rtlCol="0">
+              <a:spAutoFit/>
+            </a:bodyPr>
+            <a:lstStyle/>
+            <a:p>
+              <a:r>
+                <a:rPr lang="es-ES" sz="1600" dirty="0"/>
+                <a:t>Mentor</a:t>
+              </a:r>
+              <a:endParaRPr lang="es-ES" dirty="0"/>
+            </a:p>
+          </p:txBody>
+        </p:sp>
+      </p:grpSp>
+      <p:grpSp>
+        <p:nvGrpSpPr>
+          <p:cNvPr id="94" name="Grupo 93">
+            <a:extLst>
+              <a:ext uri="{FF2B5EF4-FFF2-40B4-BE49-F238E27FC236}">
+                <a16:creationId xmlns:a16="http://schemas.microsoft.com/office/drawing/2014/main" id="{D8D2ABC8-2C8A-DB53-BD64-5AF192FEFFA0}"/>
+              </a:ext>
+            </a:extLst>
+          </p:cNvPr>
+          <p:cNvGrpSpPr/>
+          <p:nvPr/>
+        </p:nvGrpSpPr>
+        <p:grpSpPr>
+          <a:xfrm>
+            <a:off x="8586461" y="1833555"/>
+            <a:ext cx="915695" cy="1067799"/>
+            <a:chOff x="658427" y="1607968"/>
+            <a:chExt cx="915695" cy="1067799"/>
+          </a:xfrm>
+        </p:grpSpPr>
+        <p:pic>
+          <p:nvPicPr>
+            <p:cNvPr id="95" name="Gráfico 94" descr="Usuario con relleno sólido">
+              <a:extLst>
+                <a:ext uri="{FF2B5EF4-FFF2-40B4-BE49-F238E27FC236}">
+                  <a16:creationId xmlns:a16="http://schemas.microsoft.com/office/drawing/2014/main" id="{335E9E7B-ECC7-D452-51A0-79DE47AE875D}"/>
+                </a:ext>
+              </a:extLst>
+            </p:cNvPr>
+            <p:cNvPicPr>
+              <a:picLocks noChangeAspect="1"/>
+            </p:cNvPicPr>
+            <p:nvPr/>
+          </p:nvPicPr>
+          <p:blipFill>
+            <a:blip r:embed="rId8">
+              <a:extLst>
+                <a:ext uri="{28A0092B-C50C-407E-A947-70E740481C1C}">
+                  <a14:useLocalDpi xmlns:a14="http://schemas.microsoft.com/office/drawing/2010/main" val="0"/>
+                </a:ext>
+                <a:ext uri="{96DAC541-7B7A-43D3-8B79-37D633B846F1}">
+                  <asvg:svgBlip xmlns:asvg="http://schemas.microsoft.com/office/drawing/2016/SVG/main" r:embed="rId9"/>
+                </a:ext>
+              </a:extLst>
+            </a:blip>
+            <a:stretch>
+              <a:fillRect/>
+            </a:stretch>
+          </p:blipFill>
+          <p:spPr>
+            <a:xfrm>
+              <a:off x="658427" y="1607968"/>
+              <a:ext cx="914400" cy="914400"/>
+            </a:xfrm>
+            <a:prstGeom prst="rect">
+              <a:avLst/>
+            </a:prstGeom>
+          </p:spPr>
+        </p:pic>
+        <p:sp>
+          <p:nvSpPr>
+            <p:cNvPr id="96" name="CuadroTexto 95">
+              <a:extLst>
+                <a:ext uri="{FF2B5EF4-FFF2-40B4-BE49-F238E27FC236}">
+                  <a16:creationId xmlns:a16="http://schemas.microsoft.com/office/drawing/2014/main" id="{F032654D-A3FE-EECB-211E-CF342CDCD748}"/>
+                </a:ext>
+              </a:extLst>
+            </p:cNvPr>
+            <p:cNvSpPr txBox="1"/>
+            <p:nvPr/>
+          </p:nvSpPr>
+          <p:spPr>
+            <a:xfrm>
+              <a:off x="735322" y="2337213"/>
+              <a:ext cx="838800" cy="338554"/>
+            </a:xfrm>
+            <a:prstGeom prst="rect">
+              <a:avLst/>
+            </a:prstGeom>
+            <a:noFill/>
+          </p:spPr>
+          <p:txBody>
+            <a:bodyPr wrap="square" rtlCol="0">
+              <a:spAutoFit/>
+            </a:bodyPr>
+            <a:lstStyle/>
+            <a:p>
+              <a:r>
+                <a:rPr lang="es-ES" sz="1600" dirty="0"/>
+                <a:t>Mentor</a:t>
+              </a:r>
+              <a:endParaRPr lang="es-ES" dirty="0"/>
+            </a:p>
+          </p:txBody>
+        </p:sp>
+      </p:grpSp>
+      <p:pic>
+        <p:nvPicPr>
+          <p:cNvPr id="106" name="Gráfico 105" descr="Sobre contorno">
+            <a:extLst>
+              <a:ext uri="{FF2B5EF4-FFF2-40B4-BE49-F238E27FC236}">
+                <a16:creationId xmlns:a16="http://schemas.microsoft.com/office/drawing/2014/main" id="{23915BB4-3112-7FCD-CD48-93D14759ED0A}"/>
+              </a:ext>
+            </a:extLst>
+          </p:cNvPr>
+          <p:cNvPicPr>
+            <a:picLocks noChangeAspect="1"/>
+          </p:cNvPicPr>
+          <p:nvPr/>
+        </p:nvPicPr>
+        <p:blipFill>
+          <a:blip r:embed="rId2">
+            <a:extLst>
+              <a:ext uri="{28A0092B-C50C-407E-A947-70E740481C1C}">
+                <a14:useLocalDpi xmlns:a14="http://schemas.microsoft.com/office/drawing/2010/main" val="0"/>
+              </a:ext>
+              <a:ext uri="{96DAC541-7B7A-43D3-8B79-37D633B846F1}">
+                <asvg:svgBlip xmlns:asvg="http://schemas.microsoft.com/office/drawing/2016/SVG/main" r:embed="rId3"/>
+              </a:ext>
+            </a:extLst>
+          </a:blip>
+          <a:stretch>
+            <a:fillRect/>
+          </a:stretch>
+        </p:blipFill>
+        <p:spPr>
+          <a:xfrm>
+            <a:off x="5138028" y="2971800"/>
+            <a:ext cx="914400" cy="914400"/>
+          </a:xfrm>
+          <a:prstGeom prst="rect">
+            <a:avLst/>
+          </a:prstGeom>
+        </p:spPr>
+      </p:pic>
+      <p:grpSp>
+        <p:nvGrpSpPr>
+          <p:cNvPr id="107" name="Grupo 106">
+            <a:extLst>
+              <a:ext uri="{FF2B5EF4-FFF2-40B4-BE49-F238E27FC236}">
+                <a16:creationId xmlns:a16="http://schemas.microsoft.com/office/drawing/2014/main" id="{9DFA81A1-57AE-A135-883B-3E23C665C3D8}"/>
+              </a:ext>
+            </a:extLst>
+          </p:cNvPr>
+          <p:cNvGrpSpPr/>
+          <p:nvPr/>
+        </p:nvGrpSpPr>
+        <p:grpSpPr>
+          <a:xfrm>
+            <a:off x="4941379" y="3893817"/>
+            <a:ext cx="1312926" cy="1083677"/>
+            <a:chOff x="488641" y="3779668"/>
+            <a:chExt cx="1312926" cy="1083677"/>
+          </a:xfrm>
+        </p:grpSpPr>
+        <p:pic>
+          <p:nvPicPr>
+            <p:cNvPr id="108" name="Gráfico 107" descr="Usuario con relleno sólido">
+              <a:extLst>
+                <a:ext uri="{FF2B5EF4-FFF2-40B4-BE49-F238E27FC236}">
+                  <a16:creationId xmlns:a16="http://schemas.microsoft.com/office/drawing/2014/main" id="{16FE619A-E79D-F092-CF54-6CB1E92D10A2}"/>
+                </a:ext>
+              </a:extLst>
+            </p:cNvPr>
+            <p:cNvPicPr>
+              <a:picLocks noChangeAspect="1"/>
+            </p:cNvPicPr>
+            <p:nvPr/>
+          </p:nvPicPr>
+          <p:blipFill>
+            <a:blip r:embed="rId4">
+              <a:extLst>
+                <a:ext uri="{28A0092B-C50C-407E-A947-70E740481C1C}">
+                  <a14:useLocalDpi xmlns:a14="http://schemas.microsoft.com/office/drawing/2010/main" val="0"/>
+                </a:ext>
+                <a:ext uri="{96DAC541-7B7A-43D3-8B79-37D633B846F1}">
+                  <asvg:svgBlip xmlns:asvg="http://schemas.microsoft.com/office/drawing/2016/SVG/main" r:embed="rId5"/>
+                </a:ext>
+              </a:extLst>
+            </a:blip>
+            <a:stretch>
+              <a:fillRect/>
+            </a:stretch>
+          </p:blipFill>
+          <p:spPr>
+            <a:xfrm>
+              <a:off x="658427" y="3779668"/>
+              <a:ext cx="914400" cy="914400"/>
+            </a:xfrm>
+            <a:prstGeom prst="rect">
+              <a:avLst/>
+            </a:prstGeom>
+          </p:spPr>
+        </p:pic>
+        <p:sp>
+          <p:nvSpPr>
+            <p:cNvPr id="109" name="CuadroTexto 108">
+              <a:extLst>
+                <a:ext uri="{FF2B5EF4-FFF2-40B4-BE49-F238E27FC236}">
+                  <a16:creationId xmlns:a16="http://schemas.microsoft.com/office/drawing/2014/main" id="{ED638F1D-5E5F-7815-5135-905A42272FFB}"/>
+                </a:ext>
+              </a:extLst>
+            </p:cNvPr>
+            <p:cNvSpPr txBox="1"/>
+            <p:nvPr/>
+          </p:nvSpPr>
+          <p:spPr>
+            <a:xfrm>
+              <a:off x="488641" y="4524791"/>
+              <a:ext cx="1312926" cy="338554"/>
+            </a:xfrm>
+            <a:prstGeom prst="rect">
+              <a:avLst/>
+            </a:prstGeom>
+            <a:noFill/>
+          </p:spPr>
+          <p:txBody>
+            <a:bodyPr wrap="square" rtlCol="0">
+              <a:spAutoFit/>
+            </a:bodyPr>
+            <a:lstStyle/>
+            <a:p>
+              <a:r>
+                <a:rPr lang="es-ES" sz="1600" dirty="0"/>
+                <a:t>Mentorizado</a:t>
+              </a:r>
+              <a:endParaRPr lang="es-ES" dirty="0"/>
+            </a:p>
+          </p:txBody>
+        </p:sp>
+      </p:grpSp>
+      <p:grpSp>
+        <p:nvGrpSpPr>
+          <p:cNvPr id="110" name="Grupo 109">
+            <a:extLst>
+              <a:ext uri="{FF2B5EF4-FFF2-40B4-BE49-F238E27FC236}">
+                <a16:creationId xmlns:a16="http://schemas.microsoft.com/office/drawing/2014/main" id="{E251F3D0-2796-F0C3-40B6-0A592EBC9A78}"/>
+              </a:ext>
+            </a:extLst>
+          </p:cNvPr>
+          <p:cNvGrpSpPr/>
+          <p:nvPr/>
+        </p:nvGrpSpPr>
+        <p:grpSpPr>
+          <a:xfrm>
+            <a:off x="6283103" y="2979437"/>
+            <a:ext cx="1440000" cy="1103531"/>
+            <a:chOff x="2285319" y="2896189"/>
+            <a:chExt cx="1440000" cy="1103531"/>
+          </a:xfrm>
+        </p:grpSpPr>
+        <p:pic>
+          <p:nvPicPr>
+            <p:cNvPr id="111" name="Gráfico 110" descr="Usuario con relleno sólido">
+              <a:extLst>
+                <a:ext uri="{FF2B5EF4-FFF2-40B4-BE49-F238E27FC236}">
+                  <a16:creationId xmlns:a16="http://schemas.microsoft.com/office/drawing/2014/main" id="{08154AA6-0C4B-879D-0054-2B7F97BA4D90}"/>
+                </a:ext>
+              </a:extLst>
+            </p:cNvPr>
+            <p:cNvPicPr>
+              <a:picLocks noChangeAspect="1"/>
+            </p:cNvPicPr>
+            <p:nvPr/>
+          </p:nvPicPr>
+          <p:blipFill>
+            <a:blip r:embed="rId6">
+              <a:extLst>
+                <a:ext uri="{28A0092B-C50C-407E-A947-70E740481C1C}">
+                  <a14:useLocalDpi xmlns:a14="http://schemas.microsoft.com/office/drawing/2010/main" val="0"/>
+                </a:ext>
+                <a:ext uri="{96DAC541-7B7A-43D3-8B79-37D633B846F1}">
+                  <asvg:svgBlip xmlns:asvg="http://schemas.microsoft.com/office/drawing/2016/SVG/main" r:embed="rId7"/>
+                </a:ext>
+              </a:extLst>
+            </a:blip>
+            <a:stretch>
+              <a:fillRect/>
+            </a:stretch>
+          </p:blipFill>
+          <p:spPr>
+            <a:xfrm>
+              <a:off x="2515340" y="2896189"/>
+              <a:ext cx="914400" cy="914400"/>
+            </a:xfrm>
+            <a:prstGeom prst="rect">
+              <a:avLst/>
+            </a:prstGeom>
+          </p:spPr>
+        </p:pic>
+        <p:sp>
+          <p:nvSpPr>
+            <p:cNvPr id="112" name="CuadroTexto 111">
+              <a:extLst>
+                <a:ext uri="{FF2B5EF4-FFF2-40B4-BE49-F238E27FC236}">
+                  <a16:creationId xmlns:a16="http://schemas.microsoft.com/office/drawing/2014/main" id="{1355CDE4-DE5E-5F38-7EBC-D4E52252E23B}"/>
+                </a:ext>
+              </a:extLst>
+            </p:cNvPr>
+            <p:cNvSpPr txBox="1"/>
+            <p:nvPr/>
+          </p:nvSpPr>
+          <p:spPr>
+            <a:xfrm>
+              <a:off x="2285319" y="3661166"/>
+              <a:ext cx="1440000" cy="338554"/>
+            </a:xfrm>
+            <a:prstGeom prst="rect">
+              <a:avLst/>
+            </a:prstGeom>
+            <a:noFill/>
+          </p:spPr>
+          <p:txBody>
+            <a:bodyPr wrap="square" rtlCol="0">
+              <a:spAutoFit/>
+            </a:bodyPr>
+            <a:lstStyle/>
+            <a:p>
+              <a:r>
+                <a:rPr lang="es-ES" sz="1600" dirty="0"/>
+                <a:t>Administrador</a:t>
+              </a:r>
+            </a:p>
+          </p:txBody>
+        </p:sp>
+      </p:grpSp>
+      <p:cxnSp>
+        <p:nvCxnSpPr>
+          <p:cNvPr id="113" name="Conector recto de flecha 112">
+            <a:extLst>
+              <a:ext uri="{FF2B5EF4-FFF2-40B4-BE49-F238E27FC236}">
+                <a16:creationId xmlns:a16="http://schemas.microsoft.com/office/drawing/2014/main" id="{C2D50953-93B3-B09A-7B40-E3A4B4D3815A}"/>
+              </a:ext>
+            </a:extLst>
+          </p:cNvPr>
+          <p:cNvCxnSpPr>
+            <a:cxnSpLocks/>
+            <a:stCxn id="117" idx="3"/>
+            <a:endCxn id="111" idx="1"/>
+          </p:cNvCxnSpPr>
+          <p:nvPr/>
+        </p:nvCxnSpPr>
+        <p:spPr>
+          <a:xfrm>
+            <a:off x="6025565" y="2299736"/>
+            <a:ext cx="487559" cy="1136901"/>
+          </a:xfrm>
+          <a:prstGeom prst="straightConnector1">
+            <a:avLst/>
+          </a:prstGeom>
+          <a:ln>
+            <a:headEnd type="triangle"/>
+            <a:tailEnd type="none"/>
+          </a:ln>
+        </p:spPr>
+        <p:style>
+          <a:lnRef idx="1">
+            <a:schemeClr val="dk1"/>
+          </a:lnRef>
+          <a:fillRef idx="0">
+            <a:schemeClr val="dk1"/>
+          </a:fillRef>
+          <a:effectRef idx="0">
+            <a:schemeClr val="dk1"/>
+          </a:effectRef>
+          <a:fontRef idx="minor">
+            <a:schemeClr val="tx1"/>
+          </a:fontRef>
+        </p:style>
+      </p:cxnSp>
+      <p:cxnSp>
+        <p:nvCxnSpPr>
+          <p:cNvPr id="114" name="Conector recto de flecha 113">
+            <a:extLst>
+              <a:ext uri="{FF2B5EF4-FFF2-40B4-BE49-F238E27FC236}">
+                <a16:creationId xmlns:a16="http://schemas.microsoft.com/office/drawing/2014/main" id="{ABF85E2F-B34B-CB00-038D-A549B8B99B1A}"/>
+              </a:ext>
+            </a:extLst>
+          </p:cNvPr>
+          <p:cNvCxnSpPr>
+            <a:cxnSpLocks/>
+            <a:stCxn id="108" idx="3"/>
+            <a:endCxn id="111" idx="1"/>
+          </p:cNvCxnSpPr>
+          <p:nvPr/>
+        </p:nvCxnSpPr>
+        <p:spPr>
+          <a:xfrm flipV="1">
+            <a:off x="6025565" y="3436637"/>
+            <a:ext cx="487559" cy="914380"/>
+          </a:xfrm>
+          <a:prstGeom prst="straightConnector1">
+            <a:avLst/>
+          </a:prstGeom>
+          <a:ln>
+            <a:headEnd type="triangle"/>
+            <a:tailEnd type="none"/>
+          </a:ln>
+        </p:spPr>
+        <p:style>
+          <a:lnRef idx="1">
+            <a:schemeClr val="dk1"/>
+          </a:lnRef>
+          <a:fillRef idx="0">
+            <a:schemeClr val="dk1"/>
+          </a:fillRef>
+          <a:effectRef idx="0">
+            <a:schemeClr val="dk1"/>
+          </a:effectRef>
+          <a:fontRef idx="minor">
+            <a:schemeClr val="tx1"/>
+          </a:fontRef>
+        </p:style>
+      </p:cxnSp>
+      <p:sp>
+        <p:nvSpPr>
+          <p:cNvPr id="115" name="CuadroTexto 114">
+            <a:extLst>
+              <a:ext uri="{FF2B5EF4-FFF2-40B4-BE49-F238E27FC236}">
+                <a16:creationId xmlns:a16="http://schemas.microsoft.com/office/drawing/2014/main" id="{33A6F7E5-3499-E801-B69B-B8A8BEDD6BE1}"/>
+              </a:ext>
+            </a:extLst>
+          </p:cNvPr>
+          <p:cNvSpPr txBox="1"/>
+          <p:nvPr/>
+        </p:nvSpPr>
+        <p:spPr>
+          <a:xfrm>
+            <a:off x="4937347" y="4992021"/>
+            <a:ext cx="2633915" cy="461665"/>
+          </a:xfrm>
+          <a:prstGeom prst="rect">
+            <a:avLst/>
+          </a:prstGeom>
+          <a:noFill/>
+        </p:spPr>
+        <p:txBody>
+          <a:bodyPr wrap="square" rtlCol="0">
+            <a:spAutoFit/>
+          </a:bodyPr>
+          <a:lstStyle/>
+          <a:p>
+            <a:r>
+              <a:rPr lang="es-ES" sz="2400" b="1" dirty="0"/>
+              <a:t>Emparejamiento</a:t>
+            </a:r>
+            <a:endParaRPr lang="es-ES" sz="2000" b="1" dirty="0"/>
+          </a:p>
+        </p:txBody>
+      </p:sp>
+      <p:grpSp>
+        <p:nvGrpSpPr>
+          <p:cNvPr id="116" name="Grupo 115">
+            <a:extLst>
+              <a:ext uri="{FF2B5EF4-FFF2-40B4-BE49-F238E27FC236}">
+                <a16:creationId xmlns:a16="http://schemas.microsoft.com/office/drawing/2014/main" id="{2446C315-E02D-2F64-EFC2-D5BD41117489}"/>
+              </a:ext>
+            </a:extLst>
+          </p:cNvPr>
+          <p:cNvGrpSpPr/>
+          <p:nvPr/>
+        </p:nvGrpSpPr>
+        <p:grpSpPr>
+          <a:xfrm>
+            <a:off x="5111165" y="1842536"/>
+            <a:ext cx="915693" cy="1067946"/>
+            <a:chOff x="658427" y="1607968"/>
+            <a:chExt cx="915693" cy="1067946"/>
+          </a:xfrm>
+        </p:grpSpPr>
+        <p:pic>
+          <p:nvPicPr>
+            <p:cNvPr id="117" name="Gráfico 116" descr="Usuario con relleno sólido">
+              <a:extLst>
+                <a:ext uri="{FF2B5EF4-FFF2-40B4-BE49-F238E27FC236}">
+                  <a16:creationId xmlns:a16="http://schemas.microsoft.com/office/drawing/2014/main" id="{3E0EF596-EDB5-3EF3-382A-B9D0E3577DAD}"/>
+                </a:ext>
+              </a:extLst>
+            </p:cNvPr>
+            <p:cNvPicPr>
+              <a:picLocks noChangeAspect="1"/>
+            </p:cNvPicPr>
+            <p:nvPr/>
+          </p:nvPicPr>
+          <p:blipFill>
+            <a:blip r:embed="rId8">
+              <a:extLst>
+                <a:ext uri="{28A0092B-C50C-407E-A947-70E740481C1C}">
+                  <a14:useLocalDpi xmlns:a14="http://schemas.microsoft.com/office/drawing/2010/main" val="0"/>
+                </a:ext>
+                <a:ext uri="{96DAC541-7B7A-43D3-8B79-37D633B846F1}">
+                  <asvg:svgBlip xmlns:asvg="http://schemas.microsoft.com/office/drawing/2016/SVG/main" r:embed="rId9"/>
+                </a:ext>
+              </a:extLst>
+            </a:blip>
+            <a:stretch>
+              <a:fillRect/>
+            </a:stretch>
+          </p:blipFill>
+          <p:spPr>
+            <a:xfrm>
+              <a:off x="658427" y="1607968"/>
+              <a:ext cx="914400" cy="914400"/>
+            </a:xfrm>
+            <a:prstGeom prst="rect">
+              <a:avLst/>
+            </a:prstGeom>
+          </p:spPr>
+        </p:pic>
+        <p:sp>
+          <p:nvSpPr>
+            <p:cNvPr id="118" name="CuadroTexto 117">
+              <a:extLst>
+                <a:ext uri="{FF2B5EF4-FFF2-40B4-BE49-F238E27FC236}">
+                  <a16:creationId xmlns:a16="http://schemas.microsoft.com/office/drawing/2014/main" id="{023C057B-42EF-E82E-D495-11156F20F0DA}"/>
+                </a:ext>
+              </a:extLst>
+            </p:cNvPr>
+            <p:cNvSpPr txBox="1"/>
+            <p:nvPr/>
+          </p:nvSpPr>
+          <p:spPr>
+            <a:xfrm>
+              <a:off x="735320" y="2337360"/>
+              <a:ext cx="838800" cy="338554"/>
+            </a:xfrm>
+            <a:prstGeom prst="rect">
+              <a:avLst/>
+            </a:prstGeom>
+            <a:noFill/>
+          </p:spPr>
+          <p:txBody>
+            <a:bodyPr wrap="square" rtlCol="0">
+              <a:spAutoFit/>
+            </a:bodyPr>
+            <a:lstStyle/>
+            <a:p>
+              <a:r>
+                <a:rPr lang="es-ES" sz="1600" dirty="0"/>
+                <a:t>Mentor</a:t>
+              </a:r>
+              <a:endParaRPr lang="es-ES" dirty="0"/>
+            </a:p>
+          </p:txBody>
+        </p:sp>
+      </p:grpSp>
+      <p:sp>
+        <p:nvSpPr>
+          <p:cNvPr id="119" name="CuadroTexto 118">
+            <a:extLst>
+              <a:ext uri="{FF2B5EF4-FFF2-40B4-BE49-F238E27FC236}">
+                <a16:creationId xmlns:a16="http://schemas.microsoft.com/office/drawing/2014/main" id="{81A536B1-C6A0-2B94-3BEF-BFFF4E5B9939}"/>
+              </a:ext>
+            </a:extLst>
+          </p:cNvPr>
+          <p:cNvSpPr txBox="1"/>
+          <p:nvPr/>
+        </p:nvSpPr>
+        <p:spPr>
+          <a:xfrm>
+            <a:off x="8082259" y="4992021"/>
+            <a:ext cx="2633915" cy="461665"/>
+          </a:xfrm>
+          <a:prstGeom prst="rect">
+            <a:avLst/>
+          </a:prstGeom>
+          <a:noFill/>
+        </p:spPr>
+        <p:txBody>
+          <a:bodyPr wrap="square" rtlCol="0">
+            <a:spAutoFit/>
+          </a:bodyPr>
+          <a:lstStyle/>
+          <a:p>
+            <a:r>
+              <a:rPr lang="es-ES" sz="2400" b="1" dirty="0"/>
+              <a:t>Mentorización</a:t>
+            </a:r>
+            <a:endParaRPr lang="es-ES" sz="2000" b="1" dirty="0"/>
+          </a:p>
+        </p:txBody>
+      </p:sp>
+    </p:spTree>
+    <p:extLst>
+      <p:ext uri="{BB962C8B-B14F-4D97-AF65-F5344CB8AC3E}">
+        <p14:creationId xmlns:p14="http://schemas.microsoft.com/office/powerpoint/2010/main" val="616323600"/>
+      </p:ext>
+    </p:extLst>
+  </p:cSld>
+  <p:clrMapOvr>
+    <a:masterClrMapping/>
+  </p:clrMapOvr>
+</p:sld>
+</file>
+
+<file path=ppt/slides/slide13.xml><?xml version="1.0" encoding="utf-8"?>
+<p:sld xmlns:a="http://schemas.openxmlformats.org/drawingml/2006/main" xmlns:r="http://schemas.openxmlformats.org/officeDocument/2006/relationships" xmlns:p="http://schemas.openxmlformats.org/presentationml/2006/main">
+  <p:cSld>
+    <p:spTree>
+      <p:nvGrpSpPr>
+        <p:cNvPr id="1" name=""/>
+        <p:cNvGrpSpPr/>
+        <p:nvPr/>
+      </p:nvGrpSpPr>
+      <p:grpSpPr>
+        <a:xfrm>
+          <a:off x="0" y="0"/>
+          <a:ext cx="0" cy="0"/>
+          <a:chOff x="0" y="0"/>
+          <a:chExt cx="0" cy="0"/>
+        </a:xfrm>
+      </p:grpSpPr>
+      <p:grpSp>
+        <p:nvGrpSpPr>
+          <p:cNvPr id="57" name="Grupo 56">
+            <a:extLst>
+              <a:ext uri="{FF2B5EF4-FFF2-40B4-BE49-F238E27FC236}">
+                <a16:creationId xmlns:a16="http://schemas.microsoft.com/office/drawing/2014/main" id="{FB2C77F0-E36B-C0E4-E74D-E3535597E601}"/>
+              </a:ext>
+            </a:extLst>
+          </p:cNvPr>
+          <p:cNvGrpSpPr/>
+          <p:nvPr/>
+        </p:nvGrpSpPr>
+        <p:grpSpPr>
+          <a:xfrm>
+            <a:off x="4752786" y="1775426"/>
+            <a:ext cx="915695" cy="1067799"/>
+            <a:chOff x="658427" y="1607968"/>
+            <a:chExt cx="915695" cy="1067799"/>
+          </a:xfrm>
+        </p:grpSpPr>
+        <p:pic>
+          <p:nvPicPr>
+            <p:cNvPr id="58" name="Gráfico 57" descr="Usuario con relleno sólido">
+              <a:extLst>
+                <a:ext uri="{FF2B5EF4-FFF2-40B4-BE49-F238E27FC236}">
+                  <a16:creationId xmlns:a16="http://schemas.microsoft.com/office/drawing/2014/main" id="{F817B01E-57D0-A700-A6CD-D95BCF3F9577}"/>
+                </a:ext>
+              </a:extLst>
+            </p:cNvPr>
+            <p:cNvPicPr>
+              <a:picLocks noChangeAspect="1"/>
+            </p:cNvPicPr>
+            <p:nvPr/>
+          </p:nvPicPr>
+          <p:blipFill>
+            <a:blip r:embed="rId2">
+              <a:extLst>
+                <a:ext uri="{28A0092B-C50C-407E-A947-70E740481C1C}">
+                  <a14:useLocalDpi xmlns:a14="http://schemas.microsoft.com/office/drawing/2010/main" val="0"/>
+                </a:ext>
+                <a:ext uri="{96DAC541-7B7A-43D3-8B79-37D633B846F1}">
+                  <asvg:svgBlip xmlns:asvg="http://schemas.microsoft.com/office/drawing/2016/SVG/main" r:embed="rId3"/>
+                </a:ext>
+              </a:extLst>
+            </a:blip>
+            <a:stretch>
+              <a:fillRect/>
+            </a:stretch>
+          </p:blipFill>
+          <p:spPr>
+            <a:xfrm>
+              <a:off x="658427" y="1607968"/>
+              <a:ext cx="914400" cy="914400"/>
+            </a:xfrm>
+            <a:prstGeom prst="rect">
+              <a:avLst/>
+            </a:prstGeom>
+          </p:spPr>
+        </p:pic>
+        <p:sp>
+          <p:nvSpPr>
+            <p:cNvPr id="59" name="CuadroTexto 58">
+              <a:extLst>
+                <a:ext uri="{FF2B5EF4-FFF2-40B4-BE49-F238E27FC236}">
+                  <a16:creationId xmlns:a16="http://schemas.microsoft.com/office/drawing/2014/main" id="{830DF3D3-23CB-8499-78B5-CA474C72D045}"/>
+                </a:ext>
+              </a:extLst>
+            </p:cNvPr>
+            <p:cNvSpPr txBox="1"/>
+            <p:nvPr/>
+          </p:nvSpPr>
+          <p:spPr>
+            <a:xfrm>
+              <a:off x="735322" y="2337213"/>
+              <a:ext cx="838800" cy="338554"/>
+            </a:xfrm>
+            <a:prstGeom prst="rect">
+              <a:avLst/>
+            </a:prstGeom>
+            <a:noFill/>
+          </p:spPr>
+          <p:txBody>
+            <a:bodyPr wrap="square" rtlCol="0">
+              <a:spAutoFit/>
+            </a:bodyPr>
+            <a:lstStyle/>
+            <a:p>
+              <a:r>
+                <a:rPr lang="es-ES" sz="1600" dirty="0"/>
+                <a:t>Mentor</a:t>
+              </a:r>
+              <a:endParaRPr lang="es-ES" dirty="0"/>
+            </a:p>
+          </p:txBody>
+        </p:sp>
+      </p:grpSp>
+      <p:grpSp>
+        <p:nvGrpSpPr>
+          <p:cNvPr id="60" name="Grupo 59">
+            <a:extLst>
+              <a:ext uri="{FF2B5EF4-FFF2-40B4-BE49-F238E27FC236}">
+                <a16:creationId xmlns:a16="http://schemas.microsoft.com/office/drawing/2014/main" id="{E37AD1CD-DCF5-FA4A-7CEB-31C78795370C}"/>
+              </a:ext>
+            </a:extLst>
+          </p:cNvPr>
+          <p:cNvGrpSpPr/>
+          <p:nvPr/>
+        </p:nvGrpSpPr>
+        <p:grpSpPr>
+          <a:xfrm>
+            <a:off x="4608016" y="3909274"/>
+            <a:ext cx="1314000" cy="1082457"/>
+            <a:chOff x="513657" y="3779668"/>
+            <a:chExt cx="1314000" cy="1082457"/>
+          </a:xfrm>
+        </p:grpSpPr>
+        <p:pic>
+          <p:nvPicPr>
+            <p:cNvPr id="61" name="Gráfico 60" descr="Usuario con relleno sólido">
+              <a:extLst>
+                <a:ext uri="{FF2B5EF4-FFF2-40B4-BE49-F238E27FC236}">
+                  <a16:creationId xmlns:a16="http://schemas.microsoft.com/office/drawing/2014/main" id="{C709B8D7-2E1D-392A-5BD1-77D1C95B667C}"/>
+                </a:ext>
+              </a:extLst>
+            </p:cNvPr>
+            <p:cNvPicPr>
+              <a:picLocks noChangeAspect="1"/>
+            </p:cNvPicPr>
+            <p:nvPr/>
+          </p:nvPicPr>
+          <p:blipFill>
+            <a:blip r:embed="rId4">
+              <a:extLst>
+                <a:ext uri="{28A0092B-C50C-407E-A947-70E740481C1C}">
+                  <a14:useLocalDpi xmlns:a14="http://schemas.microsoft.com/office/drawing/2010/main" val="0"/>
+                </a:ext>
+                <a:ext uri="{96DAC541-7B7A-43D3-8B79-37D633B846F1}">
+                  <asvg:svgBlip xmlns:asvg="http://schemas.microsoft.com/office/drawing/2016/SVG/main" r:embed="rId5"/>
+                </a:ext>
+              </a:extLst>
+            </a:blip>
+            <a:stretch>
+              <a:fillRect/>
+            </a:stretch>
+          </p:blipFill>
+          <p:spPr>
+            <a:xfrm>
+              <a:off x="658427" y="3779668"/>
+              <a:ext cx="914400" cy="914400"/>
+            </a:xfrm>
+            <a:prstGeom prst="rect">
+              <a:avLst/>
+            </a:prstGeom>
+          </p:spPr>
+        </p:pic>
+        <p:sp>
+          <p:nvSpPr>
+            <p:cNvPr id="62" name="CuadroTexto 61">
+              <a:extLst>
+                <a:ext uri="{FF2B5EF4-FFF2-40B4-BE49-F238E27FC236}">
+                  <a16:creationId xmlns:a16="http://schemas.microsoft.com/office/drawing/2014/main" id="{13B0A490-0449-2894-8E79-279FE3CF08C0}"/>
+                </a:ext>
+              </a:extLst>
+            </p:cNvPr>
+            <p:cNvSpPr txBox="1"/>
+            <p:nvPr/>
+          </p:nvSpPr>
+          <p:spPr>
+            <a:xfrm>
+              <a:off x="513657" y="4523571"/>
+              <a:ext cx="1314000" cy="338554"/>
+            </a:xfrm>
+            <a:prstGeom prst="rect">
+              <a:avLst/>
+            </a:prstGeom>
+            <a:noFill/>
+          </p:spPr>
+          <p:txBody>
+            <a:bodyPr wrap="square" rtlCol="0">
+              <a:spAutoFit/>
+            </a:bodyPr>
+            <a:lstStyle/>
+            <a:p>
+              <a:r>
+                <a:rPr lang="es-ES" sz="1600" dirty="0"/>
+                <a:t>Mentorizado</a:t>
+              </a:r>
+              <a:endParaRPr lang="es-ES" dirty="0"/>
+            </a:p>
+          </p:txBody>
+        </p:sp>
+      </p:grpSp>
+      <p:grpSp>
+        <p:nvGrpSpPr>
+          <p:cNvPr id="63" name="Grupo 62">
+            <a:extLst>
+              <a:ext uri="{FF2B5EF4-FFF2-40B4-BE49-F238E27FC236}">
+                <a16:creationId xmlns:a16="http://schemas.microsoft.com/office/drawing/2014/main" id="{8CB84106-3938-B671-0246-F818F0C464D7}"/>
+              </a:ext>
+            </a:extLst>
+          </p:cNvPr>
+          <p:cNvGrpSpPr/>
+          <p:nvPr/>
+        </p:nvGrpSpPr>
+        <p:grpSpPr>
+          <a:xfrm>
+            <a:off x="6356746" y="2956534"/>
+            <a:ext cx="1440000" cy="1119354"/>
+            <a:chOff x="2283884" y="2896189"/>
+            <a:chExt cx="1440000" cy="1119354"/>
+          </a:xfrm>
+        </p:grpSpPr>
+        <p:pic>
+          <p:nvPicPr>
+            <p:cNvPr id="64" name="Gráfico 63" descr="Usuario con relleno sólido">
+              <a:extLst>
+                <a:ext uri="{FF2B5EF4-FFF2-40B4-BE49-F238E27FC236}">
+                  <a16:creationId xmlns:a16="http://schemas.microsoft.com/office/drawing/2014/main" id="{C7EEB870-6186-272A-63B0-9735F8E9E487}"/>
+                </a:ext>
+              </a:extLst>
+            </p:cNvPr>
+            <p:cNvPicPr>
+              <a:picLocks noChangeAspect="1"/>
+            </p:cNvPicPr>
+            <p:nvPr/>
+          </p:nvPicPr>
+          <p:blipFill>
+            <a:blip r:embed="rId6">
+              <a:extLst>
+                <a:ext uri="{28A0092B-C50C-407E-A947-70E740481C1C}">
+                  <a14:useLocalDpi xmlns:a14="http://schemas.microsoft.com/office/drawing/2010/main" val="0"/>
+                </a:ext>
+                <a:ext uri="{96DAC541-7B7A-43D3-8B79-37D633B846F1}">
+                  <asvg:svgBlip xmlns:asvg="http://schemas.microsoft.com/office/drawing/2016/SVG/main" r:embed="rId7"/>
+                </a:ext>
+              </a:extLst>
+            </a:blip>
+            <a:stretch>
+              <a:fillRect/>
+            </a:stretch>
+          </p:blipFill>
+          <p:spPr>
+            <a:xfrm>
+              <a:off x="2515340" y="2896189"/>
+              <a:ext cx="914400" cy="914400"/>
+            </a:xfrm>
+            <a:prstGeom prst="rect">
+              <a:avLst/>
+            </a:prstGeom>
+          </p:spPr>
+        </p:pic>
+        <p:sp>
+          <p:nvSpPr>
+            <p:cNvPr id="65" name="CuadroTexto 64">
+              <a:extLst>
+                <a:ext uri="{FF2B5EF4-FFF2-40B4-BE49-F238E27FC236}">
+                  <a16:creationId xmlns:a16="http://schemas.microsoft.com/office/drawing/2014/main" id="{B06A565F-0EFB-5E62-0004-ECED5CB628F9}"/>
+                </a:ext>
+              </a:extLst>
+            </p:cNvPr>
+            <p:cNvSpPr txBox="1"/>
+            <p:nvPr/>
+          </p:nvSpPr>
+          <p:spPr>
+            <a:xfrm>
+              <a:off x="2283884" y="3676989"/>
+              <a:ext cx="1440000" cy="338554"/>
+            </a:xfrm>
+            <a:prstGeom prst="rect">
+              <a:avLst/>
+            </a:prstGeom>
+            <a:noFill/>
+            <a:ln>
+              <a:noFill/>
+            </a:ln>
+          </p:spPr>
+          <p:txBody>
+            <a:bodyPr wrap="square" rtlCol="0">
+              <a:spAutoFit/>
+            </a:bodyPr>
+            <a:lstStyle/>
+            <a:p>
+              <a:r>
+                <a:rPr lang="es-ES" sz="1600" dirty="0"/>
+                <a:t>Administrador</a:t>
+              </a:r>
+            </a:p>
+          </p:txBody>
+        </p:sp>
+      </p:grpSp>
+      <p:sp>
+        <p:nvSpPr>
+          <p:cNvPr id="2" name="Cruz 1">
+            <a:extLst>
+              <a:ext uri="{FF2B5EF4-FFF2-40B4-BE49-F238E27FC236}">
+                <a16:creationId xmlns:a16="http://schemas.microsoft.com/office/drawing/2014/main" id="{ED0463E9-9C9A-1967-A807-7C0B9368DD6B}"/>
+              </a:ext>
+            </a:extLst>
+          </p:cNvPr>
+          <p:cNvSpPr/>
+          <p:nvPr/>
+        </p:nvSpPr>
+        <p:spPr>
+          <a:xfrm rot="2683966">
+            <a:off x="6472474" y="2852737"/>
+            <a:ext cx="1145856" cy="1152525"/>
+          </a:xfrm>
+          <a:prstGeom prst="plus">
+            <a:avLst>
+              <a:gd name="adj" fmla="val 46280"/>
+            </a:avLst>
+          </a:prstGeom>
+          <a:solidFill>
+            <a:srgbClr val="FF0000"/>
+          </a:solidFill>
+        </p:spPr>
+        <p:style>
+          <a:lnRef idx="2">
+            <a:schemeClr val="accent1">
+              <a:shade val="50000"/>
+            </a:schemeClr>
+          </a:lnRef>
+          <a:fillRef idx="1">
+            <a:schemeClr val="accent1"/>
+          </a:fillRef>
+          <a:effectRef idx="0">
+            <a:schemeClr val="accent1"/>
+          </a:effectRef>
+          <a:fontRef idx="minor">
+            <a:schemeClr val="lt1"/>
+          </a:fontRef>
+        </p:style>
+        <p:txBody>
+          <a:bodyPr rtlCol="0" anchor="ctr"/>
+          <a:lstStyle/>
+          <a:p>
+            <a:pPr algn="ctr"/>
+            <a:endParaRPr lang="es-ES"/>
+          </a:p>
+        </p:txBody>
+      </p:sp>
+    </p:spTree>
+    <p:extLst>
+      <p:ext uri="{BB962C8B-B14F-4D97-AF65-F5344CB8AC3E}">
+        <p14:creationId xmlns:p14="http://schemas.microsoft.com/office/powerpoint/2010/main" val="1991414077"/>
+      </p:ext>
+    </p:extLst>
+  </p:cSld>
+  <p:clrMapOvr>
+    <a:masterClrMapping/>
+  </p:clrMapOvr>
+</p:sld>
+</file>
+
+<file path=ppt/slides/slide14.xml><?xml version="1.0" encoding="utf-8"?>
+<p:sld xmlns:a="http://schemas.openxmlformats.org/drawingml/2006/main" xmlns:r="http://schemas.openxmlformats.org/officeDocument/2006/relationships" xmlns:p="http://schemas.openxmlformats.org/presentationml/2006/main">
+  <p:cSld>
+    <p:spTree>
+      <p:nvGrpSpPr>
+        <p:cNvPr id="1" name=""/>
+        <p:cNvGrpSpPr/>
+        <p:nvPr/>
+      </p:nvGrpSpPr>
+      <p:grpSpPr>
+        <a:xfrm>
+          <a:off x="0" y="0"/>
+          <a:ext cx="0" cy="0"/>
+          <a:chOff x="0" y="0"/>
+          <a:chExt cx="0" cy="0"/>
+        </a:xfrm>
+      </p:grpSpPr>
+      <p:pic>
+        <p:nvPicPr>
+          <p:cNvPr id="13" name="Gráfico 12" descr="Base de datos contorno">
+            <a:extLst>
+              <a:ext uri="{FF2B5EF4-FFF2-40B4-BE49-F238E27FC236}">
+                <a16:creationId xmlns:a16="http://schemas.microsoft.com/office/drawing/2014/main" id="{89384C17-15A1-C2F3-A9A0-65FAF6B33788}"/>
+              </a:ext>
+            </a:extLst>
+          </p:cNvPr>
+          <p:cNvPicPr>
+            <a:picLocks noChangeAspect="1"/>
+          </p:cNvPicPr>
+          <p:nvPr/>
+        </p:nvPicPr>
+        <p:blipFill>
+          <a:blip r:embed="rId2">
+            <a:extLst>
+              <a:ext uri="{28A0092B-C50C-407E-A947-70E740481C1C}">
+                <a14:useLocalDpi xmlns:a14="http://schemas.microsoft.com/office/drawing/2010/main" val="0"/>
+              </a:ext>
+              <a:ext uri="{96DAC541-7B7A-43D3-8B79-37D633B846F1}">
+                <asvg:svgBlip xmlns:asvg="http://schemas.microsoft.com/office/drawing/2016/SVG/main" r:embed="rId3"/>
+              </a:ext>
+            </a:extLst>
+          </a:blip>
+          <a:stretch>
+            <a:fillRect/>
+          </a:stretch>
+        </p:blipFill>
+        <p:spPr>
+          <a:xfrm>
+            <a:off x="3076752" y="2971800"/>
+            <a:ext cx="914400" cy="914400"/>
+          </a:xfrm>
+          <a:prstGeom prst="rect">
+            <a:avLst/>
+          </a:prstGeom>
+        </p:spPr>
+      </p:pic>
+      <p:sp>
+        <p:nvSpPr>
+          <p:cNvPr id="45" name="Flecha: a la derecha 44">
+            <a:extLst>
+              <a:ext uri="{FF2B5EF4-FFF2-40B4-BE49-F238E27FC236}">
+                <a16:creationId xmlns:a16="http://schemas.microsoft.com/office/drawing/2014/main" id="{023C9381-2277-A55F-4636-C3F54824A840}"/>
+              </a:ext>
+            </a:extLst>
+          </p:cNvPr>
+          <p:cNvSpPr/>
+          <p:nvPr/>
+        </p:nvSpPr>
+        <p:spPr>
+          <a:xfrm>
+            <a:off x="4683223" y="3288267"/>
+            <a:ext cx="484292" cy="281465"/>
+          </a:xfrm>
+          <a:prstGeom prst="rightArrow">
+            <a:avLst/>
+          </a:prstGeom>
+          <a:noFill/>
+          <a:ln>
+            <a:solidFill>
+              <a:srgbClr val="002060"/>
+            </a:solidFill>
+          </a:ln>
+        </p:spPr>
+        <p:style>
+          <a:lnRef idx="2">
+            <a:schemeClr val="accent1">
+              <a:shade val="50000"/>
+            </a:schemeClr>
+          </a:lnRef>
+          <a:fillRef idx="1">
+            <a:schemeClr val="accent1"/>
+          </a:fillRef>
+          <a:effectRef idx="0">
+            <a:schemeClr val="accent1"/>
+          </a:effectRef>
+          <a:fontRef idx="minor">
+            <a:schemeClr val="lt1"/>
+          </a:fontRef>
+        </p:style>
+        <p:txBody>
+          <a:bodyPr rtlCol="0" anchor="ctr"/>
+          <a:lstStyle/>
+          <a:p>
+            <a:pPr algn="ctr"/>
+            <a:endParaRPr lang="es-ES"/>
+          </a:p>
+        </p:txBody>
+      </p:sp>
+      <p:sp>
+        <p:nvSpPr>
+          <p:cNvPr id="75" name="Flecha: a la derecha 74">
+            <a:extLst>
+              <a:ext uri="{FF2B5EF4-FFF2-40B4-BE49-F238E27FC236}">
+                <a16:creationId xmlns:a16="http://schemas.microsoft.com/office/drawing/2014/main" id="{C2F2FD23-DA78-7930-327F-D97DD9E8C4C1}"/>
+              </a:ext>
+            </a:extLst>
+          </p:cNvPr>
+          <p:cNvSpPr/>
+          <p:nvPr/>
+        </p:nvSpPr>
+        <p:spPr>
+          <a:xfrm>
+            <a:off x="7026450" y="3288267"/>
+            <a:ext cx="484292" cy="281465"/>
+          </a:xfrm>
+          <a:prstGeom prst="rightArrow">
+            <a:avLst/>
+          </a:prstGeom>
+          <a:noFill/>
+          <a:ln>
+            <a:solidFill>
+              <a:srgbClr val="002060"/>
+            </a:solidFill>
+          </a:ln>
+        </p:spPr>
+        <p:style>
+          <a:lnRef idx="2">
+            <a:schemeClr val="accent1">
+              <a:shade val="50000"/>
+            </a:schemeClr>
+          </a:lnRef>
+          <a:fillRef idx="1">
+            <a:schemeClr val="accent1"/>
+          </a:fillRef>
+          <a:effectRef idx="0">
+            <a:schemeClr val="accent1"/>
+          </a:effectRef>
+          <a:fontRef idx="minor">
+            <a:schemeClr val="lt1"/>
+          </a:fontRef>
+        </p:style>
+        <p:txBody>
+          <a:bodyPr rtlCol="0" anchor="ctr"/>
+          <a:lstStyle/>
+          <a:p>
+            <a:pPr algn="ctr"/>
+            <a:endParaRPr lang="es-ES"/>
+          </a:p>
+        </p:txBody>
+      </p:sp>
+      <p:grpSp>
+        <p:nvGrpSpPr>
+          <p:cNvPr id="6" name="Grupo 5">
+            <a:extLst>
+              <a:ext uri="{FF2B5EF4-FFF2-40B4-BE49-F238E27FC236}">
+                <a16:creationId xmlns:a16="http://schemas.microsoft.com/office/drawing/2014/main" id="{627DEE77-066E-A482-5AA7-381DED981C3F}"/>
+              </a:ext>
+            </a:extLst>
+          </p:cNvPr>
+          <p:cNvGrpSpPr/>
+          <p:nvPr/>
+        </p:nvGrpSpPr>
+        <p:grpSpPr>
+          <a:xfrm>
+            <a:off x="8056077" y="1833725"/>
+            <a:ext cx="1325137" cy="3147616"/>
+            <a:chOff x="9415790" y="1815716"/>
+            <a:chExt cx="1325137" cy="3147616"/>
+          </a:xfrm>
+        </p:grpSpPr>
+        <p:grpSp>
+          <p:nvGrpSpPr>
+            <p:cNvPr id="79" name="Grupo 78">
+              <a:extLst>
+                <a:ext uri="{FF2B5EF4-FFF2-40B4-BE49-F238E27FC236}">
+                  <a16:creationId xmlns:a16="http://schemas.microsoft.com/office/drawing/2014/main" id="{822B65AB-09AE-93C9-665C-023357F16CB1}"/>
+                </a:ext>
+              </a:extLst>
+            </p:cNvPr>
+            <p:cNvGrpSpPr/>
+            <p:nvPr/>
+          </p:nvGrpSpPr>
+          <p:grpSpPr>
+            <a:xfrm>
+              <a:off x="9415790" y="3880875"/>
+              <a:ext cx="1325137" cy="1082457"/>
+              <a:chOff x="513657" y="3779668"/>
+              <a:chExt cx="1325137" cy="1082457"/>
+            </a:xfrm>
+          </p:grpSpPr>
+          <p:pic>
+            <p:nvPicPr>
+              <p:cNvPr id="80" name="Gráfico 79" descr="Usuario con relleno sólido">
+                <a:extLst>
+                  <a:ext uri="{FF2B5EF4-FFF2-40B4-BE49-F238E27FC236}">
+                    <a16:creationId xmlns:a16="http://schemas.microsoft.com/office/drawing/2014/main" id="{F58D865B-639E-6A7E-FEA4-E9DD1D69DBC6}"/>
+                  </a:ext>
+                </a:extLst>
+              </p:cNvPr>
+              <p:cNvPicPr>
+                <a:picLocks noChangeAspect="1"/>
+              </p:cNvPicPr>
+              <p:nvPr/>
+            </p:nvPicPr>
+            <p:blipFill>
+              <a:blip r:embed="rId4">
+                <a:extLst>
+                  <a:ext uri="{28A0092B-C50C-407E-A947-70E740481C1C}">
+                    <a14:useLocalDpi xmlns:a14="http://schemas.microsoft.com/office/drawing/2010/main" val="0"/>
+                  </a:ext>
+                  <a:ext uri="{96DAC541-7B7A-43D3-8B79-37D633B846F1}">
+                    <asvg:svgBlip xmlns:asvg="http://schemas.microsoft.com/office/drawing/2016/SVG/main" r:embed="rId5"/>
+                  </a:ext>
+                </a:extLst>
+              </a:blip>
+              <a:stretch>
+                <a:fillRect/>
+              </a:stretch>
+            </p:blipFill>
+            <p:spPr>
+              <a:xfrm>
+                <a:off x="658427" y="3779668"/>
+                <a:ext cx="914400" cy="914400"/>
+              </a:xfrm>
+              <a:prstGeom prst="rect">
+                <a:avLst/>
+              </a:prstGeom>
+            </p:spPr>
+          </p:pic>
+          <p:sp>
+            <p:nvSpPr>
+              <p:cNvPr id="81" name="CuadroTexto 80">
+                <a:extLst>
+                  <a:ext uri="{FF2B5EF4-FFF2-40B4-BE49-F238E27FC236}">
+                    <a16:creationId xmlns:a16="http://schemas.microsoft.com/office/drawing/2014/main" id="{681E8AA8-56C0-B3B9-534D-B50B4BBC0CA5}"/>
+                  </a:ext>
+                </a:extLst>
+              </p:cNvPr>
+              <p:cNvSpPr txBox="1"/>
+              <p:nvPr/>
+            </p:nvSpPr>
+            <p:spPr>
+              <a:xfrm>
+                <a:off x="513657" y="4523571"/>
+                <a:ext cx="1325137" cy="338554"/>
+              </a:xfrm>
+              <a:prstGeom prst="rect">
+                <a:avLst/>
+              </a:prstGeom>
+              <a:noFill/>
+            </p:spPr>
+            <p:txBody>
+              <a:bodyPr wrap="square" rtlCol="0">
+                <a:spAutoFit/>
+              </a:bodyPr>
+              <a:lstStyle/>
+              <a:p>
+                <a:r>
+                  <a:rPr lang="es-ES" sz="1600" dirty="0"/>
+                  <a:t>Mentorizado</a:t>
+                </a:r>
+                <a:endParaRPr lang="es-ES" dirty="0"/>
+              </a:p>
+            </p:txBody>
+          </p:sp>
+        </p:grpSp>
+        <p:cxnSp>
+          <p:nvCxnSpPr>
+            <p:cNvPr id="89" name="Conector recto de flecha 88">
+              <a:extLst>
+                <a:ext uri="{FF2B5EF4-FFF2-40B4-BE49-F238E27FC236}">
+                  <a16:creationId xmlns:a16="http://schemas.microsoft.com/office/drawing/2014/main" id="{A0ABFBD6-A3C9-95FF-20FC-9043CC786C5C}"/>
+                </a:ext>
+              </a:extLst>
+            </p:cNvPr>
+            <p:cNvCxnSpPr>
+              <a:cxnSpLocks/>
+              <a:endCxn id="80" idx="0"/>
+            </p:cNvCxnSpPr>
+            <p:nvPr/>
+          </p:nvCxnSpPr>
+          <p:spPr>
+            <a:xfrm>
+              <a:off x="10017760" y="2910316"/>
+              <a:ext cx="0" cy="970559"/>
+            </a:xfrm>
+            <a:prstGeom prst="straightConnector1">
+              <a:avLst/>
+            </a:prstGeom>
+            <a:ln>
+              <a:solidFill>
+                <a:schemeClr val="tx1"/>
+              </a:solidFill>
+              <a:headEnd type="triangle"/>
+              <a:tailEnd type="triangle"/>
+            </a:ln>
+          </p:spPr>
+          <p:style>
+            <a:lnRef idx="1">
+              <a:schemeClr val="accent1"/>
+            </a:lnRef>
+            <a:fillRef idx="0">
+              <a:schemeClr val="accent1"/>
+            </a:fillRef>
+            <a:effectRef idx="0">
+              <a:schemeClr val="accent1"/>
+            </a:effectRef>
+            <a:fontRef idx="minor">
+              <a:schemeClr val="tx1"/>
+            </a:fontRef>
+          </p:style>
+        </p:cxnSp>
+        <p:grpSp>
+          <p:nvGrpSpPr>
+            <p:cNvPr id="94" name="Grupo 93">
+              <a:extLst>
+                <a:ext uri="{FF2B5EF4-FFF2-40B4-BE49-F238E27FC236}">
+                  <a16:creationId xmlns:a16="http://schemas.microsoft.com/office/drawing/2014/main" id="{D8D2ABC8-2C8A-DB53-BD64-5AF192FEFFA0}"/>
+                </a:ext>
+              </a:extLst>
+            </p:cNvPr>
+            <p:cNvGrpSpPr/>
+            <p:nvPr/>
+          </p:nvGrpSpPr>
+          <p:grpSpPr>
+            <a:xfrm>
+              <a:off x="9560560" y="1815716"/>
+              <a:ext cx="914400" cy="1067799"/>
+              <a:chOff x="658427" y="1607968"/>
+              <a:chExt cx="914400" cy="1067799"/>
+            </a:xfrm>
+          </p:grpSpPr>
+          <p:pic>
+            <p:nvPicPr>
+              <p:cNvPr id="95" name="Gráfico 94" descr="Usuario con relleno sólido">
+                <a:extLst>
+                  <a:ext uri="{FF2B5EF4-FFF2-40B4-BE49-F238E27FC236}">
+                    <a16:creationId xmlns:a16="http://schemas.microsoft.com/office/drawing/2014/main" id="{335E9E7B-ECC7-D452-51A0-79DE47AE875D}"/>
+                  </a:ext>
+                </a:extLst>
+              </p:cNvPr>
+              <p:cNvPicPr>
+                <a:picLocks noChangeAspect="1"/>
+              </p:cNvPicPr>
+              <p:nvPr/>
+            </p:nvPicPr>
+            <p:blipFill>
+              <a:blip r:embed="rId6">
+                <a:extLst>
+                  <a:ext uri="{28A0092B-C50C-407E-A947-70E740481C1C}">
+                    <a14:useLocalDpi xmlns:a14="http://schemas.microsoft.com/office/drawing/2010/main" val="0"/>
+                  </a:ext>
+                  <a:ext uri="{96DAC541-7B7A-43D3-8B79-37D633B846F1}">
+                    <asvg:svgBlip xmlns:asvg="http://schemas.microsoft.com/office/drawing/2016/SVG/main" r:embed="rId7"/>
+                  </a:ext>
+                </a:extLst>
+              </a:blip>
+              <a:stretch>
+                <a:fillRect/>
+              </a:stretch>
+            </p:blipFill>
+            <p:spPr>
+              <a:xfrm>
+                <a:off x="658427" y="1607968"/>
+                <a:ext cx="914400" cy="914400"/>
+              </a:xfrm>
+              <a:prstGeom prst="rect">
+                <a:avLst/>
+              </a:prstGeom>
+            </p:spPr>
+          </p:pic>
+          <p:sp>
+            <p:nvSpPr>
+              <p:cNvPr id="96" name="CuadroTexto 95">
+                <a:extLst>
+                  <a:ext uri="{FF2B5EF4-FFF2-40B4-BE49-F238E27FC236}">
+                    <a16:creationId xmlns:a16="http://schemas.microsoft.com/office/drawing/2014/main" id="{F032654D-A3FE-EECB-211E-CF342CDCD748}"/>
+                  </a:ext>
+                </a:extLst>
+              </p:cNvPr>
+              <p:cNvSpPr txBox="1"/>
+              <p:nvPr/>
+            </p:nvSpPr>
+            <p:spPr>
+              <a:xfrm>
+                <a:off x="735322" y="2337213"/>
+                <a:ext cx="837500" cy="338554"/>
+              </a:xfrm>
+              <a:prstGeom prst="rect">
+                <a:avLst/>
+              </a:prstGeom>
+              <a:noFill/>
+            </p:spPr>
+            <p:txBody>
+              <a:bodyPr wrap="square" rtlCol="0">
+                <a:spAutoFit/>
+              </a:bodyPr>
+              <a:lstStyle/>
+              <a:p>
+                <a:r>
+                  <a:rPr lang="es-ES" sz="1600" dirty="0"/>
+                  <a:t>Mentor</a:t>
+                </a:r>
+                <a:endParaRPr lang="es-ES" dirty="0"/>
+              </a:p>
+            </p:txBody>
+          </p:sp>
+        </p:grpSp>
+      </p:grpSp>
+      <p:grpSp>
+        <p:nvGrpSpPr>
+          <p:cNvPr id="5" name="Grupo 4">
+            <a:extLst>
+              <a:ext uri="{FF2B5EF4-FFF2-40B4-BE49-F238E27FC236}">
+                <a16:creationId xmlns:a16="http://schemas.microsoft.com/office/drawing/2014/main" id="{2FB22A16-A21E-CF6A-DF94-8187985AE39D}"/>
+              </a:ext>
+            </a:extLst>
+          </p:cNvPr>
+          <p:cNvGrpSpPr/>
+          <p:nvPr/>
+        </p:nvGrpSpPr>
+        <p:grpSpPr>
+          <a:xfrm>
+            <a:off x="2906965" y="1839047"/>
+            <a:ext cx="1325137" cy="3147108"/>
+            <a:chOff x="998389" y="1819916"/>
+            <a:chExt cx="1325137" cy="3147108"/>
+          </a:xfrm>
+        </p:grpSpPr>
+        <p:grpSp>
+          <p:nvGrpSpPr>
+            <p:cNvPr id="17" name="Grupo 16">
+              <a:extLst>
+                <a:ext uri="{FF2B5EF4-FFF2-40B4-BE49-F238E27FC236}">
+                  <a16:creationId xmlns:a16="http://schemas.microsoft.com/office/drawing/2014/main" id="{A84868EB-9477-E3D0-4480-60A81D892C43}"/>
+                </a:ext>
+              </a:extLst>
+            </p:cNvPr>
+            <p:cNvGrpSpPr/>
+            <p:nvPr/>
+          </p:nvGrpSpPr>
+          <p:grpSpPr>
+            <a:xfrm>
+              <a:off x="998389" y="3886870"/>
+              <a:ext cx="1325137" cy="1080154"/>
+              <a:chOff x="488640" y="3750391"/>
+              <a:chExt cx="1325137" cy="1080154"/>
+            </a:xfrm>
+          </p:grpSpPr>
+          <p:pic>
+            <p:nvPicPr>
+              <p:cNvPr id="3" name="Gráfico 2" descr="Usuario con relleno sólido">
+                <a:extLst>
+                  <a:ext uri="{FF2B5EF4-FFF2-40B4-BE49-F238E27FC236}">
+                    <a16:creationId xmlns:a16="http://schemas.microsoft.com/office/drawing/2014/main" id="{B120A660-B34C-ACC0-24E9-A9E73DDFE4F4}"/>
+                  </a:ext>
+                </a:extLst>
+              </p:cNvPr>
+              <p:cNvPicPr>
+                <a:picLocks noChangeAspect="1"/>
+              </p:cNvPicPr>
+              <p:nvPr/>
+            </p:nvPicPr>
+            <p:blipFill>
+              <a:blip r:embed="rId4">
+                <a:extLst>
+                  <a:ext uri="{28A0092B-C50C-407E-A947-70E740481C1C}">
+                    <a14:useLocalDpi xmlns:a14="http://schemas.microsoft.com/office/drawing/2010/main" val="0"/>
+                  </a:ext>
+                  <a:ext uri="{96DAC541-7B7A-43D3-8B79-37D633B846F1}">
+                    <asvg:svgBlip xmlns:asvg="http://schemas.microsoft.com/office/drawing/2016/SVG/main" r:embed="rId5"/>
+                  </a:ext>
+                </a:extLst>
+              </a:blip>
+              <a:stretch>
+                <a:fillRect/>
+              </a:stretch>
+            </p:blipFill>
+            <p:spPr>
+              <a:xfrm>
+                <a:off x="658427" y="3750391"/>
+                <a:ext cx="914400" cy="914400"/>
+              </a:xfrm>
+              <a:prstGeom prst="rect">
+                <a:avLst/>
+              </a:prstGeom>
+            </p:spPr>
+          </p:pic>
+          <p:sp>
+            <p:nvSpPr>
+              <p:cNvPr id="7" name="CuadroTexto 6">
+                <a:extLst>
+                  <a:ext uri="{FF2B5EF4-FFF2-40B4-BE49-F238E27FC236}">
+                    <a16:creationId xmlns:a16="http://schemas.microsoft.com/office/drawing/2014/main" id="{469051E8-C1DA-CC8B-CDF3-C728DBF15B81}"/>
+                  </a:ext>
+                </a:extLst>
+              </p:cNvPr>
+              <p:cNvSpPr txBox="1"/>
+              <p:nvPr/>
+            </p:nvSpPr>
+            <p:spPr>
+              <a:xfrm>
+                <a:off x="488640" y="4491991"/>
+                <a:ext cx="1325137" cy="338554"/>
+              </a:xfrm>
+              <a:prstGeom prst="rect">
+                <a:avLst/>
+              </a:prstGeom>
+              <a:noFill/>
+            </p:spPr>
+            <p:txBody>
+              <a:bodyPr wrap="square" rtlCol="0">
+                <a:spAutoFit/>
+              </a:bodyPr>
+              <a:lstStyle/>
+              <a:p>
+                <a:r>
+                  <a:rPr lang="es-ES" sz="1600" dirty="0"/>
+                  <a:t>Mentorizado</a:t>
+                </a:r>
+                <a:endParaRPr lang="es-ES" dirty="0"/>
+              </a:p>
+            </p:txBody>
+          </p:sp>
+        </p:grpSp>
+        <p:grpSp>
+          <p:nvGrpSpPr>
+            <p:cNvPr id="90" name="Grupo 89">
+              <a:extLst>
+                <a:ext uri="{FF2B5EF4-FFF2-40B4-BE49-F238E27FC236}">
+                  <a16:creationId xmlns:a16="http://schemas.microsoft.com/office/drawing/2014/main" id="{42002EE8-B3A7-4193-31DD-2091F90553A7}"/>
+                </a:ext>
+              </a:extLst>
+            </p:cNvPr>
+            <p:cNvGrpSpPr/>
+            <p:nvPr/>
+          </p:nvGrpSpPr>
+          <p:grpSpPr>
+            <a:xfrm>
+              <a:off x="1168176" y="1819916"/>
+              <a:ext cx="914400" cy="1067946"/>
+              <a:chOff x="658427" y="1607968"/>
+              <a:chExt cx="914400" cy="1067946"/>
+            </a:xfrm>
+          </p:grpSpPr>
+          <p:pic>
+            <p:nvPicPr>
+              <p:cNvPr id="91" name="Gráfico 90" descr="Usuario con relleno sólido">
+                <a:extLst>
+                  <a:ext uri="{FF2B5EF4-FFF2-40B4-BE49-F238E27FC236}">
+                    <a16:creationId xmlns:a16="http://schemas.microsoft.com/office/drawing/2014/main" id="{4C668B73-D980-6E6C-961E-AA0053F5FB88}"/>
+                  </a:ext>
+                </a:extLst>
+              </p:cNvPr>
+              <p:cNvPicPr>
+                <a:picLocks noChangeAspect="1"/>
+              </p:cNvPicPr>
+              <p:nvPr/>
+            </p:nvPicPr>
+            <p:blipFill>
+              <a:blip r:embed="rId6">
+                <a:extLst>
+                  <a:ext uri="{28A0092B-C50C-407E-A947-70E740481C1C}">
+                    <a14:useLocalDpi xmlns:a14="http://schemas.microsoft.com/office/drawing/2010/main" val="0"/>
+                  </a:ext>
+                  <a:ext uri="{96DAC541-7B7A-43D3-8B79-37D633B846F1}">
+                    <asvg:svgBlip xmlns:asvg="http://schemas.microsoft.com/office/drawing/2016/SVG/main" r:embed="rId7"/>
+                  </a:ext>
+                </a:extLst>
+              </a:blip>
+              <a:stretch>
+                <a:fillRect/>
+              </a:stretch>
+            </p:blipFill>
+            <p:spPr>
+              <a:xfrm>
+                <a:off x="658427" y="1607968"/>
+                <a:ext cx="914400" cy="914400"/>
+              </a:xfrm>
+              <a:prstGeom prst="rect">
+                <a:avLst/>
+              </a:prstGeom>
+            </p:spPr>
+          </p:pic>
+          <p:sp>
+            <p:nvSpPr>
+              <p:cNvPr id="92" name="CuadroTexto 91">
+                <a:extLst>
+                  <a:ext uri="{FF2B5EF4-FFF2-40B4-BE49-F238E27FC236}">
+                    <a16:creationId xmlns:a16="http://schemas.microsoft.com/office/drawing/2014/main" id="{D6064FF4-4DCC-ECFD-4D62-57EC99FB0668}"/>
+                  </a:ext>
+                </a:extLst>
+              </p:cNvPr>
+              <p:cNvSpPr txBox="1"/>
+              <p:nvPr/>
+            </p:nvSpPr>
+            <p:spPr>
+              <a:xfrm>
+                <a:off x="735321" y="2337360"/>
+                <a:ext cx="837503" cy="338554"/>
+              </a:xfrm>
+              <a:prstGeom prst="rect">
+                <a:avLst/>
+              </a:prstGeom>
+              <a:noFill/>
+            </p:spPr>
+            <p:txBody>
+              <a:bodyPr wrap="square" rtlCol="0">
+                <a:spAutoFit/>
+              </a:bodyPr>
+              <a:lstStyle/>
+              <a:p>
+                <a:r>
+                  <a:rPr lang="es-ES" sz="1600" dirty="0"/>
+                  <a:t>Mentor</a:t>
+                </a:r>
+                <a:endParaRPr lang="es-ES" dirty="0"/>
+              </a:p>
+            </p:txBody>
+          </p:sp>
+        </p:grpSp>
+        <p:cxnSp>
+          <p:nvCxnSpPr>
+            <p:cNvPr id="40" name="Conector recto de flecha 39">
+              <a:extLst>
+                <a:ext uri="{FF2B5EF4-FFF2-40B4-BE49-F238E27FC236}">
+                  <a16:creationId xmlns:a16="http://schemas.microsoft.com/office/drawing/2014/main" id="{1D2AEBF1-290F-35E9-D078-BDB1436EB7F1}"/>
+                </a:ext>
+              </a:extLst>
+            </p:cNvPr>
+            <p:cNvCxnSpPr>
+              <a:cxnSpLocks/>
+            </p:cNvCxnSpPr>
+            <p:nvPr/>
+          </p:nvCxnSpPr>
+          <p:spPr>
+            <a:xfrm>
+              <a:off x="1625376" y="2928536"/>
+              <a:ext cx="0" cy="970559"/>
+            </a:xfrm>
+            <a:prstGeom prst="straightConnector1">
+              <a:avLst/>
+            </a:prstGeom>
+            <a:ln>
+              <a:solidFill>
+                <a:schemeClr val="tx1"/>
+              </a:solidFill>
+              <a:headEnd type="triangle"/>
+              <a:tailEnd type="none"/>
+            </a:ln>
+          </p:spPr>
+          <p:style>
+            <a:lnRef idx="1">
+              <a:schemeClr val="accent1"/>
+            </a:lnRef>
+            <a:fillRef idx="0">
+              <a:schemeClr val="accent1"/>
+            </a:fillRef>
+            <a:effectRef idx="0">
+              <a:schemeClr val="accent1"/>
+            </a:effectRef>
+            <a:fontRef idx="minor">
+              <a:schemeClr val="tx1"/>
+            </a:fontRef>
+          </p:style>
+        </p:cxnSp>
+      </p:grpSp>
+      <p:grpSp>
+        <p:nvGrpSpPr>
+          <p:cNvPr id="4" name="Grupo 3">
+            <a:extLst>
+              <a:ext uri="{FF2B5EF4-FFF2-40B4-BE49-F238E27FC236}">
+                <a16:creationId xmlns:a16="http://schemas.microsoft.com/office/drawing/2014/main" id="{8CB917C8-C224-F308-2A18-CD7F0FC2F0F5}"/>
+              </a:ext>
+            </a:extLst>
+          </p:cNvPr>
+          <p:cNvGrpSpPr/>
+          <p:nvPr/>
+        </p:nvGrpSpPr>
+        <p:grpSpPr>
+          <a:xfrm>
+            <a:off x="5494029" y="1839600"/>
+            <a:ext cx="1325137" cy="3146554"/>
+            <a:chOff x="5398351" y="1839600"/>
+            <a:chExt cx="1325137" cy="3146554"/>
+          </a:xfrm>
+        </p:grpSpPr>
+        <p:grpSp>
+          <p:nvGrpSpPr>
+            <p:cNvPr id="57" name="Grupo 56">
+              <a:extLst>
+                <a:ext uri="{FF2B5EF4-FFF2-40B4-BE49-F238E27FC236}">
+                  <a16:creationId xmlns:a16="http://schemas.microsoft.com/office/drawing/2014/main" id="{FB2C77F0-E36B-C0E4-E74D-E3535597E601}"/>
+                </a:ext>
+              </a:extLst>
+            </p:cNvPr>
+            <p:cNvGrpSpPr/>
+            <p:nvPr/>
+          </p:nvGrpSpPr>
+          <p:grpSpPr>
+            <a:xfrm>
+              <a:off x="5543122" y="1839600"/>
+              <a:ext cx="914400" cy="1069354"/>
+              <a:chOff x="658427" y="1672142"/>
+              <a:chExt cx="914400" cy="1069354"/>
+            </a:xfrm>
+          </p:grpSpPr>
+          <p:pic>
+            <p:nvPicPr>
+              <p:cNvPr id="58" name="Gráfico 57" descr="Usuario con relleno sólido">
+                <a:extLst>
+                  <a:ext uri="{FF2B5EF4-FFF2-40B4-BE49-F238E27FC236}">
+                    <a16:creationId xmlns:a16="http://schemas.microsoft.com/office/drawing/2014/main" id="{F817B01E-57D0-A700-A6CD-D95BCF3F9577}"/>
+                  </a:ext>
+                </a:extLst>
+              </p:cNvPr>
+              <p:cNvPicPr>
+                <a:picLocks noChangeAspect="1"/>
+              </p:cNvPicPr>
+              <p:nvPr/>
+            </p:nvPicPr>
+            <p:blipFill>
+              <a:blip r:embed="rId6">
+                <a:extLst>
+                  <a:ext uri="{28A0092B-C50C-407E-A947-70E740481C1C}">
+                    <a14:useLocalDpi xmlns:a14="http://schemas.microsoft.com/office/drawing/2010/main" val="0"/>
+                  </a:ext>
+                  <a:ext uri="{96DAC541-7B7A-43D3-8B79-37D633B846F1}">
+                    <asvg:svgBlip xmlns:asvg="http://schemas.microsoft.com/office/drawing/2016/SVG/main" r:embed="rId7"/>
+                  </a:ext>
+                </a:extLst>
+              </a:blip>
+              <a:stretch>
+                <a:fillRect/>
+              </a:stretch>
+            </p:blipFill>
+            <p:spPr>
+              <a:xfrm>
+                <a:off x="658427" y="1672142"/>
+                <a:ext cx="914400" cy="914400"/>
+              </a:xfrm>
+              <a:prstGeom prst="rect">
+                <a:avLst/>
+              </a:prstGeom>
+            </p:spPr>
+          </p:pic>
+          <p:sp>
+            <p:nvSpPr>
+              <p:cNvPr id="59" name="CuadroTexto 58">
+                <a:extLst>
+                  <a:ext uri="{FF2B5EF4-FFF2-40B4-BE49-F238E27FC236}">
+                    <a16:creationId xmlns:a16="http://schemas.microsoft.com/office/drawing/2014/main" id="{830DF3D3-23CB-8499-78B5-CA474C72D045}"/>
+                  </a:ext>
+                </a:extLst>
+              </p:cNvPr>
+              <p:cNvSpPr txBox="1"/>
+              <p:nvPr/>
+            </p:nvSpPr>
+            <p:spPr>
+              <a:xfrm>
+                <a:off x="735321" y="2402942"/>
+                <a:ext cx="837501" cy="338554"/>
+              </a:xfrm>
+              <a:prstGeom prst="rect">
+                <a:avLst/>
+              </a:prstGeom>
+              <a:noFill/>
+            </p:spPr>
+            <p:txBody>
+              <a:bodyPr wrap="square" rtlCol="0">
+                <a:spAutoFit/>
+              </a:bodyPr>
+              <a:lstStyle/>
+              <a:p>
+                <a:r>
+                  <a:rPr lang="es-ES" sz="1600" dirty="0"/>
+                  <a:t>Mentor</a:t>
+                </a:r>
+                <a:endParaRPr lang="es-ES" dirty="0"/>
+              </a:p>
+            </p:txBody>
+          </p:sp>
+        </p:grpSp>
+        <p:grpSp>
+          <p:nvGrpSpPr>
+            <p:cNvPr id="60" name="Grupo 59">
+              <a:extLst>
+                <a:ext uri="{FF2B5EF4-FFF2-40B4-BE49-F238E27FC236}">
+                  <a16:creationId xmlns:a16="http://schemas.microsoft.com/office/drawing/2014/main" id="{E37AD1CD-DCF5-FA4A-7CEB-31C78795370C}"/>
+                </a:ext>
+              </a:extLst>
+            </p:cNvPr>
+            <p:cNvGrpSpPr/>
+            <p:nvPr/>
+          </p:nvGrpSpPr>
+          <p:grpSpPr>
+            <a:xfrm>
+              <a:off x="5398351" y="3906000"/>
+              <a:ext cx="1325137" cy="1080154"/>
+              <a:chOff x="513656" y="3804793"/>
+              <a:chExt cx="1325137" cy="1080154"/>
+            </a:xfrm>
+          </p:grpSpPr>
+          <p:pic>
+            <p:nvPicPr>
+              <p:cNvPr id="61" name="Gráfico 60" descr="Usuario con relleno sólido">
+                <a:extLst>
+                  <a:ext uri="{FF2B5EF4-FFF2-40B4-BE49-F238E27FC236}">
+                    <a16:creationId xmlns:a16="http://schemas.microsoft.com/office/drawing/2014/main" id="{C709B8D7-2E1D-392A-5BD1-77D1C95B667C}"/>
+                  </a:ext>
+                </a:extLst>
+              </p:cNvPr>
+              <p:cNvPicPr>
+                <a:picLocks noChangeAspect="1"/>
+              </p:cNvPicPr>
+              <p:nvPr/>
+            </p:nvPicPr>
+            <p:blipFill>
+              <a:blip r:embed="rId4">
+                <a:extLst>
+                  <a:ext uri="{28A0092B-C50C-407E-A947-70E740481C1C}">
+                    <a14:useLocalDpi xmlns:a14="http://schemas.microsoft.com/office/drawing/2010/main" val="0"/>
+                  </a:ext>
+                  <a:ext uri="{96DAC541-7B7A-43D3-8B79-37D633B846F1}">
+                    <asvg:svgBlip xmlns:asvg="http://schemas.microsoft.com/office/drawing/2016/SVG/main" r:embed="rId5"/>
+                  </a:ext>
+                </a:extLst>
+              </a:blip>
+              <a:stretch>
+                <a:fillRect/>
+              </a:stretch>
+            </p:blipFill>
+            <p:spPr>
+              <a:xfrm>
+                <a:off x="658427" y="3804793"/>
+                <a:ext cx="914400" cy="914400"/>
+              </a:xfrm>
+              <a:prstGeom prst="rect">
+                <a:avLst/>
+              </a:prstGeom>
+            </p:spPr>
+          </p:pic>
+          <p:sp>
+            <p:nvSpPr>
+              <p:cNvPr id="62" name="CuadroTexto 61">
+                <a:extLst>
+                  <a:ext uri="{FF2B5EF4-FFF2-40B4-BE49-F238E27FC236}">
+                    <a16:creationId xmlns:a16="http://schemas.microsoft.com/office/drawing/2014/main" id="{13B0A490-0449-2894-8E79-279FE3CF08C0}"/>
+                  </a:ext>
+                </a:extLst>
+              </p:cNvPr>
+              <p:cNvSpPr txBox="1"/>
+              <p:nvPr/>
+            </p:nvSpPr>
+            <p:spPr>
+              <a:xfrm>
+                <a:off x="513656" y="4546393"/>
+                <a:ext cx="1325137" cy="338554"/>
+              </a:xfrm>
+              <a:prstGeom prst="rect">
+                <a:avLst/>
+              </a:prstGeom>
+              <a:noFill/>
+            </p:spPr>
+            <p:txBody>
+              <a:bodyPr wrap="square" rtlCol="0">
+                <a:spAutoFit/>
+              </a:bodyPr>
+              <a:lstStyle/>
+              <a:p>
+                <a:r>
+                  <a:rPr lang="es-ES" sz="1600" dirty="0"/>
+                  <a:t>Mentorizado</a:t>
+                </a:r>
+                <a:endParaRPr lang="es-ES" dirty="0"/>
+              </a:p>
+            </p:txBody>
+          </p:sp>
+        </p:grpSp>
+        <p:cxnSp>
+          <p:nvCxnSpPr>
+            <p:cNvPr id="42" name="Conector recto de flecha 41">
+              <a:extLst>
+                <a:ext uri="{FF2B5EF4-FFF2-40B4-BE49-F238E27FC236}">
+                  <a16:creationId xmlns:a16="http://schemas.microsoft.com/office/drawing/2014/main" id="{8E24E1EE-88FA-7A2F-1B4D-91BEDBE934C3}"/>
+                </a:ext>
+              </a:extLst>
+            </p:cNvPr>
+            <p:cNvCxnSpPr>
+              <a:cxnSpLocks/>
+            </p:cNvCxnSpPr>
+            <p:nvPr/>
+          </p:nvCxnSpPr>
+          <p:spPr>
+            <a:xfrm>
+              <a:off x="6001400" y="2928536"/>
+              <a:ext cx="0" cy="970559"/>
+            </a:xfrm>
+            <a:prstGeom prst="straightConnector1">
+              <a:avLst/>
+            </a:prstGeom>
+            <a:ln>
+              <a:solidFill>
+                <a:schemeClr val="tx1"/>
+              </a:solidFill>
+              <a:headEnd type="none"/>
+              <a:tailEnd type="triangle"/>
+            </a:ln>
+          </p:spPr>
+          <p:style>
+            <a:lnRef idx="1">
+              <a:schemeClr val="accent1"/>
+            </a:lnRef>
+            <a:fillRef idx="0">
+              <a:schemeClr val="accent1"/>
+            </a:fillRef>
+            <a:effectRef idx="0">
+              <a:schemeClr val="accent1"/>
+            </a:effectRef>
+            <a:fontRef idx="minor">
+              <a:schemeClr val="tx1"/>
+            </a:fontRef>
+          </p:style>
+        </p:cxnSp>
+      </p:grpSp>
+      <p:pic>
+        <p:nvPicPr>
+          <p:cNvPr id="49" name="Gráfico 48" descr="Base de datos contorno">
+            <a:extLst>
+              <a:ext uri="{FF2B5EF4-FFF2-40B4-BE49-F238E27FC236}">
+                <a16:creationId xmlns:a16="http://schemas.microsoft.com/office/drawing/2014/main" id="{A3DF74CA-1C76-FBEF-BB0A-2FAAA324B8BC}"/>
+              </a:ext>
+            </a:extLst>
+          </p:cNvPr>
+          <p:cNvPicPr>
+            <a:picLocks noChangeAspect="1"/>
+          </p:cNvPicPr>
+          <p:nvPr/>
+        </p:nvPicPr>
+        <p:blipFill>
+          <a:blip r:embed="rId2">
+            <a:extLst>
+              <a:ext uri="{28A0092B-C50C-407E-A947-70E740481C1C}">
+                <a14:useLocalDpi xmlns:a14="http://schemas.microsoft.com/office/drawing/2010/main" val="0"/>
+              </a:ext>
+              <a:ext uri="{96DAC541-7B7A-43D3-8B79-37D633B846F1}">
+                <asvg:svgBlip xmlns:asvg="http://schemas.microsoft.com/office/drawing/2016/SVG/main" r:embed="rId3"/>
+              </a:ext>
+            </a:extLst>
+          </a:blip>
+          <a:stretch>
+            <a:fillRect/>
+          </a:stretch>
+        </p:blipFill>
+        <p:spPr>
+          <a:xfrm>
+            <a:off x="5638800" y="2906992"/>
+            <a:ext cx="914400" cy="914400"/>
+          </a:xfrm>
+          <a:prstGeom prst="rect">
+            <a:avLst/>
+          </a:prstGeom>
+        </p:spPr>
+      </p:pic>
+      <p:pic>
+        <p:nvPicPr>
+          <p:cNvPr id="50" name="Gráfico 49" descr="Base de datos contorno">
+            <a:extLst>
+              <a:ext uri="{FF2B5EF4-FFF2-40B4-BE49-F238E27FC236}">
+                <a16:creationId xmlns:a16="http://schemas.microsoft.com/office/drawing/2014/main" id="{3286134C-B661-3BDD-EF24-9A6CCDE9A47B}"/>
+              </a:ext>
+            </a:extLst>
+          </p:cNvPr>
+          <p:cNvPicPr>
+            <a:picLocks noChangeAspect="1"/>
+          </p:cNvPicPr>
+          <p:nvPr/>
+        </p:nvPicPr>
+        <p:blipFill>
+          <a:blip r:embed="rId2">
+            <a:extLst>
+              <a:ext uri="{28A0092B-C50C-407E-A947-70E740481C1C}">
+                <a14:useLocalDpi xmlns:a14="http://schemas.microsoft.com/office/drawing/2010/main" val="0"/>
+              </a:ext>
+              <a:ext uri="{96DAC541-7B7A-43D3-8B79-37D633B846F1}">
+                <asvg:svgBlip xmlns:asvg="http://schemas.microsoft.com/office/drawing/2016/SVG/main" r:embed="rId3"/>
+              </a:ext>
+            </a:extLst>
+          </a:blip>
+          <a:stretch>
+            <a:fillRect/>
+          </a:stretch>
+        </p:blipFill>
+        <p:spPr>
+          <a:xfrm>
+            <a:off x="8200847" y="2928536"/>
+            <a:ext cx="914400" cy="914400"/>
+          </a:xfrm>
+          <a:prstGeom prst="rect">
+            <a:avLst/>
+          </a:prstGeom>
+        </p:spPr>
+      </p:pic>
+      <p:sp>
+        <p:nvSpPr>
+          <p:cNvPr id="51" name="CuadroTexto 50">
+            <a:extLst>
+              <a:ext uri="{FF2B5EF4-FFF2-40B4-BE49-F238E27FC236}">
+                <a16:creationId xmlns:a16="http://schemas.microsoft.com/office/drawing/2014/main" id="{6E42E219-96E9-DA9D-0551-5A13DC0A69C6}"/>
+              </a:ext>
+            </a:extLst>
+          </p:cNvPr>
+          <p:cNvSpPr txBox="1"/>
+          <p:nvPr/>
+        </p:nvSpPr>
+        <p:spPr>
+          <a:xfrm>
+            <a:off x="2869863" y="5001667"/>
+            <a:ext cx="1813360" cy="461665"/>
+          </a:xfrm>
+          <a:prstGeom prst="rect">
+            <a:avLst/>
+          </a:prstGeom>
+          <a:noFill/>
+        </p:spPr>
+        <p:txBody>
+          <a:bodyPr wrap="square" rtlCol="0">
+            <a:spAutoFit/>
+          </a:bodyPr>
+          <a:lstStyle/>
+          <a:p>
+            <a:r>
+              <a:rPr lang="es-ES" sz="2400" b="1" dirty="0"/>
+              <a:t>Solicitud</a:t>
+            </a:r>
+            <a:endParaRPr lang="es-ES" sz="2000" b="1" dirty="0"/>
+          </a:p>
+        </p:txBody>
+      </p:sp>
+      <p:sp>
+        <p:nvSpPr>
+          <p:cNvPr id="52" name="CuadroTexto 51">
+            <a:extLst>
+              <a:ext uri="{FF2B5EF4-FFF2-40B4-BE49-F238E27FC236}">
+                <a16:creationId xmlns:a16="http://schemas.microsoft.com/office/drawing/2014/main" id="{181FD8CF-105D-6D06-28EB-C9256B383ED6}"/>
+              </a:ext>
+            </a:extLst>
+          </p:cNvPr>
+          <p:cNvSpPr txBox="1"/>
+          <p:nvPr/>
+        </p:nvSpPr>
+        <p:spPr>
+          <a:xfrm>
+            <a:off x="5249917" y="5001667"/>
+            <a:ext cx="1813360" cy="461665"/>
+          </a:xfrm>
+          <a:prstGeom prst="rect">
+            <a:avLst/>
+          </a:prstGeom>
+          <a:noFill/>
+        </p:spPr>
+        <p:txBody>
+          <a:bodyPr wrap="square" rtlCol="0">
+            <a:spAutoFit/>
+          </a:bodyPr>
+          <a:lstStyle/>
+          <a:p>
+            <a:r>
+              <a:rPr lang="es-ES" sz="2400" b="1" dirty="0"/>
+              <a:t>Aceptación</a:t>
+            </a:r>
+            <a:endParaRPr lang="es-ES" sz="2000" b="1" dirty="0"/>
+          </a:p>
+        </p:txBody>
+      </p:sp>
+      <p:sp>
+        <p:nvSpPr>
+          <p:cNvPr id="53" name="CuadroTexto 52">
+            <a:extLst>
+              <a:ext uri="{FF2B5EF4-FFF2-40B4-BE49-F238E27FC236}">
+                <a16:creationId xmlns:a16="http://schemas.microsoft.com/office/drawing/2014/main" id="{612FD2C5-6065-1BC9-D3AF-9CDAA514E06A}"/>
+              </a:ext>
+            </a:extLst>
+          </p:cNvPr>
+          <p:cNvSpPr txBox="1"/>
+          <p:nvPr/>
+        </p:nvSpPr>
+        <p:spPr>
+          <a:xfrm>
+            <a:off x="7602664" y="5005539"/>
+            <a:ext cx="2633915" cy="461665"/>
+          </a:xfrm>
+          <a:prstGeom prst="rect">
+            <a:avLst/>
+          </a:prstGeom>
+          <a:noFill/>
+        </p:spPr>
+        <p:txBody>
+          <a:bodyPr wrap="square" rtlCol="0">
+            <a:spAutoFit/>
+          </a:bodyPr>
+          <a:lstStyle/>
+          <a:p>
+            <a:r>
+              <a:rPr lang="es-ES" sz="2400" b="1" dirty="0"/>
+              <a:t>Mentorización</a:t>
+            </a:r>
+            <a:endParaRPr lang="es-ES" sz="2000" b="1" dirty="0"/>
+          </a:p>
+        </p:txBody>
+      </p:sp>
+    </p:spTree>
+    <p:extLst>
+      <p:ext uri="{BB962C8B-B14F-4D97-AF65-F5344CB8AC3E}">
+        <p14:creationId xmlns:p14="http://schemas.microsoft.com/office/powerpoint/2010/main" val="2884953925"/>
+      </p:ext>
+    </p:extLst>
+  </p:cSld>
+  <p:clrMapOvr>
+    <a:masterClrMapping/>
+  </p:clrMapOvr>
+</p:sld>
+</file>
+
+<file path=ppt/slides/slide15.xml><?xml version="1.0" encoding="utf-8"?>
+<p:sld xmlns:a="http://schemas.openxmlformats.org/drawingml/2006/main" xmlns:r="http://schemas.openxmlformats.org/officeDocument/2006/relationships" xmlns:p="http://schemas.openxmlformats.org/presentationml/2006/main">
+  <p:cSld>
+    <p:spTree>
+      <p:nvGrpSpPr>
+        <p:cNvPr id="1" name=""/>
+        <p:cNvGrpSpPr/>
+        <p:nvPr/>
+      </p:nvGrpSpPr>
+      <p:grpSpPr>
+        <a:xfrm>
+          <a:off x="0" y="0"/>
+          <a:ext cx="0" cy="0"/>
+          <a:chOff x="0" y="0"/>
+          <a:chExt cx="0" cy="0"/>
+        </a:xfrm>
+      </p:grpSpPr>
+      <p:pic>
+        <p:nvPicPr>
+          <p:cNvPr id="3" name="Imagen 2">
+            <a:extLst>
+              <a:ext uri="{FF2B5EF4-FFF2-40B4-BE49-F238E27FC236}">
+                <a16:creationId xmlns:a16="http://schemas.microsoft.com/office/drawing/2014/main" id="{F7E76009-C129-8D4A-30C2-CF563C9F5FD0}"/>
+              </a:ext>
+            </a:extLst>
+          </p:cNvPr>
+          <p:cNvPicPr>
+            <a:picLocks noChangeAspect="1"/>
+          </p:cNvPicPr>
+          <p:nvPr/>
+        </p:nvPicPr>
+        <p:blipFill>
+          <a:blip r:embed="rId2">
+            <a:extLst>
+              <a:ext uri="{28A0092B-C50C-407E-A947-70E740481C1C}">
+                <a14:useLocalDpi xmlns:a14="http://schemas.microsoft.com/office/drawing/2010/main" val="0"/>
+              </a:ext>
+            </a:extLst>
+          </a:blip>
+          <a:srcRect/>
+          <a:stretch/>
+        </p:blipFill>
+        <p:spPr>
+          <a:xfrm>
+            <a:off x="228696" y="612808"/>
+            <a:ext cx="4456590" cy="4456590"/>
+          </a:xfrm>
+          <a:prstGeom prst="rect">
+            <a:avLst/>
+          </a:prstGeom>
+        </p:spPr>
+      </p:pic>
+      <p:pic>
+        <p:nvPicPr>
+          <p:cNvPr id="5" name="Imagen 4" descr="Forma&#10;&#10;Descripción generada automáticamente con confianza media">
+            <a:extLst>
+              <a:ext uri="{FF2B5EF4-FFF2-40B4-BE49-F238E27FC236}">
+                <a16:creationId xmlns:a16="http://schemas.microsoft.com/office/drawing/2014/main" id="{AD5FCB38-FA56-3CE2-E8BA-93FB0B072E0E}"/>
+              </a:ext>
+            </a:extLst>
+          </p:cNvPr>
+          <p:cNvPicPr>
+            <a:picLocks noChangeAspect="1"/>
+          </p:cNvPicPr>
+          <p:nvPr/>
+        </p:nvPicPr>
+        <p:blipFill>
+          <a:blip r:embed="rId3">
+            <a:extLst>
+              <a:ext uri="{28A0092B-C50C-407E-A947-70E740481C1C}">
+                <a14:useLocalDpi xmlns:a14="http://schemas.microsoft.com/office/drawing/2010/main" val="0"/>
+              </a:ext>
+            </a:extLst>
+          </a:blip>
+          <a:stretch>
+            <a:fillRect/>
+          </a:stretch>
+        </p:blipFill>
+        <p:spPr>
+          <a:xfrm>
+            <a:off x="7653231" y="732426"/>
+            <a:ext cx="4047049" cy="4041860"/>
+          </a:xfrm>
+          <a:prstGeom prst="rect">
+            <a:avLst/>
+          </a:prstGeom>
+        </p:spPr>
+      </p:pic>
+      <p:sp>
+        <p:nvSpPr>
+          <p:cNvPr id="10" name="Arco de bloque 9">
+            <a:extLst>
+              <a:ext uri="{FF2B5EF4-FFF2-40B4-BE49-F238E27FC236}">
+                <a16:creationId xmlns:a16="http://schemas.microsoft.com/office/drawing/2014/main" id="{9842E64B-4703-4BB0-BA12-C6C5EF700B79}"/>
+              </a:ext>
+            </a:extLst>
+          </p:cNvPr>
+          <p:cNvSpPr/>
+          <p:nvPr/>
+        </p:nvSpPr>
+        <p:spPr>
+          <a:xfrm rot="5400000">
+            <a:off x="-3361444" y="-2306791"/>
+            <a:ext cx="6858000" cy="11471583"/>
+          </a:xfrm>
+          <a:prstGeom prst="blockArc">
+            <a:avLst>
+              <a:gd name="adj1" fmla="val 10727388"/>
+              <a:gd name="adj2" fmla="val 71492"/>
+              <a:gd name="adj3" fmla="val 7120"/>
+            </a:avLst>
+          </a:prstGeom>
+        </p:spPr>
+        <p:style>
+          <a:lnRef idx="2">
+            <a:schemeClr val="accent1">
+              <a:shade val="50000"/>
+            </a:schemeClr>
+          </a:lnRef>
+          <a:fillRef idx="1">
+            <a:schemeClr val="accent1"/>
+          </a:fillRef>
+          <a:effectRef idx="0">
+            <a:schemeClr val="accent1"/>
+          </a:effectRef>
+          <a:fontRef idx="minor">
+            <a:schemeClr val="lt1"/>
+          </a:fontRef>
+        </p:style>
+        <p:txBody>
+          <a:bodyPr rtlCol="0" anchor="ctr"/>
+          <a:lstStyle/>
+          <a:p>
+            <a:pPr algn="ctr"/>
+            <a:endParaRPr lang="es-ES">
+              <a:solidFill>
+                <a:schemeClr val="tx1"/>
+              </a:solidFill>
+            </a:endParaRPr>
+          </a:p>
+        </p:txBody>
+      </p:sp>
+      <p:sp>
+        <p:nvSpPr>
+          <p:cNvPr id="11" name="Arco de bloque 10">
+            <a:extLst>
+              <a:ext uri="{FF2B5EF4-FFF2-40B4-BE49-F238E27FC236}">
+                <a16:creationId xmlns:a16="http://schemas.microsoft.com/office/drawing/2014/main" id="{C6DD5554-2F38-0425-0C78-7142156D8CCE}"/>
+              </a:ext>
+            </a:extLst>
+          </p:cNvPr>
+          <p:cNvSpPr/>
+          <p:nvPr/>
+        </p:nvSpPr>
+        <p:spPr>
+          <a:xfrm rot="16200000">
+            <a:off x="8695446" y="-2306792"/>
+            <a:ext cx="6858000" cy="11471583"/>
+          </a:xfrm>
+          <a:prstGeom prst="blockArc">
+            <a:avLst>
+              <a:gd name="adj1" fmla="val 10727388"/>
+              <a:gd name="adj2" fmla="val 71492"/>
+              <a:gd name="adj3" fmla="val 7120"/>
+            </a:avLst>
+          </a:prstGeom>
+        </p:spPr>
+        <p:style>
+          <a:lnRef idx="2">
+            <a:schemeClr val="accent1">
+              <a:shade val="50000"/>
+            </a:schemeClr>
+          </a:lnRef>
+          <a:fillRef idx="1">
+            <a:schemeClr val="accent1"/>
+          </a:fillRef>
+          <a:effectRef idx="0">
+            <a:schemeClr val="accent1"/>
+          </a:effectRef>
+          <a:fontRef idx="minor">
+            <a:schemeClr val="lt1"/>
+          </a:fontRef>
+        </p:style>
+        <p:txBody>
+          <a:bodyPr rtlCol="0" anchor="ctr"/>
+          <a:lstStyle/>
+          <a:p>
+            <a:pPr algn="ctr"/>
+            <a:endParaRPr lang="es-ES">
+              <a:solidFill>
+                <a:schemeClr val="tx1"/>
+              </a:solidFill>
+            </a:endParaRPr>
+          </a:p>
+        </p:txBody>
+      </p:sp>
+      <p:sp>
+        <p:nvSpPr>
+          <p:cNvPr id="8" name="Elipse 7">
+            <a:extLst>
+              <a:ext uri="{FF2B5EF4-FFF2-40B4-BE49-F238E27FC236}">
+                <a16:creationId xmlns:a16="http://schemas.microsoft.com/office/drawing/2014/main" id="{42682670-3D33-1A27-4DF3-41844FEEDFA2}"/>
+              </a:ext>
+            </a:extLst>
+          </p:cNvPr>
+          <p:cNvSpPr/>
+          <p:nvPr/>
+        </p:nvSpPr>
+        <p:spPr>
+          <a:xfrm>
+            <a:off x="5072175" y="2416510"/>
+            <a:ext cx="2047650" cy="2024979"/>
+          </a:xfrm>
+          <a:prstGeom prst="ellipse">
+            <a:avLst/>
+          </a:prstGeom>
+          <a:solidFill>
+            <a:schemeClr val="bg1">
+              <a:lumMod val="95000"/>
+            </a:schemeClr>
+          </a:solidFill>
+          <a:ln>
+            <a:solidFill>
+              <a:schemeClr val="tx1"/>
+            </a:solidFill>
+          </a:ln>
+        </p:spPr>
+        <p:style>
+          <a:lnRef idx="2">
+            <a:schemeClr val="accent1">
+              <a:shade val="50000"/>
+            </a:schemeClr>
+          </a:lnRef>
+          <a:fillRef idx="1">
+            <a:schemeClr val="accent1"/>
+          </a:fillRef>
+          <a:effectRef idx="0">
+            <a:schemeClr val="accent1"/>
+          </a:effectRef>
+          <a:fontRef idx="minor">
+            <a:schemeClr val="lt1"/>
+          </a:fontRef>
+        </p:style>
+        <p:txBody>
+          <a:bodyPr rtlCol="0" anchor="ctr"/>
+          <a:lstStyle/>
+          <a:p>
+            <a:pPr algn="ctr"/>
+            <a:r>
+              <a:rPr lang="es-ES" sz="1600" dirty="0">
+                <a:solidFill>
+                  <a:schemeClr val="tx1"/>
+                </a:solidFill>
+              </a:rPr>
+              <a:t>Proyecto empresarial emprendedor</a:t>
+            </a:r>
+          </a:p>
+          <a:p>
+            <a:pPr algn="ctr"/>
+            <a:endParaRPr lang="es-ES" dirty="0"/>
+          </a:p>
+        </p:txBody>
+      </p:sp>
+      <p:sp>
+        <p:nvSpPr>
+          <p:cNvPr id="12" name="CuadroTexto 11">
+            <a:extLst>
+              <a:ext uri="{FF2B5EF4-FFF2-40B4-BE49-F238E27FC236}">
+                <a16:creationId xmlns:a16="http://schemas.microsoft.com/office/drawing/2014/main" id="{EB6C22E5-C473-CC33-AB68-619ADEB0ECF9}"/>
+              </a:ext>
+            </a:extLst>
+          </p:cNvPr>
+          <p:cNvSpPr txBox="1"/>
+          <p:nvPr/>
+        </p:nvSpPr>
+        <p:spPr>
+          <a:xfrm>
+            <a:off x="0" y="5045667"/>
+            <a:ext cx="3801766" cy="646331"/>
+          </a:xfrm>
+          <a:prstGeom prst="rect">
+            <a:avLst/>
+          </a:prstGeom>
+          <a:noFill/>
+        </p:spPr>
+        <p:txBody>
+          <a:bodyPr wrap="square" rtlCol="0">
+            <a:spAutoFit/>
+          </a:bodyPr>
+          <a:lstStyle/>
+          <a:p>
+            <a:r>
+              <a:rPr lang="es-ES" dirty="0"/>
+              <a:t>Trabajo de Fin de Master</a:t>
+            </a:r>
+          </a:p>
+          <a:p>
+            <a:r>
+              <a:rPr lang="es-ES" dirty="0"/>
+              <a:t>Desarrollo Económico e Innovación</a:t>
+            </a:r>
+          </a:p>
+        </p:txBody>
+      </p:sp>
+      <p:sp>
+        <p:nvSpPr>
+          <p:cNvPr id="13" name="CuadroTexto 12">
+            <a:extLst>
+              <a:ext uri="{FF2B5EF4-FFF2-40B4-BE49-F238E27FC236}">
+                <a16:creationId xmlns:a16="http://schemas.microsoft.com/office/drawing/2014/main" id="{AC83A787-BD19-F6AB-0B02-85ABA2A55280}"/>
+              </a:ext>
+            </a:extLst>
+          </p:cNvPr>
+          <p:cNvSpPr txBox="1"/>
+          <p:nvPr/>
+        </p:nvSpPr>
+        <p:spPr>
+          <a:xfrm>
+            <a:off x="9676755" y="5045666"/>
+            <a:ext cx="3384516" cy="646331"/>
+          </a:xfrm>
+          <a:prstGeom prst="rect">
+            <a:avLst/>
+          </a:prstGeom>
+          <a:noFill/>
+        </p:spPr>
+        <p:txBody>
+          <a:bodyPr wrap="square" rtlCol="0">
+            <a:spAutoFit/>
+          </a:bodyPr>
+          <a:lstStyle/>
+          <a:p>
+            <a:r>
+              <a:rPr lang="es-ES" dirty="0"/>
+              <a:t>Trabajo de Fin de Grado</a:t>
+            </a:r>
+          </a:p>
+          <a:p>
+            <a:r>
+              <a:rPr lang="es-ES" dirty="0"/>
+              <a:t>Ingeniería Informática</a:t>
+            </a:r>
+          </a:p>
+        </p:txBody>
+      </p:sp>
+      <p:sp>
+        <p:nvSpPr>
+          <p:cNvPr id="15" name="CuadroTexto 14">
+            <a:extLst>
+              <a:ext uri="{FF2B5EF4-FFF2-40B4-BE49-F238E27FC236}">
+                <a16:creationId xmlns:a16="http://schemas.microsoft.com/office/drawing/2014/main" id="{D21FF8F1-B339-725E-7F23-36C875A465F5}"/>
+              </a:ext>
+            </a:extLst>
+          </p:cNvPr>
+          <p:cNvSpPr txBox="1"/>
+          <p:nvPr/>
+        </p:nvSpPr>
+        <p:spPr>
+          <a:xfrm>
+            <a:off x="737003" y="4369931"/>
+            <a:ext cx="3801766" cy="369332"/>
+          </a:xfrm>
+          <a:prstGeom prst="rect">
+            <a:avLst/>
+          </a:prstGeom>
+          <a:noFill/>
+        </p:spPr>
+        <p:txBody>
+          <a:bodyPr wrap="square" rtlCol="0">
+            <a:spAutoFit/>
+          </a:bodyPr>
+          <a:lstStyle/>
+          <a:p>
+            <a:r>
+              <a:rPr lang="es-ES" dirty="0">
+                <a:solidFill>
+                  <a:schemeClr val="accent4">
+                    <a:lumMod val="75000"/>
+                  </a:schemeClr>
+                </a:solidFill>
+              </a:rPr>
+              <a:t>Desarrollo del modelo de negocio</a:t>
+            </a:r>
+          </a:p>
+        </p:txBody>
+      </p:sp>
+      <p:sp>
+        <p:nvSpPr>
+          <p:cNvPr id="16" name="CuadroTexto 15">
+            <a:extLst>
+              <a:ext uri="{FF2B5EF4-FFF2-40B4-BE49-F238E27FC236}">
+                <a16:creationId xmlns:a16="http://schemas.microsoft.com/office/drawing/2014/main" id="{8D21A0AA-AE6F-473D-708D-60AAD5650F85}"/>
+              </a:ext>
+            </a:extLst>
+          </p:cNvPr>
+          <p:cNvSpPr txBox="1"/>
+          <p:nvPr/>
+        </p:nvSpPr>
+        <p:spPr>
+          <a:xfrm>
+            <a:off x="8161538" y="4369931"/>
+            <a:ext cx="3801766" cy="369332"/>
+          </a:xfrm>
+          <a:prstGeom prst="rect">
+            <a:avLst/>
+          </a:prstGeom>
+          <a:noFill/>
+        </p:spPr>
+        <p:txBody>
+          <a:bodyPr wrap="square" rtlCol="0">
+            <a:spAutoFit/>
+          </a:bodyPr>
+          <a:lstStyle/>
+          <a:p>
+            <a:r>
+              <a:rPr lang="es-ES" dirty="0">
+                <a:solidFill>
+                  <a:schemeClr val="accent4">
+                    <a:lumMod val="75000"/>
+                  </a:schemeClr>
+                </a:solidFill>
+              </a:rPr>
+              <a:t>Desarrollo de la aplicación</a:t>
+            </a:r>
+          </a:p>
+        </p:txBody>
+      </p:sp>
+      <p:sp>
+        <p:nvSpPr>
+          <p:cNvPr id="17" name="CuadroTexto 16">
+            <a:extLst>
+              <a:ext uri="{FF2B5EF4-FFF2-40B4-BE49-F238E27FC236}">
+                <a16:creationId xmlns:a16="http://schemas.microsoft.com/office/drawing/2014/main" id="{F4D7E281-2C8A-AC2D-F01B-F5E354E8C8CC}"/>
+              </a:ext>
+            </a:extLst>
+          </p:cNvPr>
+          <p:cNvSpPr txBox="1"/>
+          <p:nvPr/>
+        </p:nvSpPr>
+        <p:spPr>
+          <a:xfrm>
+            <a:off x="4685286" y="109826"/>
+            <a:ext cx="3801766" cy="830997"/>
+          </a:xfrm>
+          <a:prstGeom prst="rect">
+            <a:avLst/>
+          </a:prstGeom>
+          <a:noFill/>
+        </p:spPr>
+        <p:txBody>
+          <a:bodyPr wrap="square" rtlCol="0">
+            <a:spAutoFit/>
+          </a:bodyPr>
+          <a:lstStyle/>
+          <a:p>
+            <a:r>
+              <a:rPr lang="es-ES" sz="4800" dirty="0">
+                <a:ln>
+                  <a:solidFill>
+                    <a:schemeClr val="tx1"/>
+                  </a:solidFill>
+                </a:ln>
+              </a:rPr>
+              <a:t>Mentoring</a:t>
+            </a:r>
+          </a:p>
+        </p:txBody>
+      </p:sp>
+    </p:spTree>
+    <p:extLst>
+      <p:ext uri="{BB962C8B-B14F-4D97-AF65-F5344CB8AC3E}">
+        <p14:creationId xmlns:p14="http://schemas.microsoft.com/office/powerpoint/2010/main" val="1751110315"/>
+      </p:ext>
+    </p:extLst>
+  </p:cSld>
+  <p:clrMapOvr>
+    <a:masterClrMapping/>
+  </p:clrMapOvr>
+</p:sld>
+</file>
+
+<file path=ppt/slides/slide16.xml><?xml version="1.0" encoding="utf-8"?>
+<p:sld xmlns:a="http://schemas.openxmlformats.org/drawingml/2006/main" xmlns:r="http://schemas.openxmlformats.org/officeDocument/2006/relationships" xmlns:p="http://schemas.openxmlformats.org/presentationml/2006/main">
+  <p:cSld>
+    <p:spTree>
+      <p:nvGrpSpPr>
+        <p:cNvPr id="1" name=""/>
+        <p:cNvGrpSpPr/>
+        <p:nvPr/>
+      </p:nvGrpSpPr>
+      <p:grpSpPr>
+        <a:xfrm>
+          <a:off x="0" y="0"/>
+          <a:ext cx="0" cy="0"/>
+          <a:chOff x="0" y="0"/>
+          <a:chExt cx="0" cy="0"/>
+        </a:xfrm>
+      </p:grpSpPr>
+    </p:spTree>
+    <p:extLst>
+      <p:ext uri="{BB962C8B-B14F-4D97-AF65-F5344CB8AC3E}">
+        <p14:creationId xmlns:p14="http://schemas.microsoft.com/office/powerpoint/2010/main" val="4072033671"/>
+      </p:ext>
+    </p:extLst>
+  </p:cSld>
+  <p:clrMapOvr>
+    <a:masterClrMapping/>
+  </p:clrMapOvr>
+</p:sld>
+</file>
+
+<file path=ppt/slides/slide17.xml><?xml version="1.0" encoding="utf-8"?>
+<p:sld xmlns:a="http://schemas.openxmlformats.org/drawingml/2006/main" xmlns:r="http://schemas.openxmlformats.org/officeDocument/2006/relationships" xmlns:p="http://schemas.openxmlformats.org/presentationml/2006/main">
+  <p:cSld>
+    <p:spTree>
+      <p:nvGrpSpPr>
+        <p:cNvPr id="1" name=""/>
+        <p:cNvGrpSpPr/>
+        <p:nvPr/>
+      </p:nvGrpSpPr>
+      <p:grpSpPr>
+        <a:xfrm>
+          <a:off x="0" y="0"/>
+          <a:ext cx="0" cy="0"/>
+          <a:chOff x="0" y="0"/>
+          <a:chExt cx="0" cy="0"/>
+        </a:xfrm>
+      </p:grpSpPr>
+    </p:spTree>
+    <p:extLst>
+      <p:ext uri="{BB962C8B-B14F-4D97-AF65-F5344CB8AC3E}">
+        <p14:creationId xmlns:p14="http://schemas.microsoft.com/office/powerpoint/2010/main" val="4199830841"/>
+      </p:ext>
+    </p:extLst>
+  </p:cSld>
+  <p:clrMapOvr>
+    <a:masterClrMapping/>
+  </p:clrMapOvr>
+</p:sld>
+</file>
+
+<file path=ppt/slides/slide18.xml><?xml version="1.0" encoding="utf-8"?>
+<p:sld xmlns:a="http://schemas.openxmlformats.org/drawingml/2006/main" xmlns:r="http://schemas.openxmlformats.org/officeDocument/2006/relationships" xmlns:p="http://schemas.openxmlformats.org/presentationml/2006/main">
+  <p:cSld>
     <p:bg>
       <p:bgPr>
         <a:solidFill>
@@ -6040,7 +9602,7 @@
 </p:sld>
 </file>
 
-<file path=ppt/slides/slide12.xml><?xml version="1.0" encoding="utf-8"?>
+<file path=ppt/slides/slide19.xml><?xml version="1.0" encoding="utf-8"?>
 <p:sld xmlns:a="http://schemas.openxmlformats.org/drawingml/2006/main" xmlns:r="http://schemas.openxmlformats.org/officeDocument/2006/relationships" xmlns:p="http://schemas.openxmlformats.org/presentationml/2006/main">
   <p:cSld>
     <p:bg>
@@ -6221,7 +9783,388 @@
 </p:sld>
 </file>
 
-<file path=ppt/slides/slide13.xml><?xml version="1.0" encoding="utf-8"?>
+<file path=ppt/slides/slide2.xml><?xml version="1.0" encoding="utf-8"?>
+<p:sld xmlns:a="http://schemas.openxmlformats.org/drawingml/2006/main" xmlns:r="http://schemas.openxmlformats.org/officeDocument/2006/relationships" xmlns:p="http://schemas.openxmlformats.org/presentationml/2006/main">
+  <p:cSld>
+    <p:spTree>
+      <p:nvGrpSpPr>
+        <p:cNvPr id="1" name=""/>
+        <p:cNvGrpSpPr/>
+        <p:nvPr/>
+      </p:nvGrpSpPr>
+      <p:grpSpPr>
+        <a:xfrm>
+          <a:off x="0" y="0"/>
+          <a:ext cx="0" cy="0"/>
+          <a:chOff x="0" y="0"/>
+          <a:chExt cx="0" cy="0"/>
+        </a:xfrm>
+      </p:grpSpPr>
+      <p:sp>
+        <p:nvSpPr>
+          <p:cNvPr id="2" name="Título 1">
+            <a:extLst>
+              <a:ext uri="{FF2B5EF4-FFF2-40B4-BE49-F238E27FC236}">
+                <a16:creationId xmlns:a16="http://schemas.microsoft.com/office/drawing/2014/main" id="{2DD8C21F-D350-4941-98A5-59C59C6383EB}"/>
+              </a:ext>
+            </a:extLst>
+          </p:cNvPr>
+          <p:cNvSpPr>
+            <a:spLocks noGrp="1"/>
+          </p:cNvSpPr>
+          <p:nvPr>
+            <p:ph type="title"/>
+          </p:nvPr>
+        </p:nvSpPr>
+        <p:spPr/>
+        <p:txBody>
+          <a:bodyPr/>
+          <a:lstStyle/>
+          <a:p>
+            <a:r>
+              <a:rPr lang="es-ES" dirty="0"/>
+              <a:t>Origen figuras</a:t>
+            </a:r>
+          </a:p>
+        </p:txBody>
+      </p:sp>
+      <p:sp>
+        <p:nvSpPr>
+          <p:cNvPr id="3" name="Marcador de contenido 2">
+            <a:extLst>
+              <a:ext uri="{FF2B5EF4-FFF2-40B4-BE49-F238E27FC236}">
+                <a16:creationId xmlns:a16="http://schemas.microsoft.com/office/drawing/2014/main" id="{AAC59212-EE18-4965-8F8A-7F54974FFCBA}"/>
+              </a:ext>
+            </a:extLst>
+          </p:cNvPr>
+          <p:cNvSpPr>
+            <a:spLocks noGrp="1"/>
+          </p:cNvSpPr>
+          <p:nvPr>
+            <p:ph idx="1"/>
+          </p:nvPr>
+        </p:nvSpPr>
+        <p:spPr>
+          <a:xfrm>
+            <a:off x="838200" y="1825625"/>
+            <a:ext cx="10515600" cy="4667250"/>
+          </a:xfrm>
+        </p:spPr>
+        <p:txBody>
+          <a:bodyPr>
+            <a:normAutofit fontScale="92500" lnSpcReduction="20000"/>
+          </a:bodyPr>
+          <a:lstStyle/>
+          <a:p>
+            <a:r>
+              <a:rPr lang="es-ES" sz="1100" dirty="0"/>
+              <a:t>HTML5: </a:t>
+            </a:r>
+            <a:r>
+              <a:rPr lang="es-ES" sz="1100" dirty="0">
+                <a:hlinkClick r:id="rId2"/>
+              </a:rPr>
+              <a:t>https://www.flaticon.es/icono-gratis/html-5_919827</a:t>
+            </a:r>
+            <a:endParaRPr lang="es-ES" sz="1100" dirty="0"/>
+          </a:p>
+          <a:p>
+            <a:r>
+              <a:rPr lang="es-ES" sz="1100" dirty="0"/>
+              <a:t>CSS: </a:t>
+            </a:r>
+            <a:r>
+              <a:rPr lang="es-ES" sz="1100" dirty="0">
+                <a:hlinkClick r:id="rId3"/>
+              </a:rPr>
+              <a:t>https://www.flaticon.es/icono-gratis/css-3_5968242?term=css&amp;page=1&amp;position=2&amp;page=1&amp;position=2&amp;related_id=5968242&amp;origin=search</a:t>
+            </a:r>
+            <a:endParaRPr lang="es-ES" sz="1100" dirty="0"/>
+          </a:p>
+          <a:p>
+            <a:r>
+              <a:rPr lang="es-ES" sz="1100" dirty="0"/>
+              <a:t>JS: </a:t>
+            </a:r>
+            <a:r>
+              <a:rPr lang="es-ES" sz="1100" dirty="0">
+                <a:hlinkClick r:id="rId4"/>
+              </a:rPr>
+              <a:t>https://www.flaticon.es/icono-gratis/js_5968292?term=javascript&amp;page=1&amp;position=3&amp;page=1&amp;position=3&amp;related_id=5968292&amp;origin=search</a:t>
+            </a:r>
+            <a:endParaRPr lang="es-ES" sz="1100" dirty="0"/>
+          </a:p>
+          <a:p>
+            <a:r>
+              <a:rPr lang="es-ES" sz="1100" dirty="0"/>
+              <a:t>Angular: </a:t>
+            </a:r>
+            <a:r>
+              <a:rPr lang="es-ES" sz="1100" dirty="0">
+                <a:hlinkClick r:id="rId5"/>
+              </a:rPr>
+              <a:t>https://stock.adobe.com/es/images/id/295038577?as_campaign=Flaticon&amp;as_content=api&amp;as_audience=404&amp;tduid=5d94599efed499d67637e4592bc0b69e&amp;as_channel=affiliate&amp;as_campclass=redirect&amp;as_source=arvato</a:t>
+            </a:r>
+            <a:endParaRPr lang="es-ES" sz="1100" dirty="0"/>
+          </a:p>
+          <a:p>
+            <a:r>
+              <a:rPr lang="es-ES" sz="1100" dirty="0"/>
+              <a:t>Bootstrap: </a:t>
+            </a:r>
+            <a:r>
+              <a:rPr lang="es-ES" sz="1100" dirty="0">
+                <a:hlinkClick r:id="rId6"/>
+              </a:rPr>
+              <a:t>https://www.flaticon.com/free-icon/bootstrap_5968672</a:t>
+            </a:r>
+            <a:endParaRPr lang="es-ES" sz="1100" dirty="0"/>
+          </a:p>
+          <a:p>
+            <a:r>
+              <a:rPr lang="es-ES" sz="1100" dirty="0"/>
+              <a:t>Stomp.js: </a:t>
+            </a:r>
+            <a:r>
+              <a:rPr lang="es-ES" sz="1100" dirty="0">
+                <a:hlinkClick r:id="rId7"/>
+              </a:rPr>
+              <a:t>https://www.drouiz.com/blog/2018/09/05/stomp-js-vs-websocket/</a:t>
+            </a:r>
+            <a:r>
+              <a:rPr lang="es-ES" sz="1100" dirty="0"/>
+              <a:t> </a:t>
+            </a:r>
+          </a:p>
+          <a:p>
+            <a:r>
+              <a:rPr lang="es-ES" sz="1100" dirty="0" err="1"/>
+              <a:t>WebSockect</a:t>
+            </a:r>
+            <a:r>
+              <a:rPr lang="es-ES" sz="1100" dirty="0"/>
+              <a:t>: </a:t>
+            </a:r>
+            <a:r>
+              <a:rPr lang="es-ES" sz="1100" dirty="0">
+                <a:hlinkClick r:id="rId8"/>
+              </a:rPr>
+              <a:t>https://imgur.com/gallery/HhWJGX4</a:t>
+            </a:r>
+            <a:endParaRPr lang="es-ES" sz="1100" dirty="0"/>
+          </a:p>
+          <a:p>
+            <a:r>
+              <a:rPr lang="es-ES" sz="1100" dirty="0"/>
+              <a:t>Spring </a:t>
+            </a:r>
+            <a:r>
+              <a:rPr lang="es-ES" sz="1100" dirty="0" err="1"/>
+              <a:t>security</a:t>
+            </a:r>
+            <a:r>
+              <a:rPr lang="es-ES" sz="1100" dirty="0"/>
+              <a:t>: </a:t>
+            </a:r>
+            <a:r>
+              <a:rPr lang="es-ES" sz="1100" dirty="0">
+                <a:hlinkClick r:id="rId9"/>
+              </a:rPr>
+              <a:t>https://dev.to/ravimengar/spring-boot-security-with-oauth-2-0-2emm</a:t>
+            </a:r>
+            <a:endParaRPr lang="es-ES" sz="1100" dirty="0"/>
+          </a:p>
+          <a:p>
+            <a:r>
+              <a:rPr lang="es-ES" sz="1100" dirty="0"/>
+              <a:t>Spring </a:t>
+            </a:r>
+            <a:r>
+              <a:rPr lang="es-ES" sz="1100" dirty="0" err="1"/>
+              <a:t>boot</a:t>
+            </a:r>
+            <a:r>
+              <a:rPr lang="es-ES" sz="1100" dirty="0"/>
+              <a:t>: </a:t>
+            </a:r>
+            <a:r>
+              <a:rPr lang="es-ES" sz="1100" dirty="0">
+                <a:hlinkClick r:id="rId10"/>
+              </a:rPr>
+              <a:t>https://cleventy.com/tutorial-spring-boot/</a:t>
+            </a:r>
+            <a:endParaRPr lang="es-ES" sz="1100" dirty="0"/>
+          </a:p>
+          <a:p>
+            <a:r>
+              <a:rPr lang="es-ES" sz="1100" dirty="0"/>
+              <a:t>Spring MVC: </a:t>
+            </a:r>
+            <a:r>
+              <a:rPr lang="es-ES" sz="1100" dirty="0">
+                <a:hlinkClick r:id="rId11"/>
+              </a:rPr>
+              <a:t>http://www.formadoresit.es/formacion-en-empresas/formacion/cursos-java-madrid/cursos-spring/</a:t>
+            </a:r>
+            <a:endParaRPr lang="es-ES" sz="1100" dirty="0"/>
+          </a:p>
+          <a:p>
+            <a:r>
+              <a:rPr lang="es-ES" sz="1100" dirty="0" err="1"/>
+              <a:t>Thymeleaf</a:t>
+            </a:r>
+            <a:r>
+              <a:rPr lang="es-ES" sz="1100" dirty="0"/>
+              <a:t>: </a:t>
+            </a:r>
+            <a:r>
+              <a:rPr lang="es-ES" sz="1100" dirty="0">
+                <a:hlinkClick r:id="rId12"/>
+              </a:rPr>
+              <a:t>https://www.thymeleaf.org/doc/tutorials/3.0/usingthymeleaf.html</a:t>
+            </a:r>
+            <a:endParaRPr lang="es-ES" sz="1100" dirty="0"/>
+          </a:p>
+          <a:p>
+            <a:r>
+              <a:rPr lang="es-ES" sz="1100" dirty="0" err="1"/>
+              <a:t>Hibernate</a:t>
+            </a:r>
+            <a:r>
+              <a:rPr lang="es-ES" sz="1100" dirty="0"/>
+              <a:t>: </a:t>
+            </a:r>
+            <a:r>
+              <a:rPr lang="es-ES" sz="1100" dirty="0">
+                <a:hlinkClick r:id="rId13"/>
+              </a:rPr>
+              <a:t>https://icon-icons.com/es/icono/hibernate-logotipo/169034</a:t>
+            </a:r>
+            <a:endParaRPr lang="es-ES" sz="1100" dirty="0"/>
+          </a:p>
+          <a:p>
+            <a:r>
+              <a:rPr lang="es-ES" sz="1100" dirty="0"/>
+              <a:t>Tomcat: </a:t>
+            </a:r>
+            <a:r>
+              <a:rPr lang="es-ES" sz="1100" dirty="0">
+                <a:hlinkClick r:id="rId14"/>
+              </a:rPr>
+              <a:t>https://icon-icons.com/es/icono/tomcat-original-la-marca-logotipo/146324</a:t>
+            </a:r>
+            <a:endParaRPr lang="es-ES" sz="1100" dirty="0"/>
+          </a:p>
+          <a:p>
+            <a:r>
+              <a:rPr lang="es-ES" sz="1100" dirty="0" err="1"/>
+              <a:t>Postgresql</a:t>
+            </a:r>
+            <a:r>
+              <a:rPr lang="es-ES" sz="1100" dirty="0"/>
+              <a:t>: </a:t>
+            </a:r>
+            <a:r>
+              <a:rPr lang="es-ES" sz="1100" dirty="0">
+                <a:hlinkClick r:id="rId15"/>
+              </a:rPr>
+              <a:t>https://icon-icons.com/es/icono/postgresql-llano-la-marca-logotipo/146390</a:t>
+            </a:r>
+            <a:endParaRPr lang="es-ES" sz="1100" dirty="0"/>
+          </a:p>
+          <a:p>
+            <a:r>
+              <a:rPr lang="es-ES" sz="1100" dirty="0" err="1"/>
+              <a:t>JavaMail</a:t>
+            </a:r>
+            <a:r>
+              <a:rPr lang="es-ES" sz="1100" dirty="0"/>
+              <a:t>: </a:t>
+            </a:r>
+            <a:r>
+              <a:rPr lang="es-ES" sz="1100" dirty="0">
+                <a:hlinkClick r:id="rId16"/>
+              </a:rPr>
+              <a:t>http://coderzen.blogspot.com/2015/01/javamail-wont-work-authenticationfailed.html</a:t>
+            </a:r>
+            <a:endParaRPr lang="es-ES" sz="1100" dirty="0"/>
+          </a:p>
+          <a:p>
+            <a:r>
+              <a:rPr lang="es-ES" sz="1100" dirty="0"/>
+              <a:t>Gmail: </a:t>
+            </a:r>
+            <a:r>
+              <a:rPr lang="es-ES" sz="1100" dirty="0">
+                <a:hlinkClick r:id="rId17"/>
+              </a:rPr>
+              <a:t>https://www.flaticon.es/icono-gratis/gmail_732200?term=gmail&amp;page=1&amp;position=1&amp;page=1&amp;position=1&amp;related_id=732200&amp;origin=search</a:t>
+            </a:r>
+            <a:endParaRPr lang="es-ES" sz="1100" dirty="0"/>
+          </a:p>
+          <a:p>
+            <a:r>
+              <a:rPr lang="es-ES" sz="1100" dirty="0"/>
+              <a:t>Java: </a:t>
+            </a:r>
+            <a:r>
+              <a:rPr lang="es-ES" sz="1100" dirty="0">
+                <a:hlinkClick r:id="rId18"/>
+              </a:rPr>
+              <a:t>https://www.flaticon.es/icono-gratis/java_226777?term=java&amp;page=1&amp;position=1&amp;page=1&amp;position=1&amp;related_id=226777&amp;origin=search</a:t>
+            </a:r>
+            <a:r>
+              <a:rPr lang="es-ES" sz="1100" dirty="0"/>
+              <a:t> </a:t>
+            </a:r>
+          </a:p>
+          <a:p>
+            <a:r>
+              <a:rPr lang="es-ES" sz="1100" dirty="0"/>
+              <a:t>Sockjs.js: </a:t>
+            </a:r>
+            <a:r>
+              <a:rPr lang="es-ES" sz="1100" dirty="0">
+                <a:hlinkClick r:id="rId19"/>
+              </a:rPr>
+              <a:t>https://github.com/sockjs</a:t>
+            </a:r>
+            <a:r>
+              <a:rPr lang="es-ES" sz="1100" dirty="0"/>
+              <a:t> </a:t>
+            </a:r>
+          </a:p>
+          <a:p>
+            <a:endParaRPr lang="es-ES" sz="1100" dirty="0"/>
+          </a:p>
+          <a:p>
+            <a:endParaRPr lang="es-ES" sz="1100" dirty="0"/>
+          </a:p>
+          <a:p>
+            <a:endParaRPr lang="es-ES" sz="1100" dirty="0"/>
+          </a:p>
+          <a:p>
+            <a:endParaRPr lang="es-ES" sz="1100" dirty="0"/>
+          </a:p>
+          <a:p>
+            <a:endParaRPr lang="es-ES" sz="1100" dirty="0"/>
+          </a:p>
+        </p:txBody>
+      </p:sp>
+    </p:spTree>
+    <p:extLst>
+      <p:ext uri="{BB962C8B-B14F-4D97-AF65-F5344CB8AC3E}">
+        <p14:creationId xmlns:p14="http://schemas.microsoft.com/office/powerpoint/2010/main" val="3274222130"/>
+      </p:ext>
+    </p:extLst>
+  </p:cSld>
+  <p:clrMapOvr>
+    <a:masterClrMapping/>
+  </p:clrMapOvr>
+</p:sld>
+</file>
+
+<file path=ppt/slides/slide20.xml><?xml version="1.0" encoding="utf-8"?>
 <p:sld xmlns:a="http://schemas.openxmlformats.org/drawingml/2006/main" xmlns:r="http://schemas.openxmlformats.org/officeDocument/2006/relationships" xmlns:p="http://schemas.openxmlformats.org/presentationml/2006/main">
   <p:cSld>
     <p:bg>
@@ -6582,7 +10525,7 @@
 </p:sld>
 </file>
 
-<file path=ppt/slides/slide14.xml><?xml version="1.0" encoding="utf-8"?>
+<file path=ppt/slides/slide21.xml><?xml version="1.0" encoding="utf-8"?>
 <p:sld xmlns:a="http://schemas.openxmlformats.org/drawingml/2006/main" xmlns:r="http://schemas.openxmlformats.org/officeDocument/2006/relationships" xmlns:p="http://schemas.openxmlformats.org/presentationml/2006/main">
   <p:cSld>
     <p:bg>
@@ -6799,7 +10742,7 @@
 </p:sld>
 </file>
 
-<file path=ppt/slides/slide15.xml><?xml version="1.0" encoding="utf-8"?>
+<file path=ppt/slides/slide22.xml><?xml version="1.0" encoding="utf-8"?>
 <p:sld xmlns:a="http://schemas.openxmlformats.org/drawingml/2006/main" xmlns:r="http://schemas.openxmlformats.org/officeDocument/2006/relationships" xmlns:p="http://schemas.openxmlformats.org/presentationml/2006/main">
   <p:cSld>
     <p:bg>
@@ -6979,7 +10922,7 @@
 </p:sld>
 </file>
 
-<file path=ppt/slides/slide16.xml><?xml version="1.0" encoding="utf-8"?>
+<file path=ppt/slides/slide23.xml><?xml version="1.0" encoding="utf-8"?>
 <p:sld xmlns:a="http://schemas.openxmlformats.org/drawingml/2006/main" xmlns:r="http://schemas.openxmlformats.org/officeDocument/2006/relationships" xmlns:p="http://schemas.openxmlformats.org/presentationml/2006/main">
   <p:cSld>
     <p:bg>
@@ -7124,7 +11067,7 @@
 </p:sld>
 </file>
 
-<file path=ppt/slides/slide17.xml><?xml version="1.0" encoding="utf-8"?>
+<file path=ppt/slides/slide24.xml><?xml version="1.0" encoding="utf-8"?>
 <p:sld xmlns:a="http://schemas.openxmlformats.org/drawingml/2006/main" xmlns:r="http://schemas.openxmlformats.org/officeDocument/2006/relationships" xmlns:p="http://schemas.openxmlformats.org/presentationml/2006/main">
   <p:cSld>
     <p:bg>
@@ -7233,7 +11176,7 @@
 </p:sld>
 </file>
 
-<file path=ppt/slides/slide18.xml><?xml version="1.0" encoding="utf-8"?>
+<file path=ppt/slides/slide25.xml><?xml version="1.0" encoding="utf-8"?>
 <p:sld xmlns:a="http://schemas.openxmlformats.org/drawingml/2006/main" xmlns:r="http://schemas.openxmlformats.org/officeDocument/2006/relationships" xmlns:p="http://schemas.openxmlformats.org/presentationml/2006/main">
   <p:cSld>
     <p:spTree>
@@ -7973,59 +11916,6 @@
       </p:sp>
       <p:sp>
         <p:nvSpPr>
-          <p:cNvPr id="19" name="Círculo: vacío 18">
-            <a:extLst>
-              <a:ext uri="{FF2B5EF4-FFF2-40B4-BE49-F238E27FC236}">
-                <a16:creationId xmlns:a16="http://schemas.microsoft.com/office/drawing/2014/main" id="{789FB6FE-938D-CB6E-4170-37047114C9CC}"/>
-              </a:ext>
-            </a:extLst>
-          </p:cNvPr>
-          <p:cNvSpPr/>
-          <p:nvPr/>
-        </p:nvSpPr>
-        <p:spPr>
-          <a:xfrm>
-            <a:off x="263512" y="941438"/>
-            <a:ext cx="275208" cy="301841"/>
-          </a:xfrm>
-          <a:prstGeom prst="donut">
-            <a:avLst/>
-          </a:prstGeom>
-          <a:solidFill>
-            <a:srgbClr val="00B0F0"/>
-          </a:solidFill>
-        </p:spPr>
-        <p:style>
-          <a:lnRef idx="2">
-            <a:schemeClr val="accent1">
-              <a:shade val="50000"/>
-            </a:schemeClr>
-          </a:lnRef>
-          <a:fillRef idx="1">
-            <a:schemeClr val="accent1"/>
-          </a:fillRef>
-          <a:effectRef idx="0">
-            <a:schemeClr val="accent1"/>
-          </a:effectRef>
-          <a:fontRef idx="minor">
-            <a:schemeClr val="lt1"/>
-          </a:fontRef>
-        </p:style>
-        <p:txBody>
-          <a:bodyPr rtlCol="0" anchor="ctr"/>
-          <a:lstStyle/>
-          <a:p>
-            <a:pPr algn="ctr"/>
-            <a:endParaRPr lang="es-ES" dirty="0">
-              <a:solidFill>
-                <a:schemeClr val="tx1"/>
-              </a:solidFill>
-            </a:endParaRPr>
-          </a:p>
-        </p:txBody>
-      </p:sp>
-      <p:sp>
-        <p:nvSpPr>
           <p:cNvPr id="20" name="Círculo: vacío 19">
             <a:extLst>
               <a:ext uri="{FF2B5EF4-FFF2-40B4-BE49-F238E27FC236}">
@@ -10130,391 +14020,59 @@
           </a:p>
         </p:txBody>
       </p:sp>
+      <p:sp>
+        <p:nvSpPr>
+          <p:cNvPr id="64" name="Signo de multiplicación 63">
+            <a:extLst>
+              <a:ext uri="{FF2B5EF4-FFF2-40B4-BE49-F238E27FC236}">
+                <a16:creationId xmlns:a16="http://schemas.microsoft.com/office/drawing/2014/main" id="{BBC7F60E-236F-843E-35BF-3786F3E55FAA}"/>
+              </a:ext>
+            </a:extLst>
+          </p:cNvPr>
+          <p:cNvSpPr/>
+          <p:nvPr/>
+        </p:nvSpPr>
+        <p:spPr>
+          <a:xfrm>
+            <a:off x="204667" y="990265"/>
+            <a:ext cx="275208" cy="204187"/>
+          </a:xfrm>
+          <a:prstGeom prst="mathMultiply">
+            <a:avLst/>
+          </a:prstGeom>
+          <a:solidFill>
+            <a:srgbClr val="00B0F0"/>
+          </a:solidFill>
+        </p:spPr>
+        <p:style>
+          <a:lnRef idx="2">
+            <a:schemeClr val="accent1">
+              <a:shade val="50000"/>
+            </a:schemeClr>
+          </a:lnRef>
+          <a:fillRef idx="1">
+            <a:schemeClr val="accent1"/>
+          </a:fillRef>
+          <a:effectRef idx="0">
+            <a:schemeClr val="accent1"/>
+          </a:effectRef>
+          <a:fontRef idx="minor">
+            <a:schemeClr val="lt1"/>
+          </a:fontRef>
+        </p:style>
+        <p:txBody>
+          <a:bodyPr rtlCol="0" anchor="ctr"/>
+          <a:lstStyle/>
+          <a:p>
+            <a:pPr algn="ctr"/>
+            <a:endParaRPr lang="es-ES" dirty="0"/>
+          </a:p>
+        </p:txBody>
+      </p:sp>
     </p:spTree>
     <p:extLst>
       <p:ext uri="{BB962C8B-B14F-4D97-AF65-F5344CB8AC3E}">
         <p14:creationId xmlns:p14="http://schemas.microsoft.com/office/powerpoint/2010/main" val="1187465137"/>
-      </p:ext>
-    </p:extLst>
-  </p:cSld>
-  <p:clrMapOvr>
-    <a:masterClrMapping/>
-  </p:clrMapOvr>
-</p:sld>
-</file>
-
-<file path=ppt/slides/slide2.xml><?xml version="1.0" encoding="utf-8"?>
-<p:sld xmlns:a="http://schemas.openxmlformats.org/drawingml/2006/main" xmlns:r="http://schemas.openxmlformats.org/officeDocument/2006/relationships" xmlns:p="http://schemas.openxmlformats.org/presentationml/2006/main">
-  <p:cSld>
-    <p:spTree>
-      <p:nvGrpSpPr>
-        <p:cNvPr id="1" name=""/>
-        <p:cNvGrpSpPr/>
-        <p:nvPr/>
-      </p:nvGrpSpPr>
-      <p:grpSpPr>
-        <a:xfrm>
-          <a:off x="0" y="0"/>
-          <a:ext cx="0" cy="0"/>
-          <a:chOff x="0" y="0"/>
-          <a:chExt cx="0" cy="0"/>
-        </a:xfrm>
-      </p:grpSpPr>
-      <p:sp>
-        <p:nvSpPr>
-          <p:cNvPr id="2" name="Título 1">
-            <a:extLst>
-              <a:ext uri="{FF2B5EF4-FFF2-40B4-BE49-F238E27FC236}">
-                <a16:creationId xmlns:a16="http://schemas.microsoft.com/office/drawing/2014/main" id="{2DD8C21F-D350-4941-98A5-59C59C6383EB}"/>
-              </a:ext>
-            </a:extLst>
-          </p:cNvPr>
-          <p:cNvSpPr>
-            <a:spLocks noGrp="1"/>
-          </p:cNvSpPr>
-          <p:nvPr>
-            <p:ph type="title"/>
-          </p:nvPr>
-        </p:nvSpPr>
-        <p:spPr/>
-        <p:txBody>
-          <a:bodyPr/>
-          <a:lstStyle/>
-          <a:p>
-            <a:r>
-              <a:rPr lang="es-ES" dirty="0"/>
-              <a:t>Origen figuras</a:t>
-            </a:r>
-          </a:p>
-        </p:txBody>
-      </p:sp>
-      <p:sp>
-        <p:nvSpPr>
-          <p:cNvPr id="3" name="Marcador de contenido 2">
-            <a:extLst>
-              <a:ext uri="{FF2B5EF4-FFF2-40B4-BE49-F238E27FC236}">
-                <a16:creationId xmlns:a16="http://schemas.microsoft.com/office/drawing/2014/main" id="{AAC59212-EE18-4965-8F8A-7F54974FFCBA}"/>
-              </a:ext>
-            </a:extLst>
-          </p:cNvPr>
-          <p:cNvSpPr>
-            <a:spLocks noGrp="1"/>
-          </p:cNvSpPr>
-          <p:nvPr>
-            <p:ph idx="1"/>
-          </p:nvPr>
-        </p:nvSpPr>
-        <p:spPr>
-          <a:xfrm>
-            <a:off x="838200" y="1825625"/>
-            <a:ext cx="10515600" cy="4667250"/>
-          </a:xfrm>
-        </p:spPr>
-        <p:txBody>
-          <a:bodyPr>
-            <a:normAutofit fontScale="92500" lnSpcReduction="20000"/>
-          </a:bodyPr>
-          <a:lstStyle/>
-          <a:p>
-            <a:r>
-              <a:rPr lang="es-ES" sz="1100" dirty="0"/>
-              <a:t>HTML5: </a:t>
-            </a:r>
-            <a:r>
-              <a:rPr lang="es-ES" sz="1100" dirty="0">
-                <a:hlinkClick r:id="rId2"/>
-              </a:rPr>
-              <a:t>https://www.flaticon.es/icono-gratis/html-5_919827</a:t>
-            </a:r>
-            <a:endParaRPr lang="es-ES" sz="1100" dirty="0"/>
-          </a:p>
-          <a:p>
-            <a:r>
-              <a:rPr lang="es-ES" sz="1100" dirty="0"/>
-              <a:t>CSS: </a:t>
-            </a:r>
-            <a:r>
-              <a:rPr lang="es-ES" sz="1100" dirty="0">
-                <a:hlinkClick r:id="rId3"/>
-              </a:rPr>
-              <a:t>https://www.flaticon.es/icono-gratis/css-3_5968242?term=css&amp;page=1&amp;position=2&amp;page=1&amp;position=2&amp;related_id=5968242&amp;origin=search</a:t>
-            </a:r>
-            <a:endParaRPr lang="es-ES" sz="1100" dirty="0"/>
-          </a:p>
-          <a:p>
-            <a:r>
-              <a:rPr lang="es-ES" sz="1100" dirty="0"/>
-              <a:t>JS: </a:t>
-            </a:r>
-            <a:r>
-              <a:rPr lang="es-ES" sz="1100" dirty="0">
-                <a:hlinkClick r:id="rId4"/>
-              </a:rPr>
-              <a:t>https://www.flaticon.es/icono-gratis/js_5968292?term=javascript&amp;page=1&amp;position=3&amp;page=1&amp;position=3&amp;related_id=5968292&amp;origin=search</a:t>
-            </a:r>
-            <a:endParaRPr lang="es-ES" sz="1100" dirty="0"/>
-          </a:p>
-          <a:p>
-            <a:r>
-              <a:rPr lang="es-ES" sz="1100" dirty="0"/>
-              <a:t>Angular: </a:t>
-            </a:r>
-            <a:r>
-              <a:rPr lang="es-ES" sz="1100" dirty="0">
-                <a:hlinkClick r:id="rId5"/>
-              </a:rPr>
-              <a:t>https://stock.adobe.com/es/images/id/295038577?as_campaign=Flaticon&amp;as_content=api&amp;as_audience=404&amp;tduid=5d94599efed499d67637e4592bc0b69e&amp;as_channel=affiliate&amp;as_campclass=redirect&amp;as_source=arvato</a:t>
-            </a:r>
-            <a:endParaRPr lang="es-ES" sz="1100" dirty="0"/>
-          </a:p>
-          <a:p>
-            <a:r>
-              <a:rPr lang="es-ES" sz="1100" dirty="0"/>
-              <a:t>Bootstrap: </a:t>
-            </a:r>
-            <a:r>
-              <a:rPr lang="es-ES" sz="1100" dirty="0">
-                <a:hlinkClick r:id="rId6"/>
-              </a:rPr>
-              <a:t>https://www.flaticon.com/free-icon/bootstrap_5968672</a:t>
-            </a:r>
-            <a:endParaRPr lang="es-ES" sz="1100" dirty="0"/>
-          </a:p>
-          <a:p>
-            <a:r>
-              <a:rPr lang="es-ES" sz="1100" dirty="0"/>
-              <a:t>Stomp.js: </a:t>
-            </a:r>
-            <a:r>
-              <a:rPr lang="es-ES" sz="1100" dirty="0">
-                <a:hlinkClick r:id="rId7"/>
-              </a:rPr>
-              <a:t>https://www.drouiz.com/blog/2018/09/05/stomp-js-vs-websocket/</a:t>
-            </a:r>
-            <a:r>
-              <a:rPr lang="es-ES" sz="1100" dirty="0"/>
-              <a:t> </a:t>
-            </a:r>
-          </a:p>
-          <a:p>
-            <a:r>
-              <a:rPr lang="es-ES" sz="1100" dirty="0" err="1"/>
-              <a:t>WebSockect</a:t>
-            </a:r>
-            <a:r>
-              <a:rPr lang="es-ES" sz="1100" dirty="0"/>
-              <a:t>: </a:t>
-            </a:r>
-            <a:r>
-              <a:rPr lang="es-ES" sz="1100" dirty="0">
-                <a:hlinkClick r:id="rId8"/>
-              </a:rPr>
-              <a:t>https://imgur.com/gallery/HhWJGX4</a:t>
-            </a:r>
-            <a:endParaRPr lang="es-ES" sz="1100" dirty="0"/>
-          </a:p>
-          <a:p>
-            <a:r>
-              <a:rPr lang="es-ES" sz="1100" dirty="0"/>
-              <a:t>Spring </a:t>
-            </a:r>
-            <a:r>
-              <a:rPr lang="es-ES" sz="1100" dirty="0" err="1"/>
-              <a:t>security</a:t>
-            </a:r>
-            <a:r>
-              <a:rPr lang="es-ES" sz="1100" dirty="0"/>
-              <a:t>: </a:t>
-            </a:r>
-            <a:r>
-              <a:rPr lang="es-ES" sz="1100" dirty="0">
-                <a:hlinkClick r:id="rId9"/>
-              </a:rPr>
-              <a:t>https://dev.to/ravimengar/spring-boot-security-with-oauth-2-0-2emm</a:t>
-            </a:r>
-            <a:endParaRPr lang="es-ES" sz="1100" dirty="0"/>
-          </a:p>
-          <a:p>
-            <a:r>
-              <a:rPr lang="es-ES" sz="1100" dirty="0"/>
-              <a:t>Spring </a:t>
-            </a:r>
-            <a:r>
-              <a:rPr lang="es-ES" sz="1100" dirty="0" err="1"/>
-              <a:t>boot</a:t>
-            </a:r>
-            <a:r>
-              <a:rPr lang="es-ES" sz="1100" dirty="0"/>
-              <a:t>: </a:t>
-            </a:r>
-            <a:r>
-              <a:rPr lang="es-ES" sz="1100" dirty="0">
-                <a:hlinkClick r:id="rId10"/>
-              </a:rPr>
-              <a:t>https://cleventy.com/tutorial-spring-boot/</a:t>
-            </a:r>
-            <a:endParaRPr lang="es-ES" sz="1100" dirty="0"/>
-          </a:p>
-          <a:p>
-            <a:r>
-              <a:rPr lang="es-ES" sz="1100" dirty="0"/>
-              <a:t>Spring MVC: </a:t>
-            </a:r>
-            <a:r>
-              <a:rPr lang="es-ES" sz="1100" dirty="0">
-                <a:hlinkClick r:id="rId11"/>
-              </a:rPr>
-              <a:t>http://www.formadoresit.es/formacion-en-empresas/formacion/cursos-java-madrid/cursos-spring/</a:t>
-            </a:r>
-            <a:endParaRPr lang="es-ES" sz="1100" dirty="0"/>
-          </a:p>
-          <a:p>
-            <a:r>
-              <a:rPr lang="es-ES" sz="1100" dirty="0" err="1"/>
-              <a:t>Thymeleaf</a:t>
-            </a:r>
-            <a:r>
-              <a:rPr lang="es-ES" sz="1100" dirty="0"/>
-              <a:t>: </a:t>
-            </a:r>
-            <a:r>
-              <a:rPr lang="es-ES" sz="1100" dirty="0">
-                <a:hlinkClick r:id="rId12"/>
-              </a:rPr>
-              <a:t>https://www.thymeleaf.org/doc/tutorials/3.0/usingthymeleaf.html</a:t>
-            </a:r>
-            <a:endParaRPr lang="es-ES" sz="1100" dirty="0"/>
-          </a:p>
-          <a:p>
-            <a:r>
-              <a:rPr lang="es-ES" sz="1100" dirty="0" err="1"/>
-              <a:t>Hibernate</a:t>
-            </a:r>
-            <a:r>
-              <a:rPr lang="es-ES" sz="1100" dirty="0"/>
-              <a:t>: </a:t>
-            </a:r>
-            <a:r>
-              <a:rPr lang="es-ES" sz="1100" dirty="0">
-                <a:hlinkClick r:id="rId13"/>
-              </a:rPr>
-              <a:t>https://icon-icons.com/es/icono/hibernate-logotipo/169034</a:t>
-            </a:r>
-            <a:endParaRPr lang="es-ES" sz="1100" dirty="0"/>
-          </a:p>
-          <a:p>
-            <a:r>
-              <a:rPr lang="es-ES" sz="1100" dirty="0"/>
-              <a:t>Tomcat: </a:t>
-            </a:r>
-            <a:r>
-              <a:rPr lang="es-ES" sz="1100" dirty="0">
-                <a:hlinkClick r:id="rId14"/>
-              </a:rPr>
-              <a:t>https://icon-icons.com/es/icono/tomcat-original-la-marca-logotipo/146324</a:t>
-            </a:r>
-            <a:endParaRPr lang="es-ES" sz="1100" dirty="0"/>
-          </a:p>
-          <a:p>
-            <a:r>
-              <a:rPr lang="es-ES" sz="1100" dirty="0" err="1"/>
-              <a:t>Postgresql</a:t>
-            </a:r>
-            <a:r>
-              <a:rPr lang="es-ES" sz="1100" dirty="0"/>
-              <a:t>: </a:t>
-            </a:r>
-            <a:r>
-              <a:rPr lang="es-ES" sz="1100" dirty="0">
-                <a:hlinkClick r:id="rId15"/>
-              </a:rPr>
-              <a:t>https://icon-icons.com/es/icono/postgresql-llano-la-marca-logotipo/146390</a:t>
-            </a:r>
-            <a:endParaRPr lang="es-ES" sz="1100" dirty="0"/>
-          </a:p>
-          <a:p>
-            <a:r>
-              <a:rPr lang="es-ES" sz="1100" dirty="0" err="1"/>
-              <a:t>JavaMail</a:t>
-            </a:r>
-            <a:r>
-              <a:rPr lang="es-ES" sz="1100" dirty="0"/>
-              <a:t>: </a:t>
-            </a:r>
-            <a:r>
-              <a:rPr lang="es-ES" sz="1100" dirty="0">
-                <a:hlinkClick r:id="rId16"/>
-              </a:rPr>
-              <a:t>http://coderzen.blogspot.com/2015/01/javamail-wont-work-authenticationfailed.html</a:t>
-            </a:r>
-            <a:endParaRPr lang="es-ES" sz="1100" dirty="0"/>
-          </a:p>
-          <a:p>
-            <a:r>
-              <a:rPr lang="es-ES" sz="1100" dirty="0"/>
-              <a:t>Gmail: </a:t>
-            </a:r>
-            <a:r>
-              <a:rPr lang="es-ES" sz="1100" dirty="0">
-                <a:hlinkClick r:id="rId17"/>
-              </a:rPr>
-              <a:t>https://www.flaticon.es/icono-gratis/gmail_732200?term=gmail&amp;page=1&amp;position=1&amp;page=1&amp;position=1&amp;related_id=732200&amp;origin=search</a:t>
-            </a:r>
-            <a:endParaRPr lang="es-ES" sz="1100" dirty="0"/>
-          </a:p>
-          <a:p>
-            <a:r>
-              <a:rPr lang="es-ES" sz="1100" dirty="0"/>
-              <a:t>Java: </a:t>
-            </a:r>
-            <a:r>
-              <a:rPr lang="es-ES" sz="1100" dirty="0">
-                <a:hlinkClick r:id="rId18"/>
-              </a:rPr>
-              <a:t>https://www.flaticon.es/icono-gratis/java_226777?term=java&amp;page=1&amp;position=1&amp;page=1&amp;position=1&amp;related_id=226777&amp;origin=search</a:t>
-            </a:r>
-            <a:r>
-              <a:rPr lang="es-ES" sz="1100" dirty="0"/>
-              <a:t> </a:t>
-            </a:r>
-          </a:p>
-          <a:p>
-            <a:r>
-              <a:rPr lang="es-ES" sz="1100" dirty="0"/>
-              <a:t>Sockjs.js: </a:t>
-            </a:r>
-            <a:r>
-              <a:rPr lang="es-ES" sz="1100" dirty="0">
-                <a:hlinkClick r:id="rId19"/>
-              </a:rPr>
-              <a:t>https://github.com/sockjs</a:t>
-            </a:r>
-            <a:r>
-              <a:rPr lang="es-ES" sz="1100" dirty="0"/>
-              <a:t> </a:t>
-            </a:r>
-          </a:p>
-          <a:p>
-            <a:endParaRPr lang="es-ES" sz="1100" dirty="0"/>
-          </a:p>
-          <a:p>
-            <a:endParaRPr lang="es-ES" sz="1100" dirty="0"/>
-          </a:p>
-          <a:p>
-            <a:endParaRPr lang="es-ES" sz="1100" dirty="0"/>
-          </a:p>
-          <a:p>
-            <a:endParaRPr lang="es-ES" sz="1100" dirty="0"/>
-          </a:p>
-          <a:p>
-            <a:endParaRPr lang="es-ES" sz="1100" dirty="0"/>
-          </a:p>
-        </p:txBody>
-      </p:sp>
-    </p:spTree>
-    <p:extLst>
-      <p:ext uri="{BB962C8B-B14F-4D97-AF65-F5344CB8AC3E}">
-        <p14:creationId xmlns:p14="http://schemas.microsoft.com/office/powerpoint/2010/main" val="3274222130"/>
       </p:ext>
     </p:extLst>
   </p:cSld>

</xml_diff>